<commit_message>
Frontend exam reading list replaced with PowerPoint version FrontendStuff_ForExam
</commit_message>
<xml_diff>
--- a/FrontendStuff_ForExam.pptx
+++ b/FrontendStuff_ForExam.pptx
@@ -9156,6 +9156,21 @@
             </a:pPr>
             <a:r>
               <a:rPr lang="en-US" dirty="0"/>
+              <a:t>Each thing of different nature should be in separate location. Like routing in one folder, all ajax actions </a:t>
+            </a:r>
+            <a:r>
+              <a:rPr lang="en-US"/>
+              <a:t>in another.</a:t>
+            </a:r>
+          </a:p>
+          <a:p>
+            <a:pPr>
+              <a:lnSpc>
+                <a:spcPct val="170000"/>
+              </a:lnSpc>
+            </a:pPr>
+            <a:r>
+              <a:rPr lang="en-US" dirty="0"/>
               <a:t>Each feature (done by a sub-team, feature team) is folder, file, and </a:t>
             </a:r>
             <a:r>
@@ -12924,24 +12939,6 @@
 </file>
 
 <file path=customXml/item1.xml><?xml version="1.0" encoding="utf-8"?>
-<p:properties xmlns:p="http://schemas.microsoft.com/office/2006/metadata/properties" xmlns:xsi="http://www.w3.org/2001/XMLSchema-instance" xmlns:pc="http://schemas.microsoft.com/office/infopath/2007/PartnerControls">
-  <documentManagement>
-    <PublishingExpirationDate xmlns="http://schemas.microsoft.com/sharepoint/v3" xsi:nil="true"/>
-    <PublishingStartDate xmlns="http://schemas.microsoft.com/sharepoint/v3" xsi:nil="true"/>
-  </documentManagement>
-</p:properties>
-</file>
-
-<file path=customXml/item2.xml><?xml version="1.0" encoding="utf-8"?>
-<?mso-contentType ?>
-<FormTemplates xmlns="http://schemas.microsoft.com/sharepoint/v3/contenttype/forms">
-  <Display>DocumentLibraryForm</Display>
-  <Edit>DocumentLibraryForm</Edit>
-  <New>DocumentLibraryForm</New>
-</FormTemplates>
-</file>
-
-<file path=customXml/item3.xml><?xml version="1.0" encoding="utf-8"?>
 <ct:contentTypeSchema xmlns:ct="http://schemas.microsoft.com/office/2006/metadata/contentType" xmlns:ma="http://schemas.microsoft.com/office/2006/metadata/properties/metaAttributes" ct:_="" ma:_="" ma:contentTypeName="Document" ma:contentTypeID="0x01010024C55B41993A414DABB8DD07ACBA0814" ma:contentTypeVersion="1" ma:contentTypeDescription="Create a new document." ma:contentTypeScope="" ma:versionID="3ea0c22b5866975a7b271665de4056c5">
   <xsd:schema xmlns:xsd="http://www.w3.org/2001/XMLSchema" xmlns:xs="http://www.w3.org/2001/XMLSchema" xmlns:p="http://schemas.microsoft.com/office/2006/metadata/properties" xmlns:ns1="http://schemas.microsoft.com/sharepoint/v3" targetNamespace="http://schemas.microsoft.com/office/2006/metadata/properties" ma:root="true" ma:fieldsID="ef2aa9ed40e72a78c3822fc753b43e87" ns1:_="">
     <xsd:import namespace="http://schemas.microsoft.com/sharepoint/v3"/>
@@ -13073,31 +13070,25 @@
 </ct:contentTypeSchema>
 </file>
 
-<file path=customXml/itemProps1.xml><?xml version="1.0" encoding="utf-8"?>
-<ds:datastoreItem xmlns:ds="http://schemas.openxmlformats.org/officeDocument/2006/customXml" ds:itemID="{DED4E12E-7268-4B03-A47B-0755D62B5E31}">
-  <ds:schemaRefs>
-    <ds:schemaRef ds:uri="http://schemas.microsoft.com/office/infopath/2007/PartnerControls"/>
-    <ds:schemaRef ds:uri="http://purl.org/dc/elements/1.1/"/>
-    <ds:schemaRef ds:uri="http://schemas.microsoft.com/office/2006/documentManagement/types"/>
-    <ds:schemaRef ds:uri="http://purl.org/dc/dcmitype/"/>
-    <ds:schemaRef ds:uri="http://schemas.microsoft.com/office/2006/metadata/properties"/>
-    <ds:schemaRef ds:uri="http://schemas.openxmlformats.org/package/2006/metadata/core-properties"/>
-    <ds:schemaRef ds:uri="http://schemas.microsoft.com/sharepoint/v3"/>
-    <ds:schemaRef ds:uri="http://www.w3.org/XML/1998/namespace"/>
-    <ds:schemaRef ds:uri="http://purl.org/dc/terms/"/>
-  </ds:schemaRefs>
-</ds:datastoreItem>
+<file path=customXml/item2.xml><?xml version="1.0" encoding="utf-8"?>
+<?mso-contentType ?>
+<FormTemplates xmlns="http://schemas.microsoft.com/sharepoint/v3/contenttype/forms">
+  <Display>DocumentLibraryForm</Display>
+  <Edit>DocumentLibraryForm</Edit>
+  <New>DocumentLibraryForm</New>
+</FormTemplates>
 </file>
 
-<file path=customXml/itemProps2.xml><?xml version="1.0" encoding="utf-8"?>
-<ds:datastoreItem xmlns:ds="http://schemas.openxmlformats.org/officeDocument/2006/customXml" ds:itemID="{D546C03B-CD3A-4EA0-AAA4-0E00E896454E}">
-  <ds:schemaRefs>
-    <ds:schemaRef ds:uri="http://schemas.microsoft.com/sharepoint/v3/contenttype/forms"/>
-  </ds:schemaRefs>
-</ds:datastoreItem>
+<file path=customXml/item3.xml><?xml version="1.0" encoding="utf-8"?>
+<p:properties xmlns:p="http://schemas.microsoft.com/office/2006/metadata/properties" xmlns:xsi="http://www.w3.org/2001/XMLSchema-instance" xmlns:pc="http://schemas.microsoft.com/office/infopath/2007/PartnerControls">
+  <documentManagement>
+    <PublishingExpirationDate xmlns="http://schemas.microsoft.com/sharepoint/v3" xsi:nil="true"/>
+    <PublishingStartDate xmlns="http://schemas.microsoft.com/sharepoint/v3" xsi:nil="true"/>
+  </documentManagement>
+</p:properties>
 </file>
 
-<file path=customXml/itemProps3.xml><?xml version="1.0" encoding="utf-8"?>
+<file path=customXml/itemProps1.xml><?xml version="1.0" encoding="utf-8"?>
 <ds:datastoreItem xmlns:ds="http://schemas.openxmlformats.org/officeDocument/2006/customXml" ds:itemID="{B9E4DC25-62AA-44A0-8D5C-DB44892588AF}">
   <ds:schemaRefs>
     <ds:schemaRef ds:uri="http://schemas.microsoft.com/office/2006/metadata/contentType"/>
@@ -13113,4 +13104,28 @@
     <ds:schemaRef ds:uri="http://schemas.microsoft.com/internal/obd"/>
   </ds:schemaRefs>
 </ds:datastoreItem>
+</file>
+
+<file path=customXml/itemProps2.xml><?xml version="1.0" encoding="utf-8"?>
+<ds:datastoreItem xmlns:ds="http://schemas.openxmlformats.org/officeDocument/2006/customXml" ds:itemID="{D546C03B-CD3A-4EA0-AAA4-0E00E896454E}">
+  <ds:schemaRefs>
+    <ds:schemaRef ds:uri="http://schemas.microsoft.com/sharepoint/v3/contenttype/forms"/>
+  </ds:schemaRefs>
+</ds:datastoreItem>
+</file>
+
+<file path=customXml/itemProps3.xml><?xml version="1.0" encoding="utf-8"?>
+<ds:datastoreItem xmlns:ds="http://schemas.openxmlformats.org/officeDocument/2006/customXml" ds:itemID="{DED4E12E-7268-4B03-A47B-0755D62B5E31}">
+  <ds:schemaRefs>
+    <ds:schemaRef ds:uri="http://schemas.microsoft.com/office/infopath/2007/PartnerControls"/>
+    <ds:schemaRef ds:uri="http://purl.org/dc/elements/1.1/"/>
+    <ds:schemaRef ds:uri="http://schemas.microsoft.com/office/2006/documentManagement/types"/>
+    <ds:schemaRef ds:uri="http://purl.org/dc/dcmitype/"/>
+    <ds:schemaRef ds:uri="http://schemas.microsoft.com/office/2006/metadata/properties"/>
+    <ds:schemaRef ds:uri="http://schemas.openxmlformats.org/package/2006/metadata/core-properties"/>
+    <ds:schemaRef ds:uri="http://schemas.microsoft.com/sharepoint/v3"/>
+    <ds:schemaRef ds:uri="http://www.w3.org/XML/1998/namespace"/>
+    <ds:schemaRef ds:uri="http://purl.org/dc/terms/"/>
+  </ds:schemaRefs>
+</ds:datastoreItem>
 </file>
</xml_diff>

<commit_message>
Latest improvements. Slide 10 Hooks rules promoted to own slide
</commit_message>
<xml_diff>
--- a/FrontendStuff_ForExam.pptx
+++ b/FrontendStuff_ForExam.pptx
@@ -5,7 +5,7 @@
     <p:sldMasterId id="2147483648" r:id="rId4"/>
   </p:sldMasterIdLst>
   <p:notesMasterIdLst>
-    <p:notesMasterId r:id="rId23"/>
+    <p:notesMasterId r:id="rId24"/>
   </p:notesMasterIdLst>
   <p:sldIdLst>
     <p:sldId id="256" r:id="rId5"/>
@@ -17,15 +17,16 @@
     <p:sldId id="262" r:id="rId11"/>
     <p:sldId id="263" r:id="rId12"/>
     <p:sldId id="264" r:id="rId13"/>
-    <p:sldId id="266" r:id="rId14"/>
-    <p:sldId id="265" r:id="rId15"/>
-    <p:sldId id="267" r:id="rId16"/>
-    <p:sldId id="268" r:id="rId17"/>
-    <p:sldId id="269" r:id="rId18"/>
-    <p:sldId id="270" r:id="rId19"/>
-    <p:sldId id="271" r:id="rId20"/>
-    <p:sldId id="273" r:id="rId21"/>
-    <p:sldId id="272" r:id="rId22"/>
+    <p:sldId id="274" r:id="rId14"/>
+    <p:sldId id="266" r:id="rId15"/>
+    <p:sldId id="265" r:id="rId16"/>
+    <p:sldId id="267" r:id="rId17"/>
+    <p:sldId id="268" r:id="rId18"/>
+    <p:sldId id="269" r:id="rId19"/>
+    <p:sldId id="270" r:id="rId20"/>
+    <p:sldId id="271" r:id="rId21"/>
+    <p:sldId id="273" r:id="rId22"/>
+    <p:sldId id="272" r:id="rId23"/>
   </p:sldIdLst>
   <p:sldSz cx="12192000" cy="6858000"/>
   <p:notesSz cx="6858000" cy="9144000"/>
@@ -6893,8 +6894,8 @@
           <a:p>
             <a:pPr lvl="0"/>
             <a:r>
-              <a:rPr lang="en-US" i="1" dirty="0"/>
-              <a:t>How to read this hook code?</a:t>
+              <a:rPr lang="en-US" i="1" u="sng" dirty="0"/>
+              <a:t>General rules of Hooks</a:t>
             </a:r>
             <a:endParaRPr lang="fi-FI" dirty="0"/>
           </a:p>
@@ -6924,188 +6925,40 @@
           <a:lstStyle/>
           <a:p>
             <a:r>
-              <a:rPr lang="en-US" dirty="0"/>
-              <a:t>const some = </a:t>
-            </a:r>
-            <a:r>
-              <a:rPr lang="en-US" dirty="0" err="1"/>
-              <a:t>useCustomX</a:t>
-            </a:r>
-            <a:r>
-              <a:rPr lang="en-US" dirty="0"/>
-              <a:t>( () =&gt; { </a:t>
-            </a:r>
-            <a:r>
-              <a:rPr lang="en-US" dirty="0" err="1"/>
-              <a:t>doSomething</a:t>
-            </a:r>
-            <a:r>
-              <a:rPr lang="en-US" dirty="0"/>
-              <a:t>(</a:t>
-            </a:r>
-            <a:r>
-              <a:rPr lang="en-US" dirty="0" err="1"/>
-              <a:t>kakku</a:t>
-            </a:r>
-            <a:r>
-              <a:rPr lang="en-US" dirty="0"/>
-              <a:t>); </a:t>
-            </a:r>
-            <a:r>
-              <a:rPr lang="en-US" b="1" dirty="0">
-                <a:solidFill>
-                  <a:srgbClr val="C00000"/>
-                </a:solidFill>
+              <a:rPr lang="en-US" i="1" u="sng" dirty="0">
+                <a:hlinkClick r:id="rId2"/>
               </a:rPr>
-              <a:t>return ()=&gt; {</a:t>
-            </a:r>
-            <a:r>
-              <a:rPr lang="en-US" b="1" dirty="0" err="1">
-                <a:solidFill>
-                  <a:srgbClr val="C00000"/>
-                </a:solidFill>
-              </a:rPr>
-              <a:t>doSomeAfterStuff</a:t>
-            </a:r>
-            <a:r>
-              <a:rPr lang="en-US" b="1" dirty="0">
-                <a:solidFill>
-                  <a:srgbClr val="C00000"/>
-                </a:solidFill>
-              </a:rPr>
-              <a:t>();} </a:t>
-            </a:r>
-            <a:r>
-              <a:rPr lang="en-US" dirty="0"/>
-              <a:t>} </a:t>
-            </a:r>
-            <a:r>
-              <a:rPr lang="en-US" dirty="0">
-                <a:solidFill>
-                  <a:srgbClr val="00B050"/>
-                </a:solidFill>
-              </a:rPr>
-              <a:t>,</a:t>
-            </a:r>
-            <a:r>
-              <a:rPr lang="en-US" b="1" dirty="0">
-                <a:solidFill>
-                  <a:srgbClr val="00B050"/>
-                </a:solidFill>
-              </a:rPr>
-              <a:t>[</a:t>
-            </a:r>
-            <a:r>
-              <a:rPr lang="en-US" b="1" dirty="0" err="1">
-                <a:solidFill>
-                  <a:srgbClr val="00B050"/>
-                </a:solidFill>
-              </a:rPr>
-              <a:t>kukka</a:t>
-            </a:r>
-            <a:r>
-              <a:rPr lang="en-US" b="1" dirty="0">
-                <a:solidFill>
-                  <a:srgbClr val="00B050"/>
-                </a:solidFill>
-              </a:rPr>
-              <a:t>]</a:t>
-            </a:r>
-            <a:r>
-              <a:rPr lang="en-US" dirty="0">
-                <a:solidFill>
-                  <a:srgbClr val="00B050"/>
-                </a:solidFill>
-              </a:rPr>
-              <a:t>);</a:t>
-            </a:r>
-            <a:endParaRPr lang="fi-FI" dirty="0">
-              <a:solidFill>
-                <a:srgbClr val="00B050"/>
-              </a:solidFill>
-            </a:endParaRPr>
+              <a:t>https://reactjs.org/docs/hooks-rules.html</a:t>
+            </a:r>
+            <a:r>
+              <a:rPr lang="en-US" i="1" dirty="0"/>
+              <a:t> </a:t>
+            </a:r>
           </a:p>
           <a:p>
             <a:pPr lvl="1"/>
             <a:r>
               <a:rPr lang="en-US" i="1" dirty="0"/>
-              <a:t>Custom hooks too start with lower letter “use”</a:t>
+              <a:t>Name must start with lower letter text “use”</a:t>
             </a:r>
           </a:p>
           <a:p>
             <a:pPr lvl="1"/>
             <a:r>
               <a:rPr lang="en-US" i="1" dirty="0"/>
-              <a:t>Hook </a:t>
-            </a:r>
-            <a:r>
-              <a:rPr lang="en-US" i="1" dirty="0">
-                <a:solidFill>
-                  <a:srgbClr val="00B050"/>
-                </a:solidFill>
-              </a:rPr>
-              <a:t>only fired </a:t>
-            </a:r>
-            <a:r>
-              <a:rPr lang="en-US" b="1" i="1" dirty="0">
-                <a:solidFill>
-                  <a:srgbClr val="00B050"/>
-                </a:solidFill>
-              </a:rPr>
-              <a:t>if </a:t>
-            </a:r>
-            <a:r>
-              <a:rPr lang="en-US" b="1" i="1" dirty="0" err="1">
-                <a:solidFill>
-                  <a:srgbClr val="00B050"/>
-                </a:solidFill>
-              </a:rPr>
-              <a:t>kukka</a:t>
-            </a:r>
-            <a:r>
-              <a:rPr lang="en-US" b="1" i="1" dirty="0">
-                <a:solidFill>
-                  <a:srgbClr val="00B050"/>
-                </a:solidFill>
-              </a:rPr>
-              <a:t> changes</a:t>
-            </a:r>
-            <a:r>
-              <a:rPr lang="en-US" i="1" dirty="0"/>
-              <a:t>! Not if any other prop or state.</a:t>
+              <a:t>Should only be placed/called  in the main level of the react component function</a:t>
             </a:r>
           </a:p>
           <a:p>
             <a:pPr lvl="1"/>
             <a:r>
               <a:rPr lang="en-US" i="1" dirty="0"/>
-              <a:t>After </a:t>
-            </a:r>
-            <a:r>
-              <a:rPr lang="en-US" i="1" dirty="0" err="1"/>
-              <a:t>doSomething</a:t>
-            </a:r>
-            <a:r>
-              <a:rPr lang="en-US" i="1" dirty="0"/>
-              <a:t> is done, the second function, </a:t>
-            </a:r>
-            <a:r>
-              <a:rPr lang="en-US" b="1" i="1" dirty="0">
-                <a:solidFill>
-                  <a:srgbClr val="C00000"/>
-                </a:solidFill>
-              </a:rPr>
-              <a:t>’cleanup function’</a:t>
-            </a:r>
-            <a:r>
-              <a:rPr lang="en-US" i="1" dirty="0"/>
-              <a:t>, is executed, the one that calls </a:t>
-            </a:r>
-            <a:r>
-              <a:rPr lang="en-US" i="1" dirty="0" err="1"/>
-              <a:t>doSomeAfterStuff</a:t>
-            </a:r>
-            <a:endParaRPr lang="fi-FI" i="1" dirty="0"/>
+              <a:t>Only call hooks from react functions (or other hooks), not from your regular JavaScript functions</a:t>
+            </a:r>
+          </a:p>
+          <a:p>
+            <a:pPr lvl="1"/>
+            <a:endParaRPr lang="fi-FI" dirty="0"/>
           </a:p>
           <a:p>
             <a:endParaRPr lang="en-US" i="1" dirty="0"/>
@@ -7201,7 +7054,7 @@
     </p:spTree>
     <p:extLst>
       <p:ext uri="{BB962C8B-B14F-4D97-AF65-F5344CB8AC3E}">
-        <p14:creationId xmlns:p14="http://schemas.microsoft.com/office/powerpoint/2010/main" val="208636089"/>
+        <p14:creationId xmlns:p14="http://schemas.microsoft.com/office/powerpoint/2010/main" val="1739102282"/>
       </p:ext>
     </p:extLst>
   </p:cSld>
@@ -7252,7 +7105,7 @@
             <a:pPr lvl="0"/>
             <a:r>
               <a:rPr lang="en-US" i="1" dirty="0"/>
-              <a:t>Context Hook</a:t>
+              <a:t>How to read this hook code?</a:t>
             </a:r>
             <a:endParaRPr lang="fi-FI" dirty="0"/>
           </a:p>
@@ -7274,250 +7127,211 @@
             <p:ph sz="half" idx="2"/>
           </p:nvPr>
         </p:nvSpPr>
-        <p:spPr>
-          <a:xfrm>
-            <a:off x="550864" y="1306846"/>
-            <a:ext cx="11125198" cy="4606592"/>
-          </a:xfrm>
-        </p:spPr>
+        <p:spPr/>
         <p:txBody>
           <a:bodyPr>
             <a:normAutofit/>
           </a:bodyPr>
           <a:lstStyle/>
           <a:p>
-            <a:pPr lvl="0"/>
-            <a:r>
-              <a:rPr lang="en-US" i="1" dirty="0"/>
-              <a:t>Advanced topic, useful still in our case</a:t>
-            </a:r>
-            <a:endParaRPr lang="fi-FI" dirty="0"/>
-          </a:p>
-          <a:p>
-            <a:r>
-              <a:rPr lang="en-US" i="1" u="sng" dirty="0">
-                <a:hlinkClick r:id="rId2"/>
+            <a:r>
+              <a:rPr lang="en-US" dirty="0"/>
+              <a:t>const some = </a:t>
+            </a:r>
+            <a:r>
+              <a:rPr lang="en-US" dirty="0" err="1"/>
+              <a:t>useCustomX</a:t>
+            </a:r>
+            <a:r>
+              <a:rPr lang="en-US" dirty="0"/>
+              <a:t>( () =&gt; { </a:t>
+            </a:r>
+            <a:r>
+              <a:rPr lang="en-US" dirty="0" err="1"/>
+              <a:t>doSomething</a:t>
+            </a:r>
+            <a:r>
+              <a:rPr lang="en-US" dirty="0"/>
+              <a:t>(</a:t>
+            </a:r>
+            <a:r>
+              <a:rPr lang="en-US" dirty="0" err="1"/>
+              <a:t>kakku</a:t>
+            </a:r>
+            <a:r>
+              <a:rPr lang="en-US" dirty="0"/>
+              <a:t>); </a:t>
+            </a:r>
+            <a:r>
+              <a:rPr lang="en-US" b="1" dirty="0">
+                <a:solidFill>
+                  <a:srgbClr val="C00000"/>
+                </a:solidFill>
               </a:rPr>
-              <a:t>https://reactjs.org/docs/hooks-reference.html#usecontext</a:t>
-            </a:r>
-            <a:r>
-              <a:rPr lang="en-US" i="1" dirty="0"/>
-              <a:t> </a:t>
-            </a:r>
-          </a:p>
-          <a:p>
-            <a:r>
-              <a:rPr lang="en-US" i="1" dirty="0">
-                <a:hlinkClick r:id="rId3"/>
+              <a:t>return ()=&gt; {</a:t>
+            </a:r>
+            <a:r>
+              <a:rPr lang="en-US" b="1" dirty="0" err="1">
+                <a:solidFill>
+                  <a:srgbClr val="C00000"/>
+                </a:solidFill>
               </a:rPr>
-              <a:t>https://reactjs.org/docs/context.html#when-to-use-context</a:t>
-            </a:r>
-            <a:br>
-              <a:rPr lang="en-US" i="1" dirty="0"/>
-            </a:br>
-            <a:endParaRPr lang="en-US" i="1" dirty="0"/>
-          </a:p>
-          <a:p>
-            <a:r>
-              <a:rPr lang="en-US" i="1" u="sng" dirty="0">
-                <a:hlinkClick r:id="rId4"/>
+              <a:t>doSomeAfterStuff</a:t>
+            </a:r>
+            <a:r>
+              <a:rPr lang="en-US" b="1" dirty="0">
+                <a:solidFill>
+                  <a:srgbClr val="C00000"/>
+                </a:solidFill>
               </a:rPr>
-              <a:t>https://www.youtube.com/watch?v=lhMKvyLRWo0</a:t>
-            </a:r>
-            <a:r>
-              <a:rPr lang="en-US" i="1" dirty="0"/>
-              <a:t> </a:t>
-            </a:r>
-          </a:p>
-          <a:p>
-            <a:pPr marL="0" indent="0">
-              <a:buNone/>
-            </a:pPr>
-            <a:br>
-              <a:rPr lang="en-US" i="1" dirty="0"/>
-            </a:br>
-            <a:r>
-              <a:rPr lang="en-US" i="1" dirty="0"/>
-              <a:t>BTW. What happens here? From video above</a:t>
-            </a:r>
-          </a:p>
-          <a:p>
-            <a:pPr marL="504000" lvl="1" indent="0">
-              <a:buNone/>
-            </a:pPr>
+              <a:t>();} </a:t>
+            </a:r>
+            <a:r>
+              <a:rPr lang="en-US" dirty="0"/>
+              <a:t>} </a:t>
+            </a:r>
             <a:r>
               <a:rPr lang="en-US" dirty="0">
-                <a:latin typeface="Consolas" panose="020B0609020204030204" pitchFamily="49" charset="0"/>
+                <a:solidFill>
+                  <a:srgbClr val="00B050"/>
+                </a:solidFill>
               </a:rPr>
-              <a:t>string </a:t>
-            </a:r>
-            <a:r>
-              <a:rPr lang="en-US" dirty="0" err="1">
-                <a:latin typeface="Consolas" panose="020B0609020204030204" pitchFamily="49" charset="0"/>
+              <a:t>,</a:t>
+            </a:r>
+            <a:r>
+              <a:rPr lang="en-US" b="1" dirty="0">
+                <a:solidFill>
+                  <a:srgbClr val="00B050"/>
+                </a:solidFill>
               </a:rPr>
-              <a:t>jsonText</a:t>
+              <a:t>[</a:t>
+            </a:r>
+            <a:r>
+              <a:rPr lang="en-US" b="1" dirty="0" err="1">
+                <a:solidFill>
+                  <a:srgbClr val="00B050"/>
+                </a:solidFill>
+              </a:rPr>
+              <a:t>kukka</a:t>
+            </a:r>
+            <a:r>
+              <a:rPr lang="en-US" b="1" dirty="0">
+                <a:solidFill>
+                  <a:srgbClr val="00B050"/>
+                </a:solidFill>
+              </a:rPr>
+              <a:t>]</a:t>
             </a:r>
             <a:r>
               <a:rPr lang="en-US" dirty="0">
-                <a:latin typeface="Consolas" panose="020B0609020204030204" pitchFamily="49" charset="0"/>
+                <a:solidFill>
+                  <a:srgbClr val="00B050"/>
+                </a:solidFill>
               </a:rPr>
-              <a:t> = </a:t>
-            </a:r>
-            <a:r>
-              <a:rPr lang="en-US" dirty="0" err="1">
-                <a:latin typeface="Consolas" panose="020B0609020204030204" pitchFamily="49" charset="0"/>
-              </a:rPr>
-              <a:t>JSON.stringify</a:t>
-            </a:r>
-            <a:r>
-              <a:rPr lang="en-US" dirty="0">
-                <a:latin typeface="Consolas" panose="020B0609020204030204" pitchFamily="49" charset="0"/>
-              </a:rPr>
-              <a:t>(</a:t>
-            </a:r>
-            <a:r>
-              <a:rPr lang="en-US" dirty="0" err="1">
-                <a:latin typeface="Consolas" panose="020B0609020204030204" pitchFamily="49" charset="0"/>
-              </a:rPr>
-              <a:t>myJSObject</a:t>
-            </a:r>
-            <a:r>
-              <a:rPr lang="en-US" dirty="0">
-                <a:latin typeface="Consolas" panose="020B0609020204030204" pitchFamily="49" charset="0"/>
-              </a:rPr>
-              <a:t>, </a:t>
+              <a:t>);</a:t>
+            </a:r>
+            <a:endParaRPr lang="fi-FI" dirty="0">
+              <a:solidFill>
+                <a:srgbClr val="00B050"/>
+              </a:solidFill>
+            </a:endParaRPr>
+          </a:p>
+          <a:p>
+            <a:pPr lvl="1"/>
+            <a:r>
+              <a:rPr lang="en-US" i="1" dirty="0"/>
+              <a:t>Custom hooks too start with lower letter “use”</a:t>
+            </a:r>
+          </a:p>
+          <a:p>
+            <a:pPr lvl="1"/>
+            <a:r>
+              <a:rPr lang="en-US" i="1" dirty="0"/>
+              <a:t>Hook </a:t>
             </a:r>
             <a:r>
               <a:rPr lang="en-US" i="1" dirty="0">
                 <a:solidFill>
-                  <a:schemeClr val="accent1">
-                    <a:lumMod val="60000"/>
-                    <a:lumOff val="40000"/>
-                  </a:schemeClr>
-                </a:solidFill>
-                <a:latin typeface="Consolas" panose="020B0609020204030204" pitchFamily="49" charset="0"/>
-              </a:rPr>
-              <a:t>null</a:t>
-            </a:r>
-            <a:r>
-              <a:rPr lang="en-US" dirty="0">
-                <a:latin typeface="Consolas" panose="020B0609020204030204" pitchFamily="49" charset="0"/>
-              </a:rPr>
-              <a:t>, </a:t>
-            </a:r>
-            <a:r>
-              <a:rPr lang="en-US" b="1" dirty="0">
-                <a:solidFill>
-                  <a:srgbClr val="FF0000"/>
-                </a:solidFill>
-                <a:latin typeface="Consolas" panose="020B0609020204030204" pitchFamily="49" charset="0"/>
-              </a:rPr>
-              <a:t>2</a:t>
-            </a:r>
-            <a:r>
-              <a:rPr lang="en-US" dirty="0">
-                <a:latin typeface="Consolas" panose="020B0609020204030204" pitchFamily="49" charset="0"/>
-              </a:rPr>
-              <a:t>);</a:t>
-            </a:r>
-            <a:endParaRPr lang="fi-FI" dirty="0">
-              <a:latin typeface="Consolas" panose="020B0609020204030204" pitchFamily="49" charset="0"/>
-            </a:endParaRPr>
-          </a:p>
-          <a:p>
-            <a:r>
-              <a:rPr lang="en-US" dirty="0"/>
-              <a:t>Explanation found if you look at the documentation, here with my longer parameter names though:</a:t>
-            </a:r>
-          </a:p>
-          <a:p>
-            <a:pPr marL="504000" lvl="1" indent="0">
-              <a:buNone/>
-            </a:pPr>
-            <a:r>
-              <a:rPr lang="en-US" dirty="0" err="1"/>
-              <a:t>JSON.stringify</a:t>
-            </a:r>
-            <a:r>
-              <a:rPr lang="en-US" dirty="0"/>
-              <a:t>(</a:t>
-            </a:r>
-            <a:r>
-              <a:rPr lang="en-US" dirty="0" err="1"/>
-              <a:t>object_to_be_stringified_as_JSON</a:t>
-            </a:r>
-            <a:r>
-              <a:rPr lang="en-US" b="1" dirty="0"/>
-              <a:t>,</a:t>
-            </a:r>
-            <a:r>
-              <a:rPr lang="en-US" dirty="0"/>
-              <a:t> </a:t>
-            </a:r>
-            <a:br>
-              <a:rPr lang="en-US" dirty="0"/>
-            </a:br>
-            <a:r>
-              <a:rPr lang="en-US" dirty="0"/>
-              <a:t>		   </a:t>
-            </a:r>
-            <a:r>
-              <a:rPr lang="en-US" i="1" dirty="0">
-                <a:solidFill>
-                  <a:schemeClr val="accent1">
-                    <a:lumMod val="60000"/>
-                    <a:lumOff val="40000"/>
-                  </a:schemeClr>
+                  <a:srgbClr val="00B050"/>
                 </a:solidFill>
               </a:rPr>
-              <a:t>null_as_no_replacer_function_needed_here_but_still_needs_something_as_second_param</a:t>
-            </a:r>
-            <a:r>
-              <a:rPr lang="en-US" b="1" dirty="0"/>
-              <a:t>,</a:t>
-            </a:r>
-            <a:r>
-              <a:rPr lang="en-US" dirty="0"/>
-              <a:t>  </a:t>
-            </a:r>
-            <a:br>
-              <a:rPr lang="en-US" dirty="0"/>
-            </a:br>
-            <a:r>
-              <a:rPr lang="en-US" dirty="0"/>
-              <a:t>                                                              </a:t>
-            </a:r>
-            <a:r>
-              <a:rPr lang="en-US" b="1" dirty="0" err="1">
+              <a:t>only fired </a:t>
+            </a:r>
+            <a:r>
+              <a:rPr lang="en-US" b="1" i="1" dirty="0">
                 <a:solidFill>
-                  <a:srgbClr val="FF0000"/>
+                  <a:srgbClr val="00B050"/>
                 </a:solidFill>
               </a:rPr>
-              <a:t>white_space_has_to_be_the_</a:t>
-            </a:r>
-            <a:r>
-              <a:rPr lang="en-US" b="1" i="1" u="sng" dirty="0" err="1">
+              <a:t>if </a:t>
+            </a:r>
+            <a:r>
+              <a:rPr lang="en-US" b="1" i="1" dirty="0" err="1">
                 <a:solidFill>
-                  <a:srgbClr val="FF0000"/>
+                  <a:srgbClr val="00B050"/>
                 </a:solidFill>
               </a:rPr>
-              <a:t>third</a:t>
-            </a:r>
-            <a:r>
-              <a:rPr lang="en-US" b="1" dirty="0" err="1">
+              <a:t>kukka</a:t>
+            </a:r>
+            <a:r>
+              <a:rPr lang="en-US" b="1" i="1" dirty="0">
                 <a:solidFill>
-                  <a:srgbClr val="FF0000"/>
+                  <a:srgbClr val="00B050"/>
                 </a:solidFill>
               </a:rPr>
-              <a:t>_parameter</a:t>
-            </a:r>
-            <a:r>
-              <a:rPr lang="en-US" dirty="0"/>
-              <a:t> )        </a:t>
-            </a:r>
-            <a:br>
-              <a:rPr lang="en-US" i="1" dirty="0"/>
-            </a:br>
+              <a:t> changes</a:t>
+            </a:r>
+            <a:r>
+              <a:rPr lang="en-US" i="1" dirty="0"/>
+              <a:t>! Not if any other prop or state changes, like e.g. </a:t>
+            </a:r>
+            <a:r>
+              <a:rPr lang="en-US" i="1" dirty="0" err="1"/>
+              <a:t>useEffect</a:t>
+            </a:r>
+            <a:r>
+              <a:rPr lang="en-US" i="1" dirty="0"/>
+              <a:t> does </a:t>
+            </a:r>
+            <a:r>
+              <a:rPr lang="en-US" i="1"/>
+              <a:t>by default.</a:t>
+            </a:r>
+            <a:endParaRPr lang="en-US" i="1" dirty="0"/>
+          </a:p>
+          <a:p>
+            <a:pPr lvl="1"/>
+            <a:r>
+              <a:rPr lang="en-US" i="1" dirty="0"/>
+              <a:t>After </a:t>
+            </a:r>
+            <a:r>
+              <a:rPr lang="en-US" i="1" dirty="0" err="1"/>
+              <a:t>doSomething</a:t>
+            </a:r>
+            <a:r>
+              <a:rPr lang="en-US" i="1" dirty="0"/>
+              <a:t> is done, the second function, </a:t>
+            </a:r>
+            <a:r>
+              <a:rPr lang="en-US" b="1" i="1" dirty="0">
+                <a:solidFill>
+                  <a:srgbClr val="C00000"/>
+                </a:solidFill>
+              </a:rPr>
+              <a:t>’cleanup function’</a:t>
+            </a:r>
+            <a:r>
+              <a:rPr lang="en-US" i="1" dirty="0"/>
+              <a:t>, is executed, the one that calls </a:t>
+            </a:r>
+            <a:r>
+              <a:rPr lang="en-US" i="1" dirty="0" err="1"/>
+              <a:t>doSomeAfterStuff</a:t>
+            </a:r>
+            <a:endParaRPr lang="fi-FI" i="1" dirty="0"/>
+          </a:p>
+          <a:p>
             <a:endParaRPr lang="en-US" i="1" dirty="0"/>
           </a:p>
           <a:p>
@@ -7611,7 +7425,7 @@
     </p:spTree>
     <p:extLst>
       <p:ext uri="{BB962C8B-B14F-4D97-AF65-F5344CB8AC3E}">
-        <p14:creationId xmlns:p14="http://schemas.microsoft.com/office/powerpoint/2010/main" val="3898430019"/>
+        <p14:creationId xmlns:p14="http://schemas.microsoft.com/office/powerpoint/2010/main" val="208636089"/>
       </p:ext>
     </p:extLst>
   </p:cSld>
@@ -7662,7 +7476,7 @@
             <a:pPr lvl="0"/>
             <a:r>
               <a:rPr lang="en-US" i="1" dirty="0"/>
-              <a:t>Custom Hooks (a bit Advanced topic)</a:t>
+              <a:t>Context Hook</a:t>
             </a:r>
             <a:endParaRPr lang="fi-FI" dirty="0"/>
           </a:p>
@@ -7684,55 +7498,250 @@
             <p:ph sz="half" idx="2"/>
           </p:nvPr>
         </p:nvSpPr>
-        <p:spPr/>
+        <p:spPr>
+          <a:xfrm>
+            <a:off x="550864" y="1306846"/>
+            <a:ext cx="11125198" cy="4606592"/>
+          </a:xfrm>
+        </p:spPr>
         <p:txBody>
           <a:bodyPr>
             <a:normAutofit/>
           </a:bodyPr>
           <a:lstStyle/>
           <a:p>
+            <a:pPr lvl="0"/>
+            <a:r>
+              <a:rPr lang="en-US" i="1" dirty="0"/>
+              <a:t>Advanced topic, useful still in our case</a:t>
+            </a:r>
+            <a:endParaRPr lang="fi-FI" dirty="0"/>
+          </a:p>
+          <a:p>
             <a:r>
               <a:rPr lang="en-US" i="1" u="sng" dirty="0">
                 <a:hlinkClick r:id="rId2"/>
               </a:rPr>
-              <a:t>https://reactjs.org/docs/hooks-custom.html</a:t>
+              <a:t>https://reactjs.org/docs/hooks-reference.html#usecontext</a:t>
             </a:r>
             <a:r>
               <a:rPr lang="en-US" i="1" dirty="0"/>
               <a:t> </a:t>
             </a:r>
-            <a:endParaRPr lang="fi-FI" dirty="0"/>
-          </a:p>
-          <a:p>
-            <a:r>
-              <a:rPr lang="en-US" i="1" dirty="0"/>
-              <a:t>- custom hooks,   like the ones in the second video:    </a:t>
-            </a:r>
-            <a:endParaRPr lang="fi-FI" dirty="0"/>
-          </a:p>
-          <a:p>
-            <a:r>
-              <a:rPr lang="en-US" i="1" dirty="0"/>
-              <a:t>   </a:t>
-            </a:r>
-            <a:r>
-              <a:rPr lang="en-US" i="1" dirty="0" err="1"/>
-              <a:t>useWindowWidth</a:t>
-            </a:r>
-            <a:endParaRPr lang="fi-FI" dirty="0"/>
-          </a:p>
-          <a:p>
-            <a:r>
-              <a:rPr lang="en-US" i="1" dirty="0"/>
-              <a:t>   </a:t>
-            </a:r>
-            <a:r>
-              <a:rPr lang="en-US" i="1" dirty="0" err="1"/>
-              <a:t>useDocumentTitle</a:t>
-            </a:r>
-            <a:endParaRPr lang="fi-FI" dirty="0"/>
-          </a:p>
-          <a:p>
+          </a:p>
+          <a:p>
+            <a:r>
+              <a:rPr lang="en-US" i="1" dirty="0">
+                <a:hlinkClick r:id="rId3"/>
+              </a:rPr>
+              <a:t>https://reactjs.org/docs/context.html#when-to-use-context</a:t>
+            </a:r>
+            <a:br>
+              <a:rPr lang="en-US" i="1" dirty="0"/>
+            </a:br>
+            <a:endParaRPr lang="en-US" i="1" dirty="0"/>
+          </a:p>
+          <a:p>
+            <a:r>
+              <a:rPr lang="en-US" i="1" u="sng" dirty="0">
+                <a:hlinkClick r:id="rId4"/>
+              </a:rPr>
+              <a:t>https://www.youtube.com/watch?v=lhMKvyLRWo0</a:t>
+            </a:r>
+            <a:r>
+              <a:rPr lang="en-US" i="1" dirty="0"/>
+              <a:t> </a:t>
+            </a:r>
+          </a:p>
+          <a:p>
+            <a:pPr marL="0" indent="0">
+              <a:buNone/>
+            </a:pPr>
+            <a:br>
+              <a:rPr lang="en-US" i="1" dirty="0"/>
+            </a:br>
+            <a:r>
+              <a:rPr lang="en-US" i="1" dirty="0"/>
+              <a:t>BTW. What happens here? From video above</a:t>
+            </a:r>
+          </a:p>
+          <a:p>
+            <a:pPr marL="504000" lvl="1" indent="0">
+              <a:buNone/>
+            </a:pPr>
+            <a:r>
+              <a:rPr lang="en-US" dirty="0">
+                <a:latin typeface="Consolas" panose="020B0609020204030204" pitchFamily="49" charset="0"/>
+              </a:rPr>
+              <a:t>string </a:t>
+            </a:r>
+            <a:r>
+              <a:rPr lang="en-US" dirty="0" err="1">
+                <a:latin typeface="Consolas" panose="020B0609020204030204" pitchFamily="49" charset="0"/>
+              </a:rPr>
+              <a:t>jsonText</a:t>
+            </a:r>
+            <a:r>
+              <a:rPr lang="en-US" dirty="0">
+                <a:latin typeface="Consolas" panose="020B0609020204030204" pitchFamily="49" charset="0"/>
+              </a:rPr>
+              <a:t> = </a:t>
+            </a:r>
+            <a:r>
+              <a:rPr lang="en-US" dirty="0" err="1">
+                <a:latin typeface="Consolas" panose="020B0609020204030204" pitchFamily="49" charset="0"/>
+              </a:rPr>
+              <a:t>JSON.stringify</a:t>
+            </a:r>
+            <a:r>
+              <a:rPr lang="en-US" dirty="0">
+                <a:latin typeface="Consolas" panose="020B0609020204030204" pitchFamily="49" charset="0"/>
+              </a:rPr>
+              <a:t>(</a:t>
+            </a:r>
+            <a:r>
+              <a:rPr lang="en-US" dirty="0" err="1">
+                <a:latin typeface="Consolas" panose="020B0609020204030204" pitchFamily="49" charset="0"/>
+              </a:rPr>
+              <a:t>myJSObject</a:t>
+            </a:r>
+            <a:r>
+              <a:rPr lang="en-US" dirty="0">
+                <a:latin typeface="Consolas" panose="020B0609020204030204" pitchFamily="49" charset="0"/>
+              </a:rPr>
+              <a:t>, </a:t>
+            </a:r>
+            <a:r>
+              <a:rPr lang="en-US" i="1" dirty="0">
+                <a:solidFill>
+                  <a:schemeClr val="accent1">
+                    <a:lumMod val="60000"/>
+                    <a:lumOff val="40000"/>
+                  </a:schemeClr>
+                </a:solidFill>
+                <a:latin typeface="Consolas" panose="020B0609020204030204" pitchFamily="49" charset="0"/>
+              </a:rPr>
+              <a:t>null</a:t>
+            </a:r>
+            <a:r>
+              <a:rPr lang="en-US" dirty="0">
+                <a:latin typeface="Consolas" panose="020B0609020204030204" pitchFamily="49" charset="0"/>
+              </a:rPr>
+              <a:t>, </a:t>
+            </a:r>
+            <a:r>
+              <a:rPr lang="en-US" b="1" dirty="0">
+                <a:solidFill>
+                  <a:srgbClr val="FF0000"/>
+                </a:solidFill>
+                <a:latin typeface="Consolas" panose="020B0609020204030204" pitchFamily="49" charset="0"/>
+              </a:rPr>
+              <a:t>2</a:t>
+            </a:r>
+            <a:r>
+              <a:rPr lang="en-US" dirty="0">
+                <a:latin typeface="Consolas" panose="020B0609020204030204" pitchFamily="49" charset="0"/>
+              </a:rPr>
+              <a:t>);</a:t>
+            </a:r>
+            <a:endParaRPr lang="fi-FI" dirty="0">
+              <a:latin typeface="Consolas" panose="020B0609020204030204" pitchFamily="49" charset="0"/>
+            </a:endParaRPr>
+          </a:p>
+          <a:p>
+            <a:r>
+              <a:rPr lang="en-US" dirty="0"/>
+              <a:t>Explanation found if you look at the documentation, here with my longer parameter names though:</a:t>
+            </a:r>
+          </a:p>
+          <a:p>
+            <a:pPr marL="504000" lvl="1" indent="0">
+              <a:buNone/>
+            </a:pPr>
+            <a:r>
+              <a:rPr lang="en-US" dirty="0" err="1"/>
+              <a:t>JSON.stringify</a:t>
+            </a:r>
+            <a:r>
+              <a:rPr lang="en-US" dirty="0"/>
+              <a:t>(</a:t>
+            </a:r>
+            <a:r>
+              <a:rPr lang="en-US" dirty="0" err="1"/>
+              <a:t>object_to_be_stringified_as_JSON</a:t>
+            </a:r>
+            <a:r>
+              <a:rPr lang="en-US" b="1" dirty="0"/>
+              <a:t>,</a:t>
+            </a:r>
+            <a:r>
+              <a:rPr lang="en-US" dirty="0"/>
+              <a:t> </a:t>
+            </a:r>
+            <a:br>
+              <a:rPr lang="en-US" dirty="0"/>
+            </a:br>
+            <a:r>
+              <a:rPr lang="en-US" dirty="0"/>
+              <a:t>		   </a:t>
+            </a:r>
+            <a:r>
+              <a:rPr lang="en-US" i="1" dirty="0">
+                <a:solidFill>
+                  <a:schemeClr val="accent1">
+                    <a:lumMod val="60000"/>
+                    <a:lumOff val="40000"/>
+                  </a:schemeClr>
+                </a:solidFill>
+              </a:rPr>
+              <a:t>null_as_no_replacer_function_needed_here_but_still_needs_something_as_second_param</a:t>
+            </a:r>
+            <a:r>
+              <a:rPr lang="en-US" b="1" dirty="0"/>
+              <a:t>,</a:t>
+            </a:r>
+            <a:r>
+              <a:rPr lang="en-US" dirty="0"/>
+              <a:t>  </a:t>
+            </a:r>
+            <a:br>
+              <a:rPr lang="en-US" dirty="0"/>
+            </a:br>
+            <a:r>
+              <a:rPr lang="en-US" dirty="0"/>
+              <a:t>                                                              </a:t>
+            </a:r>
+            <a:r>
+              <a:rPr lang="en-US" b="1" dirty="0" err="1">
+                <a:solidFill>
+                  <a:srgbClr val="FF0000"/>
+                </a:solidFill>
+              </a:rPr>
+              <a:t>white_space_has_to_be_the_</a:t>
+            </a:r>
+            <a:r>
+              <a:rPr lang="en-US" b="1" i="1" u="sng" dirty="0" err="1">
+                <a:solidFill>
+                  <a:srgbClr val="FF0000"/>
+                </a:solidFill>
+              </a:rPr>
+              <a:t>third</a:t>
+            </a:r>
+            <a:r>
+              <a:rPr lang="en-US" b="1" dirty="0" err="1">
+                <a:solidFill>
+                  <a:srgbClr val="FF0000"/>
+                </a:solidFill>
+              </a:rPr>
+              <a:t>_parameter</a:t>
+            </a:r>
+            <a:r>
+              <a:rPr lang="en-US" dirty="0"/>
+              <a:t> )        </a:t>
+            </a:r>
+            <a:br>
+              <a:rPr lang="en-US" i="1" dirty="0"/>
+            </a:br>
             <a:endParaRPr lang="en-US" i="1" dirty="0"/>
           </a:p>
           <a:p>
@@ -7826,7 +7835,7 @@
     </p:spTree>
     <p:extLst>
       <p:ext uri="{BB962C8B-B14F-4D97-AF65-F5344CB8AC3E}">
-        <p14:creationId xmlns:p14="http://schemas.microsoft.com/office/powerpoint/2010/main" val="252544298"/>
+        <p14:creationId xmlns:p14="http://schemas.microsoft.com/office/powerpoint/2010/main" val="3898430019"/>
       </p:ext>
     </p:extLst>
   </p:cSld>
@@ -7876,8 +7885,8 @@
           <a:p>
             <a:pPr lvl="0"/>
             <a:r>
-              <a:rPr lang="en-US" dirty="0"/>
-              <a:t>create-react-app – “CRA”</a:t>
+              <a:rPr lang="en-US" i="1" dirty="0"/>
+              <a:t>Custom Hooks (a bit Advanced topic)</a:t>
             </a:r>
             <a:endParaRPr lang="fi-FI" dirty="0"/>
           </a:p>
@@ -7907,120 +7916,47 @@
           <a:lstStyle/>
           <a:p>
             <a:r>
-              <a:rPr lang="en-US" b="1" dirty="0"/>
-              <a:t>The tool for downloading and setting up the React dev project environment</a:t>
-            </a:r>
-          </a:p>
-          <a:p>
-            <a:r>
-              <a:rPr lang="en-US" dirty="0"/>
-              <a:t>Basic understanding needed</a:t>
-            </a:r>
-          </a:p>
-          <a:p>
-            <a:r>
-              <a:rPr lang="en-US" i="1" dirty="0"/>
-              <a:t>What kind of project create-react-app creates? (</a:t>
+              <a:rPr lang="en-US" i="1" u="sng" dirty="0">
+                <a:hlinkClick r:id="rId2"/>
+              </a:rPr>
+              <a:t>https://reactjs.org/docs/hooks-custom.html</a:t>
+            </a:r>
+            <a:r>
+              <a:rPr lang="en-US" i="1" dirty="0"/>
+              <a:t> </a:t>
+            </a:r>
+            <a:endParaRPr lang="fi-FI" dirty="0"/>
+          </a:p>
+          <a:p>
+            <a:r>
+              <a:rPr lang="en-US" i="1" dirty="0"/>
+              <a:t>- custom hooks,   like the ones in the second video:    </a:t>
+            </a:r>
+            <a:endParaRPr lang="fi-FI" dirty="0"/>
+          </a:p>
+          <a:p>
+            <a:r>
+              <a:rPr lang="en-US" i="1" dirty="0"/>
+              <a:t>   </a:t>
             </a:r>
             <a:r>
               <a:rPr lang="en-US" i="1" dirty="0" err="1"/>
-              <a:t>npm</a:t>
-            </a:r>
-            <a:r>
-              <a:rPr lang="en-US" i="1" dirty="0"/>
-              <a:t> start =&gt; dev time environment with Node server, </a:t>
+              <a:t>useWindowWidth</a:t>
+            </a:r>
+            <a:endParaRPr lang="fi-FI" dirty="0"/>
+          </a:p>
+          <a:p>
+            <a:r>
+              <a:rPr lang="en-US" i="1" dirty="0"/>
+              <a:t>   </a:t>
             </a:r>
             <a:r>
               <a:rPr lang="en-US" i="1" dirty="0" err="1"/>
-              <a:t>webpackage</a:t>
-            </a:r>
-            <a:r>
-              <a:rPr lang="en-US" i="1" dirty="0"/>
-              <a:t>/</a:t>
-            </a:r>
-            <a:r>
-              <a:rPr lang="en-US" i="1" dirty="0" err="1"/>
-              <a:t>nodemon</a:t>
-            </a:r>
-            <a:r>
-              <a:rPr lang="en-US" i="1" dirty="0"/>
-              <a:t> (and e.g. React Dev tools) starts)</a:t>
+              <a:t>useDocumentTitle</a:t>
             </a:r>
             <a:endParaRPr lang="fi-FI" dirty="0"/>
           </a:p>
           <a:p>
-            <a:r>
-              <a:rPr lang="en-US" i="1" dirty="0"/>
-              <a:t>What's the relationship with the /public/index.html and the React app? How the React app starts and builds up the page? index.js | index.html + App.js | and so on.</a:t>
-            </a:r>
-            <a:endParaRPr lang="fi-FI" dirty="0"/>
-          </a:p>
-          <a:p>
-            <a:r>
-              <a:rPr lang="en-US" i="1" dirty="0"/>
-              <a:t>How is the dev environment related to the build version = when published and put to 'production environment’?  </a:t>
-            </a:r>
-            <a:endParaRPr lang="fi-FI" dirty="0"/>
-          </a:p>
-          <a:p>
-            <a:pPr lvl="1"/>
-            <a:r>
-              <a:rPr lang="en-US" i="1" dirty="0" err="1"/>
-              <a:t>npm</a:t>
-            </a:r>
-            <a:r>
-              <a:rPr lang="en-US" i="1" dirty="0"/>
-              <a:t> build =&gt;  /build folder with only few mashed up .html and .</a:t>
-            </a:r>
-            <a:r>
-              <a:rPr lang="en-US" i="1" dirty="0" err="1"/>
-              <a:t>js</a:t>
-            </a:r>
-            <a:r>
-              <a:rPr lang="en-US" i="1" dirty="0"/>
-              <a:t> (and needed .</a:t>
-            </a:r>
-            <a:r>
-              <a:rPr lang="en-US" i="1" dirty="0" err="1"/>
-              <a:t>css</a:t>
-            </a:r>
-            <a:r>
-              <a:rPr lang="en-US" i="1" dirty="0"/>
-              <a:t> plus other static files),  </a:t>
-            </a:r>
-          </a:p>
-          <a:p>
-            <a:pPr lvl="1"/>
-            <a:r>
-              <a:rPr lang="en-US" i="1" dirty="0"/>
-              <a:t>no Node anymore, no ES5,6,7,8, no </a:t>
-            </a:r>
-            <a:r>
-              <a:rPr lang="en-US" i="1" dirty="0" err="1"/>
-              <a:t>node_modules</a:t>
-            </a:r>
-            <a:r>
-              <a:rPr lang="en-US" i="1" dirty="0"/>
-              <a:t>, just browser runnable ‘DOM API’ JS + html + </a:t>
-            </a:r>
-            <a:r>
-              <a:rPr lang="en-US" i="1" dirty="0" err="1"/>
-              <a:t>css</a:t>
-            </a:r>
-            <a:r>
-              <a:rPr lang="en-US" i="1" dirty="0"/>
-              <a:t> + …, </a:t>
-            </a:r>
-          </a:p>
-          <a:p>
-            <a:pPr lvl="1"/>
-            <a:r>
-              <a:rPr lang="en-US" i="1" dirty="0"/>
-              <a:t>served to the client's web browser by even a static web server, from www ports like 80/443 or so</a:t>
-            </a:r>
-            <a:br>
-              <a:rPr lang="en-US" i="1" dirty="0"/>
-            </a:br>
             <a:endParaRPr lang="en-US" i="1" dirty="0"/>
           </a:p>
           <a:p>
@@ -8114,7 +8050,7 @@
     </p:spTree>
     <p:extLst>
       <p:ext uri="{BB962C8B-B14F-4D97-AF65-F5344CB8AC3E}">
-        <p14:creationId xmlns:p14="http://schemas.microsoft.com/office/powerpoint/2010/main" val="727035588"/>
+        <p14:creationId xmlns:p14="http://schemas.microsoft.com/office/powerpoint/2010/main" val="252544298"/>
       </p:ext>
     </p:extLst>
   </p:cSld>
@@ -8165,7 +8101,7 @@
             <a:pPr lvl="0"/>
             <a:r>
               <a:rPr lang="en-US" dirty="0"/>
-              <a:t>SPA = Single-Page Application</a:t>
+              <a:t>create-react-app – “CRA”</a:t>
             </a:r>
             <a:endParaRPr lang="fi-FI" dirty="0"/>
           </a:p>
@@ -8195,67 +8131,121 @@
           <a:lstStyle/>
           <a:p>
             <a:r>
-              <a:rPr lang="en-US" i="1" dirty="0"/>
-              <a:t>Only one web page downloaded from the Web Server, but then with JS &amp; AJAX that single page’s DOM updated constantly. Showing/hiding certain Views so that it looks like we would have several Pages</a:t>
+              <a:rPr lang="en-US" b="1" dirty="0"/>
+              <a:t>The tool for downloading and setting up the React dev project environment</a:t>
+            </a:r>
+          </a:p>
+          <a:p>
+            <a:r>
+              <a:rPr lang="en-US" dirty="0"/>
+              <a:t>Basic understanding needed</a:t>
+            </a:r>
+          </a:p>
+          <a:p>
+            <a:r>
+              <a:rPr lang="en-US" i="1" dirty="0"/>
+              <a:t>What kind of project create-react-app creates? (</a:t>
+            </a:r>
+            <a:r>
+              <a:rPr lang="en-US" i="1" dirty="0" err="1"/>
+              <a:t>npm</a:t>
+            </a:r>
+            <a:r>
+              <a:rPr lang="en-US" i="1" dirty="0"/>
+              <a:t> start =&gt; dev time environment with Node server, </a:t>
+            </a:r>
+            <a:r>
+              <a:rPr lang="en-US" i="1" dirty="0" err="1"/>
+              <a:t>webpackage</a:t>
+            </a:r>
+            <a:r>
+              <a:rPr lang="en-US" i="1" dirty="0"/>
+              <a:t>/</a:t>
+            </a:r>
+            <a:r>
+              <a:rPr lang="en-US" i="1" dirty="0" err="1"/>
+              <a:t>nodemon</a:t>
+            </a:r>
+            <a:r>
+              <a:rPr lang="en-US" i="1" dirty="0"/>
+              <a:t> (and e.g. React Dev tools) starts)</a:t>
             </a:r>
             <a:endParaRPr lang="fi-FI" dirty="0"/>
           </a:p>
           <a:p>
             <a:r>
               <a:rPr lang="en-US" i="1" dirty="0"/>
-              <a:t>SPA understood in general. </a:t>
-            </a:r>
-          </a:p>
-          <a:p>
-            <a:r>
-              <a:rPr lang="en-US" i="1" dirty="0"/>
-              <a:t>Single page which is changed based on user actions, by JS code, AJAX requests/responses and react-router routing "going to a new View" with possible routing parameters.</a:t>
+              <a:t>What's the relationship with the /public/index.html and the React app? How the React app starts and builds up the page? index.js | index.html + App.js | and so on.</a:t>
             </a:r>
             <a:endParaRPr lang="fi-FI" dirty="0"/>
           </a:p>
           <a:p>
             <a:r>
               <a:rPr lang="en-US" i="1" dirty="0"/>
-              <a:t>React components can be: </a:t>
-            </a:r>
+              <a:t>How is the dev environment related to the build version = when published and put to 'production environment’?  </a:t>
+            </a:r>
+            <a:endParaRPr lang="fi-FI" dirty="0"/>
           </a:p>
           <a:p>
             <a:pPr lvl="1"/>
             <a:r>
-              <a:rPr lang="en-US" i="1" dirty="0"/>
-              <a:t>Views = SPA ‘pages’ we can get routed to</a:t>
-            </a:r>
-            <a:endParaRPr lang="fi-FI" dirty="0"/>
+              <a:rPr lang="en-US" i="1" dirty="0" err="1"/>
+              <a:t>npm</a:t>
+            </a:r>
+            <a:r>
+              <a:rPr lang="en-US" i="1" dirty="0"/>
+              <a:t> build =&gt;  /build folder with only few mashed up .html and .</a:t>
+            </a:r>
+            <a:r>
+              <a:rPr lang="en-US" i="1" dirty="0" err="1"/>
+              <a:t>js</a:t>
+            </a:r>
+            <a:r>
+              <a:rPr lang="en-US" i="1" dirty="0"/>
+              <a:t> (and needed .</a:t>
+            </a:r>
+            <a:r>
+              <a:rPr lang="en-US" i="1" dirty="0" err="1"/>
+              <a:t>css</a:t>
+            </a:r>
+            <a:r>
+              <a:rPr lang="en-US" i="1" dirty="0"/>
+              <a:t> plus other static files),  </a:t>
+            </a:r>
           </a:p>
           <a:p>
             <a:pPr lvl="1"/>
             <a:r>
               <a:rPr lang="en-US" i="1" dirty="0"/>
-              <a:t>Some others are re-usable children of the Views</a:t>
-            </a:r>
-            <a:endParaRPr lang="fi-FI" dirty="0"/>
-          </a:p>
-          <a:p>
-            <a:r>
-              <a:rPr lang="en-US" i="1" dirty="0"/>
-              <a:t>Some are:</a:t>
+              <a:t>no Node anymore, no ES5,6,7,8, no </a:t>
+            </a:r>
+            <a:r>
+              <a:rPr lang="en-US" i="1" dirty="0" err="1"/>
+              <a:t>node_modules</a:t>
+            </a:r>
+            <a:r>
+              <a:rPr lang="en-US" i="1" dirty="0"/>
+              <a:t>, just browser runnable ‘DOM API’ JS + html + </a:t>
+            </a:r>
+            <a:r>
+              <a:rPr lang="en-US" i="1" dirty="0" err="1"/>
+              <a:t>css</a:t>
+            </a:r>
+            <a:r>
+              <a:rPr lang="en-US" i="1" dirty="0"/>
+              <a:t> + …, </a:t>
             </a:r>
           </a:p>
           <a:p>
             <a:pPr lvl="1"/>
             <a:r>
               <a:rPr lang="en-US" i="1" dirty="0"/>
-              <a:t>container components who have/fetch the data, hold the state</a:t>
-            </a:r>
-            <a:endParaRPr lang="fi-FI" dirty="0"/>
-          </a:p>
-          <a:p>
-            <a:pPr lvl="1"/>
-            <a:r>
-              <a:rPr lang="en-US" i="1" dirty="0"/>
-              <a:t>Some others are presentational components who get the data from mother, and who only show what they get (plus possibly provide links/buttons related to _that_ item that it's showing)</a:t>
-            </a:r>
-            <a:endParaRPr lang="fi-FI" dirty="0"/>
+              <a:t>served to the client's web browser by even a static web server, from www ports like 80/443 or so</a:t>
+            </a:r>
+            <a:br>
+              <a:rPr lang="en-US" i="1" dirty="0"/>
+            </a:br>
+            <a:endParaRPr lang="en-US" i="1" dirty="0"/>
           </a:p>
           <a:p>
             <a:endParaRPr lang="fi-FI" dirty="0"/>
@@ -8348,7 +8338,7 @@
     </p:spTree>
     <p:extLst>
       <p:ext uri="{BB962C8B-B14F-4D97-AF65-F5344CB8AC3E}">
-        <p14:creationId xmlns:p14="http://schemas.microsoft.com/office/powerpoint/2010/main" val="1069548193"/>
+        <p14:creationId xmlns:p14="http://schemas.microsoft.com/office/powerpoint/2010/main" val="727035588"/>
       </p:ext>
     </p:extLst>
   </p:cSld>
@@ -8399,7 +8389,7 @@
             <a:pPr lvl="0"/>
             <a:r>
               <a:rPr lang="en-US" dirty="0"/>
-              <a:t>React routing   (SPA routing in frontend, in DOM) </a:t>
+              <a:t>SPA = Single-Page Application</a:t>
             </a:r>
             <a:endParaRPr lang="fi-FI" dirty="0"/>
           </a:p>
@@ -8421,12 +8411,7 @@
             <p:ph sz="half" idx="2"/>
           </p:nvPr>
         </p:nvSpPr>
-        <p:spPr>
-          <a:xfrm>
-            <a:off x="550864" y="1114548"/>
-            <a:ext cx="11125198" cy="4798890"/>
-          </a:xfrm>
-        </p:spPr>
+        <p:spPr/>
         <p:txBody>
           <a:bodyPr>
             <a:normAutofit/>
@@ -8434,45 +8419,57 @@
           <a:lstStyle/>
           <a:p>
             <a:r>
-              <a:rPr lang="en-US" dirty="0"/>
-              <a:t>SPA front-end routing between the Views (~like “going” to a different ‘page’)</a:t>
+              <a:rPr lang="en-US" i="1" dirty="0"/>
+              <a:t>Only one web page downloaded from the Web Server, but then with JS &amp; AJAX that single page’s DOM updated constantly. Showing/hiding certain Views so that it looks like we would have several Pages</a:t>
             </a:r>
             <a:endParaRPr lang="fi-FI" dirty="0"/>
           </a:p>
           <a:p>
-            <a:pPr lvl="0"/>
-            <a:r>
-              <a:rPr lang="en-US" dirty="0"/>
-              <a:t>While really just showing and hiding React Views on one downloaded page</a:t>
+            <a:r>
+              <a:rPr lang="en-US" i="1" dirty="0"/>
+              <a:t>SPA understood in general. </a:t>
+            </a:r>
+          </a:p>
+          <a:p>
+            <a:r>
+              <a:rPr lang="en-US" i="1" dirty="0"/>
+              <a:t>Single page which is changed based on user actions, by JS code, AJAX requests/responses and react-router routing "going to a new View" with possible routing parameters.</a:t>
             </a:r>
             <a:endParaRPr lang="fi-FI" dirty="0"/>
           </a:p>
           <a:p>
-            <a:pPr lvl="0"/>
-            <a:r>
-              <a:rPr lang="en-US" dirty="0"/>
-              <a:t>We can also send routing parameter data while going to another View, e.g. id needed by next View</a:t>
+            <a:r>
+              <a:rPr lang="en-US" i="1" dirty="0"/>
+              <a:t>React components can be: </a:t>
+            </a:r>
+          </a:p>
+          <a:p>
+            <a:pPr lvl="1"/>
+            <a:r>
+              <a:rPr lang="en-US" i="1" dirty="0"/>
+              <a:t>Views = SPA ‘pages’ we can get routed to</a:t>
             </a:r>
             <a:endParaRPr lang="fi-FI" dirty="0"/>
           </a:p>
           <a:p>
-            <a:r>
-              <a:rPr lang="en-US" i="1" dirty="0"/>
-              <a:t>How is the react-router routing working in general. </a:t>
+            <a:pPr lvl="1"/>
+            <a:r>
+              <a:rPr lang="en-US" i="1" dirty="0"/>
+              <a:t>Some others are re-usable children of the Views</a:t>
             </a:r>
             <a:endParaRPr lang="fi-FI" dirty="0"/>
           </a:p>
           <a:p>
+            <a:r>
+              <a:rPr lang="en-US" i="1" dirty="0"/>
+              <a:t>Some are:</a:t>
+            </a:r>
+          </a:p>
+          <a:p>
             <a:pPr lvl="1"/>
             <a:r>
-              <a:rPr lang="en-US" i="1" u="sng" dirty="0">
-                <a:hlinkClick r:id="rId2"/>
-              </a:rPr>
-              <a:t>https://youtu.be/Law7wfdg_ls?t=73</a:t>
-            </a:r>
-            <a:r>
-              <a:rPr lang="en-US" i="1" dirty="0"/>
-              <a:t> </a:t>
+              <a:rPr lang="en-US" i="1" dirty="0"/>
+              <a:t>container components who have/fetch the data, hold the state</a:t>
             </a:r>
             <a:endParaRPr lang="fi-FI" dirty="0"/>
           </a:p>
@@ -8480,120 +8477,7 @@
             <a:pPr lvl="1"/>
             <a:r>
               <a:rPr lang="en-US" i="1" dirty="0"/>
-              <a:t>from 1:13 (link above already at that time) until 16:46 at least. </a:t>
-            </a:r>
-            <a:endParaRPr lang="fi-FI" dirty="0"/>
-          </a:p>
-          <a:p>
-            <a:pPr lvl="1"/>
-            <a:r>
-              <a:rPr lang="en-US" i="1" dirty="0"/>
-              <a:t>after 16:46 starts "custom routing" i.e. routing with parameters. 33 mins in total.</a:t>
-            </a:r>
-          </a:p>
-          <a:p>
-            <a:r>
-              <a:rPr lang="en-US" b="1" i="1" dirty="0"/>
-              <a:t>Ingredients of routing</a:t>
-            </a:r>
-            <a:r>
-              <a:rPr lang="en-US" i="1" dirty="0"/>
-              <a:t>: </a:t>
-            </a:r>
-          </a:p>
-          <a:p>
-            <a:pPr lvl="1"/>
-            <a:r>
-              <a:rPr lang="en-US" b="1" i="1" dirty="0"/>
-              <a:t>react-router-</a:t>
-            </a:r>
-            <a:r>
-              <a:rPr lang="en-US" b="1" i="1" dirty="0" err="1"/>
-              <a:t>dom</a:t>
-            </a:r>
-            <a:r>
-              <a:rPr lang="en-US" i="1" dirty="0"/>
-              <a:t> node module, </a:t>
-            </a:r>
-          </a:p>
-          <a:p>
-            <a:pPr lvl="1"/>
-            <a:r>
-              <a:rPr lang="en-US" b="1" i="1" dirty="0"/>
-              <a:t>Router</a:t>
-            </a:r>
-            <a:r>
-              <a:rPr lang="en-US" i="1" dirty="0"/>
-              <a:t> at root component with </a:t>
-            </a:r>
-            <a:r>
-              <a:rPr lang="en-US" b="1" i="1" dirty="0"/>
-              <a:t>Switch or similar</a:t>
-            </a:r>
-            <a:r>
-              <a:rPr lang="en-US" i="1" dirty="0"/>
-              <a:t>, </a:t>
-            </a:r>
-          </a:p>
-          <a:p>
-            <a:pPr lvl="1"/>
-            <a:r>
-              <a:rPr lang="en-US" b="1" i="1" dirty="0"/>
-              <a:t>Routes </a:t>
-            </a:r>
-            <a:r>
-              <a:rPr lang="en-US" i="1" dirty="0"/>
-              <a:t>with </a:t>
-            </a:r>
-            <a:r>
-              <a:rPr lang="en-US" b="1" i="1" dirty="0"/>
-              <a:t>"</a:t>
-            </a:r>
-            <a:r>
-              <a:rPr lang="en-US" b="1" i="1" dirty="0" err="1"/>
-              <a:t>url</a:t>
-            </a:r>
-            <a:r>
-              <a:rPr lang="en-US" b="1" i="1" dirty="0"/>
-              <a:t>" patterns</a:t>
-            </a:r>
-            <a:r>
-              <a:rPr lang="en-US" i="1" dirty="0"/>
-              <a:t>, possible </a:t>
-            </a:r>
-            <a:r>
-              <a:rPr lang="en-US" b="1" i="1" dirty="0"/>
-              <a:t>parameters</a:t>
-            </a:r>
-            <a:r>
-              <a:rPr lang="en-US" i="1" dirty="0"/>
-              <a:t>, </a:t>
-            </a:r>
-          </a:p>
-          <a:p>
-            <a:pPr lvl="1"/>
-            <a:r>
-              <a:rPr lang="en-US" i="1" dirty="0"/>
-              <a:t>Route mapped to (view) React </a:t>
-            </a:r>
-            <a:r>
-              <a:rPr lang="en-US" b="1" i="1" dirty="0"/>
-              <a:t>component</a:t>
-            </a:r>
-            <a:r>
-              <a:rPr lang="en-US" i="1" dirty="0"/>
-              <a:t>, </a:t>
-            </a:r>
-          </a:p>
-          <a:p>
-            <a:pPr lvl="1"/>
-            <a:r>
-              <a:rPr lang="en-US" b="1" i="1" dirty="0"/>
-              <a:t>Link</a:t>
-            </a:r>
-            <a:r>
-              <a:rPr lang="en-US" i="1" dirty="0"/>
-              <a:t> components in other (view) components' code that use those Routes. Offering navigation to another view</a:t>
+              <a:t>Some others are presentational components who get the data from mother, and who only show what they get (plus possibly provide links/buttons related to _that_ item that it's showing)</a:t>
             </a:r>
             <a:endParaRPr lang="fi-FI" dirty="0"/>
           </a:p>
@@ -8688,7 +8572,7 @@
     </p:spTree>
     <p:extLst>
       <p:ext uri="{BB962C8B-B14F-4D97-AF65-F5344CB8AC3E}">
-        <p14:creationId xmlns:p14="http://schemas.microsoft.com/office/powerpoint/2010/main" val="2980731948"/>
+        <p14:creationId xmlns:p14="http://schemas.microsoft.com/office/powerpoint/2010/main" val="1069548193"/>
       </p:ext>
     </p:extLst>
   </p:cSld>
@@ -8739,7 +8623,7 @@
             <a:pPr lvl="0"/>
             <a:r>
               <a:rPr lang="en-US" dirty="0"/>
-              <a:t>Theming, styling</a:t>
+              <a:t>React routing   (SPA routing in frontend, in DOM) </a:t>
             </a:r>
             <a:endParaRPr lang="fi-FI" dirty="0"/>
           </a:p>
@@ -8763,8 +8647,8 @@
         </p:nvSpPr>
         <p:spPr>
           <a:xfrm>
-            <a:off x="550864" y="1079227"/>
-            <a:ext cx="11125198" cy="4834211"/>
+            <a:off x="550864" y="1114548"/>
+            <a:ext cx="11125198" cy="4798890"/>
           </a:xfrm>
         </p:spPr>
         <p:txBody>
@@ -8773,153 +8657,172 @@
           </a:bodyPr>
           <a:lstStyle/>
           <a:p>
+            <a:r>
+              <a:rPr lang="en-US" dirty="0"/>
+              <a:t>SPA front-end routing between the Views (~like “going” to a different ‘page’)</a:t>
+            </a:r>
+            <a:endParaRPr lang="fi-FI" dirty="0"/>
+          </a:p>
+          <a:p>
             <a:pPr lvl="0"/>
+            <a:r>
+              <a:rPr lang="en-US" dirty="0"/>
+              <a:t>While really just showing and hiding React Views on one downloaded page</a:t>
+            </a:r>
             <a:endParaRPr lang="fi-FI" dirty="0"/>
           </a:p>
           <a:p>
-            <a:r>
-              <a:rPr lang="en-US" i="1" dirty="0"/>
-              <a:t>How is the style Theme shared with / provided to all React components? </a:t>
-            </a:r>
+            <a:pPr lvl="0"/>
+            <a:r>
+              <a:rPr lang="en-US" dirty="0"/>
+              <a:t>We can also send routing parameter data while going to another View, e.g. id needed by next View</a:t>
+            </a:r>
+            <a:endParaRPr lang="fi-FI" dirty="0"/>
+          </a:p>
+          <a:p>
+            <a:r>
+              <a:rPr lang="en-US" i="1" dirty="0"/>
+              <a:t>How is the react-router routing working in general. </a:t>
+            </a:r>
+            <a:endParaRPr lang="fi-FI" dirty="0"/>
           </a:p>
           <a:p>
             <a:pPr lvl="1"/>
             <a:r>
-              <a:rPr lang="en-US" i="1" dirty="0"/>
-              <a:t>Answer: Injected to the root React element, and theme-abled child components used, and they automagically read the style from the component tree</a:t>
-            </a:r>
-          </a:p>
-          <a:p>
-            <a:r>
-              <a:rPr lang="en-US" i="1" dirty="0"/>
-              <a:t>How is Theme idea good? Fulfills our goal of defining things only once, in one place / file / row etc.</a:t>
+              <a:rPr lang="en-US" i="1" u="sng" dirty="0">
+                <a:hlinkClick r:id="rId2"/>
+              </a:rPr>
+              <a:t>https://youtu.be/Law7wfdg_ls?t=73</a:t>
+            </a:r>
+            <a:r>
+              <a:rPr lang="en-US" i="1" dirty="0"/>
+              <a:t> </a:t>
             </a:r>
             <a:endParaRPr lang="fi-FI" dirty="0"/>
           </a:p>
           <a:p>
+            <a:pPr lvl="1"/>
+            <a:r>
+              <a:rPr lang="en-US" i="1" dirty="0"/>
+              <a:t>from 1:13 (link above already at that time) until 16:46 at least. </a:t>
+            </a:r>
             <a:endParaRPr lang="fi-FI" dirty="0"/>
           </a:p>
           <a:p>
-            <a:r>
-              <a:rPr lang="fi-FI" dirty="0" err="1"/>
-              <a:t>Thus</a:t>
-            </a:r>
-            <a:r>
-              <a:rPr lang="fi-FI" dirty="0"/>
-              <a:t> </a:t>
-            </a:r>
-            <a:r>
-              <a:rPr lang="fi-FI" dirty="0" err="1"/>
-              <a:t>the</a:t>
-            </a:r>
-            <a:r>
-              <a:rPr lang="fi-FI" dirty="0"/>
-              <a:t> </a:t>
-            </a:r>
-            <a:r>
-              <a:rPr lang="fi-FI" dirty="0" err="1"/>
-              <a:t>Theme</a:t>
-            </a:r>
-            <a:r>
-              <a:rPr lang="fi-FI" dirty="0"/>
-              <a:t> is </a:t>
-            </a:r>
-            <a:r>
-              <a:rPr lang="fi-FI" dirty="0" err="1"/>
-              <a:t>shared</a:t>
-            </a:r>
-            <a:r>
-              <a:rPr lang="fi-FI" dirty="0"/>
-              <a:t> to </a:t>
-            </a:r>
-            <a:r>
-              <a:rPr lang="fi-FI" dirty="0" err="1"/>
-              <a:t>child</a:t>
-            </a:r>
-            <a:r>
-              <a:rPr lang="fi-FI" dirty="0"/>
-              <a:t> </a:t>
-            </a:r>
-            <a:r>
-              <a:rPr lang="fi-FI" dirty="0" err="1"/>
-              <a:t>componets</a:t>
-            </a:r>
-            <a:r>
-              <a:rPr lang="fi-FI" dirty="0"/>
-              <a:t> a </a:t>
-            </a:r>
-            <a:r>
-              <a:rPr lang="fi-FI" dirty="0" err="1"/>
-              <a:t>bit</a:t>
-            </a:r>
-            <a:r>
-              <a:rPr lang="fi-FI" dirty="0"/>
-              <a:t> </a:t>
-            </a:r>
-            <a:r>
-              <a:rPr lang="fi-FI" dirty="0" err="1"/>
-              <a:t>like</a:t>
-            </a:r>
-            <a:r>
-              <a:rPr lang="fi-FI" dirty="0"/>
-              <a:t> </a:t>
-            </a:r>
-            <a:r>
-              <a:rPr lang="fi-FI" dirty="0" err="1"/>
-              <a:t>the</a:t>
-            </a:r>
-            <a:r>
-              <a:rPr lang="fi-FI" dirty="0"/>
-              <a:t> </a:t>
-            </a:r>
-            <a:r>
-              <a:rPr lang="fi-FI" dirty="0" err="1"/>
-              <a:t>Context</a:t>
-            </a:r>
-            <a:r>
-              <a:rPr lang="fi-FI" dirty="0"/>
-              <a:t> is </a:t>
-            </a:r>
-            <a:r>
-              <a:rPr lang="fi-FI" dirty="0" err="1"/>
-              <a:t>also</a:t>
-            </a:r>
-            <a:r>
-              <a:rPr lang="fi-FI" dirty="0"/>
-              <a:t> </a:t>
-            </a:r>
-            <a:r>
-              <a:rPr lang="fi-FI" dirty="0" err="1"/>
-              <a:t>shared</a:t>
-            </a:r>
-            <a:r>
-              <a:rPr lang="fi-FI" dirty="0"/>
-              <a:t> in </a:t>
-            </a:r>
-            <a:r>
-              <a:rPr lang="fi-FI" dirty="0" err="1"/>
-              <a:t>the</a:t>
-            </a:r>
-            <a:r>
-              <a:rPr lang="fi-FI" dirty="0"/>
-              <a:t> </a:t>
-            </a:r>
-            <a:r>
-              <a:rPr lang="fi-FI" dirty="0" err="1"/>
+            <a:pPr lvl="1"/>
+            <a:r>
+              <a:rPr lang="en-US" i="1" dirty="0"/>
+              <a:t>after 16:46 starts "custom routing" i.e. routing with parameters. 33 mins in total.</a:t>
+            </a:r>
+          </a:p>
+          <a:p>
+            <a:r>
+              <a:rPr lang="en-US" b="1" i="1" dirty="0"/>
+              <a:t>Ingredients of routing</a:t>
+            </a:r>
+            <a:r>
+              <a:rPr lang="en-US" i="1" dirty="0"/>
+              <a:t>: </a:t>
+            </a:r>
+          </a:p>
+          <a:p>
+            <a:pPr lvl="1"/>
+            <a:r>
+              <a:rPr lang="en-US" b="1" i="1" dirty="0"/>
+              <a:t>react-router-</a:t>
+            </a:r>
+            <a:r>
+              <a:rPr lang="en-US" b="1" i="1" dirty="0" err="1"/>
+              <a:t>dom</a:t>
+            </a:r>
+            <a:r>
+              <a:rPr lang="en-US" i="1" dirty="0"/>
+              <a:t> node module, </a:t>
+            </a:r>
+          </a:p>
+          <a:p>
+            <a:pPr lvl="1"/>
+            <a:r>
+              <a:rPr lang="en-US" b="1" i="1" dirty="0"/>
+              <a:t>Router</a:t>
+            </a:r>
+            <a:r>
+              <a:rPr lang="en-US" i="1" dirty="0"/>
+              <a:t> at root component with </a:t>
+            </a:r>
+            <a:r>
+              <a:rPr lang="en-US" b="1" i="1" dirty="0"/>
+              <a:t>Switch or similar</a:t>
+            </a:r>
+            <a:r>
+              <a:rPr lang="en-US" i="1" dirty="0"/>
+              <a:t>, </a:t>
+            </a:r>
+          </a:p>
+          <a:p>
+            <a:pPr lvl="1"/>
+            <a:r>
+              <a:rPr lang="en-US" b="1" i="1" dirty="0"/>
+              <a:t>Routes </a:t>
+            </a:r>
+            <a:r>
+              <a:rPr lang="en-US" i="1" dirty="0"/>
+              <a:t>with </a:t>
+            </a:r>
+            <a:r>
+              <a:rPr lang="en-US" b="1" i="1" dirty="0"/>
+              <a:t>"</a:t>
+            </a:r>
+            <a:r>
+              <a:rPr lang="en-US" b="1" i="1" dirty="0" err="1"/>
+              <a:t>url</a:t>
+            </a:r>
+            <a:r>
+              <a:rPr lang="en-US" b="1" i="1" dirty="0"/>
+              <a:t>" patterns</a:t>
+            </a:r>
+            <a:r>
+              <a:rPr lang="en-US" i="1" dirty="0"/>
+              <a:t>, possible </a:t>
+            </a:r>
+            <a:r>
+              <a:rPr lang="en-US" b="1" i="1" dirty="0"/>
+              <a:t>parameters</a:t>
+            </a:r>
+            <a:r>
+              <a:rPr lang="en-US" i="1" dirty="0"/>
+              <a:t>, </a:t>
+            </a:r>
+          </a:p>
+          <a:p>
+            <a:pPr lvl="1"/>
+            <a:r>
+              <a:rPr lang="en-US" i="1" dirty="0"/>
+              <a:t>Route mapped to (view) React </a:t>
+            </a:r>
+            <a:r>
+              <a:rPr lang="en-US" b="1" i="1" dirty="0"/>
               <a:t>component</a:t>
             </a:r>
             <a:r>
-              <a:rPr lang="fi-FI" dirty="0"/>
-              <a:t> </a:t>
-            </a:r>
-            <a:r>
-              <a:rPr lang="fi-FI" dirty="0" err="1"/>
-              <a:t>tree</a:t>
-            </a:r>
-            <a:r>
-              <a:rPr lang="fi-FI" dirty="0"/>
-              <a:t>!</a:t>
-            </a:r>
+              <a:rPr lang="en-US" i="1" dirty="0"/>
+              <a:t>, </a:t>
+            </a:r>
+          </a:p>
+          <a:p>
+            <a:pPr lvl="1"/>
+            <a:r>
+              <a:rPr lang="en-US" b="1" i="1" dirty="0"/>
+              <a:t>Link</a:t>
+            </a:r>
+            <a:r>
+              <a:rPr lang="en-US" i="1" dirty="0"/>
+              <a:t> components in other (view) components' code that use those Routes. Offering navigation to another view</a:t>
+            </a:r>
+            <a:endParaRPr lang="fi-FI" dirty="0"/>
+          </a:p>
+          <a:p>
+            <a:endParaRPr lang="fi-FI" dirty="0"/>
           </a:p>
         </p:txBody>
       </p:sp>
@@ -9009,7 +8912,7 @@
     </p:spTree>
     <p:extLst>
       <p:ext uri="{BB962C8B-B14F-4D97-AF65-F5344CB8AC3E}">
-        <p14:creationId xmlns:p14="http://schemas.microsoft.com/office/powerpoint/2010/main" val="2990207751"/>
+        <p14:creationId xmlns:p14="http://schemas.microsoft.com/office/powerpoint/2010/main" val="2980731948"/>
       </p:ext>
     </p:extLst>
   </p:cSld>
@@ -9060,7 +8963,7 @@
             <a:pPr lvl="0"/>
             <a:r>
               <a:rPr lang="en-US" dirty="0"/>
-              <a:t>Frontend architecture principles</a:t>
+              <a:t>Theming, styling</a:t>
             </a:r>
             <a:endParaRPr lang="fi-FI" dirty="0"/>
           </a:p>
@@ -9084,209 +8987,162 @@
         </p:nvSpPr>
         <p:spPr>
           <a:xfrm>
-            <a:off x="192299" y="1016437"/>
-            <a:ext cx="11883275" cy="4897002"/>
+            <a:off x="550864" y="1079227"/>
+            <a:ext cx="11125198" cy="4834211"/>
           </a:xfrm>
         </p:spPr>
         <p:txBody>
           <a:bodyPr>
-            <a:normAutofit fontScale="62500" lnSpcReduction="20000"/>
+            <a:normAutofit/>
           </a:bodyPr>
           <a:lstStyle/>
           <a:p>
-            <a:pPr>
-              <a:lnSpc>
-                <a:spcPct val="170000"/>
-              </a:lnSpc>
-            </a:pPr>
-            <a:r>
-              <a:rPr lang="en-US" dirty="0"/>
-              <a:t>SRP, Single-Responsibility Principle. Each module, function, and item is doing only one thing. (If one module is doing several, split into multiple orchestrated modules)</a:t>
-            </a:r>
-          </a:p>
-          <a:p>
-            <a:pPr lvl="1">
-              <a:lnSpc>
-                <a:spcPct val="170000"/>
-              </a:lnSpc>
-            </a:pPr>
-            <a:r>
-              <a:rPr lang="en-US" dirty="0" err="1"/>
-              <a:t>E.g</a:t>
-            </a:r>
-            <a:r>
-              <a:rPr lang="en-US" dirty="0"/>
-              <a:t> React components should be in their own files so that they can be a) easily reused b) checked fast and with good test need understanding</a:t>
-            </a:r>
-            <a:br>
-              <a:rPr lang="en-US" dirty="0"/>
-            </a:br>
-            <a:r>
-              <a:rPr lang="en-US" dirty="0"/>
-              <a:t>c) seen without scrolling the code</a:t>
-            </a:r>
-          </a:p>
-          <a:p>
-            <a:pPr>
-              <a:lnSpc>
-                <a:spcPct val="170000"/>
-              </a:lnSpc>
-            </a:pPr>
-            <a:r>
-              <a:rPr lang="en-US" dirty="0"/>
-              <a:t>Cousin of the previous one: Each thing is only specified once, in one place</a:t>
-            </a:r>
-          </a:p>
-          <a:p>
-            <a:pPr lvl="1">
-              <a:lnSpc>
-                <a:spcPct val="170000"/>
-              </a:lnSpc>
-            </a:pPr>
-            <a:r>
-              <a:rPr lang="en-US" dirty="0"/>
-              <a:t>All settings and other constants should be read from env variables or other centralized storage</a:t>
-            </a:r>
-          </a:p>
-          <a:p>
-            <a:pPr>
-              <a:lnSpc>
-                <a:spcPct val="170000"/>
-              </a:lnSpc>
-            </a:pPr>
-            <a:r>
-              <a:rPr lang="en-US" dirty="0"/>
-              <a:t>Each thing of different nature should be in separate location. Like routing in one folder, all ajax actions </a:t>
-            </a:r>
-            <a:r>
-              <a:rPr lang="en-US"/>
-              <a:t>in another.</a:t>
-            </a:r>
-          </a:p>
-          <a:p>
-            <a:pPr>
-              <a:lnSpc>
-                <a:spcPct val="170000"/>
-              </a:lnSpc>
-            </a:pPr>
-            <a:r>
-              <a:rPr lang="en-US" dirty="0"/>
-              <a:t>Each feature (done by a sub-team, feature team) is folder, file, and </a:t>
-            </a:r>
-            <a:r>
-              <a:rPr lang="en-US" dirty="0" err="1"/>
-              <a:t>codeline</a:t>
-            </a:r>
-            <a:r>
-              <a:rPr lang="en-US" dirty="0"/>
-              <a:t> -wise as independent of others as possible.</a:t>
-            </a:r>
-          </a:p>
-          <a:p>
-            <a:pPr lvl="1">
-              <a:lnSpc>
-                <a:spcPct val="170000"/>
-              </a:lnSpc>
-            </a:pPr>
-            <a:r>
-              <a:rPr lang="en-US" dirty="0"/>
-              <a:t>(</a:t>
-            </a:r>
-            <a:r>
-              <a:rPr lang="en-US" dirty="0" err="1"/>
-              <a:t>codeline</a:t>
-            </a:r>
-            <a:r>
-              <a:rPr lang="en-US" dirty="0"/>
-              <a:t>-wise: It's not always/mostly possible to add new feature without touching something of the</a:t>
-            </a:r>
-            <a:br>
-              <a:rPr lang="en-US" dirty="0"/>
-            </a:br>
-            <a:r>
-              <a:rPr lang="en-US" dirty="0"/>
-              <a:t>existing shared files. But that should be done as a) as a fast commit and shared to others b) as uniform way as possible</a:t>
-            </a:r>
-            <a:br>
-              <a:rPr lang="en-US" dirty="0"/>
-            </a:br>
-            <a:r>
-              <a:rPr lang="en-US" dirty="0"/>
-              <a:t>c) hopefully in a new </a:t>
-            </a:r>
-            <a:r>
-              <a:rPr lang="en-US" dirty="0" err="1"/>
-              <a:t>codeline</a:t>
-            </a:r>
-            <a:r>
-              <a:rPr lang="en-US" dirty="0"/>
-              <a:t> separate from the previous items. Seen nicely in Git</a:t>
-            </a:r>
-            <a:br>
-              <a:rPr lang="en-US" dirty="0"/>
-            </a:br>
-            <a:r>
-              <a:rPr lang="en-US" dirty="0"/>
-              <a:t>	Think about e.g. a new View and its SPA "URL" added to the routing.	</a:t>
-            </a:r>
-          </a:p>
-          <a:p>
-            <a:pPr>
-              <a:lnSpc>
-                <a:spcPct val="170000"/>
-              </a:lnSpc>
-            </a:pPr>
-            <a:r>
-              <a:rPr lang="en-US" dirty="0"/>
-              <a:t>Code should be easy to read by people who did not write it. Maximize reading speed, not writing speed.</a:t>
-            </a:r>
-          </a:p>
-          <a:p>
-            <a:pPr>
-              <a:lnSpc>
-                <a:spcPct val="170000"/>
-              </a:lnSpc>
-            </a:pPr>
-            <a:r>
-              <a:rPr lang="en-US" dirty="0"/>
-              <a:t>Documentation should be short but informative and easy to modify and commit to git (Markdown or other text format). </a:t>
-            </a:r>
-            <a:br>
-              <a:rPr lang="en-US" dirty="0"/>
-            </a:br>
-            <a:r>
-              <a:rPr lang="en-US" dirty="0"/>
-              <a:t> Documentation 'hierarchy’: 1. code naming should tell as much it can 2. only then comments in code, 3. only the rest to the separate documentation (in repo Markdown) </a:t>
-            </a:r>
-          </a:p>
-          <a:p>
-            <a:pPr lvl="1">
-              <a:lnSpc>
-                <a:spcPct val="170000"/>
-              </a:lnSpc>
-            </a:pPr>
-            <a:r>
-              <a:rPr lang="en-US" dirty="0"/>
-              <a:t>temp comments in code are good </a:t>
-            </a:r>
-            <a:r>
-              <a:rPr lang="en-US" u="sng" dirty="0"/>
-              <a:t>while</a:t>
-            </a:r>
-            <a:r>
-              <a:rPr lang="en-US" dirty="0"/>
-              <a:t> developing. Use a TODO marker</a:t>
-            </a:r>
-          </a:p>
-          <a:p>
-            <a:pPr lvl="1">
-              <a:lnSpc>
-                <a:spcPct val="170000"/>
-              </a:lnSpc>
-            </a:pPr>
-            <a:r>
-              <a:rPr lang="en-US" dirty="0"/>
-              <a:t>People who do not know the project should be able to install and setup the project. Hand-over to customer is important</a:t>
+            <a:pPr lvl="0"/>
+            <a:endParaRPr lang="fi-FI" dirty="0"/>
+          </a:p>
+          <a:p>
+            <a:r>
+              <a:rPr lang="en-US" i="1" dirty="0"/>
+              <a:t>How is the style Theme shared with / provided to all React components? </a:t>
+            </a:r>
+          </a:p>
+          <a:p>
+            <a:pPr lvl="1"/>
+            <a:r>
+              <a:rPr lang="en-US" i="1" dirty="0"/>
+              <a:t>Answer: Injected to the root React element, and theme-abled child components used, and they automagically read the style from the component tree</a:t>
+            </a:r>
+          </a:p>
+          <a:p>
+            <a:r>
+              <a:rPr lang="en-US" i="1" dirty="0"/>
+              <a:t>How is Theme idea good? Fulfills our goal of defining things only once, in one place / file / row etc.</a:t>
+            </a:r>
+            <a:endParaRPr lang="fi-FI" dirty="0"/>
+          </a:p>
+          <a:p>
+            <a:endParaRPr lang="fi-FI" dirty="0"/>
+          </a:p>
+          <a:p>
+            <a:r>
+              <a:rPr lang="fi-FI" dirty="0" err="1"/>
+              <a:t>Thus</a:t>
+            </a:r>
+            <a:r>
+              <a:rPr lang="fi-FI" dirty="0"/>
+              <a:t> </a:t>
+            </a:r>
+            <a:r>
+              <a:rPr lang="fi-FI" dirty="0" err="1"/>
+              <a:t>the</a:t>
+            </a:r>
+            <a:r>
+              <a:rPr lang="fi-FI" dirty="0"/>
+              <a:t> </a:t>
+            </a:r>
+            <a:r>
+              <a:rPr lang="fi-FI" dirty="0" err="1"/>
+              <a:t>Theme</a:t>
+            </a:r>
+            <a:r>
+              <a:rPr lang="fi-FI" dirty="0"/>
+              <a:t> is </a:t>
+            </a:r>
+            <a:r>
+              <a:rPr lang="fi-FI" dirty="0" err="1"/>
+              <a:t>shared</a:t>
+            </a:r>
+            <a:r>
+              <a:rPr lang="fi-FI" dirty="0"/>
+              <a:t> to </a:t>
+            </a:r>
+            <a:r>
+              <a:rPr lang="fi-FI" dirty="0" err="1"/>
+              <a:t>child</a:t>
+            </a:r>
+            <a:r>
+              <a:rPr lang="fi-FI" dirty="0"/>
+              <a:t> </a:t>
+            </a:r>
+            <a:r>
+              <a:rPr lang="fi-FI" dirty="0" err="1"/>
+              <a:t>componets</a:t>
+            </a:r>
+            <a:r>
+              <a:rPr lang="fi-FI" dirty="0"/>
+              <a:t> a </a:t>
+            </a:r>
+            <a:r>
+              <a:rPr lang="fi-FI" dirty="0" err="1"/>
+              <a:t>bit</a:t>
+            </a:r>
+            <a:r>
+              <a:rPr lang="fi-FI" dirty="0"/>
+              <a:t> </a:t>
+            </a:r>
+            <a:r>
+              <a:rPr lang="fi-FI" dirty="0" err="1"/>
+              <a:t>like</a:t>
+            </a:r>
+            <a:r>
+              <a:rPr lang="fi-FI" dirty="0"/>
+              <a:t> </a:t>
+            </a:r>
+            <a:r>
+              <a:rPr lang="fi-FI" dirty="0" err="1"/>
+              <a:t>the</a:t>
+            </a:r>
+            <a:r>
+              <a:rPr lang="fi-FI" dirty="0"/>
+              <a:t> </a:t>
+            </a:r>
+            <a:r>
+              <a:rPr lang="fi-FI" dirty="0" err="1"/>
+              <a:t>Context</a:t>
+            </a:r>
+            <a:r>
+              <a:rPr lang="fi-FI" dirty="0"/>
+              <a:t> is </a:t>
+            </a:r>
+            <a:r>
+              <a:rPr lang="fi-FI" dirty="0" err="1"/>
+              <a:t>also</a:t>
+            </a:r>
+            <a:r>
+              <a:rPr lang="fi-FI" dirty="0"/>
+              <a:t> </a:t>
+            </a:r>
+            <a:r>
+              <a:rPr lang="fi-FI" dirty="0" err="1"/>
+              <a:t>shared</a:t>
+            </a:r>
+            <a:r>
+              <a:rPr lang="fi-FI" dirty="0"/>
+              <a:t> in </a:t>
+            </a:r>
+            <a:r>
+              <a:rPr lang="fi-FI" dirty="0" err="1"/>
+              <a:t>the</a:t>
+            </a:r>
+            <a:r>
+              <a:rPr lang="fi-FI" dirty="0"/>
+              <a:t> </a:t>
+            </a:r>
+            <a:r>
+              <a:rPr lang="fi-FI" dirty="0" err="1"/>
+              <a:t>component</a:t>
+            </a:r>
+            <a:r>
+              <a:rPr lang="fi-FI" dirty="0"/>
+              <a:t> </a:t>
+            </a:r>
+            <a:r>
+              <a:rPr lang="fi-FI" dirty="0" err="1"/>
+              <a:t>tree</a:t>
+            </a:r>
+            <a:r>
+              <a:rPr lang="fi-FI" dirty="0"/>
+              <a:t>!</a:t>
             </a:r>
           </a:p>
         </p:txBody>
@@ -9377,7 +9233,7 @@
     </p:spTree>
     <p:extLst>
       <p:ext uri="{BB962C8B-B14F-4D97-AF65-F5344CB8AC3E}">
-        <p14:creationId xmlns:p14="http://schemas.microsoft.com/office/powerpoint/2010/main" val="3416131050"/>
+        <p14:creationId xmlns:p14="http://schemas.microsoft.com/office/powerpoint/2010/main" val="2990207751"/>
       </p:ext>
     </p:extLst>
   </p:cSld>
@@ -9428,6 +9284,374 @@
             <a:pPr lvl="0"/>
             <a:r>
               <a:rPr lang="en-US" dirty="0"/>
+              <a:t>Frontend architecture principles</a:t>
+            </a:r>
+            <a:endParaRPr lang="fi-FI" dirty="0"/>
+          </a:p>
+        </p:txBody>
+      </p:sp>
+      <p:sp>
+        <p:nvSpPr>
+          <p:cNvPr id="9" name="Content Placeholder 8">
+            <a:extLst>
+              <a:ext uri="{FF2B5EF4-FFF2-40B4-BE49-F238E27FC236}">
+                <a16:creationId xmlns:a16="http://schemas.microsoft.com/office/drawing/2014/main" id="{ACDE61D8-A75A-F94B-B57A-46F276C03311}"/>
+              </a:ext>
+            </a:extLst>
+          </p:cNvPr>
+          <p:cNvSpPr>
+            <a:spLocks noGrp="1"/>
+          </p:cNvSpPr>
+          <p:nvPr>
+            <p:ph sz="half" idx="2"/>
+          </p:nvPr>
+        </p:nvSpPr>
+        <p:spPr>
+          <a:xfrm>
+            <a:off x="192299" y="1016437"/>
+            <a:ext cx="11883275" cy="4897002"/>
+          </a:xfrm>
+        </p:spPr>
+        <p:txBody>
+          <a:bodyPr>
+            <a:normAutofit fontScale="62500" lnSpcReduction="20000"/>
+          </a:bodyPr>
+          <a:lstStyle/>
+          <a:p>
+            <a:pPr>
+              <a:lnSpc>
+                <a:spcPct val="170000"/>
+              </a:lnSpc>
+            </a:pPr>
+            <a:r>
+              <a:rPr lang="en-US" dirty="0"/>
+              <a:t>SRP, Single-Responsibility Principle. Each module, function, and item is doing only one thing. (If one module is doing several, split into multiple orchestrated modules)</a:t>
+            </a:r>
+          </a:p>
+          <a:p>
+            <a:pPr lvl="1">
+              <a:lnSpc>
+                <a:spcPct val="170000"/>
+              </a:lnSpc>
+            </a:pPr>
+            <a:r>
+              <a:rPr lang="en-US" dirty="0" err="1"/>
+              <a:t>E.g</a:t>
+            </a:r>
+            <a:r>
+              <a:rPr lang="en-US" dirty="0"/>
+              <a:t> React components should be in their own files so that they can be a) easily reused b) checked fast and with good test need understanding</a:t>
+            </a:r>
+            <a:br>
+              <a:rPr lang="en-US" dirty="0"/>
+            </a:br>
+            <a:r>
+              <a:rPr lang="en-US" dirty="0"/>
+              <a:t>c) seen without scrolling the code</a:t>
+            </a:r>
+          </a:p>
+          <a:p>
+            <a:pPr>
+              <a:lnSpc>
+                <a:spcPct val="170000"/>
+              </a:lnSpc>
+            </a:pPr>
+            <a:r>
+              <a:rPr lang="en-US" dirty="0"/>
+              <a:t>Cousin of the previous one: Each thing is only specified once, in one place</a:t>
+            </a:r>
+          </a:p>
+          <a:p>
+            <a:pPr lvl="1">
+              <a:lnSpc>
+                <a:spcPct val="170000"/>
+              </a:lnSpc>
+            </a:pPr>
+            <a:r>
+              <a:rPr lang="en-US" dirty="0"/>
+              <a:t>All settings and other constants should be read from env variables or other centralized storage</a:t>
+            </a:r>
+          </a:p>
+          <a:p>
+            <a:pPr>
+              <a:lnSpc>
+                <a:spcPct val="170000"/>
+              </a:lnSpc>
+            </a:pPr>
+            <a:r>
+              <a:rPr lang="en-US" dirty="0"/>
+              <a:t>Each thing of different nature should be in separate location. Like routing in one folder, all ajax actions </a:t>
+            </a:r>
+            <a:r>
+              <a:rPr lang="en-US"/>
+              <a:t>in another.</a:t>
+            </a:r>
+          </a:p>
+          <a:p>
+            <a:pPr>
+              <a:lnSpc>
+                <a:spcPct val="170000"/>
+              </a:lnSpc>
+            </a:pPr>
+            <a:r>
+              <a:rPr lang="en-US" dirty="0"/>
+              <a:t>Each feature (done by a sub-team, feature team) is folder, file, and </a:t>
+            </a:r>
+            <a:r>
+              <a:rPr lang="en-US" dirty="0" err="1"/>
+              <a:t>codeline</a:t>
+            </a:r>
+            <a:r>
+              <a:rPr lang="en-US" dirty="0"/>
+              <a:t> -wise as independent of others as possible.</a:t>
+            </a:r>
+          </a:p>
+          <a:p>
+            <a:pPr lvl="1">
+              <a:lnSpc>
+                <a:spcPct val="170000"/>
+              </a:lnSpc>
+            </a:pPr>
+            <a:r>
+              <a:rPr lang="en-US" dirty="0"/>
+              <a:t>(</a:t>
+            </a:r>
+            <a:r>
+              <a:rPr lang="en-US" dirty="0" err="1"/>
+              <a:t>codeline</a:t>
+            </a:r>
+            <a:r>
+              <a:rPr lang="en-US" dirty="0"/>
+              <a:t>-wise: It's not always/mostly possible to add new feature without touching something of the</a:t>
+            </a:r>
+            <a:br>
+              <a:rPr lang="en-US" dirty="0"/>
+            </a:br>
+            <a:r>
+              <a:rPr lang="en-US" dirty="0"/>
+              <a:t>existing shared files. But that should be done as a) as a fast commit and shared to others b) as uniform way as possible</a:t>
+            </a:r>
+            <a:br>
+              <a:rPr lang="en-US" dirty="0"/>
+            </a:br>
+            <a:r>
+              <a:rPr lang="en-US" dirty="0"/>
+              <a:t>c) hopefully in a new </a:t>
+            </a:r>
+            <a:r>
+              <a:rPr lang="en-US" dirty="0" err="1"/>
+              <a:t>codeline</a:t>
+            </a:r>
+            <a:r>
+              <a:rPr lang="en-US" dirty="0"/>
+              <a:t> separate from the previous items. Seen nicely in Git</a:t>
+            </a:r>
+            <a:br>
+              <a:rPr lang="en-US" dirty="0"/>
+            </a:br>
+            <a:r>
+              <a:rPr lang="en-US" dirty="0"/>
+              <a:t>	Think about e.g. a new View and its SPA "URL" added to the routing.	</a:t>
+            </a:r>
+          </a:p>
+          <a:p>
+            <a:pPr>
+              <a:lnSpc>
+                <a:spcPct val="170000"/>
+              </a:lnSpc>
+            </a:pPr>
+            <a:r>
+              <a:rPr lang="en-US" dirty="0"/>
+              <a:t>Code should be easy to read by people who did not write it. Maximize reading speed, not writing speed.</a:t>
+            </a:r>
+          </a:p>
+          <a:p>
+            <a:pPr>
+              <a:lnSpc>
+                <a:spcPct val="170000"/>
+              </a:lnSpc>
+            </a:pPr>
+            <a:r>
+              <a:rPr lang="en-US" dirty="0"/>
+              <a:t>Documentation should be short but informative and easy to modify and commit to git (Markdown or other text format). </a:t>
+            </a:r>
+            <a:br>
+              <a:rPr lang="en-US" dirty="0"/>
+            </a:br>
+            <a:r>
+              <a:rPr lang="en-US" dirty="0"/>
+              <a:t> Documentation 'hierarchy’: 1. code naming should tell as much it can 2. only then comments in code, 3. only the rest to the separate documentation (in repo Markdown) </a:t>
+            </a:r>
+          </a:p>
+          <a:p>
+            <a:pPr lvl="1">
+              <a:lnSpc>
+                <a:spcPct val="170000"/>
+              </a:lnSpc>
+            </a:pPr>
+            <a:r>
+              <a:rPr lang="en-US" dirty="0"/>
+              <a:t>temp comments in code are good </a:t>
+            </a:r>
+            <a:r>
+              <a:rPr lang="en-US" u="sng" dirty="0"/>
+              <a:t>while</a:t>
+            </a:r>
+            <a:r>
+              <a:rPr lang="en-US" dirty="0"/>
+              <a:t> developing. Use a TODO marker</a:t>
+            </a:r>
+          </a:p>
+          <a:p>
+            <a:pPr lvl="1">
+              <a:lnSpc>
+                <a:spcPct val="170000"/>
+              </a:lnSpc>
+            </a:pPr>
+            <a:r>
+              <a:rPr lang="en-US" dirty="0"/>
+              <a:t>People who do not know the project should be able to install and setup the project. Hand-over to customer is important</a:t>
+            </a:r>
+          </a:p>
+        </p:txBody>
+      </p:sp>
+      <p:sp>
+        <p:nvSpPr>
+          <p:cNvPr id="5" name="Date Placeholder 4">
+            <a:extLst>
+              <a:ext uri="{FF2B5EF4-FFF2-40B4-BE49-F238E27FC236}">
+                <a16:creationId xmlns:a16="http://schemas.microsoft.com/office/drawing/2014/main" id="{976244E2-AA76-2742-B2EC-FEC79276155C}"/>
+              </a:ext>
+            </a:extLst>
+          </p:cNvPr>
+          <p:cNvSpPr>
+            <a:spLocks noGrp="1"/>
+          </p:cNvSpPr>
+          <p:nvPr>
+            <p:ph type="dt" sz="half" idx="10"/>
+          </p:nvPr>
+        </p:nvSpPr>
+        <p:spPr/>
+        <p:txBody>
+          <a:bodyPr/>
+          <a:lstStyle/>
+          <a:p>
+            <a:fld id="{202E1EC2-47B8-044B-A09E-6A63B4D80C87}" type="datetime1">
+              <a:rPr lang="fi-FI" smtClean="0"/>
+              <a:t>8.5.2022</a:t>
+            </a:fld>
+            <a:endParaRPr lang="en-GB"/>
+          </a:p>
+        </p:txBody>
+      </p:sp>
+      <p:sp>
+        <p:nvSpPr>
+          <p:cNvPr id="6" name="Footer Placeholder 5">
+            <a:extLst>
+              <a:ext uri="{FF2B5EF4-FFF2-40B4-BE49-F238E27FC236}">
+                <a16:creationId xmlns:a16="http://schemas.microsoft.com/office/drawing/2014/main" id="{588CE607-4137-8840-8FEA-42EAC857E3A3}"/>
+              </a:ext>
+            </a:extLst>
+          </p:cNvPr>
+          <p:cNvSpPr>
+            <a:spLocks noGrp="1"/>
+          </p:cNvSpPr>
+          <p:nvPr>
+            <p:ph type="ftr" sz="quarter" idx="11"/>
+          </p:nvPr>
+        </p:nvSpPr>
+        <p:spPr/>
+        <p:txBody>
+          <a:bodyPr/>
+          <a:lstStyle/>
+          <a:p>
+            <a:endParaRPr lang="en-GB"/>
+          </a:p>
+        </p:txBody>
+      </p:sp>
+      <p:sp>
+        <p:nvSpPr>
+          <p:cNvPr id="7" name="Slide Number Placeholder 6">
+            <a:extLst>
+              <a:ext uri="{FF2B5EF4-FFF2-40B4-BE49-F238E27FC236}">
+                <a16:creationId xmlns:a16="http://schemas.microsoft.com/office/drawing/2014/main" id="{2E133A96-6C73-0844-B8CB-27C2B5F4CFB1}"/>
+              </a:ext>
+            </a:extLst>
+          </p:cNvPr>
+          <p:cNvSpPr>
+            <a:spLocks noGrp="1"/>
+          </p:cNvSpPr>
+          <p:nvPr>
+            <p:ph type="sldNum" sz="quarter" idx="12"/>
+          </p:nvPr>
+        </p:nvSpPr>
+        <p:spPr/>
+        <p:txBody>
+          <a:bodyPr/>
+          <a:lstStyle/>
+          <a:p>
+            <a:fld id="{76BAB7ED-EDE9-4D4B-9A2D-30E18C47C16E}" type="slidenum">
+              <a:rPr lang="en-GB" smtClean="0"/>
+              <a:t>18</a:t>
+            </a:fld>
+            <a:endParaRPr lang="en-GB"/>
+          </a:p>
+        </p:txBody>
+      </p:sp>
+    </p:spTree>
+    <p:extLst>
+      <p:ext uri="{BB962C8B-B14F-4D97-AF65-F5344CB8AC3E}">
+        <p14:creationId xmlns:p14="http://schemas.microsoft.com/office/powerpoint/2010/main" val="3416131050"/>
+      </p:ext>
+    </p:extLst>
+  </p:cSld>
+  <p:clrMapOvr>
+    <a:masterClrMapping/>
+  </p:clrMapOvr>
+</p:sld>
+</file>
+
+<file path=ppt/slides/slide19.xml><?xml version="1.0" encoding="utf-8"?>
+<p:sld xmlns:a="http://schemas.openxmlformats.org/drawingml/2006/main" xmlns:r="http://schemas.openxmlformats.org/officeDocument/2006/relationships" xmlns:p="http://schemas.openxmlformats.org/presentationml/2006/main">
+  <p:cSld>
+    <p:spTree>
+      <p:nvGrpSpPr>
+        <p:cNvPr id="1" name=""/>
+        <p:cNvGrpSpPr/>
+        <p:nvPr/>
+      </p:nvGrpSpPr>
+      <p:grpSpPr>
+        <a:xfrm>
+          <a:off x="0" y="0"/>
+          <a:ext cx="0" cy="0"/>
+          <a:chOff x="0" y="0"/>
+          <a:chExt cx="0" cy="0"/>
+        </a:xfrm>
+      </p:grpSpPr>
+      <p:sp>
+        <p:nvSpPr>
+          <p:cNvPr id="8" name="Title 7">
+            <a:extLst>
+              <a:ext uri="{FF2B5EF4-FFF2-40B4-BE49-F238E27FC236}">
+                <a16:creationId xmlns:a16="http://schemas.microsoft.com/office/drawing/2014/main" id="{197044C3-CD23-D844-B780-26FABA91AD0F}"/>
+              </a:ext>
+            </a:extLst>
+          </p:cNvPr>
+          <p:cNvSpPr>
+            <a:spLocks noGrp="1"/>
+          </p:cNvSpPr>
+          <p:nvPr>
+            <p:ph type="title"/>
+          </p:nvPr>
+        </p:nvSpPr>
+        <p:spPr/>
+        <p:txBody>
+          <a:bodyPr/>
+          <a:lstStyle/>
+          <a:p>
+            <a:pPr lvl="0"/>
+            <a:r>
+              <a:rPr lang="en-US" dirty="0"/>
               <a:t>Other topics for the exam</a:t>
             </a:r>
             <a:endParaRPr lang="fi-FI" dirty="0"/>
@@ -9641,7 +9865,7 @@
           <a:p>
             <a:fld id="{76BAB7ED-EDE9-4D4B-9A2D-30E18C47C16E}" type="slidenum">
               <a:rPr lang="en-GB" smtClean="0"/>
-              <a:t>18</a:t>
+              <a:t>19</a:t>
             </a:fld>
             <a:endParaRPr lang="en-GB"/>
           </a:p>
@@ -9991,7 +10215,7 @@
           <a:p>
             <a:r>
               <a:rPr lang="en-US" i="1" dirty="0"/>
-              <a:t>One syntax example: What is the following?</a:t>
+              <a:t>One syntax example: What is happening in the following?</a:t>
             </a:r>
             <a:br>
               <a:rPr lang="en-US" i="1" dirty="0"/>
@@ -10415,9 +10639,8 @@
               <a:rPr lang="en-US" i="1" dirty="0"/>
               <a:t>' props.</a:t>
             </a:r>
-            <a:br>
-              <a:rPr lang="en-US" i="1" dirty="0"/>
-            </a:br>
+          </a:p>
+          <a:p>
             <a:r>
               <a:rPr lang="en-US" i="1" u="sng" dirty="0">
                 <a:hlinkClick r:id="rId3"/>
@@ -10910,6 +11133,7 @@
             <a:endParaRPr lang="fi-FI" i="1" dirty="0"/>
           </a:p>
           <a:p>
+            <a:pPr lvl="1"/>
             <a:r>
               <a:rPr lang="fi-FI" i="1" dirty="0" err="1"/>
               <a:t>const</a:t>
@@ -10981,6 +11205,7 @@
             <a:endParaRPr lang="fi-FI" i="1" dirty="0"/>
           </a:p>
           <a:p>
+            <a:pPr lvl="1"/>
             <a:r>
               <a:rPr lang="fi-FI" i="1" dirty="0" err="1"/>
               <a:t>const</a:t>
@@ -11084,6 +11309,7 @@
             <a:endParaRPr lang="fi-FI" i="1" dirty="0"/>
           </a:p>
           <a:p>
+            <a:pPr lvl="1"/>
             <a:r>
               <a:rPr lang="fi-FI" i="1" dirty="0" err="1"/>
               <a:t>the</a:t>
@@ -11190,6 +11416,7 @@
             </a:r>
           </a:p>
           <a:p>
+            <a:pPr lvl="1"/>
             <a:r>
               <a:rPr lang="fi-FI" i="1" dirty="0" err="1"/>
               <a:t>useState</a:t>
@@ -11261,6 +11488,7 @@
             <a:endParaRPr lang="fi-FI" i="1" dirty="0"/>
           </a:p>
           <a:p>
+            <a:pPr lvl="1"/>
             <a:r>
               <a:rPr lang="fi-FI" i="1" dirty="0" err="1"/>
               <a:t>we</a:t>
@@ -11993,7 +12221,7 @@
             </a:r>
             <a:r>
               <a:rPr lang="en-US" i="1" dirty="0"/>
-              <a:t> has replaced the React component life-cycle event handlers (Where you could 'attach' your event-handler functions). inner function = function defined inside the component function. So, the visibility of the function is inside the outer function, inside that component only.</a:t>
+              <a:t> has replaced the old React component life-cycle event handlers (Where you could 'attach' your event-handler functions). inner function = function defined inside the component function. So, the visibility of the function is inside the outer function, inside that component only.</a:t>
             </a:r>
           </a:p>
         </p:txBody>
@@ -12251,34 +12479,6 @@
               <a:rPr lang="en-US" i="1" u="sng" dirty="0"/>
               <a:t>Context Hooks</a:t>
             </a:r>
-          </a:p>
-          <a:p>
-            <a:endParaRPr lang="en-US" i="1" u="sng" dirty="0"/>
-          </a:p>
-          <a:p>
-            <a:pPr marL="0" lvl="0" indent="0">
-              <a:buNone/>
-            </a:pPr>
-            <a:r>
-              <a:rPr lang="en-US" i="1" u="sng" dirty="0"/>
-              <a:t>General rules of Hooks</a:t>
-            </a:r>
-            <a:endParaRPr lang="fi-FI" dirty="0"/>
-          </a:p>
-          <a:p>
-            <a:r>
-              <a:rPr lang="en-US" i="1" u="sng" dirty="0">
-                <a:hlinkClick r:id="rId6"/>
-              </a:rPr>
-              <a:t>https://reactjs.org/docs/hooks-rules.html</a:t>
-            </a:r>
-            <a:r>
-              <a:rPr lang="en-US" i="1" dirty="0"/>
-              <a:t> </a:t>
-            </a:r>
-            <a:endParaRPr lang="fi-FI" dirty="0"/>
-          </a:p>
-          <a:p>
             <a:endParaRPr lang="en-US" i="1" dirty="0"/>
           </a:p>
           <a:p>
@@ -12939,6 +13139,24 @@
 </file>
 
 <file path=customXml/item1.xml><?xml version="1.0" encoding="utf-8"?>
+<?mso-contentType ?>
+<FormTemplates xmlns="http://schemas.microsoft.com/sharepoint/v3/contenttype/forms">
+  <Display>DocumentLibraryForm</Display>
+  <Edit>DocumentLibraryForm</Edit>
+  <New>DocumentLibraryForm</New>
+</FormTemplates>
+</file>
+
+<file path=customXml/item2.xml><?xml version="1.0" encoding="utf-8"?>
+<p:properties xmlns:p="http://schemas.microsoft.com/office/2006/metadata/properties" xmlns:xsi="http://www.w3.org/2001/XMLSchema-instance" xmlns:pc="http://schemas.microsoft.com/office/infopath/2007/PartnerControls">
+  <documentManagement>
+    <PublishingExpirationDate xmlns="http://schemas.microsoft.com/sharepoint/v3" xsi:nil="true"/>
+    <PublishingStartDate xmlns="http://schemas.microsoft.com/sharepoint/v3" xsi:nil="true"/>
+  </documentManagement>
+</p:properties>
+</file>
+
+<file path=customXml/item3.xml><?xml version="1.0" encoding="utf-8"?>
 <ct:contentTypeSchema xmlns:ct="http://schemas.microsoft.com/office/2006/metadata/contentType" xmlns:ma="http://schemas.microsoft.com/office/2006/metadata/properties/metaAttributes" ct:_="" ma:_="" ma:contentTypeName="Document" ma:contentTypeID="0x01010024C55B41993A414DABB8DD07ACBA0814" ma:contentTypeVersion="1" ma:contentTypeDescription="Create a new document." ma:contentTypeScope="" ma:versionID="3ea0c22b5866975a7b271665de4056c5">
   <xsd:schema xmlns:xsd="http://www.w3.org/2001/XMLSchema" xmlns:xs="http://www.w3.org/2001/XMLSchema" xmlns:p="http://schemas.microsoft.com/office/2006/metadata/properties" xmlns:ns1="http://schemas.microsoft.com/sharepoint/v3" targetNamespace="http://schemas.microsoft.com/office/2006/metadata/properties" ma:root="true" ma:fieldsID="ef2aa9ed40e72a78c3822fc753b43e87" ns1:_="">
     <xsd:import namespace="http://schemas.microsoft.com/sharepoint/v3"/>
@@ -13070,25 +13288,31 @@
 </ct:contentTypeSchema>
 </file>
 
-<file path=customXml/item2.xml><?xml version="1.0" encoding="utf-8"?>
-<?mso-contentType ?>
-<FormTemplates xmlns="http://schemas.microsoft.com/sharepoint/v3/contenttype/forms">
-  <Display>DocumentLibraryForm</Display>
-  <Edit>DocumentLibraryForm</Edit>
-  <New>DocumentLibraryForm</New>
-</FormTemplates>
+<file path=customXml/itemProps1.xml><?xml version="1.0" encoding="utf-8"?>
+<ds:datastoreItem xmlns:ds="http://schemas.openxmlformats.org/officeDocument/2006/customXml" ds:itemID="{D546C03B-CD3A-4EA0-AAA4-0E00E896454E}">
+  <ds:schemaRefs>
+    <ds:schemaRef ds:uri="http://schemas.microsoft.com/sharepoint/v3/contenttype/forms"/>
+  </ds:schemaRefs>
+</ds:datastoreItem>
 </file>
 
-<file path=customXml/item3.xml><?xml version="1.0" encoding="utf-8"?>
-<p:properties xmlns:p="http://schemas.microsoft.com/office/2006/metadata/properties" xmlns:xsi="http://www.w3.org/2001/XMLSchema-instance" xmlns:pc="http://schemas.microsoft.com/office/infopath/2007/PartnerControls">
-  <documentManagement>
-    <PublishingExpirationDate xmlns="http://schemas.microsoft.com/sharepoint/v3" xsi:nil="true"/>
-    <PublishingStartDate xmlns="http://schemas.microsoft.com/sharepoint/v3" xsi:nil="true"/>
-  </documentManagement>
-</p:properties>
+<file path=customXml/itemProps2.xml><?xml version="1.0" encoding="utf-8"?>
+<ds:datastoreItem xmlns:ds="http://schemas.openxmlformats.org/officeDocument/2006/customXml" ds:itemID="{DED4E12E-7268-4B03-A47B-0755D62B5E31}">
+  <ds:schemaRefs>
+    <ds:schemaRef ds:uri="http://schemas.microsoft.com/office/infopath/2007/PartnerControls"/>
+    <ds:schemaRef ds:uri="http://purl.org/dc/elements/1.1/"/>
+    <ds:schemaRef ds:uri="http://schemas.microsoft.com/office/2006/documentManagement/types"/>
+    <ds:schemaRef ds:uri="http://purl.org/dc/dcmitype/"/>
+    <ds:schemaRef ds:uri="http://schemas.microsoft.com/office/2006/metadata/properties"/>
+    <ds:schemaRef ds:uri="http://schemas.openxmlformats.org/package/2006/metadata/core-properties"/>
+    <ds:schemaRef ds:uri="http://schemas.microsoft.com/sharepoint/v3"/>
+    <ds:schemaRef ds:uri="http://www.w3.org/XML/1998/namespace"/>
+    <ds:schemaRef ds:uri="http://purl.org/dc/terms/"/>
+  </ds:schemaRefs>
+</ds:datastoreItem>
 </file>
 
-<file path=customXml/itemProps1.xml><?xml version="1.0" encoding="utf-8"?>
+<file path=customXml/itemProps3.xml><?xml version="1.0" encoding="utf-8"?>
 <ds:datastoreItem xmlns:ds="http://schemas.openxmlformats.org/officeDocument/2006/customXml" ds:itemID="{B9E4DC25-62AA-44A0-8D5C-DB44892588AF}">
   <ds:schemaRefs>
     <ds:schemaRef ds:uri="http://schemas.microsoft.com/office/2006/metadata/contentType"/>
@@ -13104,28 +13328,4 @@
     <ds:schemaRef ds:uri="http://schemas.microsoft.com/internal/obd"/>
   </ds:schemaRefs>
 </ds:datastoreItem>
-</file>
-
-<file path=customXml/itemProps2.xml><?xml version="1.0" encoding="utf-8"?>
-<ds:datastoreItem xmlns:ds="http://schemas.openxmlformats.org/officeDocument/2006/customXml" ds:itemID="{D546C03B-CD3A-4EA0-AAA4-0E00E896454E}">
-  <ds:schemaRefs>
-    <ds:schemaRef ds:uri="http://schemas.microsoft.com/sharepoint/v3/contenttype/forms"/>
-  </ds:schemaRefs>
-</ds:datastoreItem>
-</file>
-
-<file path=customXml/itemProps3.xml><?xml version="1.0" encoding="utf-8"?>
-<ds:datastoreItem xmlns:ds="http://schemas.openxmlformats.org/officeDocument/2006/customXml" ds:itemID="{DED4E12E-7268-4B03-A47B-0755D62B5E31}">
-  <ds:schemaRefs>
-    <ds:schemaRef ds:uri="http://schemas.microsoft.com/office/infopath/2007/PartnerControls"/>
-    <ds:schemaRef ds:uri="http://purl.org/dc/elements/1.1/"/>
-    <ds:schemaRef ds:uri="http://schemas.microsoft.com/office/2006/documentManagement/types"/>
-    <ds:schemaRef ds:uri="http://purl.org/dc/dcmitype/"/>
-    <ds:schemaRef ds:uri="http://schemas.microsoft.com/office/2006/metadata/properties"/>
-    <ds:schemaRef ds:uri="http://schemas.openxmlformats.org/package/2006/metadata/core-properties"/>
-    <ds:schemaRef ds:uri="http://schemas.microsoft.com/sharepoint/v3"/>
-    <ds:schemaRef ds:uri="http://www.w3.org/XML/1998/namespace"/>
-    <ds:schemaRef ds:uri="http://purl.org/dc/terms/"/>
-  </ds:schemaRefs>
-</ds:datastoreItem>
 </file>
</xml_diff>

<commit_message>
Updating the frontend exam docs
</commit_message>
<xml_diff>
--- a/FrontendStuff_ForExam.pptx
+++ b/FrontendStuff_ForExam.pptx
@@ -5,7 +5,7 @@
     <p:sldMasterId id="2147483648" r:id="rId4"/>
   </p:sldMasterIdLst>
   <p:notesMasterIdLst>
-    <p:notesMasterId r:id="rId24"/>
+    <p:notesMasterId r:id="rId25"/>
   </p:notesMasterIdLst>
   <p:sldIdLst>
     <p:sldId id="256" r:id="rId5"/>
@@ -27,6 +27,7 @@
     <p:sldId id="271" r:id="rId21"/>
     <p:sldId id="273" r:id="rId22"/>
     <p:sldId id="272" r:id="rId23"/>
+    <p:sldId id="275" r:id="rId24"/>
   </p:sldIdLst>
   <p:sldSz cx="12192000" cy="6858000"/>
   <p:notesSz cx="6858000" cy="9144000"/>
@@ -1209,7 +1210,7 @@
           <a:p>
             <a:fld id="{5645C365-1C26-6946-87AF-75D6A7DF4277}" type="datetimeFigureOut">
               <a:rPr lang="en-GB" smtClean="0"/>
-              <a:t>08/05/2022</a:t>
+              <a:t>02/10/2022</a:t>
             </a:fld>
             <a:endParaRPr lang="en-GB"/>
           </a:p>
@@ -1708,7 +1709,7 @@
           <a:p>
             <a:fld id="{35B864B8-8D08-7B43-B4FB-B2FB41A5D9E3}" type="datetime1">
               <a:rPr lang="fi-FI" smtClean="0"/>
-              <a:t>8.5.2022</a:t>
+              <a:t>2.10.2022</a:t>
             </a:fld>
             <a:endParaRPr lang="en-GB" dirty="0"/>
           </a:p>
@@ -2035,7 +2036,7 @@
           <a:p>
             <a:fld id="{D5AEA85A-FC56-D34C-9AA6-ECC3D2586F37}" type="datetime1">
               <a:rPr lang="fi-FI" smtClean="0"/>
-              <a:t>8.5.2022</a:t>
+              <a:t>2.10.2022</a:t>
             </a:fld>
             <a:endParaRPr lang="en-GB" dirty="0"/>
           </a:p>
@@ -2245,7 +2246,7 @@
           <a:p>
             <a:fld id="{E6BC6EEF-E660-7844-8930-418AFF95EA40}" type="datetime1">
               <a:rPr lang="fi-FI" smtClean="0"/>
-              <a:t>8.5.2022</a:t>
+              <a:t>2.10.2022</a:t>
             </a:fld>
             <a:endParaRPr lang="en-GB" dirty="0"/>
           </a:p>
@@ -2554,7 +2555,7 @@
           <a:p>
             <a:fld id="{4E10C7EC-C1C1-9849-A573-7692478FCD52}" type="datetime1">
               <a:rPr lang="fi-FI" smtClean="0"/>
-              <a:t>8.5.2022</a:t>
+              <a:t>2.10.2022</a:t>
             </a:fld>
             <a:endParaRPr lang="en-GB" dirty="0"/>
           </a:p>
@@ -2827,7 +2828,7 @@
           <a:p>
             <a:fld id="{844FF3FE-30BE-2040-9151-6FBC4992BF4F}" type="datetime1">
               <a:rPr lang="fi-FI" smtClean="0"/>
-              <a:t>8.5.2022</a:t>
+              <a:t>2.10.2022</a:t>
             </a:fld>
             <a:endParaRPr lang="en-GB" dirty="0"/>
           </a:p>
@@ -3067,7 +3068,7 @@
           <a:p>
             <a:fld id="{11EDCD7B-6966-E249-89F2-D46BDFBF56BE}" type="datetime1">
               <a:rPr lang="fi-FI" smtClean="0"/>
-              <a:t>8.5.2022</a:t>
+              <a:t>2.10.2022</a:t>
             </a:fld>
             <a:endParaRPr lang="en-GB" dirty="0"/>
           </a:p>
@@ -3360,7 +3361,7 @@
           <a:p>
             <a:fld id="{11EDCD7B-6966-E249-89F2-D46BDFBF56BE}" type="datetime1">
               <a:rPr lang="fi-FI" smtClean="0"/>
-              <a:t>8.5.2022</a:t>
+              <a:t>2.10.2022</a:t>
             </a:fld>
             <a:endParaRPr lang="en-GB" dirty="0"/>
           </a:p>
@@ -3799,7 +3800,7 @@
           <a:p>
             <a:fld id="{844FF3FE-30BE-2040-9151-6FBC4992BF4F}" type="datetime1">
               <a:rPr lang="fi-FI" smtClean="0"/>
-              <a:t>8.5.2022</a:t>
+              <a:t>2.10.2022</a:t>
             </a:fld>
             <a:endParaRPr lang="en-GB" dirty="0"/>
           </a:p>
@@ -4027,7 +4028,7 @@
           <a:p>
             <a:fld id="{11EDCD7B-6966-E249-89F2-D46BDFBF56BE}" type="datetime1">
               <a:rPr lang="fi-FI" smtClean="0"/>
-              <a:t>8.5.2022</a:t>
+              <a:t>2.10.2022</a:t>
             </a:fld>
             <a:endParaRPr lang="en-GB" dirty="0"/>
           </a:p>
@@ -4442,7 +4443,7 @@
           <a:p>
             <a:fld id="{B62E192A-D52B-F541-B2AA-4AEB9388F1F7}" type="datetime1">
               <a:rPr lang="fi-FI" smtClean="0"/>
-              <a:t>8.5.2022</a:t>
+              <a:t>2.10.2022</a:t>
             </a:fld>
             <a:endParaRPr lang="en-GB" dirty="0"/>
           </a:p>
@@ -4742,7 +4743,7 @@
           <a:p>
             <a:fld id="{EEA4FAA2-2B3E-264C-A42F-2D6D3EF33A3C}" type="datetime1">
               <a:rPr lang="fi-FI" smtClean="0"/>
-              <a:t>8.5.2022</a:t>
+              <a:t>2.10.2022</a:t>
             </a:fld>
             <a:endParaRPr lang="en-GB" dirty="0"/>
           </a:p>
@@ -5645,7 +5646,7 @@
           <a:p>
             <a:fld id="{B3114A65-8017-1743-A85A-B2A4BB835AE9}" type="datetime1">
               <a:rPr lang="fi-FI" smtClean="0"/>
-              <a:t>8.5.2022</a:t>
+              <a:t>2.10.2022</a:t>
             </a:fld>
             <a:endParaRPr lang="en-GB" dirty="0"/>
           </a:p>
@@ -5873,7 +5874,7 @@
           <a:p>
             <a:fld id="{11EDCD7B-6966-E249-89F2-D46BDFBF56BE}" type="datetime1">
               <a:rPr lang="fi-FI" smtClean="0"/>
-              <a:t>8.5.2022</a:t>
+              <a:t>2.10.2022</a:t>
             </a:fld>
             <a:endParaRPr lang="en-GB" dirty="0"/>
           </a:p>
@@ -6165,7 +6166,7 @@
           <a:p>
             <a:fld id="{45F98643-D206-614D-B596-3C8548138211}" type="datetime1">
               <a:rPr lang="fi-FI" smtClean="0"/>
-              <a:t>8.5.2022</a:t>
+              <a:t>2.10.2022</a:t>
             </a:fld>
             <a:endParaRPr lang="en-GB" dirty="0"/>
           </a:p>
@@ -6810,7 +6811,7 @@
           <a:p>
             <a:fld id="{30BF63A1-919F-FB49-ABA8-182126D24C50}" type="datetime1">
               <a:rPr lang="fi-FI" smtClean="0"/>
-              <a:t>8.5.2022</a:t>
+              <a:t>2.10.2022</a:t>
             </a:fld>
             <a:endParaRPr lang="en-GB" dirty="0"/>
           </a:p>
@@ -6894,7 +6895,7 @@
           <a:p>
             <a:pPr lvl="0"/>
             <a:r>
-              <a:rPr lang="en-US" i="1" u="sng" dirty="0"/>
+              <a:rPr lang="en-US" u="sng" dirty="0"/>
               <a:t>General rules of Hooks</a:t>
             </a:r>
             <a:endParaRPr lang="fi-FI" dirty="0"/>
@@ -6925,40 +6926,230 @@
           <a:lstStyle/>
           <a:p>
             <a:r>
-              <a:rPr lang="en-US" i="1" u="sng" dirty="0">
+              <a:rPr lang="en-US" u="sng" dirty="0">
                 <a:hlinkClick r:id="rId2"/>
               </a:rPr>
               <a:t>https://reactjs.org/docs/hooks-rules.html</a:t>
             </a:r>
             <a:r>
-              <a:rPr lang="en-US" i="1" dirty="0"/>
+              <a:rPr lang="en-US" dirty="0"/>
               <a:t> </a:t>
             </a:r>
           </a:p>
           <a:p>
             <a:pPr lvl="1"/>
             <a:r>
-              <a:rPr lang="en-US" i="1" dirty="0"/>
+              <a:rPr lang="en-US" dirty="0"/>
               <a:t>Name must start with lower letter text “use”</a:t>
             </a:r>
           </a:p>
           <a:p>
             <a:pPr lvl="1"/>
             <a:r>
-              <a:rPr lang="en-US" i="1" dirty="0"/>
-              <a:t>Should only be placed/called  in the main level of the react component function</a:t>
+              <a:rPr lang="en-US" dirty="0"/>
+              <a:t>Should only be placed/called in the main level of the react component function</a:t>
             </a:r>
           </a:p>
           <a:p>
             <a:pPr lvl="1"/>
             <a:r>
-              <a:rPr lang="en-US" i="1" dirty="0"/>
-              <a:t>Only call hooks from react functions (or other hooks), not from your regular JavaScript functions</a:t>
-            </a:r>
-          </a:p>
-          <a:p>
-            <a:pPr lvl="1"/>
-            <a:endParaRPr lang="fi-FI" dirty="0"/>
+              <a:rPr lang="en-US" dirty="0"/>
+              <a:t>Call hooks only from your react functions (e.g. from your other hooks), </a:t>
+            </a:r>
+          </a:p>
+          <a:p>
+            <a:pPr lvl="2"/>
+            <a:r>
+              <a:rPr lang="en-US" dirty="0"/>
+              <a:t>Do not call them from your regular JavaScript functions</a:t>
+            </a:r>
+          </a:p>
+          <a:p>
+            <a:pPr marL="504000" lvl="1" indent="0">
+              <a:buNone/>
+            </a:pPr>
+            <a:endParaRPr lang="en-US" dirty="0"/>
+          </a:p>
+          <a:p>
+            <a:pPr marL="504000" lvl="1" indent="0">
+              <a:buNone/>
+            </a:pPr>
+            <a:endParaRPr lang="en-US" dirty="0"/>
+          </a:p>
+          <a:p>
+            <a:pPr marL="504000" lvl="1" indent="0">
+              <a:buNone/>
+            </a:pPr>
+            <a:endParaRPr lang="en-US" dirty="0"/>
+          </a:p>
+          <a:p>
+            <a:pPr marL="504000" lvl="1" indent="0">
+              <a:buNone/>
+            </a:pPr>
+            <a:endParaRPr lang="en-US" dirty="0"/>
+          </a:p>
+          <a:p>
+            <a:pPr marL="504000" lvl="1" indent="0">
+              <a:buNone/>
+            </a:pPr>
+            <a:endParaRPr lang="en-US" dirty="0"/>
+          </a:p>
+          <a:p>
+            <a:pPr marL="504000" lvl="1" indent="0">
+              <a:buNone/>
+            </a:pPr>
+            <a:r>
+              <a:rPr lang="fi-FI" dirty="0" err="1"/>
+              <a:t>Mostly</a:t>
+            </a:r>
+            <a:r>
+              <a:rPr lang="fi-FI" dirty="0"/>
+              <a:t> of </a:t>
+            </a:r>
+            <a:r>
+              <a:rPr lang="fi-FI" dirty="0" err="1"/>
+              <a:t>course</a:t>
+            </a:r>
+            <a:r>
+              <a:rPr lang="fi-FI" dirty="0"/>
+              <a:t> </a:t>
+            </a:r>
+            <a:r>
+              <a:rPr lang="fi-FI" dirty="0" err="1"/>
+              <a:t>the</a:t>
+            </a:r>
+            <a:r>
+              <a:rPr lang="fi-FI" dirty="0"/>
+              <a:t> </a:t>
+            </a:r>
+            <a:r>
+              <a:rPr lang="fi-FI" dirty="0" err="1"/>
+              <a:t>React</a:t>
+            </a:r>
+            <a:r>
+              <a:rPr lang="fi-FI" dirty="0"/>
+              <a:t> </a:t>
+            </a:r>
+            <a:r>
+              <a:rPr lang="fi-FI" dirty="0" err="1"/>
+              <a:t>environment</a:t>
+            </a:r>
+            <a:r>
+              <a:rPr lang="fi-FI" dirty="0"/>
+              <a:t> </a:t>
+            </a:r>
+            <a:r>
+              <a:rPr lang="fi-FI" dirty="0" err="1"/>
+              <a:t>itself</a:t>
+            </a:r>
+            <a:r>
+              <a:rPr lang="fi-FI" dirty="0"/>
+              <a:t> </a:t>
+            </a:r>
+            <a:r>
+              <a:rPr lang="fi-FI" dirty="0" err="1"/>
+              <a:t>calls</a:t>
+            </a:r>
+            <a:r>
+              <a:rPr lang="fi-FI" dirty="0"/>
+              <a:t> </a:t>
+            </a:r>
+            <a:r>
+              <a:rPr lang="fi-FI" dirty="0" err="1"/>
+              <a:t>the</a:t>
+            </a:r>
+            <a:r>
+              <a:rPr lang="fi-FI" dirty="0"/>
+              <a:t> </a:t>
+            </a:r>
+            <a:r>
+              <a:rPr lang="fi-FI" dirty="0" err="1"/>
+              <a:t>hooks</a:t>
+            </a:r>
+            <a:r>
+              <a:rPr lang="fi-FI" dirty="0"/>
+              <a:t>, and </a:t>
+            </a:r>
+            <a:r>
+              <a:rPr lang="fi-FI" dirty="0" err="1"/>
+              <a:t>not</a:t>
+            </a:r>
+            <a:r>
+              <a:rPr lang="fi-FI" dirty="0"/>
+              <a:t> us. </a:t>
+            </a:r>
+            <a:r>
+              <a:rPr lang="fi-FI" dirty="0" err="1"/>
+              <a:t>But</a:t>
+            </a:r>
+            <a:r>
+              <a:rPr lang="fi-FI" dirty="0"/>
+              <a:t> </a:t>
+            </a:r>
+            <a:r>
+              <a:rPr lang="fi-FI" dirty="0" err="1"/>
+              <a:t>if</a:t>
+            </a:r>
+            <a:r>
+              <a:rPr lang="fi-FI" dirty="0"/>
+              <a:t> </a:t>
+            </a:r>
+            <a:r>
+              <a:rPr lang="fi-FI" dirty="0" err="1"/>
+              <a:t>we</a:t>
+            </a:r>
+            <a:r>
+              <a:rPr lang="fi-FI" dirty="0"/>
+              <a:t> </a:t>
+            </a:r>
+            <a:r>
+              <a:rPr lang="fi-FI" dirty="0" err="1"/>
+              <a:t>call</a:t>
+            </a:r>
+            <a:r>
+              <a:rPr lang="fi-FI" dirty="0"/>
+              <a:t>, </a:t>
+            </a:r>
+            <a:r>
+              <a:rPr lang="fi-FI" dirty="0" err="1"/>
+              <a:t>then</a:t>
+            </a:r>
+            <a:r>
+              <a:rPr lang="fi-FI" dirty="0"/>
+              <a:t> </a:t>
+            </a:r>
+            <a:r>
+              <a:rPr lang="fi-FI" dirty="0" err="1"/>
+              <a:t>from</a:t>
+            </a:r>
+            <a:r>
+              <a:rPr lang="fi-FI" dirty="0"/>
+              <a:t> </a:t>
+            </a:r>
+            <a:r>
+              <a:rPr lang="fi-FI" dirty="0" err="1"/>
+              <a:t>our</a:t>
+            </a:r>
+            <a:r>
+              <a:rPr lang="fi-FI" dirty="0"/>
+              <a:t> </a:t>
+            </a:r>
+            <a:r>
+              <a:rPr lang="fi-FI" dirty="0" err="1"/>
+              <a:t>rect</a:t>
+            </a:r>
+            <a:r>
+              <a:rPr lang="fi-FI" dirty="0"/>
+              <a:t> </a:t>
+            </a:r>
+            <a:r>
+              <a:rPr lang="fi-FI" dirty="0" err="1"/>
+              <a:t>functions</a:t>
+            </a:r>
+            <a:r>
+              <a:rPr lang="fi-FI" dirty="0"/>
+              <a:t>.</a:t>
+            </a:r>
           </a:p>
           <a:p>
             <a:endParaRPr lang="en-US" i="1" dirty="0"/>
@@ -6991,7 +7182,7 @@
           <a:p>
             <a:fld id="{202E1EC2-47B8-044B-A09E-6A63B4D80C87}" type="datetime1">
               <a:rPr lang="fi-FI" smtClean="0"/>
-              <a:t>8.5.2022</a:t>
+              <a:t>2.10.2022</a:t>
             </a:fld>
             <a:endParaRPr lang="en-GB"/>
           </a:p>
@@ -7362,7 +7553,7 @@
           <a:p>
             <a:fld id="{202E1EC2-47B8-044B-A09E-6A63B4D80C87}" type="datetime1">
               <a:rPr lang="fi-FI" smtClean="0"/>
-              <a:t>8.5.2022</a:t>
+              <a:t>2.10.2022</a:t>
             </a:fld>
             <a:endParaRPr lang="en-GB"/>
           </a:p>
@@ -7512,44 +7703,44 @@
           <a:p>
             <a:pPr lvl="0"/>
             <a:r>
-              <a:rPr lang="en-US" i="1" dirty="0"/>
+              <a:rPr lang="en-US" dirty="0"/>
               <a:t>Advanced topic, useful still in our case</a:t>
             </a:r>
             <a:endParaRPr lang="fi-FI" dirty="0"/>
           </a:p>
           <a:p>
             <a:r>
-              <a:rPr lang="en-US" i="1" u="sng" dirty="0">
+              <a:rPr lang="en-US" u="sng" dirty="0">
                 <a:hlinkClick r:id="rId2"/>
               </a:rPr>
               <a:t>https://reactjs.org/docs/hooks-reference.html#usecontext</a:t>
             </a:r>
             <a:r>
-              <a:rPr lang="en-US" i="1" dirty="0"/>
+              <a:rPr lang="en-US" dirty="0"/>
               <a:t> </a:t>
             </a:r>
           </a:p>
           <a:p>
             <a:r>
-              <a:rPr lang="en-US" i="1" dirty="0">
+              <a:rPr lang="en-US" dirty="0">
                 <a:hlinkClick r:id="rId3"/>
               </a:rPr>
               <a:t>https://reactjs.org/docs/context.html#when-to-use-context</a:t>
             </a:r>
             <a:br>
-              <a:rPr lang="en-US" i="1" dirty="0"/>
+              <a:rPr lang="en-US" dirty="0"/>
             </a:br>
-            <a:endParaRPr lang="en-US" i="1" dirty="0"/>
-          </a:p>
-          <a:p>
-            <a:r>
-              <a:rPr lang="en-US" i="1" u="sng" dirty="0">
+            <a:endParaRPr lang="en-US" dirty="0"/>
+          </a:p>
+          <a:p>
+            <a:r>
+              <a:rPr lang="en-US" u="sng" dirty="0">
                 <a:hlinkClick r:id="rId4"/>
               </a:rPr>
               <a:t>https://www.youtube.com/watch?v=lhMKvyLRWo0</a:t>
             </a:r>
             <a:r>
-              <a:rPr lang="en-US" i="1" dirty="0"/>
+              <a:rPr lang="en-US" dirty="0"/>
               <a:t> </a:t>
             </a:r>
           </a:p>
@@ -7772,7 +7963,7 @@
           <a:p>
             <a:fld id="{202E1EC2-47B8-044B-A09E-6A63B4D80C87}" type="datetime1">
               <a:rPr lang="fi-FI" smtClean="0"/>
-              <a:t>8.5.2022</a:t>
+              <a:t>2.10.2022</a:t>
             </a:fld>
             <a:endParaRPr lang="en-GB"/>
           </a:p>
@@ -7930,7 +8121,7 @@
           <a:p>
             <a:r>
               <a:rPr lang="en-US" i="1" dirty="0"/>
-              <a:t>- custom hooks,   like the ones in the second video:    </a:t>
+              <a:t>custom hooks,   like the ones in the second video:    </a:t>
             </a:r>
             <a:endParaRPr lang="fi-FI" dirty="0"/>
           </a:p>
@@ -7987,7 +8178,7 @@
           <a:p>
             <a:fld id="{202E1EC2-47B8-044B-A09E-6A63B4D80C87}" type="datetime1">
               <a:rPr lang="fi-FI" smtClean="0"/>
-              <a:t>8.5.2022</a:t>
+              <a:t>2.10.2022</a:t>
             </a:fld>
             <a:endParaRPr lang="en-GB"/>
           </a:p>
@@ -8144,30 +8335,34 @@
           <a:p>
             <a:r>
               <a:rPr lang="en-US" i="1" dirty="0"/>
-              <a:t>What kind of project create-react-app creates? (</a:t>
-            </a:r>
-            <a:r>
-              <a:rPr lang="en-US" i="1" dirty="0" err="1"/>
+              <a:t>What kind of project create-react-app creates? </a:t>
+            </a:r>
+            <a:r>
+              <a:rPr lang="en-US" dirty="0"/>
+              <a:t>(</a:t>
+            </a:r>
+            <a:r>
+              <a:rPr lang="en-US" dirty="0" err="1"/>
               <a:t>npm</a:t>
             </a:r>
             <a:r>
-              <a:rPr lang="en-US" i="1" dirty="0"/>
+              <a:rPr lang="en-US" dirty="0"/>
               <a:t> start =&gt; dev time environment with Node server, </a:t>
             </a:r>
             <a:r>
-              <a:rPr lang="en-US" i="1" dirty="0" err="1"/>
+              <a:rPr lang="en-US" dirty="0" err="1"/>
               <a:t>webpackage</a:t>
             </a:r>
             <a:r>
-              <a:rPr lang="en-US" i="1" dirty="0"/>
+              <a:rPr lang="en-US" dirty="0"/>
               <a:t>/</a:t>
             </a:r>
             <a:r>
-              <a:rPr lang="en-US" i="1" dirty="0" err="1"/>
+              <a:rPr lang="en-US" dirty="0" err="1"/>
               <a:t>nodemon</a:t>
             </a:r>
             <a:r>
-              <a:rPr lang="en-US" i="1" dirty="0"/>
+              <a:rPr lang="en-US" dirty="0"/>
               <a:t> (and e.g. React Dev tools) starts)</a:t>
             </a:r>
             <a:endParaRPr lang="fi-FI" dirty="0"/>
@@ -8189,57 +8384,57 @@
           <a:p>
             <a:pPr lvl="1"/>
             <a:r>
-              <a:rPr lang="en-US" i="1" dirty="0" err="1"/>
+              <a:rPr lang="en-US" dirty="0" err="1"/>
               <a:t>npm</a:t>
             </a:r>
             <a:r>
-              <a:rPr lang="en-US" i="1" dirty="0"/>
+              <a:rPr lang="en-US" dirty="0"/>
               <a:t> build =&gt;  /build folder with only few mashed up .html and .</a:t>
             </a:r>
             <a:r>
-              <a:rPr lang="en-US" i="1" dirty="0" err="1"/>
+              <a:rPr lang="en-US" dirty="0" err="1"/>
               <a:t>js</a:t>
             </a:r>
             <a:r>
-              <a:rPr lang="en-US" i="1" dirty="0"/>
+              <a:rPr lang="en-US" dirty="0"/>
               <a:t> (and needed .</a:t>
             </a:r>
             <a:r>
-              <a:rPr lang="en-US" i="1" dirty="0" err="1"/>
+              <a:rPr lang="en-US" dirty="0" err="1"/>
               <a:t>css</a:t>
             </a:r>
             <a:r>
-              <a:rPr lang="en-US" i="1" dirty="0"/>
+              <a:rPr lang="en-US" dirty="0"/>
               <a:t> plus other static files),  </a:t>
             </a:r>
           </a:p>
           <a:p>
             <a:pPr lvl="1"/>
             <a:r>
-              <a:rPr lang="en-US" i="1" dirty="0"/>
+              <a:rPr lang="en-US" dirty="0"/>
               <a:t>no Node anymore, no ES5,6,7,8, no </a:t>
             </a:r>
             <a:r>
-              <a:rPr lang="en-US" i="1" dirty="0" err="1"/>
+              <a:rPr lang="en-US" dirty="0" err="1"/>
               <a:t>node_modules</a:t>
             </a:r>
             <a:r>
-              <a:rPr lang="en-US" i="1" dirty="0"/>
+              <a:rPr lang="en-US" dirty="0"/>
               <a:t>, just browser runnable ‘DOM API’ JS + html + </a:t>
             </a:r>
             <a:r>
-              <a:rPr lang="en-US" i="1" dirty="0" err="1"/>
+              <a:rPr lang="en-US" dirty="0" err="1"/>
               <a:t>css</a:t>
             </a:r>
             <a:r>
-              <a:rPr lang="en-US" i="1" dirty="0"/>
+              <a:rPr lang="en-US" dirty="0"/>
               <a:t> + …, </a:t>
             </a:r>
           </a:p>
           <a:p>
             <a:pPr lvl="1"/>
             <a:r>
-              <a:rPr lang="en-US" i="1" dirty="0"/>
+              <a:rPr lang="en-US" dirty="0"/>
               <a:t>served to the client's web browser by even a static web server, from www ports like 80/443 or so</a:t>
             </a:r>
             <a:br>
@@ -8275,7 +8470,7 @@
           <a:p>
             <a:fld id="{202E1EC2-47B8-044B-A09E-6A63B4D80C87}" type="datetime1">
               <a:rPr lang="fi-FI" smtClean="0"/>
-              <a:t>8.5.2022</a:t>
+              <a:t>2.10.2022</a:t>
             </a:fld>
             <a:endParaRPr lang="en-GB"/>
           </a:p>
@@ -8419,34 +8614,34 @@
           <a:lstStyle/>
           <a:p>
             <a:r>
-              <a:rPr lang="en-US" i="1" dirty="0"/>
+              <a:rPr lang="en-US" dirty="0"/>
               <a:t>Only one web page downloaded from the Web Server, but then with JS &amp; AJAX that single page’s DOM updated constantly. Showing/hiding certain Views so that it looks like we would have several Pages</a:t>
             </a:r>
             <a:endParaRPr lang="fi-FI" dirty="0"/>
           </a:p>
           <a:p>
             <a:r>
-              <a:rPr lang="en-US" i="1" dirty="0"/>
+              <a:rPr lang="en-US" dirty="0"/>
               <a:t>SPA understood in general. </a:t>
             </a:r>
           </a:p>
           <a:p>
             <a:r>
-              <a:rPr lang="en-US" i="1" dirty="0"/>
+              <a:rPr lang="en-US" dirty="0"/>
               <a:t>Single page which is changed based on user actions, by JS code, AJAX requests/responses and react-router routing "going to a new View" with possible routing parameters.</a:t>
             </a:r>
             <a:endParaRPr lang="fi-FI" dirty="0"/>
           </a:p>
           <a:p>
             <a:r>
-              <a:rPr lang="en-US" i="1" dirty="0"/>
+              <a:rPr lang="en-US" dirty="0"/>
               <a:t>React components can be: </a:t>
             </a:r>
           </a:p>
           <a:p>
             <a:pPr lvl="1"/>
             <a:r>
-              <a:rPr lang="en-US" i="1" dirty="0"/>
+              <a:rPr lang="en-US" dirty="0"/>
               <a:t>Views = SPA ‘pages’ we can get routed to</a:t>
             </a:r>
             <a:endParaRPr lang="fi-FI" dirty="0"/>
@@ -8454,21 +8649,21 @@
           <a:p>
             <a:pPr lvl="1"/>
             <a:r>
-              <a:rPr lang="en-US" i="1" dirty="0"/>
+              <a:rPr lang="en-US" dirty="0"/>
               <a:t>Some others are re-usable children of the Views</a:t>
             </a:r>
             <a:endParaRPr lang="fi-FI" dirty="0"/>
           </a:p>
           <a:p>
             <a:r>
-              <a:rPr lang="en-US" i="1" dirty="0"/>
+              <a:rPr lang="en-US" dirty="0"/>
               <a:t>Some are:</a:t>
             </a:r>
           </a:p>
           <a:p>
             <a:pPr lvl="1"/>
             <a:r>
-              <a:rPr lang="en-US" i="1" dirty="0"/>
+              <a:rPr lang="en-US" dirty="0"/>
               <a:t>container components who have/fetch the data, hold the state</a:t>
             </a:r>
             <a:endParaRPr lang="fi-FI" dirty="0"/>
@@ -8476,12 +8671,9 @@
           <a:p>
             <a:pPr lvl="1"/>
             <a:r>
-              <a:rPr lang="en-US" i="1" dirty="0"/>
+              <a:rPr lang="en-US" dirty="0"/>
               <a:t>Some others are presentational components who get the data from mother, and who only show what they get (plus possibly provide links/buttons related to _that_ item that it's showing)</a:t>
             </a:r>
-            <a:endParaRPr lang="fi-FI" dirty="0"/>
-          </a:p>
-          <a:p>
             <a:endParaRPr lang="fi-FI" dirty="0"/>
           </a:p>
         </p:txBody>
@@ -8509,7 +8701,7 @@
           <a:p>
             <a:fld id="{202E1EC2-47B8-044B-A09E-6A63B4D80C87}" type="datetime1">
               <a:rPr lang="fi-FI" smtClean="0"/>
-              <a:t>8.5.2022</a:t>
+              <a:t>2.10.2022</a:t>
             </a:fld>
             <a:endParaRPr lang="en-GB"/>
           </a:p>
@@ -8682,20 +8874,20 @@
           <a:p>
             <a:r>
               <a:rPr lang="en-US" i="1" dirty="0"/>
-              <a:t>How is the react-router routing working in general. </a:t>
+              <a:t>How is the react-router routing working in general? </a:t>
             </a:r>
             <a:endParaRPr lang="fi-FI" dirty="0"/>
           </a:p>
           <a:p>
             <a:pPr lvl="1"/>
             <a:r>
-              <a:rPr lang="en-US" i="1" u="sng" dirty="0">
+              <a:rPr lang="en-US" u="sng" dirty="0">
                 <a:hlinkClick r:id="rId2"/>
               </a:rPr>
               <a:t>https://youtu.be/Law7wfdg_ls?t=73</a:t>
             </a:r>
             <a:r>
-              <a:rPr lang="en-US" i="1" dirty="0"/>
+              <a:rPr lang="en-US" dirty="0"/>
               <a:t> </a:t>
             </a:r>
             <a:endParaRPr lang="fi-FI" dirty="0"/>
@@ -8703,7 +8895,7 @@
           <a:p>
             <a:pPr lvl="1"/>
             <a:r>
-              <a:rPr lang="en-US" i="1" dirty="0"/>
+              <a:rPr lang="en-US" dirty="0"/>
               <a:t>from 1:13 (link above already at that time) until 16:46 at least. </a:t>
             </a:r>
             <a:endParaRPr lang="fi-FI" dirty="0"/>
@@ -8711,112 +8903,112 @@
           <a:p>
             <a:pPr lvl="1"/>
             <a:r>
-              <a:rPr lang="en-US" i="1" dirty="0"/>
+              <a:rPr lang="en-US" dirty="0"/>
               <a:t>after 16:46 starts "custom routing" i.e. routing with parameters. 33 mins in total.</a:t>
             </a:r>
           </a:p>
           <a:p>
             <a:r>
-              <a:rPr lang="en-US" b="1" i="1" dirty="0"/>
+              <a:rPr lang="en-US" b="1" dirty="0"/>
               <a:t>Ingredients of routing</a:t>
             </a:r>
             <a:r>
-              <a:rPr lang="en-US" i="1" dirty="0"/>
+              <a:rPr lang="en-US" dirty="0"/>
               <a:t>: </a:t>
             </a:r>
           </a:p>
           <a:p>
             <a:pPr lvl="1"/>
             <a:r>
-              <a:rPr lang="en-US" b="1" i="1" dirty="0"/>
+              <a:rPr lang="en-US" b="1" dirty="0"/>
               <a:t>react-router-</a:t>
             </a:r>
             <a:r>
-              <a:rPr lang="en-US" b="1" i="1" dirty="0" err="1"/>
+              <a:rPr lang="en-US" b="1" dirty="0" err="1"/>
               <a:t>dom</a:t>
             </a:r>
             <a:r>
-              <a:rPr lang="en-US" i="1" dirty="0"/>
+              <a:rPr lang="en-US" dirty="0"/>
               <a:t> node module, </a:t>
             </a:r>
           </a:p>
           <a:p>
             <a:pPr lvl="1"/>
             <a:r>
-              <a:rPr lang="en-US" b="1" i="1" dirty="0"/>
+              <a:rPr lang="en-US" b="1" dirty="0"/>
               <a:t>Router</a:t>
             </a:r>
             <a:r>
-              <a:rPr lang="en-US" i="1" dirty="0"/>
+              <a:rPr lang="en-US" dirty="0"/>
               <a:t> at root component with </a:t>
             </a:r>
             <a:r>
-              <a:rPr lang="en-US" b="1" i="1" dirty="0"/>
+              <a:rPr lang="en-US" b="1" dirty="0"/>
               <a:t>Switch or similar</a:t>
             </a:r>
             <a:r>
-              <a:rPr lang="en-US" i="1" dirty="0"/>
+              <a:rPr lang="en-US" dirty="0"/>
               <a:t>, </a:t>
             </a:r>
           </a:p>
           <a:p>
             <a:pPr lvl="1"/>
             <a:r>
-              <a:rPr lang="en-US" b="1" i="1" dirty="0"/>
+              <a:rPr lang="en-US" b="1" dirty="0"/>
               <a:t>Routes </a:t>
             </a:r>
             <a:r>
-              <a:rPr lang="en-US" i="1" dirty="0"/>
+              <a:rPr lang="en-US" dirty="0"/>
               <a:t>with </a:t>
             </a:r>
             <a:r>
-              <a:rPr lang="en-US" b="1" i="1" dirty="0"/>
+              <a:rPr lang="en-US" b="1" dirty="0"/>
               <a:t>"</a:t>
             </a:r>
             <a:r>
-              <a:rPr lang="en-US" b="1" i="1" dirty="0" err="1"/>
+              <a:rPr lang="en-US" b="1" dirty="0" err="1"/>
               <a:t>url</a:t>
             </a:r>
             <a:r>
-              <a:rPr lang="en-US" b="1" i="1" dirty="0"/>
+              <a:rPr lang="en-US" b="1" dirty="0"/>
               <a:t>" patterns</a:t>
             </a:r>
             <a:r>
-              <a:rPr lang="en-US" i="1" dirty="0"/>
+              <a:rPr lang="en-US" dirty="0"/>
               <a:t>, possible </a:t>
             </a:r>
             <a:r>
-              <a:rPr lang="en-US" b="1" i="1" dirty="0"/>
+              <a:rPr lang="en-US" b="1" dirty="0"/>
               <a:t>parameters</a:t>
             </a:r>
             <a:r>
-              <a:rPr lang="en-US" i="1" dirty="0"/>
+              <a:rPr lang="en-US" dirty="0"/>
               <a:t>, </a:t>
             </a:r>
           </a:p>
           <a:p>
             <a:pPr lvl="1"/>
             <a:r>
-              <a:rPr lang="en-US" i="1" dirty="0"/>
+              <a:rPr lang="en-US" dirty="0"/>
               <a:t>Route mapped to (view) React </a:t>
             </a:r>
             <a:r>
-              <a:rPr lang="en-US" b="1" i="1" dirty="0"/>
+              <a:rPr lang="en-US" b="1" dirty="0"/>
               <a:t>component</a:t>
             </a:r>
             <a:r>
-              <a:rPr lang="en-US" i="1" dirty="0"/>
+              <a:rPr lang="en-US" dirty="0"/>
               <a:t>, </a:t>
             </a:r>
           </a:p>
           <a:p>
             <a:pPr lvl="1"/>
             <a:r>
-              <a:rPr lang="en-US" b="1" i="1" dirty="0"/>
+              <a:rPr lang="en-US" b="1" dirty="0"/>
               <a:t>Link</a:t>
             </a:r>
             <a:r>
-              <a:rPr lang="en-US" i="1" dirty="0"/>
+              <a:rPr lang="en-US" dirty="0"/>
               <a:t> components in other (view) components' code that use those Routes. Offering navigation to another view</a:t>
             </a:r>
             <a:endParaRPr lang="fi-FI" dirty="0"/>
@@ -8849,7 +9041,7 @@
           <a:p>
             <a:fld id="{202E1EC2-47B8-044B-A09E-6A63B4D80C87}" type="datetime1">
               <a:rPr lang="fi-FI" smtClean="0"/>
-              <a:t>8.5.2022</a:t>
+              <a:t>2.10.2022</a:t>
             </a:fld>
             <a:endParaRPr lang="en-GB"/>
           </a:p>
@@ -9009,7 +9201,7 @@
           <a:p>
             <a:pPr lvl="1"/>
             <a:r>
-              <a:rPr lang="en-US" i="1" dirty="0"/>
+              <a:rPr lang="en-US" dirty="0"/>
               <a:t>Answer: Injected to the root React element, and theme-abled child components used, and they automagically read the style from the component tree</a:t>
             </a:r>
           </a:p>
@@ -9170,7 +9362,7 @@
           <a:p>
             <a:fld id="{202E1EC2-47B8-044B-A09E-6A63B4D80C87}" type="datetime1">
               <a:rPr lang="fi-FI" smtClean="0"/>
-              <a:t>8.5.2022</a:t>
+              <a:t>2.10.2022</a:t>
             </a:fld>
             <a:endParaRPr lang="en-GB"/>
           </a:p>
@@ -9538,7 +9730,7 @@
           <a:p>
             <a:fld id="{202E1EC2-47B8-044B-A09E-6A63B4D80C87}" type="datetime1">
               <a:rPr lang="fi-FI" smtClean="0"/>
-              <a:t>8.5.2022</a:t>
+              <a:t>2.10.2022</a:t>
             </a:fld>
             <a:endParaRPr lang="en-GB"/>
           </a:p>
@@ -9652,7 +9844,7 @@
             <a:pPr lvl="0"/>
             <a:r>
               <a:rPr lang="en-US" dirty="0"/>
-              <a:t>Other topics for the exam</a:t>
+              <a:t>Tech used in this semester’s case</a:t>
             </a:r>
             <a:endParaRPr lang="fi-FI" dirty="0"/>
           </a:p>
@@ -9686,104 +9878,86 @@
           </a:bodyPr>
           <a:lstStyle/>
           <a:p>
-            <a:pPr lvl="0"/>
-            <a:r>
-              <a:rPr lang="en-US" b="1" dirty="0"/>
-              <a:t>AJAX</a:t>
-            </a:r>
-            <a:endParaRPr lang="fi-FI" dirty="0"/>
-          </a:p>
-          <a:p>
-            <a:r>
-              <a:rPr lang="en-US" i="1" dirty="0"/>
-              <a:t>- Something about AJAX?</a:t>
-            </a:r>
-          </a:p>
-          <a:p>
-            <a:pPr lvl="1"/>
-            <a:r>
-              <a:rPr lang="en-US" i="1" dirty="0"/>
-              <a:t>Do we get the result out as JSON text, or already auto-parsed to be a JS object? Depends on library / function</a:t>
-            </a:r>
-          </a:p>
-          <a:p>
-            <a:pPr lvl="1"/>
-            <a:r>
-              <a:rPr lang="en-US" i="1" dirty="0"/>
-              <a:t>Usually each AJAX library has multiple different ways to write exactly same things! (e.g. </a:t>
-            </a:r>
-            <a:r>
-              <a:rPr lang="en-US" i="1" dirty="0" err="1"/>
-              <a:t>Axios</a:t>
-            </a:r>
-            <a:r>
-              <a:rPr lang="en-US" i="1" dirty="0"/>
-              <a:t> has, jQuery has,…)</a:t>
-            </a:r>
-            <a:endParaRPr lang="fi-FI" dirty="0"/>
-          </a:p>
-          <a:p>
-            <a:pPr lvl="0"/>
-            <a:r>
-              <a:rPr lang="en-US" b="1" dirty="0" err="1"/>
-              <a:t>LocalStorage</a:t>
-            </a:r>
-            <a:endParaRPr lang="fi-FI" dirty="0"/>
-          </a:p>
-          <a:p>
-            <a:pPr lvl="1"/>
-            <a:r>
-              <a:rPr lang="en-US" i="1" dirty="0"/>
-              <a:t>Browsers are able to save text files to the computer’s disk and open them with a key/name e.g. days later. If objects are stringified=(serialized as JSON text) we can even persist (data) objects.</a:t>
-            </a:r>
-            <a:endParaRPr lang="fi-FI" dirty="0"/>
-          </a:p>
-          <a:p>
-            <a:pPr lvl="0"/>
-            <a:r>
-              <a:rPr lang="en-US" b="1" dirty="0"/>
-              <a:t>Full-stack open 202X, the reading list</a:t>
-            </a:r>
-            <a:endParaRPr lang="fi-FI" dirty="0"/>
-          </a:p>
-          <a:p>
-            <a:pPr lvl="1"/>
-            <a:r>
-              <a:rPr lang="en-US" i="1" dirty="0"/>
-              <a:t>has now the green parts that are interesting from Frontend learning point of view!</a:t>
-            </a:r>
-            <a:endParaRPr lang="fi-FI" dirty="0"/>
-          </a:p>
-          <a:p>
-            <a:pPr lvl="1"/>
-            <a:r>
-              <a:rPr lang="en-US" i="1" u="sng" dirty="0">
-                <a:hlinkClick r:id="rId2"/>
-              </a:rPr>
-              <a:t>https://github.com/valju/docs_backend_design/blob/master/FSO/FSOReadingList.pdf</a:t>
-            </a:r>
-            <a:r>
-              <a:rPr lang="en-US" i="1" dirty="0"/>
-              <a:t> (in Backend docs repo)   Note: some things from part 7 might be added for the Spring 2022 exam and onwards for advanced students!</a:t>
-            </a:r>
-            <a:endParaRPr lang="fi-FI" dirty="0"/>
-          </a:p>
-          <a:p>
-            <a:pPr lvl="0"/>
-            <a:r>
-              <a:rPr lang="en-US" b="1" dirty="0"/>
-              <a:t>For thoughts:   Possible frontend project design &amp; creation steps</a:t>
-            </a:r>
-            <a:endParaRPr lang="fi-FI" dirty="0"/>
-          </a:p>
-          <a:p>
-            <a:pPr lvl="1"/>
-            <a:r>
-              <a:rPr lang="en-US" i="1" u="sng" dirty="0">
-                <a:hlinkClick r:id="rId3"/>
-              </a:rPr>
-              <a:t>https://github.com/valju/docs_frontend_design/blob/master/FrontendRelatedSteps_SimilarToOurCases.pdf</a:t>
-            </a:r>
+            <a:pPr marL="0" indent="0">
+              <a:buNone/>
+            </a:pPr>
+            <a:r>
+              <a:rPr lang="fi-FI" dirty="0" err="1"/>
+              <a:t>See</a:t>
+            </a:r>
+            <a:r>
+              <a:rPr lang="fi-FI" dirty="0"/>
+              <a:t> </a:t>
+            </a:r>
+            <a:r>
+              <a:rPr lang="fi-FI" dirty="0" err="1"/>
+              <a:t>the</a:t>
+            </a:r>
+            <a:r>
+              <a:rPr lang="fi-FI" dirty="0"/>
+              <a:t> </a:t>
+            </a:r>
+            <a:r>
+              <a:rPr lang="fi-FI" dirty="0" err="1"/>
+              <a:t>possible</a:t>
+            </a:r>
+            <a:r>
+              <a:rPr lang="fi-FI" dirty="0"/>
+              <a:t> Frontend_UsedTech_20XXY.pdf </a:t>
+            </a:r>
+            <a:r>
+              <a:rPr lang="fi-FI" dirty="0" err="1"/>
+              <a:t>file</a:t>
+            </a:r>
+            <a:r>
+              <a:rPr lang="fi-FI" dirty="0"/>
+              <a:t> in </a:t>
+            </a:r>
+            <a:r>
+              <a:rPr lang="fi-FI" dirty="0" err="1"/>
+              <a:t>this</a:t>
+            </a:r>
+            <a:r>
+              <a:rPr lang="fi-FI" dirty="0"/>
+              <a:t> </a:t>
+            </a:r>
+            <a:r>
+              <a:rPr lang="fi-FI" dirty="0" err="1"/>
+              <a:t>frontend</a:t>
+            </a:r>
+            <a:r>
+              <a:rPr lang="fi-FI" dirty="0"/>
+              <a:t> </a:t>
+            </a:r>
+            <a:r>
+              <a:rPr lang="fi-FI" dirty="0" err="1"/>
+              <a:t>learning</a:t>
+            </a:r>
+            <a:r>
+              <a:rPr lang="fi-FI" dirty="0"/>
+              <a:t> </a:t>
+            </a:r>
+            <a:r>
+              <a:rPr lang="fi-FI" dirty="0" err="1"/>
+              <a:t>repository</a:t>
+            </a:r>
+            <a:r>
+              <a:rPr lang="fi-FI" dirty="0"/>
+              <a:t> (</a:t>
+            </a:r>
+            <a:r>
+              <a:rPr lang="fi-FI" dirty="0" err="1"/>
+              <a:t>docs_frontend_design</a:t>
+            </a:r>
+            <a:r>
+              <a:rPr lang="fi-FI"/>
+              <a:t>).</a:t>
+            </a:r>
+          </a:p>
+          <a:p>
+            <a:pPr marL="0" indent="0">
+              <a:buNone/>
+            </a:pPr>
             <a:endParaRPr lang="fi-FI" dirty="0"/>
           </a:p>
         </p:txBody>
@@ -9811,7 +9985,7 @@
           <a:p>
             <a:fld id="{202E1EC2-47B8-044B-A09E-6A63B4D80C87}" type="datetime1">
               <a:rPr lang="fi-FI" smtClean="0"/>
-              <a:t>8.5.2022</a:t>
+              <a:t>2.10.2022</a:t>
             </a:fld>
             <a:endParaRPr lang="en-GB"/>
           </a:p>
@@ -10032,7 +10206,7 @@
           <a:p>
             <a:fld id="{202E1EC2-47B8-044B-A09E-6A63B4D80C87}" type="datetime1">
               <a:rPr lang="fi-FI" smtClean="0"/>
-              <a:t>8.5.2022</a:t>
+              <a:t>2.10.2022</a:t>
             </a:fld>
             <a:endParaRPr lang="en-GB"/>
           </a:p>
@@ -10096,6 +10270,279 @@
     <p:extLst>
       <p:ext uri="{BB962C8B-B14F-4D97-AF65-F5344CB8AC3E}">
         <p14:creationId xmlns:p14="http://schemas.microsoft.com/office/powerpoint/2010/main" val="1587126786"/>
+      </p:ext>
+    </p:extLst>
+  </p:cSld>
+  <p:clrMapOvr>
+    <a:masterClrMapping/>
+  </p:clrMapOvr>
+</p:sld>
+</file>
+
+<file path=ppt/slides/slide20.xml><?xml version="1.0" encoding="utf-8"?>
+<p:sld xmlns:a="http://schemas.openxmlformats.org/drawingml/2006/main" xmlns:r="http://schemas.openxmlformats.org/officeDocument/2006/relationships" xmlns:p="http://schemas.openxmlformats.org/presentationml/2006/main">
+  <p:cSld>
+    <p:spTree>
+      <p:nvGrpSpPr>
+        <p:cNvPr id="1" name=""/>
+        <p:cNvGrpSpPr/>
+        <p:nvPr/>
+      </p:nvGrpSpPr>
+      <p:grpSpPr>
+        <a:xfrm>
+          <a:off x="0" y="0"/>
+          <a:ext cx="0" cy="0"/>
+          <a:chOff x="0" y="0"/>
+          <a:chExt cx="0" cy="0"/>
+        </a:xfrm>
+      </p:grpSpPr>
+      <p:sp>
+        <p:nvSpPr>
+          <p:cNvPr id="8" name="Title 7">
+            <a:extLst>
+              <a:ext uri="{FF2B5EF4-FFF2-40B4-BE49-F238E27FC236}">
+                <a16:creationId xmlns:a16="http://schemas.microsoft.com/office/drawing/2014/main" id="{197044C3-CD23-D844-B780-26FABA91AD0F}"/>
+              </a:ext>
+            </a:extLst>
+          </p:cNvPr>
+          <p:cNvSpPr>
+            <a:spLocks noGrp="1"/>
+          </p:cNvSpPr>
+          <p:nvPr>
+            <p:ph type="title"/>
+          </p:nvPr>
+        </p:nvSpPr>
+        <p:spPr/>
+        <p:txBody>
+          <a:bodyPr/>
+          <a:lstStyle/>
+          <a:p>
+            <a:pPr lvl="0"/>
+            <a:r>
+              <a:rPr lang="en-US" dirty="0"/>
+              <a:t>Other topics for the exam</a:t>
+            </a:r>
+            <a:endParaRPr lang="fi-FI" dirty="0"/>
+          </a:p>
+        </p:txBody>
+      </p:sp>
+      <p:sp>
+        <p:nvSpPr>
+          <p:cNvPr id="9" name="Content Placeholder 8">
+            <a:extLst>
+              <a:ext uri="{FF2B5EF4-FFF2-40B4-BE49-F238E27FC236}">
+                <a16:creationId xmlns:a16="http://schemas.microsoft.com/office/drawing/2014/main" id="{ACDE61D8-A75A-F94B-B57A-46F276C03311}"/>
+              </a:ext>
+            </a:extLst>
+          </p:cNvPr>
+          <p:cNvSpPr>
+            <a:spLocks noGrp="1"/>
+          </p:cNvSpPr>
+          <p:nvPr>
+            <p:ph sz="half" idx="2"/>
+          </p:nvPr>
+        </p:nvSpPr>
+        <p:spPr>
+          <a:xfrm>
+            <a:off x="550864" y="1295073"/>
+            <a:ext cx="11125198" cy="4618365"/>
+          </a:xfrm>
+        </p:spPr>
+        <p:txBody>
+          <a:bodyPr>
+            <a:normAutofit/>
+          </a:bodyPr>
+          <a:lstStyle/>
+          <a:p>
+            <a:pPr lvl="0"/>
+            <a:r>
+              <a:rPr lang="en-US" b="1" dirty="0"/>
+              <a:t>AJAX</a:t>
+            </a:r>
+            <a:endParaRPr lang="fi-FI" dirty="0"/>
+          </a:p>
+          <a:p>
+            <a:r>
+              <a:rPr lang="en-US" i="1" dirty="0"/>
+              <a:t>Something asked about AJAX? If then some core understanding.</a:t>
+            </a:r>
+          </a:p>
+          <a:p>
+            <a:pPr lvl="1"/>
+            <a:r>
+              <a:rPr lang="en-US" i="1" dirty="0"/>
+              <a:t>Do we get the result out as JSON text, or already auto-parsed to be a JS object? Depends on library / function.</a:t>
+            </a:r>
+          </a:p>
+          <a:p>
+            <a:pPr lvl="1"/>
+            <a:r>
+              <a:rPr lang="en-US" i="1" dirty="0"/>
+              <a:t>Usually each AJAX library has multiple different ways to write exactly same things! (e.g. </a:t>
+            </a:r>
+            <a:r>
+              <a:rPr lang="en-US" i="1" dirty="0" err="1"/>
+              <a:t>Axios</a:t>
+            </a:r>
+            <a:r>
+              <a:rPr lang="en-US" i="1" dirty="0"/>
+              <a:t> has, jQuery has,…)</a:t>
+            </a:r>
+            <a:endParaRPr lang="fi-FI" dirty="0"/>
+          </a:p>
+          <a:p>
+            <a:pPr lvl="0"/>
+            <a:r>
+              <a:rPr lang="en-US" b="1" dirty="0" err="1"/>
+              <a:t>LocalStorage</a:t>
+            </a:r>
+            <a:endParaRPr lang="fi-FI" dirty="0"/>
+          </a:p>
+          <a:p>
+            <a:pPr lvl="1"/>
+            <a:r>
+              <a:rPr lang="en-US" dirty="0"/>
+              <a:t>Browsers are able to save ‘text files’ to the computer’s disk and open them with a key/name e.g. days later. If objects are stringified=(serialized as JSON text) we can even persist (data) objects.</a:t>
+            </a:r>
+            <a:endParaRPr lang="fi-FI" dirty="0"/>
+          </a:p>
+          <a:p>
+            <a:pPr lvl="0"/>
+            <a:r>
+              <a:rPr lang="en-US" b="1" dirty="0"/>
+              <a:t>Full-stack open 202X, the reading list</a:t>
+            </a:r>
+            <a:endParaRPr lang="fi-FI" dirty="0"/>
+          </a:p>
+          <a:p>
+            <a:pPr lvl="1"/>
+            <a:r>
+              <a:rPr lang="en-US" dirty="0"/>
+              <a:t>has now the green parts that are interesting from Frontend learning point of view!</a:t>
+            </a:r>
+            <a:endParaRPr lang="fi-FI" dirty="0"/>
+          </a:p>
+          <a:p>
+            <a:pPr lvl="1"/>
+            <a:r>
+              <a:rPr lang="en-US" u="sng" dirty="0">
+                <a:hlinkClick r:id="rId2"/>
+              </a:rPr>
+              <a:t>https://github.com/valju/docs_backend_design/blob/master/FSO/FSOReadingList.pdf</a:t>
+            </a:r>
+            <a:r>
+              <a:rPr lang="en-US" dirty="0"/>
+              <a:t> (in Backend docs repo)   Note: some things from part 7 might be added for the Spring 2022 exam and onwards for advanced students!</a:t>
+            </a:r>
+            <a:endParaRPr lang="fi-FI" dirty="0"/>
+          </a:p>
+          <a:p>
+            <a:pPr lvl="0"/>
+            <a:r>
+              <a:rPr lang="en-US" b="1" dirty="0"/>
+              <a:t>For thoughts:   Possible frontend project design &amp; creation steps</a:t>
+            </a:r>
+            <a:endParaRPr lang="fi-FI" dirty="0"/>
+          </a:p>
+          <a:p>
+            <a:pPr lvl="1"/>
+            <a:r>
+              <a:rPr lang="en-US" u="sng" dirty="0">
+                <a:hlinkClick r:id="rId3"/>
+              </a:rPr>
+              <a:t>https://github.com/valju/docs_frontend_design/blob/master/FrontendRelatedSteps_SimilarToOurCases.pdf</a:t>
+            </a:r>
+            <a:endParaRPr lang="fi-FI" dirty="0"/>
+          </a:p>
+        </p:txBody>
+      </p:sp>
+      <p:sp>
+        <p:nvSpPr>
+          <p:cNvPr id="5" name="Date Placeholder 4">
+            <a:extLst>
+              <a:ext uri="{FF2B5EF4-FFF2-40B4-BE49-F238E27FC236}">
+                <a16:creationId xmlns:a16="http://schemas.microsoft.com/office/drawing/2014/main" id="{976244E2-AA76-2742-B2EC-FEC79276155C}"/>
+              </a:ext>
+            </a:extLst>
+          </p:cNvPr>
+          <p:cNvSpPr>
+            <a:spLocks noGrp="1"/>
+          </p:cNvSpPr>
+          <p:nvPr>
+            <p:ph type="dt" sz="half" idx="10"/>
+          </p:nvPr>
+        </p:nvSpPr>
+        <p:spPr/>
+        <p:txBody>
+          <a:bodyPr/>
+          <a:lstStyle/>
+          <a:p>
+            <a:fld id="{202E1EC2-47B8-044B-A09E-6A63B4D80C87}" type="datetime1">
+              <a:rPr lang="fi-FI" smtClean="0"/>
+              <a:t>2.10.2022</a:t>
+            </a:fld>
+            <a:endParaRPr lang="en-GB"/>
+          </a:p>
+        </p:txBody>
+      </p:sp>
+      <p:sp>
+        <p:nvSpPr>
+          <p:cNvPr id="6" name="Footer Placeholder 5">
+            <a:extLst>
+              <a:ext uri="{FF2B5EF4-FFF2-40B4-BE49-F238E27FC236}">
+                <a16:creationId xmlns:a16="http://schemas.microsoft.com/office/drawing/2014/main" id="{588CE607-4137-8840-8FEA-42EAC857E3A3}"/>
+              </a:ext>
+            </a:extLst>
+          </p:cNvPr>
+          <p:cNvSpPr>
+            <a:spLocks noGrp="1"/>
+          </p:cNvSpPr>
+          <p:nvPr>
+            <p:ph type="ftr" sz="quarter" idx="11"/>
+          </p:nvPr>
+        </p:nvSpPr>
+        <p:spPr/>
+        <p:txBody>
+          <a:bodyPr/>
+          <a:lstStyle/>
+          <a:p>
+            <a:endParaRPr lang="en-GB"/>
+          </a:p>
+        </p:txBody>
+      </p:sp>
+      <p:sp>
+        <p:nvSpPr>
+          <p:cNvPr id="7" name="Slide Number Placeholder 6">
+            <a:extLst>
+              <a:ext uri="{FF2B5EF4-FFF2-40B4-BE49-F238E27FC236}">
+                <a16:creationId xmlns:a16="http://schemas.microsoft.com/office/drawing/2014/main" id="{2E133A96-6C73-0844-B8CB-27C2B5F4CFB1}"/>
+              </a:ext>
+            </a:extLst>
+          </p:cNvPr>
+          <p:cNvSpPr>
+            <a:spLocks noGrp="1"/>
+          </p:cNvSpPr>
+          <p:nvPr>
+            <p:ph type="sldNum" sz="quarter" idx="12"/>
+          </p:nvPr>
+        </p:nvSpPr>
+        <p:spPr/>
+        <p:txBody>
+          <a:bodyPr/>
+          <a:lstStyle/>
+          <a:p>
+            <a:fld id="{76BAB7ED-EDE9-4D4B-9A2D-30E18C47C16E}" type="slidenum">
+              <a:rPr lang="en-GB" smtClean="0"/>
+              <a:t>20</a:t>
+            </a:fld>
+            <a:endParaRPr lang="en-GB"/>
+          </a:p>
+        </p:txBody>
+      </p:sp>
+    </p:spTree>
+    <p:extLst>
+      <p:ext uri="{BB962C8B-B14F-4D97-AF65-F5344CB8AC3E}">
+        <p14:creationId xmlns:p14="http://schemas.microsoft.com/office/powerpoint/2010/main" val="702849068"/>
       </p:ext>
     </p:extLst>
   </p:cSld>
@@ -10184,147 +10631,140 @@
             </a:r>
             <a:r>
               <a:rPr lang="en-US" dirty="0"/>
-              <a:t>: Basics</a:t>
-            </a:r>
-            <a:r>
-              <a:rPr lang="en-US" i="1" dirty="0"/>
+              <a:t>: Basics </a:t>
+            </a:r>
+          </a:p>
+          <a:p>
+            <a:pPr lvl="1"/>
+            <a:r>
+              <a:rPr lang="en-US" dirty="0"/>
+              <a:t>XML-like language mixing JS and React component markup, </a:t>
+            </a:r>
+          </a:p>
+          <a:p>
+            <a:pPr lvl="1"/>
+            <a:r>
+              <a:rPr lang="en-US" dirty="0"/>
+              <a:t>not XML as it's not following XML rules, </a:t>
+            </a:r>
+          </a:p>
+          <a:p>
+            <a:pPr lvl="1"/>
+            <a:r>
+              <a:rPr lang="en-US" dirty="0"/>
+              <a:t>nor HTML structure rules either</a:t>
+            </a:r>
+          </a:p>
+          <a:p>
+            <a:r>
+              <a:rPr lang="en-US" dirty="0"/>
+              <a:t>One syntax example: What is happening in the following?</a:t>
+            </a:r>
+            <a:br>
+              <a:rPr lang="en-US" dirty="0"/>
+            </a:br>
+            <a:r>
+              <a:rPr lang="en-US" dirty="0"/>
+              <a:t>            var a =123; </a:t>
+            </a:r>
+            <a:br>
+              <a:rPr lang="en-US" dirty="0"/>
+            </a:br>
+            <a:r>
+              <a:rPr lang="en-US" dirty="0"/>
+              <a:t>            &lt;</a:t>
+            </a:r>
+            <a:r>
+              <a:rPr lang="en-US" dirty="0" err="1"/>
+              <a:t>Xyz</a:t>
+            </a:r>
+            <a:r>
+              <a:rPr lang="en-US" dirty="0"/>
               <a:t> </a:t>
             </a:r>
+            <a:r>
+              <a:rPr lang="en-US" dirty="0" err="1"/>
+              <a:t>abc</a:t>
+            </a:r>
+            <a:r>
+              <a:rPr lang="en-US" dirty="0"/>
+              <a:t>={{a}}  /&gt;   </a:t>
+            </a:r>
+          </a:p>
+          <a:p>
+            <a:pPr lvl="3"/>
+            <a:r>
+              <a:rPr lang="en-US" dirty="0"/>
+              <a:t>first go to JS mode with {  }, </a:t>
+            </a:r>
+          </a:p>
+          <a:p>
+            <a:pPr lvl="3"/>
+            <a:r>
+              <a:rPr lang="en-US" dirty="0"/>
+              <a:t>then create an object {a}, (thus same as ={{</a:t>
+            </a:r>
+            <a:r>
+              <a:rPr lang="en-US" dirty="0" err="1"/>
+              <a:t>a:a</a:t>
+            </a:r>
+            <a:r>
+              <a:rPr lang="en-US" dirty="0"/>
+              <a:t>}}</a:t>
+            </a:r>
+          </a:p>
+          <a:p>
+            <a:r>
+              <a:rPr lang="en-US" dirty="0"/>
+              <a:t>React components with </a:t>
+            </a:r>
+            <a:r>
+              <a:rPr lang="en-US" b="1" dirty="0" err="1"/>
+              <a:t>C</a:t>
+            </a:r>
+            <a:r>
+              <a:rPr lang="en-US" dirty="0" err="1"/>
+              <a:t>apitalFirstLetter</a:t>
+            </a:r>
+            <a:r>
+              <a:rPr lang="en-US" dirty="0"/>
+              <a:t>, HTML elements/attributes with small letter</a:t>
+            </a:r>
+          </a:p>
+          <a:p>
+            <a:r>
+              <a:rPr lang="en-US" b="1" dirty="0" err="1"/>
+              <a:t>className</a:t>
+            </a:r>
+            <a:r>
+              <a:rPr lang="en-US" b="1" dirty="0"/>
+              <a:t>(s)</a:t>
+            </a:r>
+            <a:r>
+              <a:rPr lang="en-US" dirty="0"/>
+              <a:t> attribute or so (in React, react-rendered)  vs.   </a:t>
+            </a:r>
+            <a:r>
+              <a:rPr lang="en-US" b="1" dirty="0"/>
+              <a:t>class</a:t>
+            </a:r>
+            <a:r>
+              <a:rPr lang="en-US" dirty="0"/>
+              <a:t> attribute (HTML, already ready html. </a:t>
+            </a:r>
           </a:p>
           <a:p>
             <a:pPr lvl="1"/>
             <a:r>
-              <a:rPr lang="en-US" i="1" dirty="0"/>
-              <a:t>XML-like language mixing JS and React component markup, </a:t>
-            </a:r>
-          </a:p>
-          <a:p>
-            <a:pPr lvl="1"/>
-            <a:r>
-              <a:rPr lang="en-US" i="1" dirty="0"/>
-              <a:t>not XML as it's not following XML rules, </a:t>
-            </a:r>
-          </a:p>
-          <a:p>
-            <a:pPr lvl="1"/>
-            <a:r>
-              <a:rPr lang="en-US" i="1" dirty="0"/>
-              <a:t>nor HTML structure rules either</a:t>
-            </a:r>
-          </a:p>
-          <a:p>
-            <a:r>
-              <a:rPr lang="en-US" i="1" dirty="0"/>
-              <a:t>One syntax example: What is happening in the following?</a:t>
-            </a:r>
-            <a:br>
-              <a:rPr lang="en-US" i="1" dirty="0"/>
-            </a:br>
-            <a:r>
-              <a:rPr lang="en-US" i="1" dirty="0"/>
-              <a:t>            var a =123; </a:t>
-            </a:r>
-            <a:br>
-              <a:rPr lang="en-US" i="1" dirty="0"/>
-            </a:br>
-            <a:r>
-              <a:rPr lang="en-US" i="1" dirty="0"/>
-              <a:t>            &lt;</a:t>
-            </a:r>
-            <a:r>
-              <a:rPr lang="en-US" i="1" dirty="0" err="1"/>
-              <a:t>Xyz</a:t>
-            </a:r>
-            <a:r>
-              <a:rPr lang="en-US" i="1" dirty="0"/>
-              <a:t> </a:t>
-            </a:r>
-            <a:r>
-              <a:rPr lang="en-US" i="1" dirty="0" err="1"/>
-              <a:t>abc</a:t>
-            </a:r>
-            <a:r>
-              <a:rPr lang="en-US" i="1" dirty="0"/>
-              <a:t>={{a}}  /&gt;   </a:t>
-            </a:r>
-          </a:p>
-          <a:p>
-            <a:pPr lvl="3"/>
-            <a:r>
-              <a:rPr lang="en-US" i="1" dirty="0"/>
-              <a:t>first go to JS mode with {  }, </a:t>
-            </a:r>
-          </a:p>
-          <a:p>
-            <a:pPr lvl="3"/>
-            <a:r>
-              <a:rPr lang="en-US" i="1" dirty="0"/>
-              <a:t>then create an object {a}, (thus same as ={{</a:t>
-            </a:r>
-            <a:r>
-              <a:rPr lang="en-US" i="1" dirty="0" err="1"/>
-              <a:t>a:a</a:t>
-            </a:r>
-            <a:r>
-              <a:rPr lang="en-US" i="1" dirty="0"/>
-              <a:t>}}</a:t>
-            </a:r>
-          </a:p>
-          <a:p>
-            <a:r>
-              <a:rPr lang="en-US" i="1" dirty="0"/>
-              <a:t>React components with </a:t>
-            </a:r>
-            <a:r>
-              <a:rPr lang="en-US" b="1" i="1" dirty="0" err="1"/>
-              <a:t>C</a:t>
-            </a:r>
-            <a:r>
-              <a:rPr lang="en-US" i="1" dirty="0" err="1"/>
-              <a:t>apitalFirstLetter</a:t>
-            </a:r>
-            <a:r>
-              <a:rPr lang="en-US" i="1" dirty="0"/>
-              <a:t>, HTML elements/attributes with small letter</a:t>
-            </a:r>
-          </a:p>
-          <a:p>
-            <a:r>
-              <a:rPr lang="en-US" b="1" i="1" dirty="0" err="1"/>
-              <a:t>className</a:t>
-            </a:r>
-            <a:r>
-              <a:rPr lang="en-US" b="1" i="1" dirty="0"/>
-              <a:t>(s)</a:t>
-            </a:r>
-            <a:r>
-              <a:rPr lang="en-US" i="1" dirty="0"/>
-              <a:t> attribute or so (in React, react-rendered)  vs.   </a:t>
-            </a:r>
-            <a:r>
-              <a:rPr lang="en-US" b="1" i="1" dirty="0"/>
-              <a:t>class</a:t>
-            </a:r>
-            <a:r>
-              <a:rPr lang="en-US" i="1" dirty="0"/>
-              <a:t> attribute (HTML, already ready html. </a:t>
-            </a:r>
-          </a:p>
-          <a:p>
-            <a:pPr lvl="1"/>
-            <a:r>
-              <a:rPr lang="en-US" i="1" dirty="0"/>
+              <a:rPr lang="en-US" dirty="0"/>
               <a:t>Thus, being able to mix JSX and ready html, though only okay if unavoidable</a:t>
             </a:r>
           </a:p>
           <a:p>
             <a:r>
-              <a:rPr lang="en-US" i="1" dirty="0"/>
-              <a:t>when returning JSX, wrap it inside (  ) (((Or make sure to start JSX from same line as the return keyword)))  </a:t>
-            </a:r>
-            <a:br>
-              <a:rPr lang="en-US" i="1" dirty="0"/>
-            </a:br>
+              <a:rPr lang="en-US" dirty="0"/>
+              <a:t>when returning JSX, wrap it inside (  ) (((Or make sure to start JSX from same line as the return keyword))) </a:t>
+            </a:r>
             <a:endParaRPr lang="fi-FI" dirty="0"/>
           </a:p>
         </p:txBody>
@@ -10352,7 +10792,7 @@
           <a:p>
             <a:fld id="{202E1EC2-47B8-044B-A09E-6A63B4D80C87}" type="datetime1">
               <a:rPr lang="fi-FI" smtClean="0"/>
-              <a:t>8.5.2022</a:t>
+              <a:t>2.10.2022</a:t>
             </a:fld>
             <a:endParaRPr lang="en-GB"/>
           </a:p>
@@ -10681,7 +11121,7 @@
           <a:p>
             <a:fld id="{202E1EC2-47B8-044B-A09E-6A63B4D80C87}" type="datetime1">
               <a:rPr lang="fi-FI" smtClean="0"/>
-              <a:t>8.5.2022</a:t>
+              <a:t>2.10.2022</a:t>
             </a:fld>
             <a:endParaRPr lang="en-GB" dirty="0"/>
           </a:p>
@@ -10893,8 +11333,16 @@
           </a:p>
           <a:p>
             <a:r>
+              <a:rPr lang="en-US" b="1" i="1" dirty="0">
+                <a:solidFill>
+                  <a:srgbClr val="FF0000"/>
+                </a:solidFill>
+              </a:rPr>
+              <a:t>Spoiler alert</a:t>
+            </a:r>
+            <a:r>
               <a:rPr lang="en-US" i="1" dirty="0"/>
-              <a:t>Spoiler alert: Answer on next slide</a:t>
+              <a:t>: Answer on next slide</a:t>
             </a:r>
             <a:endParaRPr lang="fi-FI" dirty="0"/>
           </a:p>
@@ -10929,7 +11377,7 @@
           <a:p>
             <a:fld id="{202E1EC2-47B8-044B-A09E-6A63B4D80C87}" type="datetime1">
               <a:rPr lang="fi-FI" smtClean="0"/>
-              <a:t>8.5.2022</a:t>
+              <a:t>2.10.2022</a:t>
             </a:fld>
             <a:endParaRPr lang="en-GB"/>
           </a:p>
@@ -11091,7 +11539,12 @@
             <p:ph sz="half" idx="2"/>
           </p:nvPr>
         </p:nvSpPr>
-        <p:spPr/>
+        <p:spPr>
+          <a:xfrm>
+            <a:off x="550863" y="1773238"/>
+            <a:ext cx="11512937" cy="4140200"/>
+          </a:xfrm>
+        </p:spPr>
         <p:txBody>
           <a:bodyPr>
             <a:normAutofit/>
@@ -11212,7 +11665,31 @@
             </a:r>
             <a:r>
               <a:rPr lang="fi-FI" i="1" dirty="0"/>
-              <a:t> </a:t>
+              <a:t> ’</a:t>
+            </a:r>
+            <a:r>
+              <a:rPr lang="fi-FI" i="1" dirty="0" err="1"/>
+              <a:t>setAge</a:t>
+            </a:r>
+            <a:r>
+              <a:rPr lang="fi-FI" i="1" dirty="0"/>
+              <a:t>’ </a:t>
+            </a:r>
+            <a:r>
+              <a:rPr lang="fi-FI" i="1" dirty="0" err="1"/>
+              <a:t>created</a:t>
+            </a:r>
+            <a:r>
+              <a:rPr lang="fi-FI" i="1" dirty="0"/>
+              <a:t> and </a:t>
+            </a:r>
+            <a:r>
+              <a:rPr lang="fi-FI" i="1" dirty="0" err="1"/>
+              <a:t>assigned</a:t>
+            </a:r>
+            <a:r>
+              <a:rPr lang="fi-FI" i="1" dirty="0"/>
+              <a:t> a </a:t>
             </a:r>
             <a:r>
               <a:rPr lang="fi-FI" i="1" dirty="0" err="1"/>
@@ -11228,6 +11705,676 @@
             </a:r>
             <a:r>
               <a:rPr lang="fi-FI" i="1" dirty="0"/>
+              <a:t> for </a:t>
+            </a:r>
+            <a:r>
+              <a:rPr lang="fi-FI" i="1" dirty="0" err="1"/>
+              <a:t>setting</a:t>
+            </a:r>
+            <a:r>
+              <a:rPr lang="fi-FI" i="1" dirty="0"/>
+              <a:t> </a:t>
+            </a:r>
+            <a:r>
+              <a:rPr lang="fi-FI" i="1" dirty="0" err="1"/>
+              <a:t>new</a:t>
+            </a:r>
+            <a:r>
+              <a:rPr lang="fi-FI" i="1" dirty="0"/>
+              <a:t> </a:t>
+            </a:r>
+            <a:r>
+              <a:rPr lang="fi-FI" i="1" dirty="0" err="1"/>
+              <a:t>values</a:t>
+            </a:r>
+            <a:r>
+              <a:rPr lang="fi-FI" i="1" dirty="0"/>
+              <a:t> to </a:t>
+            </a:r>
+            <a:r>
+              <a:rPr lang="fi-FI" i="1" dirty="0" err="1"/>
+              <a:t>age</a:t>
+            </a:r>
+            <a:r>
+              <a:rPr lang="fi-FI" i="1" dirty="0"/>
+              <a:t>, </a:t>
+            </a:r>
+            <a:r>
+              <a:rPr lang="fi-FI" i="1" dirty="0" err="1"/>
+              <a:t>automagically</a:t>
+            </a:r>
+            <a:r>
+              <a:rPr lang="fi-FI" i="1" dirty="0"/>
+              <a:t> </a:t>
+            </a:r>
+            <a:r>
+              <a:rPr lang="fi-FI" i="1" dirty="0" err="1"/>
+              <a:t>assigned</a:t>
+            </a:r>
+            <a:r>
+              <a:rPr lang="fi-FI" i="1" dirty="0"/>
+              <a:t>, no </a:t>
+            </a:r>
+            <a:r>
+              <a:rPr lang="fi-FI" i="1" dirty="0" err="1"/>
+              <a:t>need</a:t>
+            </a:r>
+            <a:r>
+              <a:rPr lang="fi-FI" i="1" dirty="0"/>
+              <a:t> for </a:t>
+            </a:r>
+            <a:r>
+              <a:rPr lang="fi-FI" i="1" dirty="0" err="1"/>
+              <a:t>our</a:t>
+            </a:r>
+            <a:r>
+              <a:rPr lang="fi-FI" i="1" dirty="0"/>
+              <a:t> </a:t>
+            </a:r>
+            <a:r>
+              <a:rPr lang="fi-FI" i="1" dirty="0" err="1"/>
+              <a:t>code</a:t>
+            </a:r>
+            <a:endParaRPr lang="fi-FI" i="1" dirty="0"/>
+          </a:p>
+          <a:p>
+            <a:pPr lvl="2"/>
+            <a:r>
+              <a:rPr lang="fi-FI" i="1" dirty="0" err="1">
+                <a:solidFill>
+                  <a:schemeClr val="bg1">
+                    <a:lumMod val="50000"/>
+                  </a:schemeClr>
+                </a:solidFill>
+              </a:rPr>
+              <a:t>thus</a:t>
+            </a:r>
+            <a:r>
+              <a:rPr lang="fi-FI" i="1" dirty="0">
+                <a:solidFill>
+                  <a:schemeClr val="bg1">
+                    <a:lumMod val="50000"/>
+                  </a:schemeClr>
+                </a:solidFill>
+              </a:rPr>
+              <a:t> </a:t>
+            </a:r>
+            <a:r>
+              <a:rPr lang="fi-FI" i="1" dirty="0" err="1">
+                <a:solidFill>
+                  <a:schemeClr val="bg1">
+                    <a:lumMod val="50000"/>
+                  </a:schemeClr>
+                </a:solidFill>
+              </a:rPr>
+              <a:t>we</a:t>
+            </a:r>
+            <a:r>
+              <a:rPr lang="fi-FI" i="1" dirty="0">
+                <a:solidFill>
+                  <a:schemeClr val="bg1">
+                    <a:lumMod val="50000"/>
+                  </a:schemeClr>
+                </a:solidFill>
+              </a:rPr>
+              <a:t> </a:t>
+            </a:r>
+            <a:r>
+              <a:rPr lang="fi-FI" i="1" dirty="0" err="1">
+                <a:solidFill>
+                  <a:schemeClr val="bg1">
+                    <a:lumMod val="50000"/>
+                  </a:schemeClr>
+                </a:solidFill>
+              </a:rPr>
+              <a:t>are</a:t>
+            </a:r>
+            <a:r>
+              <a:rPr lang="fi-FI" i="1" dirty="0">
+                <a:solidFill>
+                  <a:schemeClr val="bg1">
+                    <a:lumMod val="50000"/>
+                  </a:schemeClr>
+                </a:solidFill>
+              </a:rPr>
+              <a:t> </a:t>
+            </a:r>
+            <a:r>
+              <a:rPr lang="fi-FI" i="1" dirty="0" err="1">
+                <a:solidFill>
+                  <a:schemeClr val="bg1">
+                    <a:lumMod val="50000"/>
+                  </a:schemeClr>
+                </a:solidFill>
+              </a:rPr>
+              <a:t>kind</a:t>
+            </a:r>
+            <a:r>
+              <a:rPr lang="fi-FI" i="1" dirty="0">
+                <a:solidFill>
+                  <a:schemeClr val="bg1">
+                    <a:lumMod val="50000"/>
+                  </a:schemeClr>
+                </a:solidFill>
+              </a:rPr>
+              <a:t> of </a:t>
+            </a:r>
+            <a:r>
+              <a:rPr lang="fi-FI" i="1" dirty="0" err="1">
+                <a:solidFill>
+                  <a:schemeClr val="bg1">
+                    <a:lumMod val="50000"/>
+                  </a:schemeClr>
+                </a:solidFill>
+              </a:rPr>
+              <a:t>defining</a:t>
+            </a:r>
+            <a:r>
+              <a:rPr lang="fi-FI" i="1" dirty="0">
+                <a:solidFill>
+                  <a:schemeClr val="bg1">
+                    <a:lumMod val="50000"/>
+                  </a:schemeClr>
+                </a:solidFill>
+              </a:rPr>
+              <a:t> a </a:t>
+            </a:r>
+            <a:r>
+              <a:rPr lang="fi-FI" i="1" dirty="0" err="1">
+                <a:solidFill>
+                  <a:schemeClr val="bg1">
+                    <a:lumMod val="50000"/>
+                  </a:schemeClr>
+                </a:solidFill>
+              </a:rPr>
+              <a:t>function</a:t>
+            </a:r>
+            <a:r>
+              <a:rPr lang="fi-FI" i="1" dirty="0">
+                <a:solidFill>
+                  <a:schemeClr val="bg1">
+                    <a:lumMod val="50000"/>
+                  </a:schemeClr>
+                </a:solidFill>
+              </a:rPr>
+              <a:t> </a:t>
+            </a:r>
+            <a:r>
+              <a:rPr lang="fi-FI" i="1" dirty="0" err="1">
+                <a:solidFill>
+                  <a:schemeClr val="bg1">
+                    <a:lumMod val="50000"/>
+                  </a:schemeClr>
+                </a:solidFill>
+              </a:rPr>
+              <a:t>called</a:t>
+            </a:r>
+            <a:r>
+              <a:rPr lang="fi-FI" i="1" dirty="0">
+                <a:solidFill>
+                  <a:schemeClr val="bg1">
+                    <a:lumMod val="50000"/>
+                  </a:schemeClr>
+                </a:solidFill>
+              </a:rPr>
+              <a:t> </a:t>
+            </a:r>
+            <a:r>
+              <a:rPr lang="fi-FI" i="1" dirty="0" err="1">
+                <a:solidFill>
+                  <a:schemeClr val="bg1">
+                    <a:lumMod val="50000"/>
+                  </a:schemeClr>
+                </a:solidFill>
+              </a:rPr>
+              <a:t>setAge</a:t>
+            </a:r>
+            <a:r>
+              <a:rPr lang="fi-FI" i="1" dirty="0">
+                <a:solidFill>
+                  <a:schemeClr val="bg1">
+                    <a:lumMod val="50000"/>
+                  </a:schemeClr>
+                </a:solidFill>
+              </a:rPr>
+              <a:t>, </a:t>
+            </a:r>
+            <a:r>
+              <a:rPr lang="fi-FI" i="1" dirty="0" err="1">
+                <a:solidFill>
+                  <a:schemeClr val="bg1">
+                    <a:lumMod val="50000"/>
+                  </a:schemeClr>
+                </a:solidFill>
+              </a:rPr>
+              <a:t>but</a:t>
+            </a:r>
+            <a:r>
+              <a:rPr lang="fi-FI" i="1" dirty="0">
+                <a:solidFill>
+                  <a:schemeClr val="bg1">
+                    <a:lumMod val="50000"/>
+                  </a:schemeClr>
+                </a:solidFill>
+              </a:rPr>
+              <a:t> </a:t>
+            </a:r>
+            <a:r>
+              <a:rPr lang="fi-FI" i="1" dirty="0" err="1">
+                <a:solidFill>
+                  <a:schemeClr val="bg1">
+                    <a:lumMod val="50000"/>
+                  </a:schemeClr>
+                </a:solidFill>
+              </a:rPr>
+              <a:t>we</a:t>
+            </a:r>
+            <a:r>
+              <a:rPr lang="fi-FI" i="1" dirty="0">
+                <a:solidFill>
+                  <a:schemeClr val="bg1">
+                    <a:lumMod val="50000"/>
+                  </a:schemeClr>
+                </a:solidFill>
+              </a:rPr>
+              <a:t> </a:t>
+            </a:r>
+            <a:r>
+              <a:rPr lang="fi-FI" i="1" dirty="0" err="1">
+                <a:solidFill>
+                  <a:schemeClr val="bg1">
+                    <a:lumMod val="50000"/>
+                  </a:schemeClr>
+                </a:solidFill>
+              </a:rPr>
+              <a:t>receive</a:t>
+            </a:r>
+            <a:r>
+              <a:rPr lang="fi-FI" i="1" dirty="0">
+                <a:solidFill>
+                  <a:schemeClr val="bg1">
+                    <a:lumMod val="50000"/>
+                  </a:schemeClr>
+                </a:solidFill>
+              </a:rPr>
+              <a:t> </a:t>
+            </a:r>
+            <a:r>
+              <a:rPr lang="fi-FI" i="1" dirty="0" err="1">
+                <a:solidFill>
+                  <a:schemeClr val="bg1">
+                    <a:lumMod val="50000"/>
+                  </a:schemeClr>
+                </a:solidFill>
+              </a:rPr>
+              <a:t>the</a:t>
+            </a:r>
+            <a:r>
+              <a:rPr lang="fi-FI" i="1" dirty="0">
+                <a:solidFill>
+                  <a:schemeClr val="bg1">
+                    <a:lumMod val="50000"/>
+                  </a:schemeClr>
+                </a:solidFill>
+              </a:rPr>
+              <a:t> </a:t>
+            </a:r>
+            <a:r>
+              <a:rPr lang="fi-FI" i="1" dirty="0" err="1">
+                <a:solidFill>
+                  <a:schemeClr val="bg1">
+                    <a:lumMod val="50000"/>
+                  </a:schemeClr>
+                </a:solidFill>
+              </a:rPr>
+              <a:t>function</a:t>
+            </a:r>
+            <a:r>
+              <a:rPr lang="fi-FI" i="1" dirty="0">
+                <a:solidFill>
+                  <a:schemeClr val="bg1">
+                    <a:lumMod val="50000"/>
+                  </a:schemeClr>
+                </a:solidFill>
+              </a:rPr>
+              <a:t> </a:t>
+            </a:r>
+            <a:r>
+              <a:rPr lang="fi-FI" i="1" dirty="0" err="1">
+                <a:solidFill>
+                  <a:schemeClr val="bg1">
+                    <a:lumMod val="50000"/>
+                  </a:schemeClr>
+                </a:solidFill>
+              </a:rPr>
+              <a:t>object</a:t>
+            </a:r>
+            <a:r>
+              <a:rPr lang="fi-FI" i="1" dirty="0">
+                <a:solidFill>
+                  <a:schemeClr val="bg1">
+                    <a:lumMod val="50000"/>
+                  </a:schemeClr>
+                </a:solidFill>
+              </a:rPr>
+              <a:t> </a:t>
+            </a:r>
+            <a:r>
+              <a:rPr lang="fi-FI" i="1" dirty="0" err="1">
+                <a:solidFill>
+                  <a:schemeClr val="bg1">
+                    <a:lumMod val="50000"/>
+                  </a:schemeClr>
+                </a:solidFill>
+              </a:rPr>
+              <a:t>from</a:t>
+            </a:r>
+            <a:r>
+              <a:rPr lang="fi-FI" i="1" dirty="0">
+                <a:solidFill>
+                  <a:schemeClr val="bg1">
+                    <a:lumMod val="50000"/>
+                  </a:schemeClr>
+                </a:solidFill>
+              </a:rPr>
+              <a:t> </a:t>
+            </a:r>
+            <a:r>
+              <a:rPr lang="fi-FI" i="1" dirty="0" err="1">
+                <a:solidFill>
+                  <a:schemeClr val="bg1">
+                    <a:lumMod val="50000"/>
+                  </a:schemeClr>
+                </a:solidFill>
+              </a:rPr>
+              <a:t>React</a:t>
+            </a:r>
+            <a:r>
+              <a:rPr lang="fi-FI" i="1" dirty="0">
+                <a:solidFill>
+                  <a:schemeClr val="bg1">
+                    <a:lumMod val="50000"/>
+                  </a:schemeClr>
+                </a:solidFill>
+              </a:rPr>
+              <a:t> </a:t>
+            </a:r>
+            <a:r>
+              <a:rPr lang="fi-FI" i="1" dirty="0" err="1">
+                <a:solidFill>
+                  <a:schemeClr val="bg1">
+                    <a:lumMod val="50000"/>
+                  </a:schemeClr>
+                </a:solidFill>
+              </a:rPr>
+              <a:t>object</a:t>
+            </a:r>
+            <a:r>
+              <a:rPr lang="fi-FI" i="1" dirty="0">
+                <a:solidFill>
+                  <a:schemeClr val="bg1">
+                    <a:lumMod val="50000"/>
+                  </a:schemeClr>
+                </a:solidFill>
+              </a:rPr>
+              <a:t> </a:t>
+            </a:r>
+            <a:r>
+              <a:rPr lang="fi-FI" i="1" dirty="0" err="1">
+                <a:solidFill>
+                  <a:schemeClr val="bg1">
+                    <a:lumMod val="50000"/>
+                  </a:schemeClr>
+                </a:solidFill>
+              </a:rPr>
+              <a:t>created</a:t>
+            </a:r>
+            <a:r>
+              <a:rPr lang="fi-FI" i="1" dirty="0">
+                <a:solidFill>
+                  <a:schemeClr val="bg1">
+                    <a:lumMod val="50000"/>
+                  </a:schemeClr>
+                </a:solidFill>
+              </a:rPr>
+              <a:t> </a:t>
+            </a:r>
+            <a:r>
+              <a:rPr lang="fi-FI" i="1" dirty="0" err="1">
+                <a:solidFill>
+                  <a:schemeClr val="bg1">
+                    <a:lumMod val="50000"/>
+                  </a:schemeClr>
+                </a:solidFill>
+              </a:rPr>
+              <a:t>by</a:t>
+            </a:r>
+            <a:r>
+              <a:rPr lang="fi-FI" i="1" dirty="0">
+                <a:solidFill>
+                  <a:schemeClr val="bg1">
+                    <a:lumMod val="50000"/>
+                  </a:schemeClr>
+                </a:solidFill>
+              </a:rPr>
+              <a:t> </a:t>
+            </a:r>
+            <a:r>
+              <a:rPr lang="fi-FI" i="1" dirty="0" err="1">
+                <a:solidFill>
+                  <a:schemeClr val="bg1">
+                    <a:lumMod val="50000"/>
+                  </a:schemeClr>
+                </a:solidFill>
+              </a:rPr>
+              <a:t>the</a:t>
+            </a:r>
+            <a:r>
+              <a:rPr lang="fi-FI" i="1" dirty="0">
+                <a:solidFill>
+                  <a:schemeClr val="bg1">
+                    <a:lumMod val="50000"/>
+                  </a:schemeClr>
+                </a:solidFill>
+              </a:rPr>
+              <a:t> </a:t>
+            </a:r>
+            <a:r>
+              <a:rPr lang="fi-FI" i="1" dirty="0" err="1">
+                <a:solidFill>
+                  <a:schemeClr val="bg1">
+                    <a:lumMod val="50000"/>
+                  </a:schemeClr>
+                </a:solidFill>
+              </a:rPr>
+              <a:t>useState</a:t>
+            </a:r>
+            <a:r>
+              <a:rPr lang="fi-FI" i="1" dirty="0">
+                <a:solidFill>
+                  <a:schemeClr val="bg1">
+                    <a:lumMod val="50000"/>
+                  </a:schemeClr>
+                </a:solidFill>
+              </a:rPr>
+              <a:t>() </a:t>
+            </a:r>
+            <a:r>
+              <a:rPr lang="fi-FI" i="1" dirty="0" err="1">
+                <a:solidFill>
+                  <a:schemeClr val="bg1">
+                    <a:lumMod val="50000"/>
+                  </a:schemeClr>
+                </a:solidFill>
+              </a:rPr>
+              <a:t>call</a:t>
+            </a:r>
+            <a:r>
+              <a:rPr lang="fi-FI" i="1" dirty="0">
+                <a:solidFill>
+                  <a:schemeClr val="bg1">
+                    <a:lumMod val="50000"/>
+                  </a:schemeClr>
+                </a:solidFill>
+              </a:rPr>
+              <a:t>. </a:t>
+            </a:r>
+          </a:p>
+          <a:p>
+            <a:pPr lvl="1"/>
+            <a:r>
+              <a:rPr lang="fi-FI" i="1" dirty="0" err="1"/>
+              <a:t>the</a:t>
+            </a:r>
+            <a:r>
+              <a:rPr lang="fi-FI" i="1" dirty="0"/>
+              <a:t> </a:t>
+            </a:r>
+            <a:r>
+              <a:rPr lang="fi-FI" i="1" dirty="0" err="1"/>
+              <a:t>initial</a:t>
+            </a:r>
+            <a:r>
+              <a:rPr lang="fi-FI" i="1" dirty="0"/>
+              <a:t> </a:t>
+            </a:r>
+            <a:r>
+              <a:rPr lang="fi-FI" i="1" dirty="0" err="1"/>
+              <a:t>value</a:t>
+            </a:r>
+            <a:r>
+              <a:rPr lang="fi-FI" i="1" dirty="0"/>
+              <a:t> of </a:t>
+            </a:r>
+            <a:r>
+              <a:rPr lang="fi-FI" i="1" dirty="0" err="1"/>
+              <a:t>age</a:t>
+            </a:r>
+            <a:r>
+              <a:rPr lang="fi-FI" i="1" dirty="0"/>
+              <a:t> </a:t>
+            </a:r>
+            <a:r>
+              <a:rPr lang="fi-FI" i="1" dirty="0" err="1"/>
+              <a:t>will</a:t>
+            </a:r>
+            <a:r>
+              <a:rPr lang="fi-FI" i="1" dirty="0"/>
+              <a:t> </a:t>
+            </a:r>
+            <a:r>
+              <a:rPr lang="fi-FI" i="1" dirty="0" err="1"/>
+              <a:t>be</a:t>
+            </a:r>
+            <a:r>
+              <a:rPr lang="fi-FI" i="1" dirty="0"/>
+              <a:t> 7 (</a:t>
+            </a:r>
+            <a:r>
+              <a:rPr lang="fi-FI" i="1" dirty="0" err="1"/>
+              <a:t>initial</a:t>
+            </a:r>
+            <a:r>
+              <a:rPr lang="fi-FI" i="1" dirty="0"/>
+              <a:t> </a:t>
+            </a:r>
+            <a:r>
+              <a:rPr lang="fi-FI" i="1" dirty="0" err="1"/>
+              <a:t>value</a:t>
+            </a:r>
+            <a:r>
+              <a:rPr lang="fi-FI" i="1" dirty="0"/>
+              <a:t> </a:t>
+            </a:r>
+            <a:r>
+              <a:rPr lang="fi-FI" i="1" dirty="0" err="1"/>
+              <a:t>only</a:t>
+            </a:r>
+            <a:r>
+              <a:rPr lang="fi-FI" i="1" dirty="0"/>
+              <a:t> </a:t>
+            </a:r>
+            <a:r>
+              <a:rPr lang="fi-FI" i="1" dirty="0" err="1"/>
+              <a:t>used</a:t>
+            </a:r>
+            <a:r>
+              <a:rPr lang="fi-FI" i="1" dirty="0"/>
+              <a:t> </a:t>
+            </a:r>
+            <a:r>
+              <a:rPr lang="fi-FI" i="1" dirty="0" err="1"/>
+              <a:t>when</a:t>
+            </a:r>
+            <a:r>
+              <a:rPr lang="fi-FI" i="1" dirty="0"/>
+              <a:t> </a:t>
+            </a:r>
+            <a:r>
+              <a:rPr lang="fi-FI" i="1" dirty="0" err="1"/>
+              <a:t>component</a:t>
+            </a:r>
+            <a:r>
+              <a:rPr lang="fi-FI" i="1" dirty="0"/>
+              <a:t> </a:t>
+            </a:r>
+            <a:r>
+              <a:rPr lang="fi-FI" i="1" dirty="0" err="1"/>
+              <a:t>created</a:t>
+            </a:r>
+            <a:r>
+              <a:rPr lang="fi-FI" i="1" dirty="0"/>
+              <a:t>)</a:t>
+            </a:r>
+          </a:p>
+          <a:p>
+            <a:pPr lvl="1"/>
+            <a:r>
+              <a:rPr lang="fi-FI" i="1" dirty="0" err="1"/>
+              <a:t>useState</a:t>
+            </a:r>
+            <a:r>
+              <a:rPr lang="fi-FI" i="1" dirty="0"/>
+              <a:t> </a:t>
+            </a:r>
+            <a:r>
+              <a:rPr lang="fi-FI" i="1" dirty="0" err="1"/>
+              <a:t>will</a:t>
+            </a:r>
+            <a:r>
+              <a:rPr lang="fi-FI" i="1" dirty="0"/>
+              <a:t> </a:t>
+            </a:r>
+            <a:r>
+              <a:rPr lang="fi-FI" i="1" dirty="0" err="1"/>
+              <a:t>return</a:t>
+            </a:r>
+            <a:r>
+              <a:rPr lang="fi-FI" i="1" dirty="0"/>
+              <a:t> </a:t>
+            </a:r>
+            <a:r>
+              <a:rPr lang="fi-FI" i="1" dirty="0" err="1"/>
+              <a:t>that</a:t>
+            </a:r>
+            <a:r>
+              <a:rPr lang="fi-FI" i="1" dirty="0"/>
+              <a:t> </a:t>
+            </a:r>
+            <a:r>
+              <a:rPr lang="fi-FI" i="1" dirty="0" err="1"/>
+              <a:t>value</a:t>
+            </a:r>
+            <a:r>
+              <a:rPr lang="fi-FI" i="1" dirty="0"/>
+              <a:t> 7 and </a:t>
+            </a:r>
+            <a:r>
+              <a:rPr lang="fi-FI" i="1" dirty="0" err="1"/>
+              <a:t>the</a:t>
+            </a:r>
+            <a:r>
+              <a:rPr lang="fi-FI" i="1" dirty="0"/>
               <a:t> </a:t>
             </a:r>
             <a:r>
@@ -11240,15 +12387,23 @@
             </a:r>
             <a:r>
               <a:rPr lang="fi-FI" i="1" dirty="0" err="1"/>
-              <a:t>created</a:t>
+              <a:t>function</a:t>
             </a:r>
             <a:r>
               <a:rPr lang="fi-FI" i="1" dirty="0"/>
-              <a:t> for </a:t>
+              <a:t> as an </a:t>
             </a:r>
             <a:r>
               <a:rPr lang="fi-FI" i="1" dirty="0" err="1"/>
-              <a:t>setting</a:t>
+              <a:t>array</a:t>
+            </a:r>
+            <a:endParaRPr lang="fi-FI" i="1" dirty="0"/>
+          </a:p>
+          <a:p>
+            <a:pPr lvl="1"/>
+            <a:r>
+              <a:rPr lang="fi-FI" i="1" dirty="0" err="1"/>
+              <a:t>we</a:t>
             </a:r>
             <a:r>
               <a:rPr lang="fi-FI" i="1" dirty="0"/>
@@ -11256,7 +12411,7 @@
             </a:r>
             <a:r>
               <a:rPr lang="fi-FI" i="1" dirty="0" err="1"/>
-              <a:t>new</a:t>
+              <a:t>use</a:t>
             </a:r>
             <a:r>
               <a:rPr lang="fi-FI" i="1" dirty="0"/>
@@ -11264,7 +12419,23 @@
             </a:r>
             <a:r>
               <a:rPr lang="fi-FI" i="1" dirty="0" err="1"/>
-              <a:t>values</a:t>
+              <a:t>the</a:t>
+            </a:r>
+            <a:r>
+              <a:rPr lang="fi-FI" i="1" dirty="0"/>
+              <a:t> </a:t>
+            </a:r>
+            <a:r>
+              <a:rPr lang="fi-FI" i="1" dirty="0" err="1"/>
+              <a:t>destructuring</a:t>
+            </a:r>
+            <a:r>
+              <a:rPr lang="fi-FI" i="1" dirty="0"/>
+              <a:t> </a:t>
+            </a:r>
+            <a:r>
+              <a:rPr lang="fi-FI" i="1" dirty="0" err="1"/>
+              <a:t>assignment</a:t>
             </a:r>
             <a:r>
               <a:rPr lang="fi-FI" i="1" dirty="0"/>
@@ -11272,15 +12443,7 @@
             </a:r>
             <a:r>
               <a:rPr lang="fi-FI" i="1" dirty="0" err="1"/>
-              <a:t>age</a:t>
-            </a:r>
-            <a:r>
-              <a:rPr lang="fi-FI" i="1" dirty="0"/>
-              <a:t>, </a:t>
-            </a:r>
-            <a:r>
-              <a:rPr lang="fi-FI" i="1" dirty="0" err="1"/>
-              <a:t>automagically</a:t>
+              <a:t>pick</a:t>
             </a:r>
             <a:r>
               <a:rPr lang="fi-FI" i="1" dirty="0"/>
@@ -11288,31 +12451,7 @@
             </a:r>
             <a:r>
               <a:rPr lang="fi-FI" i="1" dirty="0" err="1"/>
-              <a:t>works</a:t>
-            </a:r>
-            <a:r>
-              <a:rPr lang="fi-FI" i="1" dirty="0"/>
-              <a:t>, no </a:t>
-            </a:r>
-            <a:r>
-              <a:rPr lang="fi-FI" i="1" dirty="0" err="1"/>
-              <a:t>need</a:t>
-            </a:r>
-            <a:r>
-              <a:rPr lang="fi-FI" i="1" dirty="0"/>
-              <a:t> for </a:t>
-            </a:r>
-            <a:r>
-              <a:rPr lang="fi-FI" i="1" dirty="0" err="1"/>
-              <a:t>code</a:t>
-            </a:r>
-            <a:endParaRPr lang="fi-FI" i="1" dirty="0"/>
-          </a:p>
-          <a:p>
-            <a:pPr lvl="1"/>
-            <a:r>
-              <a:rPr lang="fi-FI" i="1" dirty="0" err="1"/>
-              <a:t>the</a:t>
+              <a:t>that</a:t>
             </a:r>
             <a:r>
               <a:rPr lang="fi-FI" i="1" dirty="0"/>
@@ -11320,7 +12459,31 @@
             </a:r>
             <a:r>
               <a:rPr lang="fi-FI" i="1" dirty="0" err="1"/>
-              <a:t>initial</a:t>
+              <a:t>value</a:t>
+            </a:r>
+            <a:r>
+              <a:rPr lang="fi-FI" i="1" dirty="0"/>
+              <a:t> and </a:t>
+            </a:r>
+            <a:r>
+              <a:rPr lang="fi-FI" i="1" dirty="0" err="1"/>
+              <a:t>assign</a:t>
+            </a:r>
+            <a:r>
+              <a:rPr lang="fi-FI" i="1" dirty="0"/>
+              <a:t> it to ’</a:t>
+            </a:r>
+            <a:r>
+              <a:rPr lang="fi-FI" i="1" dirty="0" err="1"/>
+              <a:t>age</a:t>
+            </a:r>
+            <a:r>
+              <a:rPr lang="fi-FI" i="1" dirty="0"/>
+              <a:t>’, and </a:t>
+            </a:r>
+            <a:r>
+              <a:rPr lang="fi-FI" i="1" dirty="0" err="1"/>
+              <a:t>that</a:t>
             </a:r>
             <a:r>
               <a:rPr lang="fi-FI" i="1" dirty="0"/>
@@ -11328,142 +12491,11 @@
             </a:r>
             <a:r>
               <a:rPr lang="fi-FI" i="1" dirty="0" err="1"/>
-              <a:t>value</a:t>
+              <a:t>function</a:t>
             </a:r>
             <a:r>
               <a:rPr lang="fi-FI" i="1" dirty="0"/>
-              <a:t> of </a:t>
-            </a:r>
-            <a:r>
-              <a:rPr lang="fi-FI" i="1" dirty="0" err="1"/>
-              <a:t>age</a:t>
-            </a:r>
-            <a:r>
-              <a:rPr lang="fi-FI" i="1" dirty="0"/>
-              <a:t> </a:t>
-            </a:r>
-            <a:r>
-              <a:rPr lang="fi-FI" i="1" dirty="0" err="1"/>
-              <a:t>will</a:t>
-            </a:r>
-            <a:r>
-              <a:rPr lang="fi-FI" i="1" dirty="0"/>
-              <a:t> </a:t>
-            </a:r>
-            <a:r>
-              <a:rPr lang="fi-FI" i="1" dirty="0" err="1"/>
-              <a:t>be</a:t>
-            </a:r>
-            <a:r>
-              <a:rPr lang="fi-FI" i="1" dirty="0"/>
-              <a:t> 7 (</a:t>
-            </a:r>
-            <a:r>
-              <a:rPr lang="fi-FI" i="1" dirty="0" err="1"/>
-              <a:t>initial</a:t>
-            </a:r>
-            <a:r>
-              <a:rPr lang="fi-FI" i="1" dirty="0"/>
-              <a:t> </a:t>
-            </a:r>
-            <a:r>
-              <a:rPr lang="fi-FI" i="1" dirty="0" err="1"/>
-              <a:t>value</a:t>
-            </a:r>
-            <a:r>
-              <a:rPr lang="fi-FI" i="1" dirty="0"/>
-              <a:t> </a:t>
-            </a:r>
-            <a:r>
-              <a:rPr lang="fi-FI" i="1" dirty="0" err="1"/>
-              <a:t>only</a:t>
-            </a:r>
-            <a:r>
-              <a:rPr lang="fi-FI" i="1" dirty="0"/>
-              <a:t> </a:t>
-            </a:r>
-            <a:r>
-              <a:rPr lang="fi-FI" i="1" dirty="0" err="1"/>
-              <a:t>used</a:t>
-            </a:r>
-            <a:r>
-              <a:rPr lang="fi-FI" i="1" dirty="0"/>
-              <a:t> </a:t>
-            </a:r>
-            <a:r>
-              <a:rPr lang="fi-FI" i="1" dirty="0" err="1"/>
-              <a:t>when</a:t>
-            </a:r>
-            <a:r>
-              <a:rPr lang="fi-FI" i="1" dirty="0"/>
-              <a:t> </a:t>
-            </a:r>
-            <a:r>
-              <a:rPr lang="fi-FI" i="1" dirty="0" err="1"/>
-              <a:t>component</a:t>
-            </a:r>
-            <a:r>
-              <a:rPr lang="fi-FI" i="1" dirty="0"/>
-              <a:t> </a:t>
-            </a:r>
-            <a:r>
-              <a:rPr lang="fi-FI" i="1" dirty="0" err="1"/>
-              <a:t>created</a:t>
-            </a:r>
-            <a:r>
-              <a:rPr lang="fi-FI" i="1" dirty="0"/>
-              <a:t>)</a:t>
-            </a:r>
-          </a:p>
-          <a:p>
-            <a:pPr lvl="1"/>
-            <a:r>
-              <a:rPr lang="fi-FI" i="1" dirty="0" err="1"/>
-              <a:t>useState</a:t>
-            </a:r>
-            <a:r>
-              <a:rPr lang="fi-FI" i="1" dirty="0"/>
-              <a:t> </a:t>
-            </a:r>
-            <a:r>
-              <a:rPr lang="fi-FI" i="1" dirty="0" err="1"/>
-              <a:t>will</a:t>
-            </a:r>
-            <a:r>
-              <a:rPr lang="fi-FI" i="1" dirty="0"/>
-              <a:t> </a:t>
-            </a:r>
-            <a:r>
-              <a:rPr lang="fi-FI" i="1" dirty="0" err="1"/>
-              <a:t>return</a:t>
-            </a:r>
-            <a:r>
-              <a:rPr lang="fi-FI" i="1" dirty="0"/>
-              <a:t> </a:t>
-            </a:r>
-            <a:r>
-              <a:rPr lang="fi-FI" i="1" dirty="0" err="1"/>
-              <a:t>that</a:t>
-            </a:r>
-            <a:r>
-              <a:rPr lang="fi-FI" i="1" dirty="0"/>
-              <a:t> </a:t>
-            </a:r>
-            <a:r>
-              <a:rPr lang="fi-FI" i="1" dirty="0" err="1"/>
-              <a:t>value</a:t>
-            </a:r>
-            <a:r>
-              <a:rPr lang="fi-FI" i="1" dirty="0"/>
-              <a:t> 7 and </a:t>
-            </a:r>
-            <a:r>
-              <a:rPr lang="fi-FI" i="1" dirty="0" err="1"/>
-              <a:t>the</a:t>
-            </a:r>
-            <a:r>
-              <a:rPr lang="fi-FI" i="1" dirty="0"/>
-              <a:t> </a:t>
+              <a:t> to ’</a:t>
             </a:r>
             <a:r>
               <a:rPr lang="fi-FI" i="1" dirty="0" err="1"/>
@@ -11471,125 +12503,8 @@
             </a:r>
             <a:r>
               <a:rPr lang="fi-FI" i="1" dirty="0"/>
-              <a:t> </a:t>
-            </a:r>
-            <a:r>
-              <a:rPr lang="fi-FI" i="1" dirty="0" err="1"/>
-              <a:t>function</a:t>
-            </a:r>
-            <a:r>
-              <a:rPr lang="fi-FI" i="1" dirty="0"/>
-              <a:t> as an </a:t>
-            </a:r>
-            <a:r>
-              <a:rPr lang="fi-FI" i="1" dirty="0" err="1"/>
-              <a:t>array</a:t>
-            </a:r>
-            <a:endParaRPr lang="fi-FI" i="1" dirty="0"/>
-          </a:p>
-          <a:p>
-            <a:pPr lvl="1"/>
-            <a:r>
-              <a:rPr lang="fi-FI" i="1" dirty="0" err="1"/>
-              <a:t>we</a:t>
-            </a:r>
-            <a:r>
-              <a:rPr lang="fi-FI" i="1" dirty="0"/>
-              <a:t> </a:t>
-            </a:r>
-            <a:r>
-              <a:rPr lang="fi-FI" i="1" dirty="0" err="1"/>
-              <a:t>use</a:t>
-            </a:r>
-            <a:r>
-              <a:rPr lang="fi-FI" i="1" dirty="0"/>
-              <a:t> </a:t>
-            </a:r>
-            <a:r>
-              <a:rPr lang="fi-FI" i="1" dirty="0" err="1"/>
-              <a:t>the</a:t>
-            </a:r>
-            <a:r>
-              <a:rPr lang="fi-FI" i="1" dirty="0"/>
-              <a:t> </a:t>
-            </a:r>
-            <a:r>
-              <a:rPr lang="fi-FI" i="1" dirty="0" err="1"/>
-              <a:t>destructuring</a:t>
-            </a:r>
-            <a:r>
-              <a:rPr lang="fi-FI" i="1" dirty="0"/>
-              <a:t> </a:t>
-            </a:r>
-            <a:r>
-              <a:rPr lang="fi-FI" i="1" dirty="0" err="1"/>
-              <a:t>assignment</a:t>
-            </a:r>
-            <a:r>
-              <a:rPr lang="fi-FI" i="1" dirty="0"/>
-              <a:t> to </a:t>
-            </a:r>
-            <a:r>
-              <a:rPr lang="fi-FI" i="1" dirty="0" err="1"/>
-              <a:t>pick</a:t>
-            </a:r>
-            <a:r>
-              <a:rPr lang="fi-FI" i="1" dirty="0"/>
-              <a:t> </a:t>
-            </a:r>
-            <a:r>
-              <a:rPr lang="fi-FI" i="1" dirty="0" err="1"/>
-              <a:t>that</a:t>
-            </a:r>
-            <a:r>
-              <a:rPr lang="fi-FI" i="1" dirty="0"/>
-              <a:t> </a:t>
-            </a:r>
-            <a:r>
-              <a:rPr lang="fi-FI" i="1" dirty="0" err="1"/>
-              <a:t>value</a:t>
-            </a:r>
-            <a:r>
-              <a:rPr lang="fi-FI" i="1" dirty="0"/>
-              <a:t> and </a:t>
-            </a:r>
-            <a:r>
-              <a:rPr lang="fi-FI" i="1" dirty="0" err="1"/>
-              <a:t>assign</a:t>
-            </a:r>
-            <a:r>
-              <a:rPr lang="fi-FI" i="1" dirty="0"/>
-              <a:t> it to </a:t>
-            </a:r>
-            <a:r>
-              <a:rPr lang="fi-FI" i="1" dirty="0" err="1"/>
-              <a:t>age</a:t>
-            </a:r>
-            <a:r>
-              <a:rPr lang="fi-FI" i="1" dirty="0"/>
-              <a:t>, and </a:t>
-            </a:r>
-            <a:r>
-              <a:rPr lang="fi-FI" i="1" dirty="0" err="1"/>
-              <a:t>that</a:t>
-            </a:r>
-            <a:r>
-              <a:rPr lang="fi-FI" i="1" dirty="0"/>
-              <a:t> </a:t>
-            </a:r>
-            <a:r>
-              <a:rPr lang="fi-FI" i="1" dirty="0" err="1"/>
-              <a:t>functio</a:t>
-            </a:r>
-            <a:r>
-              <a:rPr lang="fi-FI" i="1" dirty="0"/>
-              <a:t> and set it to </a:t>
-            </a:r>
-            <a:r>
-              <a:rPr lang="fi-FI" i="1" dirty="0" err="1"/>
-              <a:t>setAge</a:t>
-            </a:r>
-            <a:endParaRPr lang="fi-FI" i="1" dirty="0"/>
+              <a:t>’</a:t>
+            </a:r>
           </a:p>
           <a:p>
             <a:endParaRPr lang="fi-FI" i="1" dirty="0"/>
@@ -11622,7 +12537,7 @@
           <a:p>
             <a:fld id="{202E1EC2-47B8-044B-A09E-6A63B4D80C87}" type="datetime1">
               <a:rPr lang="fi-FI" smtClean="0"/>
-              <a:t>8.5.2022</a:t>
+              <a:t>2.10.2022</a:t>
             </a:fld>
             <a:endParaRPr lang="en-GB"/>
           </a:p>
@@ -11797,37 +12712,37 @@
           <a:lstStyle/>
           <a:p>
             <a:r>
-              <a:rPr lang="en-US" i="1" u="sng" dirty="0">
+              <a:rPr lang="en-US" u="sng" dirty="0">
                 <a:hlinkClick r:id="rId2"/>
               </a:rPr>
               <a:t>https://youtu.be/dpw9EHDh2bM?t=1061</a:t>
             </a:r>
             <a:r>
-              <a:rPr lang="en-US" i="1" dirty="0"/>
+              <a:rPr lang="en-US" dirty="0"/>
               <a:t>        (</a:t>
             </a:r>
             <a:r>
-              <a:rPr lang="en-US" i="1" dirty="0" err="1"/>
+              <a:rPr lang="en-US" dirty="0" err="1"/>
               <a:t>useState</a:t>
             </a:r>
             <a:r>
-              <a:rPr lang="en-US" i="1" dirty="0"/>
+              <a:rPr lang="en-US" dirty="0"/>
               <a:t>, </a:t>
             </a:r>
             <a:r>
-              <a:rPr lang="en-US" i="1" dirty="0" err="1"/>
+              <a:rPr lang="en-US" dirty="0" err="1"/>
               <a:t>useEffect</a:t>
             </a:r>
             <a:r>
-              <a:rPr lang="en-US" i="1" dirty="0"/>
+              <a:rPr lang="en-US" dirty="0"/>
               <a:t>, </a:t>
             </a:r>
             <a:r>
-              <a:rPr lang="en-US" b="1" i="1" dirty="0" err="1"/>
+              <a:rPr lang="en-US" b="1" dirty="0" err="1"/>
               <a:t>useContext</a:t>
             </a:r>
             <a:r>
-              <a:rPr lang="en-US" i="1" dirty="0"/>
+              <a:rPr lang="en-US" dirty="0"/>
               <a:t> introduced)</a:t>
             </a:r>
             <a:endParaRPr lang="fi-FI" dirty="0"/>
@@ -11835,61 +12750,54 @@
           <a:p>
             <a:pPr lvl="1"/>
             <a:r>
-              <a:rPr lang="en-US" i="1" dirty="0"/>
+              <a:rPr lang="en-US" dirty="0"/>
               <a:t>from 17:45 until 54:13   =   &lt;36 mins   </a:t>
             </a:r>
           </a:p>
           <a:p>
             <a:pPr lvl="1"/>
             <a:r>
-              <a:rPr lang="en-US" i="1" dirty="0"/>
+              <a:rPr lang="en-US" dirty="0"/>
               <a:t>NOTICE, No need to watch the unrelated LATTER PART OF THE SHOW!</a:t>
             </a:r>
           </a:p>
           <a:p>
             <a:r>
-              <a:rPr lang="en-US" b="1" i="1" dirty="0" err="1"/>
+              <a:rPr lang="en-US" b="1" dirty="0" err="1"/>
               <a:t>useState</a:t>
             </a:r>
             <a:r>
-              <a:rPr lang="en-US" i="1" dirty="0"/>
-              <a:t> =&gt; used to just setup the component’s React state fraction and its maintenance function!</a:t>
-            </a:r>
-          </a:p>
-          <a:p>
-            <a:r>
-              <a:rPr lang="en-US" i="1" dirty="0"/>
-              <a:t>state/props created/changed =&gt; </a:t>
-            </a:r>
-            <a:r>
-              <a:rPr lang="en-US" b="1" i="1" dirty="0" err="1"/>
+              <a:rPr lang="en-US" dirty="0"/>
+              <a:t> =&gt; used to just setup some fraction of the component’s React state and its maintenance function</a:t>
+            </a:r>
+          </a:p>
+          <a:p>
+            <a:r>
+              <a:rPr lang="en-US" dirty="0"/>
+              <a:t>state/props created or changed =&gt; </a:t>
+            </a:r>
+            <a:r>
+              <a:rPr lang="en-US" b="1" dirty="0" err="1"/>
               <a:t>useEffect</a:t>
             </a:r>
             <a:r>
-              <a:rPr lang="en-US" b="1" i="1" dirty="0"/>
+              <a:rPr lang="en-US" b="1" dirty="0"/>
               <a:t>( )</a:t>
             </a:r>
             <a:r>
-              <a:rPr lang="en-US" i="1" dirty="0"/>
+              <a:rPr lang="en-US" dirty="0"/>
               <a:t> fires! Thus useful for attaching any functionality</a:t>
             </a:r>
           </a:p>
           <a:p>
             <a:r>
-              <a:rPr lang="en-US" b="1" i="1" dirty="0" err="1"/>
+              <a:rPr lang="en-US" b="1" dirty="0" err="1"/>
               <a:t>useContext</a:t>
             </a:r>
             <a:r>
-              <a:rPr lang="en-US" i="1" dirty="0"/>
+              <a:rPr lang="en-US" dirty="0"/>
               <a:t> =&gt; used to share data / data structures between unrelated React components</a:t>
             </a:r>
-            <a:endParaRPr lang="fi-FI" dirty="0"/>
-          </a:p>
-          <a:p>
-            <a:endParaRPr lang="fi-FI" i="1" dirty="0"/>
-          </a:p>
-          <a:p>
-            <a:endParaRPr lang="en-US" i="1" dirty="0"/>
           </a:p>
         </p:txBody>
       </p:sp>
@@ -11916,7 +12824,7 @@
           <a:p>
             <a:fld id="{202E1EC2-47B8-044B-A09E-6A63B4D80C87}" type="datetime1">
               <a:rPr lang="fi-FI" smtClean="0"/>
-              <a:t>8.5.2022</a:t>
+              <a:t>2.10.2022</a:t>
             </a:fld>
             <a:endParaRPr lang="en-GB"/>
           </a:p>
@@ -12094,133 +13002,133 @@
           <a:lstStyle/>
           <a:p>
             <a:r>
-              <a:rPr lang="en-US" i="1" u="sng" dirty="0">
+              <a:rPr lang="en-US" u="sng" dirty="0">
                 <a:hlinkClick r:id="rId2"/>
               </a:rPr>
               <a:t>https://www.youtube.com/watch?v=TNhaISOUy6Q</a:t>
             </a:r>
-            <a:endParaRPr lang="en-US" i="1" u="sng" dirty="0"/>
-          </a:p>
-          <a:p>
-            <a:r>
-              <a:rPr lang="en-US" i="1" u="sng" dirty="0"/>
+            <a:endParaRPr lang="en-US" u="sng" dirty="0"/>
+          </a:p>
+          <a:p>
+            <a:r>
+              <a:rPr lang="en-US" u="sng" dirty="0"/>
               <a:t>f</a:t>
             </a:r>
             <a:r>
-              <a:rPr lang="en-US" i="1" dirty="0"/>
+              <a:rPr lang="en-US" dirty="0"/>
               <a:t>rom 0:00 </a:t>
             </a:r>
             <a:r>
-              <a:rPr lang="en-US" b="1" i="1" dirty="0"/>
+              <a:rPr lang="en-US" b="1" dirty="0"/>
               <a:t>until 6:58</a:t>
             </a:r>
             <a:r>
-              <a:rPr lang="en-US" i="1" dirty="0"/>
+              <a:rPr lang="en-US" dirty="0"/>
               <a:t>   our 3 Hooks (</a:t>
             </a:r>
             <a:r>
-              <a:rPr lang="en-US" i="1" dirty="0" err="1"/>
+              <a:rPr lang="en-US" dirty="0" err="1"/>
               <a:t>useState</a:t>
             </a:r>
             <a:r>
-              <a:rPr lang="en-US" i="1" dirty="0"/>
+              <a:rPr lang="en-US" dirty="0"/>
               <a:t>, </a:t>
             </a:r>
             <a:r>
-              <a:rPr lang="en-US" i="1" dirty="0" err="1"/>
+              <a:rPr lang="en-US" dirty="0" err="1"/>
               <a:t>useEffect</a:t>
             </a:r>
             <a:r>
-              <a:rPr lang="en-US" i="1" dirty="0"/>
+              <a:rPr lang="en-US" dirty="0"/>
               <a:t>, </a:t>
             </a:r>
             <a:r>
-              <a:rPr lang="en-US" i="1" dirty="0" err="1"/>
+              <a:rPr lang="en-US" dirty="0" err="1"/>
               <a:t>useContext</a:t>
             </a:r>
             <a:r>
-              <a:rPr lang="en-US" i="1" dirty="0"/>
+              <a:rPr lang="en-US" dirty="0"/>
               <a:t>) shown in just 7 mins</a:t>
             </a:r>
           </a:p>
           <a:p>
             <a:r>
-              <a:rPr lang="en-US" i="1" dirty="0"/>
+              <a:rPr lang="en-US" dirty="0"/>
               <a:t>Video progresses fast. Pause and read code! </a:t>
             </a:r>
-            <a:endParaRPr lang="fi-FI" i="1" dirty="0"/>
-          </a:p>
-          <a:p>
-            <a:r>
-              <a:rPr lang="en-US" i="1" dirty="0"/>
-              <a:t>post cleanup happens with the function that </a:t>
-            </a:r>
-            <a:r>
-              <a:rPr lang="en-US" i="1" dirty="0" err="1"/>
+            <a:endParaRPr lang="fi-FI" dirty="0"/>
+          </a:p>
+          <a:p>
+            <a:r>
+              <a:rPr lang="en-US" dirty="0"/>
+              <a:t>The ‘post cleanup’ happens with the function that your </a:t>
+            </a:r>
+            <a:r>
+              <a:rPr lang="en-US" dirty="0" err="1"/>
               <a:t>useEffect</a:t>
             </a:r>
             <a:r>
-              <a:rPr lang="en-US" i="1" dirty="0"/>
+              <a:rPr lang="en-US" dirty="0"/>
               <a:t> </a:t>
             </a:r>
             <a:r>
-              <a:rPr lang="en-US" b="1" i="1" dirty="0"/>
-              <a:t>possibly </a:t>
-            </a:r>
-            <a:r>
-              <a:rPr lang="en-US" b="1" i="1" u="sng" dirty="0"/>
+              <a:rPr lang="en-US" b="1" dirty="0"/>
+              <a:t>optionally </a:t>
+            </a:r>
+            <a:r>
+              <a:rPr lang="en-US" b="1" u="sng" dirty="0"/>
               <a:t>returns</a:t>
             </a:r>
             <a:r>
-              <a:rPr lang="en-US" b="1" i="1" dirty="0"/>
+              <a:rPr lang="en-US" b="1" dirty="0"/>
               <a:t> </a:t>
             </a:r>
             <a:r>
-              <a:rPr lang="en-US" i="1" dirty="0"/>
+              <a:rPr lang="en-US" dirty="0"/>
               <a:t>after it's done with what it wants to do!</a:t>
             </a:r>
           </a:p>
           <a:p>
             <a:r>
-              <a:rPr lang="en-US" i="1" dirty="0"/>
+              <a:rPr lang="en-US" dirty="0"/>
               <a:t>note: </a:t>
             </a:r>
             <a:r>
-              <a:rPr lang="en-US" b="1" i="1" dirty="0"/>
+              <a:rPr lang="en-US" b="1" dirty="0"/>
               <a:t>side effects </a:t>
             </a:r>
             <a:r>
-              <a:rPr lang="en-US" i="1" dirty="0"/>
+              <a:rPr lang="en-US" dirty="0"/>
               <a:t>= things happening outside of the React state/prop change </a:t>
             </a:r>
             <a:r>
-              <a:rPr lang="en-US" i="1" dirty="0">
+              <a:rPr lang="en-US" dirty="0">
                 <a:sym typeface="Wingdings" panose="05000000000000000000" pitchFamily="2" charset="2"/>
               </a:rPr>
               <a:t></a:t>
             </a:r>
             <a:r>
-              <a:rPr lang="en-US" i="1" dirty="0"/>
-              <a:t> re-render cycle. So e.g. saving something, even crucial to our business process, to backend via AJAX is a "side effect".</a:t>
-            </a:r>
-          </a:p>
-          <a:p>
-            <a:r>
-              <a:rPr lang="en-US" i="1" dirty="0" err="1"/>
+              <a:rPr lang="en-US" dirty="0"/>
+              <a:t> re-render -cycle. So e.g. saving something, even crucial to our business process, to backend via AJAX is a "side effect".</a:t>
+            </a:r>
+          </a:p>
+          <a:p>
+            <a:r>
+              <a:rPr lang="en-US" dirty="0" err="1"/>
               <a:t>useEffect</a:t>
             </a:r>
             <a:r>
-              <a:rPr lang="en-US" i="1" dirty="0"/>
+              <a:rPr lang="en-US" dirty="0"/>
               <a:t> is an inner function of component function. </a:t>
             </a:r>
           </a:p>
           <a:p>
             <a:r>
-              <a:rPr lang="en-US" i="1" dirty="0" err="1"/>
+              <a:rPr lang="en-US" dirty="0" err="1"/>
               <a:t>useEffect</a:t>
             </a:r>
             <a:r>
-              <a:rPr lang="en-US" i="1" dirty="0"/>
+              <a:rPr lang="en-US" dirty="0"/>
               <a:t> has replaced the old React component life-cycle event handlers (Where you could 'attach' your event-handler functions). inner function = function defined inside the component function. So, the visibility of the function is inside the outer function, inside that component only.</a:t>
             </a:r>
           </a:p>
@@ -12249,7 +13157,7 @@
           <a:p>
             <a:fld id="{202E1EC2-47B8-044B-A09E-6A63B4D80C87}" type="datetime1">
               <a:rPr lang="fi-FI" smtClean="0"/>
-              <a:t>8.5.2022</a:t>
+              <a:t>2.10.2022</a:t>
             </a:fld>
             <a:endParaRPr lang="en-GB"/>
           </a:p>
@@ -12427,20 +13335,20 @@
           <a:lstStyle/>
           <a:p>
             <a:r>
-              <a:rPr lang="en-US" i="1" u="sng" dirty="0">
+              <a:rPr lang="en-US" u="sng" dirty="0">
                 <a:hlinkClick r:id="rId2"/>
               </a:rPr>
               <a:t>https://reactjs.org/docs/hooks-overview.html</a:t>
             </a:r>
             <a:r>
-              <a:rPr lang="en-US" i="1" dirty="0"/>
+              <a:rPr lang="en-US" dirty="0"/>
               <a:t>              </a:t>
             </a:r>
             <a:endParaRPr lang="fi-FI" dirty="0"/>
           </a:p>
           <a:p>
             <a:r>
-              <a:rPr lang="en-US" i="1" u="sng" dirty="0">
+              <a:rPr lang="en-US" u="sng" dirty="0">
                 <a:hlinkClick r:id="rId3"/>
               </a:rPr>
               <a:t>https://reactjs.org/docs/hooks-state.html</a:t>
@@ -12449,37 +13357,37 @@
           </a:p>
           <a:p>
             <a:r>
-              <a:rPr lang="en-US" i="1" u="sng" dirty="0">
+              <a:rPr lang="en-US" u="sng" dirty="0">
                 <a:hlinkClick r:id="rId4"/>
               </a:rPr>
               <a:t>https://reactjs.org/docs/hooks-effect.html</a:t>
             </a:r>
             <a:r>
-              <a:rPr lang="en-US" i="1" dirty="0"/>
+              <a:rPr lang="en-US" dirty="0"/>
               <a:t> </a:t>
             </a:r>
             <a:r>
-              <a:rPr lang="en-US" i="1" u="sng" dirty="0"/>
+              <a:rPr lang="en-US" u="sng" dirty="0"/>
               <a:t>Effect Hooks</a:t>
             </a:r>
-            <a:endParaRPr lang="en-US" i="1" dirty="0"/>
-          </a:p>
-          <a:p>
-            <a:r>
-              <a:rPr lang="en-US" i="1" dirty="0">
+            <a:endParaRPr lang="en-US" dirty="0"/>
+          </a:p>
+          <a:p>
+            <a:r>
+              <a:rPr lang="en-US" dirty="0">
                 <a:hlinkClick r:id="rId5"/>
               </a:rPr>
               <a:t>https://reactjs.org/docs/context.html#when-to-use-context</a:t>
             </a:r>
             <a:r>
-              <a:rPr lang="en-US" i="1" dirty="0"/>
+              <a:rPr lang="en-US" dirty="0"/>
               <a:t> </a:t>
             </a:r>
             <a:r>
-              <a:rPr lang="en-US" i="1" u="sng" dirty="0"/>
+              <a:rPr lang="en-US" u="sng" dirty="0"/>
               <a:t>Context Hooks</a:t>
             </a:r>
-            <a:endParaRPr lang="en-US" i="1" dirty="0"/>
+            <a:endParaRPr lang="en-US" dirty="0"/>
           </a:p>
           <a:p>
             <a:endParaRPr lang="fi-FI" dirty="0"/>
@@ -12509,7 +13417,7 @@
           <a:p>
             <a:fld id="{202E1EC2-47B8-044B-A09E-6A63B4D80C87}" type="datetime1">
               <a:rPr lang="fi-FI" smtClean="0"/>
-              <a:t>8.5.2022</a:t>
+              <a:t>2.10.2022</a:t>
             </a:fld>
             <a:endParaRPr lang="en-GB"/>
           </a:p>
@@ -13139,15 +14047,6 @@
 </file>
 
 <file path=customXml/item1.xml><?xml version="1.0" encoding="utf-8"?>
-<?mso-contentType ?>
-<FormTemplates xmlns="http://schemas.microsoft.com/sharepoint/v3/contenttype/forms">
-  <Display>DocumentLibraryForm</Display>
-  <Edit>DocumentLibraryForm</Edit>
-  <New>DocumentLibraryForm</New>
-</FormTemplates>
-</file>
-
-<file path=customXml/item2.xml><?xml version="1.0" encoding="utf-8"?>
 <p:properties xmlns:p="http://schemas.microsoft.com/office/2006/metadata/properties" xmlns:xsi="http://www.w3.org/2001/XMLSchema-instance" xmlns:pc="http://schemas.microsoft.com/office/infopath/2007/PartnerControls">
   <documentManagement>
     <PublishingExpirationDate xmlns="http://schemas.microsoft.com/sharepoint/v3" xsi:nil="true"/>
@@ -13156,7 +14055,7 @@
 </p:properties>
 </file>
 
-<file path=customXml/item3.xml><?xml version="1.0" encoding="utf-8"?>
+<file path=customXml/item2.xml><?xml version="1.0" encoding="utf-8"?>
 <ct:contentTypeSchema xmlns:ct="http://schemas.microsoft.com/office/2006/metadata/contentType" xmlns:ma="http://schemas.microsoft.com/office/2006/metadata/properties/metaAttributes" ct:_="" ma:_="" ma:contentTypeName="Document" ma:contentTypeID="0x01010024C55B41993A414DABB8DD07ACBA0814" ma:contentTypeVersion="1" ma:contentTypeDescription="Create a new document." ma:contentTypeScope="" ma:versionID="3ea0c22b5866975a7b271665de4056c5">
   <xsd:schema xmlns:xsd="http://www.w3.org/2001/XMLSchema" xmlns:xs="http://www.w3.org/2001/XMLSchema" xmlns:p="http://schemas.microsoft.com/office/2006/metadata/properties" xmlns:ns1="http://schemas.microsoft.com/sharepoint/v3" targetNamespace="http://schemas.microsoft.com/office/2006/metadata/properties" ma:root="true" ma:fieldsID="ef2aa9ed40e72a78c3822fc753b43e87" ns1:_="">
     <xsd:import namespace="http://schemas.microsoft.com/sharepoint/v3"/>
@@ -13288,31 +14187,32 @@
 </ct:contentTypeSchema>
 </file>
 
+<file path=customXml/item3.xml><?xml version="1.0" encoding="utf-8"?>
+<?mso-contentType ?>
+<FormTemplates xmlns="http://schemas.microsoft.com/sharepoint/v3/contenttype/forms">
+  <Display>DocumentLibraryForm</Display>
+  <Edit>DocumentLibraryForm</Edit>
+  <New>DocumentLibraryForm</New>
+</FormTemplates>
+</file>
+
 <file path=customXml/itemProps1.xml><?xml version="1.0" encoding="utf-8"?>
-<ds:datastoreItem xmlns:ds="http://schemas.openxmlformats.org/officeDocument/2006/customXml" ds:itemID="{D546C03B-CD3A-4EA0-AAA4-0E00E896454E}">
+<ds:datastoreItem xmlns:ds="http://schemas.openxmlformats.org/officeDocument/2006/customXml" ds:itemID="{DED4E12E-7268-4B03-A47B-0755D62B5E31}">
   <ds:schemaRefs>
-    <ds:schemaRef ds:uri="http://schemas.microsoft.com/sharepoint/v3/contenttype/forms"/>
+    <ds:schemaRef ds:uri="http://purl.org/dc/terms/"/>
+    <ds:schemaRef ds:uri="http://schemas.microsoft.com/office/2006/documentManagement/types"/>
+    <ds:schemaRef ds:uri="http://schemas.microsoft.com/sharepoint/v3"/>
+    <ds:schemaRef ds:uri="http://schemas.microsoft.com/office/infopath/2007/PartnerControls"/>
+    <ds:schemaRef ds:uri="http://schemas.openxmlformats.org/package/2006/metadata/core-properties"/>
+    <ds:schemaRef ds:uri="http://schemas.microsoft.com/office/2006/metadata/properties"/>
+    <ds:schemaRef ds:uri="http://www.w3.org/XML/1998/namespace"/>
+    <ds:schemaRef ds:uri="http://purl.org/dc/dcmitype/"/>
+    <ds:schemaRef ds:uri="http://purl.org/dc/elements/1.1/"/>
   </ds:schemaRefs>
 </ds:datastoreItem>
 </file>
 
 <file path=customXml/itemProps2.xml><?xml version="1.0" encoding="utf-8"?>
-<ds:datastoreItem xmlns:ds="http://schemas.openxmlformats.org/officeDocument/2006/customXml" ds:itemID="{DED4E12E-7268-4B03-A47B-0755D62B5E31}">
-  <ds:schemaRefs>
-    <ds:schemaRef ds:uri="http://schemas.microsoft.com/office/infopath/2007/PartnerControls"/>
-    <ds:schemaRef ds:uri="http://purl.org/dc/elements/1.1/"/>
-    <ds:schemaRef ds:uri="http://schemas.microsoft.com/office/2006/documentManagement/types"/>
-    <ds:schemaRef ds:uri="http://purl.org/dc/dcmitype/"/>
-    <ds:schemaRef ds:uri="http://schemas.microsoft.com/office/2006/metadata/properties"/>
-    <ds:schemaRef ds:uri="http://schemas.openxmlformats.org/package/2006/metadata/core-properties"/>
-    <ds:schemaRef ds:uri="http://schemas.microsoft.com/sharepoint/v3"/>
-    <ds:schemaRef ds:uri="http://www.w3.org/XML/1998/namespace"/>
-    <ds:schemaRef ds:uri="http://purl.org/dc/terms/"/>
-  </ds:schemaRefs>
-</ds:datastoreItem>
-</file>
-
-<file path=customXml/itemProps3.xml><?xml version="1.0" encoding="utf-8"?>
 <ds:datastoreItem xmlns:ds="http://schemas.openxmlformats.org/officeDocument/2006/customXml" ds:itemID="{B9E4DC25-62AA-44A0-8D5C-DB44892588AF}">
   <ds:schemaRefs>
     <ds:schemaRef ds:uri="http://schemas.microsoft.com/office/2006/metadata/contentType"/>
@@ -13328,4 +14228,12 @@
     <ds:schemaRef ds:uri="http://schemas.microsoft.com/internal/obd"/>
   </ds:schemaRefs>
 </ds:datastoreItem>
+</file>
+
+<file path=customXml/itemProps3.xml><?xml version="1.0" encoding="utf-8"?>
+<ds:datastoreItem xmlns:ds="http://schemas.openxmlformats.org/officeDocument/2006/customXml" ds:itemID="{D546C03B-CD3A-4EA0-AAA4-0E00E896454E}">
+  <ds:schemaRefs>
+    <ds:schemaRef ds:uri="http://schemas.microsoft.com/sharepoint/v3/contenttype/forms"/>
+  </ds:schemaRefs>
+</ds:datastoreItem>
 </file>
</xml_diff>

<commit_message>
Updating the frontend exam docs on Monday too
</commit_message>
<xml_diff>
--- a/FrontendStuff_ForExam.pptx
+++ b/FrontendStuff_ForExam.pptx
@@ -1210,7 +1210,7 @@
           <a:p>
             <a:fld id="{5645C365-1C26-6946-87AF-75D6A7DF4277}" type="datetimeFigureOut">
               <a:rPr lang="en-GB" smtClean="0"/>
-              <a:t>02/10/2022</a:t>
+              <a:t>03/10/2022</a:t>
             </a:fld>
             <a:endParaRPr lang="en-GB"/>
           </a:p>
@@ -1709,7 +1709,7 @@
           <a:p>
             <a:fld id="{35B864B8-8D08-7B43-B4FB-B2FB41A5D9E3}" type="datetime1">
               <a:rPr lang="fi-FI" smtClean="0"/>
-              <a:t>2.10.2022</a:t>
+              <a:t>3.10.2022</a:t>
             </a:fld>
             <a:endParaRPr lang="en-GB" dirty="0"/>
           </a:p>
@@ -2036,7 +2036,7 @@
           <a:p>
             <a:fld id="{D5AEA85A-FC56-D34C-9AA6-ECC3D2586F37}" type="datetime1">
               <a:rPr lang="fi-FI" smtClean="0"/>
-              <a:t>2.10.2022</a:t>
+              <a:t>3.10.2022</a:t>
             </a:fld>
             <a:endParaRPr lang="en-GB" dirty="0"/>
           </a:p>
@@ -2246,7 +2246,7 @@
           <a:p>
             <a:fld id="{E6BC6EEF-E660-7844-8930-418AFF95EA40}" type="datetime1">
               <a:rPr lang="fi-FI" smtClean="0"/>
-              <a:t>2.10.2022</a:t>
+              <a:t>3.10.2022</a:t>
             </a:fld>
             <a:endParaRPr lang="en-GB" dirty="0"/>
           </a:p>
@@ -2555,7 +2555,7 @@
           <a:p>
             <a:fld id="{4E10C7EC-C1C1-9849-A573-7692478FCD52}" type="datetime1">
               <a:rPr lang="fi-FI" smtClean="0"/>
-              <a:t>2.10.2022</a:t>
+              <a:t>3.10.2022</a:t>
             </a:fld>
             <a:endParaRPr lang="en-GB" dirty="0"/>
           </a:p>
@@ -2828,7 +2828,7 @@
           <a:p>
             <a:fld id="{844FF3FE-30BE-2040-9151-6FBC4992BF4F}" type="datetime1">
               <a:rPr lang="fi-FI" smtClean="0"/>
-              <a:t>2.10.2022</a:t>
+              <a:t>3.10.2022</a:t>
             </a:fld>
             <a:endParaRPr lang="en-GB" dirty="0"/>
           </a:p>
@@ -3068,7 +3068,7 @@
           <a:p>
             <a:fld id="{11EDCD7B-6966-E249-89F2-D46BDFBF56BE}" type="datetime1">
               <a:rPr lang="fi-FI" smtClean="0"/>
-              <a:t>2.10.2022</a:t>
+              <a:t>3.10.2022</a:t>
             </a:fld>
             <a:endParaRPr lang="en-GB" dirty="0"/>
           </a:p>
@@ -3361,7 +3361,7 @@
           <a:p>
             <a:fld id="{11EDCD7B-6966-E249-89F2-D46BDFBF56BE}" type="datetime1">
               <a:rPr lang="fi-FI" smtClean="0"/>
-              <a:t>2.10.2022</a:t>
+              <a:t>3.10.2022</a:t>
             </a:fld>
             <a:endParaRPr lang="en-GB" dirty="0"/>
           </a:p>
@@ -3800,7 +3800,7 @@
           <a:p>
             <a:fld id="{844FF3FE-30BE-2040-9151-6FBC4992BF4F}" type="datetime1">
               <a:rPr lang="fi-FI" smtClean="0"/>
-              <a:t>2.10.2022</a:t>
+              <a:t>3.10.2022</a:t>
             </a:fld>
             <a:endParaRPr lang="en-GB" dirty="0"/>
           </a:p>
@@ -4028,7 +4028,7 @@
           <a:p>
             <a:fld id="{11EDCD7B-6966-E249-89F2-D46BDFBF56BE}" type="datetime1">
               <a:rPr lang="fi-FI" smtClean="0"/>
-              <a:t>2.10.2022</a:t>
+              <a:t>3.10.2022</a:t>
             </a:fld>
             <a:endParaRPr lang="en-GB" dirty="0"/>
           </a:p>
@@ -4443,7 +4443,7 @@
           <a:p>
             <a:fld id="{B62E192A-D52B-F541-B2AA-4AEB9388F1F7}" type="datetime1">
               <a:rPr lang="fi-FI" smtClean="0"/>
-              <a:t>2.10.2022</a:t>
+              <a:t>3.10.2022</a:t>
             </a:fld>
             <a:endParaRPr lang="en-GB" dirty="0"/>
           </a:p>
@@ -4743,7 +4743,7 @@
           <a:p>
             <a:fld id="{EEA4FAA2-2B3E-264C-A42F-2D6D3EF33A3C}" type="datetime1">
               <a:rPr lang="fi-FI" smtClean="0"/>
-              <a:t>2.10.2022</a:t>
+              <a:t>3.10.2022</a:t>
             </a:fld>
             <a:endParaRPr lang="en-GB" dirty="0"/>
           </a:p>
@@ -5646,7 +5646,7 @@
           <a:p>
             <a:fld id="{B3114A65-8017-1743-A85A-B2A4BB835AE9}" type="datetime1">
               <a:rPr lang="fi-FI" smtClean="0"/>
-              <a:t>2.10.2022</a:t>
+              <a:t>3.10.2022</a:t>
             </a:fld>
             <a:endParaRPr lang="en-GB" dirty="0"/>
           </a:p>
@@ -5874,7 +5874,7 @@
           <a:p>
             <a:fld id="{11EDCD7B-6966-E249-89F2-D46BDFBF56BE}" type="datetime1">
               <a:rPr lang="fi-FI" smtClean="0"/>
-              <a:t>2.10.2022</a:t>
+              <a:t>3.10.2022</a:t>
             </a:fld>
             <a:endParaRPr lang="en-GB" dirty="0"/>
           </a:p>
@@ -6166,7 +6166,7 @@
           <a:p>
             <a:fld id="{45F98643-D206-614D-B596-3C8548138211}" type="datetime1">
               <a:rPr lang="fi-FI" smtClean="0"/>
-              <a:t>2.10.2022</a:t>
+              <a:t>3.10.2022</a:t>
             </a:fld>
             <a:endParaRPr lang="en-GB" dirty="0"/>
           </a:p>
@@ -6811,7 +6811,7 @@
           <a:p>
             <a:fld id="{30BF63A1-919F-FB49-ABA8-182126D24C50}" type="datetime1">
               <a:rPr lang="fi-FI" smtClean="0"/>
-              <a:t>2.10.2022</a:t>
+              <a:t>3.10.2022</a:t>
             </a:fld>
             <a:endParaRPr lang="en-GB" dirty="0"/>
           </a:p>
@@ -7182,7 +7182,7 @@
           <a:p>
             <a:fld id="{202E1EC2-47B8-044B-A09E-6A63B4D80C87}" type="datetime1">
               <a:rPr lang="fi-FI" smtClean="0"/>
-              <a:t>2.10.2022</a:t>
+              <a:t>3.10.2022</a:t>
             </a:fld>
             <a:endParaRPr lang="en-GB"/>
           </a:p>
@@ -7553,7 +7553,7 @@
           <a:p>
             <a:fld id="{202E1EC2-47B8-044B-A09E-6A63B4D80C87}" type="datetime1">
               <a:rPr lang="fi-FI" smtClean="0"/>
-              <a:t>2.10.2022</a:t>
+              <a:t>3.10.2022</a:t>
             </a:fld>
             <a:endParaRPr lang="en-GB"/>
           </a:p>
@@ -7963,7 +7963,7 @@
           <a:p>
             <a:fld id="{202E1EC2-47B8-044B-A09E-6A63B4D80C87}" type="datetime1">
               <a:rPr lang="fi-FI" smtClean="0"/>
-              <a:t>2.10.2022</a:t>
+              <a:t>3.10.2022</a:t>
             </a:fld>
             <a:endParaRPr lang="en-GB"/>
           </a:p>
@@ -8178,7 +8178,7 @@
           <a:p>
             <a:fld id="{202E1EC2-47B8-044B-A09E-6A63B4D80C87}" type="datetime1">
               <a:rPr lang="fi-FI" smtClean="0"/>
-              <a:t>2.10.2022</a:t>
+              <a:t>3.10.2022</a:t>
             </a:fld>
             <a:endParaRPr lang="en-GB"/>
           </a:p>
@@ -8470,7 +8470,7 @@
           <a:p>
             <a:fld id="{202E1EC2-47B8-044B-A09E-6A63B4D80C87}" type="datetime1">
               <a:rPr lang="fi-FI" smtClean="0"/>
-              <a:t>2.10.2022</a:t>
+              <a:t>3.10.2022</a:t>
             </a:fld>
             <a:endParaRPr lang="en-GB"/>
           </a:p>
@@ -8701,7 +8701,7 @@
           <a:p>
             <a:fld id="{202E1EC2-47B8-044B-A09E-6A63B4D80C87}" type="datetime1">
               <a:rPr lang="fi-FI" smtClean="0"/>
-              <a:t>2.10.2022</a:t>
+              <a:t>3.10.2022</a:t>
             </a:fld>
             <a:endParaRPr lang="en-GB"/>
           </a:p>
@@ -9041,7 +9041,7 @@
           <a:p>
             <a:fld id="{202E1EC2-47B8-044B-A09E-6A63B4D80C87}" type="datetime1">
               <a:rPr lang="fi-FI" smtClean="0"/>
-              <a:t>2.10.2022</a:t>
+              <a:t>3.10.2022</a:t>
             </a:fld>
             <a:endParaRPr lang="en-GB"/>
           </a:p>
@@ -9362,7 +9362,7 @@
           <a:p>
             <a:fld id="{202E1EC2-47B8-044B-A09E-6A63B4D80C87}" type="datetime1">
               <a:rPr lang="fi-FI" smtClean="0"/>
-              <a:t>2.10.2022</a:t>
+              <a:t>3.10.2022</a:t>
             </a:fld>
             <a:endParaRPr lang="en-GB"/>
           </a:p>
@@ -9730,7 +9730,7 @@
           <a:p>
             <a:fld id="{202E1EC2-47B8-044B-A09E-6A63B4D80C87}" type="datetime1">
               <a:rPr lang="fi-FI" smtClean="0"/>
-              <a:t>2.10.2022</a:t>
+              <a:t>3.10.2022</a:t>
             </a:fld>
             <a:endParaRPr lang="en-GB"/>
           </a:p>
@@ -9985,7 +9985,7 @@
           <a:p>
             <a:fld id="{202E1EC2-47B8-044B-A09E-6A63B4D80C87}" type="datetime1">
               <a:rPr lang="fi-FI" smtClean="0"/>
-              <a:t>2.10.2022</a:t>
+              <a:t>3.10.2022</a:t>
             </a:fld>
             <a:endParaRPr lang="en-GB"/>
           </a:p>
@@ -10206,7 +10206,7 @@
           <a:p>
             <a:fld id="{202E1EC2-47B8-044B-A09E-6A63B4D80C87}" type="datetime1">
               <a:rPr lang="fi-FI" smtClean="0"/>
-              <a:t>2.10.2022</a:t>
+              <a:t>3.10.2022</a:t>
             </a:fld>
             <a:endParaRPr lang="en-GB"/>
           </a:p>
@@ -10479,7 +10479,7 @@
           <a:p>
             <a:fld id="{202E1EC2-47B8-044B-A09E-6A63B4D80C87}" type="datetime1">
               <a:rPr lang="fi-FI" smtClean="0"/>
-              <a:t>2.10.2022</a:t>
+              <a:t>3.10.2022</a:t>
             </a:fld>
             <a:endParaRPr lang="en-GB"/>
           </a:p>
@@ -10792,7 +10792,7 @@
           <a:p>
             <a:fld id="{202E1EC2-47B8-044B-A09E-6A63B4D80C87}" type="datetime1">
               <a:rPr lang="fi-FI" smtClean="0"/>
-              <a:t>2.10.2022</a:t>
+              <a:t>3.10.2022</a:t>
             </a:fld>
             <a:endParaRPr lang="en-GB"/>
           </a:p>
@@ -10952,54 +10952,54 @@
           <a:p>
             <a:pPr lvl="0"/>
             <a:r>
-              <a:rPr lang="en-US" i="1" dirty="0"/>
+              <a:rPr lang="en-US" dirty="0"/>
               <a:t>Recap also the ES object destructor assignment if needed.</a:t>
             </a:r>
             <a:endParaRPr lang="fi-FI" dirty="0"/>
           </a:p>
           <a:p>
             <a:r>
-              <a:rPr lang="en-US" i="1" u="sng" dirty="0">
+              <a:rPr lang="en-US" u="sng" dirty="0">
                 <a:hlinkClick r:id="rId2"/>
               </a:rPr>
               <a:t>https://youtu.be/mxK8b99iJTg?t=150</a:t>
             </a:r>
             <a:r>
-              <a:rPr lang="en-US" i="1" dirty="0"/>
+              <a:rPr lang="en-US" dirty="0"/>
               <a:t> from 02:30 to 19:50, 18 mins </a:t>
             </a:r>
           </a:p>
           <a:p>
             <a:pPr lvl="1"/>
             <a:r>
-              <a:rPr lang="en-US" sz="1400" i="1" u="sng" dirty="0"/>
+              <a:rPr lang="en-US" sz="1400" u="sng" dirty="0"/>
               <a:t>(Skip</a:t>
             </a:r>
             <a:r>
-              <a:rPr lang="en-US" sz="1400" i="1" dirty="0"/>
+              <a:rPr lang="en-US" sz="1400" dirty="0"/>
               <a:t> pre-release react installation! no need for: "</a:t>
             </a:r>
             <a:r>
-              <a:rPr lang="en-US" sz="1400" i="1" dirty="0" err="1"/>
+              <a:rPr lang="en-US" sz="1400" dirty="0" err="1"/>
               <a:t>npm</a:t>
             </a:r>
             <a:r>
-              <a:rPr lang="en-US" sz="1400" i="1" dirty="0"/>
+              <a:rPr lang="en-US" sz="1400" dirty="0"/>
               <a:t> </a:t>
             </a:r>
             <a:r>
-              <a:rPr lang="en-US" sz="1400" i="1" dirty="0" err="1"/>
+              <a:rPr lang="en-US" sz="1400" dirty="0" err="1"/>
               <a:t>i</a:t>
             </a:r>
             <a:r>
-              <a:rPr lang="en-US" sz="1400" i="1" dirty="0"/>
+              <a:rPr lang="en-US" sz="1400" dirty="0"/>
               <a:t> ...“)</a:t>
             </a:r>
           </a:p>
           <a:p>
             <a:pPr lvl="1"/>
             <a:r>
-              <a:rPr lang="en-US" sz="1400" i="1" dirty="0"/>
+              <a:rPr lang="en-US" sz="1400" dirty="0"/>
               <a:t>(Here also anything with class/constructor you can just follow/skip, only fully understand the hooks version of the same.) </a:t>
             </a:r>
             <a:endParaRPr lang="fi-FI" sz="1400" dirty="0"/>
@@ -11007,7 +11007,7 @@
           <a:p>
             <a:pPr lvl="1"/>
             <a:r>
-              <a:rPr lang="en-US" i="1" dirty="0"/>
+              <a:rPr lang="en-US" dirty="0"/>
               <a:t>Simple output and input UI with react hooks. (No AJAX/persistence here) Pay attention to: </a:t>
             </a:r>
           </a:p>
@@ -11016,7 +11016,7 @@
               <a:buAutoNum type="arabicPeriod"/>
             </a:pPr>
             <a:r>
-              <a:rPr lang="en-US" i="1" dirty="0"/>
+              <a:rPr lang="en-US" dirty="0"/>
               <a:t>only arrow functions used!  </a:t>
             </a:r>
           </a:p>
@@ -11025,15 +11025,15 @@
               <a:buAutoNum type="arabicPeriod"/>
             </a:pPr>
             <a:r>
-              <a:rPr lang="en-US" i="1" dirty="0"/>
+              <a:rPr lang="en-US" dirty="0"/>
               <a:t>function definitions vs. </a:t>
             </a:r>
             <a:r>
-              <a:rPr lang="en-US" i="1" dirty="0" err="1"/>
+              <a:rPr lang="en-US" dirty="0" err="1"/>
               <a:t>func</a:t>
             </a:r>
             <a:r>
-              <a:rPr lang="en-US" i="1" dirty="0"/>
+              <a:rPr lang="en-US" dirty="0"/>
               <a:t> calls! (function definitions / ready function objects passed, not calls)</a:t>
             </a:r>
           </a:p>
@@ -11042,7 +11042,7 @@
               <a:buAutoNum type="arabicPeriod"/>
             </a:pPr>
             <a:r>
-              <a:rPr lang="en-US" i="1" dirty="0"/>
+              <a:rPr lang="en-US" dirty="0"/>
               <a:t>set state function is created automatically</a:t>
             </a:r>
           </a:p>
@@ -11051,7 +11051,7 @@
               <a:buAutoNum type="arabicPeriod"/>
             </a:pPr>
             <a:r>
-              <a:rPr lang="en-US" i="1" dirty="0"/>
+              <a:rPr lang="en-US" dirty="0"/>
               <a:t>React dev tools used to study component state</a:t>
             </a:r>
           </a:p>
@@ -11060,35 +11060,76 @@
               <a:buAutoNum type="arabicPeriod"/>
             </a:pPr>
             <a:r>
-              <a:rPr lang="en-US" i="1" dirty="0"/>
-              <a:t>Above also Mother passing to Children data and/or</a:t>
-            </a:r>
-            <a:r>
-              <a:rPr lang="en-US" dirty="0"/>
-              <a:t> </a:t>
-            </a:r>
-            <a:r>
-              <a:rPr lang="en-US" i="1" dirty="0"/>
-              <a:t>event-handler function objects, in </a:t>
-            </a:r>
-            <a:r>
-              <a:rPr lang="en-US" i="1" dirty="0" err="1"/>
+              <a:rPr lang="en-US" dirty="0"/>
+              <a:t>Above also Mother passing to Children data and/or event-handler function objects, in </a:t>
+            </a:r>
+            <a:r>
+              <a:rPr lang="en-US" dirty="0" err="1"/>
               <a:t>Childrens</a:t>
             </a:r>
             <a:r>
-              <a:rPr lang="en-US" i="1" dirty="0"/>
+              <a:rPr lang="en-US" dirty="0"/>
               <a:t>' props.</a:t>
             </a:r>
           </a:p>
           <a:p>
-            <a:r>
-              <a:rPr lang="en-US" i="1" u="sng" dirty="0">
+            <a:pPr marL="504000" lvl="1" indent="0">
+              <a:buNone/>
+            </a:pPr>
+            <a:r>
+              <a:rPr lang="en-US" dirty="0"/>
+              <a:t>(Of course we would </a:t>
+            </a:r>
+            <a:r>
+              <a:rPr lang="en-US" b="1" dirty="0"/>
+              <a:t>not</a:t>
+            </a:r>
+            <a:r>
+              <a:rPr lang="en-US" dirty="0"/>
+              <a:t> write </a:t>
+            </a:r>
+            <a:r>
+              <a:rPr lang="en-US" dirty="0" err="1"/>
+              <a:t>Todo</a:t>
+            </a:r>
+            <a:r>
+              <a:rPr lang="en-US" dirty="0"/>
+              <a:t>, </a:t>
+            </a:r>
+            <a:r>
+              <a:rPr lang="en-US" dirty="0" err="1"/>
+              <a:t>TodoForm</a:t>
+            </a:r>
+            <a:r>
+              <a:rPr lang="en-US" dirty="0"/>
+              <a:t> and App in the same file. This is a basic demo. Also ‘value’/’</a:t>
+            </a:r>
+            <a:r>
+              <a:rPr lang="en-US" dirty="0" err="1"/>
+              <a:t>setValue</a:t>
+            </a:r>
+            <a:r>
+              <a:rPr lang="en-US" dirty="0"/>
+              <a:t>’ could be called e.g. ‘task’ ‘</a:t>
+            </a:r>
+            <a:r>
+              <a:rPr lang="en-US" dirty="0" err="1"/>
+              <a:t>setTask</a:t>
+            </a:r>
+            <a:r>
+              <a:rPr lang="en-US" dirty="0"/>
+              <a:t>’. As you can have multiple states in a component, ‘value’ is too ambiguous name)</a:t>
+            </a:r>
+          </a:p>
+          <a:p>
+            <a:r>
+              <a:rPr lang="en-US" u="sng" dirty="0">
                 <a:hlinkClick r:id="rId3"/>
               </a:rPr>
               <a:t>https://reactjs.org/docs/hooks-intro.html</a:t>
             </a:r>
             <a:r>
-              <a:rPr lang="en-US" i="1" dirty="0"/>
+              <a:rPr lang="en-US" dirty="0"/>
               <a:t> Tutorial text and examples of the same  </a:t>
             </a:r>
             <a:endParaRPr lang="fi-FI" dirty="0"/>
@@ -11121,7 +11162,7 @@
           <a:p>
             <a:fld id="{202E1EC2-47B8-044B-A09E-6A63B4D80C87}" type="datetime1">
               <a:rPr lang="fi-FI" smtClean="0"/>
-              <a:t>2.10.2022</a:t>
+              <a:t>3.10.2022</a:t>
             </a:fld>
             <a:endParaRPr lang="en-GB" dirty="0"/>
           </a:p>
@@ -11377,7 +11418,7 @@
           <a:p>
             <a:fld id="{202E1EC2-47B8-044B-A09E-6A63B4D80C87}" type="datetime1">
               <a:rPr lang="fi-FI" smtClean="0"/>
-              <a:t>2.10.2022</a:t>
+              <a:t>3.10.2022</a:t>
             </a:fld>
             <a:endParaRPr lang="en-GB"/>
           </a:p>
@@ -12537,7 +12578,7 @@
           <a:p>
             <a:fld id="{202E1EC2-47B8-044B-A09E-6A63B4D80C87}" type="datetime1">
               <a:rPr lang="fi-FI" smtClean="0"/>
-              <a:t>2.10.2022</a:t>
+              <a:t>3.10.2022</a:t>
             </a:fld>
             <a:endParaRPr lang="en-GB"/>
           </a:p>
@@ -12824,7 +12865,7 @@
           <a:p>
             <a:fld id="{202E1EC2-47B8-044B-A09E-6A63B4D80C87}" type="datetime1">
               <a:rPr lang="fi-FI" smtClean="0"/>
-              <a:t>2.10.2022</a:t>
+              <a:t>3.10.2022</a:t>
             </a:fld>
             <a:endParaRPr lang="en-GB"/>
           </a:p>
@@ -13157,7 +13198,7 @@
           <a:p>
             <a:fld id="{202E1EC2-47B8-044B-A09E-6A63B4D80C87}" type="datetime1">
               <a:rPr lang="fi-FI" smtClean="0"/>
-              <a:t>2.10.2022</a:t>
+              <a:t>3.10.2022</a:t>
             </a:fld>
             <a:endParaRPr lang="en-GB"/>
           </a:p>
@@ -13417,7 +13458,7 @@
           <a:p>
             <a:fld id="{202E1EC2-47B8-044B-A09E-6A63B4D80C87}" type="datetime1">
               <a:rPr lang="fi-FI" smtClean="0"/>
-              <a:t>2.10.2022</a:t>
+              <a:t>3.10.2022</a:t>
             </a:fld>
             <a:endParaRPr lang="en-GB"/>
           </a:p>
@@ -14047,12 +14088,12 @@
 </file>
 
 <file path=customXml/item1.xml><?xml version="1.0" encoding="utf-8"?>
-<p:properties xmlns:p="http://schemas.microsoft.com/office/2006/metadata/properties" xmlns:xsi="http://www.w3.org/2001/XMLSchema-instance" xmlns:pc="http://schemas.microsoft.com/office/infopath/2007/PartnerControls">
-  <documentManagement>
-    <PublishingExpirationDate xmlns="http://schemas.microsoft.com/sharepoint/v3" xsi:nil="true"/>
-    <PublishingStartDate xmlns="http://schemas.microsoft.com/sharepoint/v3" xsi:nil="true"/>
-  </documentManagement>
-</p:properties>
+<?mso-contentType ?>
+<FormTemplates xmlns="http://schemas.microsoft.com/sharepoint/v3/contenttype/forms">
+  <Display>DocumentLibraryForm</Display>
+  <Edit>DocumentLibraryForm</Edit>
+  <New>DocumentLibraryForm</New>
+</FormTemplates>
 </file>
 
 <file path=customXml/item2.xml><?xml version="1.0" encoding="utf-8"?>
@@ -14188,26 +14229,18 @@
 </file>
 
 <file path=customXml/item3.xml><?xml version="1.0" encoding="utf-8"?>
-<?mso-contentType ?>
-<FormTemplates xmlns="http://schemas.microsoft.com/sharepoint/v3/contenttype/forms">
-  <Display>DocumentLibraryForm</Display>
-  <Edit>DocumentLibraryForm</Edit>
-  <New>DocumentLibraryForm</New>
-</FormTemplates>
+<p:properties xmlns:p="http://schemas.microsoft.com/office/2006/metadata/properties" xmlns:xsi="http://www.w3.org/2001/XMLSchema-instance" xmlns:pc="http://schemas.microsoft.com/office/infopath/2007/PartnerControls">
+  <documentManagement>
+    <PublishingExpirationDate xmlns="http://schemas.microsoft.com/sharepoint/v3" xsi:nil="true"/>
+    <PublishingStartDate xmlns="http://schemas.microsoft.com/sharepoint/v3" xsi:nil="true"/>
+  </documentManagement>
+</p:properties>
 </file>
 
 <file path=customXml/itemProps1.xml><?xml version="1.0" encoding="utf-8"?>
-<ds:datastoreItem xmlns:ds="http://schemas.openxmlformats.org/officeDocument/2006/customXml" ds:itemID="{DED4E12E-7268-4B03-A47B-0755D62B5E31}">
+<ds:datastoreItem xmlns:ds="http://schemas.openxmlformats.org/officeDocument/2006/customXml" ds:itemID="{D546C03B-CD3A-4EA0-AAA4-0E00E896454E}">
   <ds:schemaRefs>
-    <ds:schemaRef ds:uri="http://purl.org/dc/terms/"/>
-    <ds:schemaRef ds:uri="http://schemas.microsoft.com/office/2006/documentManagement/types"/>
-    <ds:schemaRef ds:uri="http://schemas.microsoft.com/sharepoint/v3"/>
-    <ds:schemaRef ds:uri="http://schemas.microsoft.com/office/infopath/2007/PartnerControls"/>
-    <ds:schemaRef ds:uri="http://schemas.openxmlformats.org/package/2006/metadata/core-properties"/>
-    <ds:schemaRef ds:uri="http://schemas.microsoft.com/office/2006/metadata/properties"/>
-    <ds:schemaRef ds:uri="http://www.w3.org/XML/1998/namespace"/>
-    <ds:schemaRef ds:uri="http://purl.org/dc/dcmitype/"/>
-    <ds:schemaRef ds:uri="http://purl.org/dc/elements/1.1/"/>
+    <ds:schemaRef ds:uri="http://schemas.microsoft.com/sharepoint/v3/contenttype/forms"/>
   </ds:schemaRefs>
 </ds:datastoreItem>
 </file>
@@ -14231,9 +14264,17 @@
 </file>
 
 <file path=customXml/itemProps3.xml><?xml version="1.0" encoding="utf-8"?>
-<ds:datastoreItem xmlns:ds="http://schemas.openxmlformats.org/officeDocument/2006/customXml" ds:itemID="{D546C03B-CD3A-4EA0-AAA4-0E00E896454E}">
+<ds:datastoreItem xmlns:ds="http://schemas.openxmlformats.org/officeDocument/2006/customXml" ds:itemID="{DED4E12E-7268-4B03-A47B-0755D62B5E31}">
   <ds:schemaRefs>
-    <ds:schemaRef ds:uri="http://schemas.microsoft.com/sharepoint/v3/contenttype/forms"/>
+    <ds:schemaRef ds:uri="http://purl.org/dc/terms/"/>
+    <ds:schemaRef ds:uri="http://schemas.microsoft.com/office/2006/documentManagement/types"/>
+    <ds:schemaRef ds:uri="http://schemas.microsoft.com/sharepoint/v3"/>
+    <ds:schemaRef ds:uri="http://schemas.microsoft.com/office/infopath/2007/PartnerControls"/>
+    <ds:schemaRef ds:uri="http://schemas.openxmlformats.org/package/2006/metadata/core-properties"/>
+    <ds:schemaRef ds:uri="http://schemas.microsoft.com/office/2006/metadata/properties"/>
+    <ds:schemaRef ds:uri="http://www.w3.org/XML/1998/namespace"/>
+    <ds:schemaRef ds:uri="http://purl.org/dc/dcmitype/"/>
+    <ds:schemaRef ds:uri="http://purl.org/dc/elements/1.1/"/>
   </ds:schemaRefs>
 </ds:datastoreItem>
 </file>
</xml_diff>

<commit_message>
Still formatting nicer for readers
</commit_message>
<xml_diff>
--- a/FrontendStuff_ForExam.pptx
+++ b/FrontendStuff_ForExam.pptx
@@ -1210,7 +1210,7 @@
           <a:p>
             <a:fld id="{5645C365-1C26-6946-87AF-75D6A7DF4277}" type="datetimeFigureOut">
               <a:rPr lang="en-GB" smtClean="0"/>
-              <a:t>03/10/2022</a:t>
+              <a:t>12/10/2022</a:t>
             </a:fld>
             <a:endParaRPr lang="en-GB"/>
           </a:p>
@@ -1709,7 +1709,7 @@
           <a:p>
             <a:fld id="{35B864B8-8D08-7B43-B4FB-B2FB41A5D9E3}" type="datetime1">
               <a:rPr lang="fi-FI" smtClean="0"/>
-              <a:t>3.10.2022</a:t>
+              <a:t>12.10.2022</a:t>
             </a:fld>
             <a:endParaRPr lang="en-GB" dirty="0"/>
           </a:p>
@@ -2036,7 +2036,7 @@
           <a:p>
             <a:fld id="{D5AEA85A-FC56-D34C-9AA6-ECC3D2586F37}" type="datetime1">
               <a:rPr lang="fi-FI" smtClean="0"/>
-              <a:t>3.10.2022</a:t>
+              <a:t>12.10.2022</a:t>
             </a:fld>
             <a:endParaRPr lang="en-GB" dirty="0"/>
           </a:p>
@@ -2246,7 +2246,7 @@
           <a:p>
             <a:fld id="{E6BC6EEF-E660-7844-8930-418AFF95EA40}" type="datetime1">
               <a:rPr lang="fi-FI" smtClean="0"/>
-              <a:t>3.10.2022</a:t>
+              <a:t>12.10.2022</a:t>
             </a:fld>
             <a:endParaRPr lang="en-GB" dirty="0"/>
           </a:p>
@@ -2555,7 +2555,7 @@
           <a:p>
             <a:fld id="{4E10C7EC-C1C1-9849-A573-7692478FCD52}" type="datetime1">
               <a:rPr lang="fi-FI" smtClean="0"/>
-              <a:t>3.10.2022</a:t>
+              <a:t>12.10.2022</a:t>
             </a:fld>
             <a:endParaRPr lang="en-GB" dirty="0"/>
           </a:p>
@@ -2828,7 +2828,7 @@
           <a:p>
             <a:fld id="{844FF3FE-30BE-2040-9151-6FBC4992BF4F}" type="datetime1">
               <a:rPr lang="fi-FI" smtClean="0"/>
-              <a:t>3.10.2022</a:t>
+              <a:t>12.10.2022</a:t>
             </a:fld>
             <a:endParaRPr lang="en-GB" dirty="0"/>
           </a:p>
@@ -3068,7 +3068,7 @@
           <a:p>
             <a:fld id="{11EDCD7B-6966-E249-89F2-D46BDFBF56BE}" type="datetime1">
               <a:rPr lang="fi-FI" smtClean="0"/>
-              <a:t>3.10.2022</a:t>
+              <a:t>12.10.2022</a:t>
             </a:fld>
             <a:endParaRPr lang="en-GB" dirty="0"/>
           </a:p>
@@ -3361,7 +3361,7 @@
           <a:p>
             <a:fld id="{11EDCD7B-6966-E249-89F2-D46BDFBF56BE}" type="datetime1">
               <a:rPr lang="fi-FI" smtClean="0"/>
-              <a:t>3.10.2022</a:t>
+              <a:t>12.10.2022</a:t>
             </a:fld>
             <a:endParaRPr lang="en-GB" dirty="0"/>
           </a:p>
@@ -3800,7 +3800,7 @@
           <a:p>
             <a:fld id="{844FF3FE-30BE-2040-9151-6FBC4992BF4F}" type="datetime1">
               <a:rPr lang="fi-FI" smtClean="0"/>
-              <a:t>3.10.2022</a:t>
+              <a:t>12.10.2022</a:t>
             </a:fld>
             <a:endParaRPr lang="en-GB" dirty="0"/>
           </a:p>
@@ -4028,7 +4028,7 @@
           <a:p>
             <a:fld id="{11EDCD7B-6966-E249-89F2-D46BDFBF56BE}" type="datetime1">
               <a:rPr lang="fi-FI" smtClean="0"/>
-              <a:t>3.10.2022</a:t>
+              <a:t>12.10.2022</a:t>
             </a:fld>
             <a:endParaRPr lang="en-GB" dirty="0"/>
           </a:p>
@@ -4443,7 +4443,7 @@
           <a:p>
             <a:fld id="{B62E192A-D52B-F541-B2AA-4AEB9388F1F7}" type="datetime1">
               <a:rPr lang="fi-FI" smtClean="0"/>
-              <a:t>3.10.2022</a:t>
+              <a:t>12.10.2022</a:t>
             </a:fld>
             <a:endParaRPr lang="en-GB" dirty="0"/>
           </a:p>
@@ -4743,7 +4743,7 @@
           <a:p>
             <a:fld id="{EEA4FAA2-2B3E-264C-A42F-2D6D3EF33A3C}" type="datetime1">
               <a:rPr lang="fi-FI" smtClean="0"/>
-              <a:t>3.10.2022</a:t>
+              <a:t>12.10.2022</a:t>
             </a:fld>
             <a:endParaRPr lang="en-GB" dirty="0"/>
           </a:p>
@@ -5646,7 +5646,7 @@
           <a:p>
             <a:fld id="{B3114A65-8017-1743-A85A-B2A4BB835AE9}" type="datetime1">
               <a:rPr lang="fi-FI" smtClean="0"/>
-              <a:t>3.10.2022</a:t>
+              <a:t>12.10.2022</a:t>
             </a:fld>
             <a:endParaRPr lang="en-GB" dirty="0"/>
           </a:p>
@@ -5874,7 +5874,7 @@
           <a:p>
             <a:fld id="{11EDCD7B-6966-E249-89F2-D46BDFBF56BE}" type="datetime1">
               <a:rPr lang="fi-FI" smtClean="0"/>
-              <a:t>3.10.2022</a:t>
+              <a:t>12.10.2022</a:t>
             </a:fld>
             <a:endParaRPr lang="en-GB" dirty="0"/>
           </a:p>
@@ -6166,7 +6166,7 @@
           <a:p>
             <a:fld id="{45F98643-D206-614D-B596-3C8548138211}" type="datetime1">
               <a:rPr lang="fi-FI" smtClean="0"/>
-              <a:t>3.10.2022</a:t>
+              <a:t>12.10.2022</a:t>
             </a:fld>
             <a:endParaRPr lang="en-GB" dirty="0"/>
           </a:p>
@@ -6811,7 +6811,7 @@
           <a:p>
             <a:fld id="{30BF63A1-919F-FB49-ABA8-182126D24C50}" type="datetime1">
               <a:rPr lang="fi-FI" smtClean="0"/>
-              <a:t>3.10.2022</a:t>
+              <a:t>12.10.2022</a:t>
             </a:fld>
             <a:endParaRPr lang="en-GB" dirty="0"/>
           </a:p>
@@ -7182,7 +7182,7 @@
           <a:p>
             <a:fld id="{202E1EC2-47B8-044B-A09E-6A63B4D80C87}" type="datetime1">
               <a:rPr lang="fi-FI" smtClean="0"/>
-              <a:t>3.10.2022</a:t>
+              <a:t>12.10.2022</a:t>
             </a:fld>
             <a:endParaRPr lang="en-GB"/>
           </a:p>
@@ -7553,7 +7553,7 @@
           <a:p>
             <a:fld id="{202E1EC2-47B8-044B-A09E-6A63B4D80C87}" type="datetime1">
               <a:rPr lang="fi-FI" smtClean="0"/>
-              <a:t>3.10.2022</a:t>
+              <a:t>12.10.2022</a:t>
             </a:fld>
             <a:endParaRPr lang="en-GB"/>
           </a:p>
@@ -7666,10 +7666,24 @@
           <a:p>
             <a:pPr lvl="0"/>
             <a:r>
-              <a:rPr lang="en-US" i="1" dirty="0"/>
+              <a:rPr lang="en-US" i="1" dirty="0">
+                <a:solidFill>
+                  <a:schemeClr val="accent1">
+                    <a:lumMod val="20000"/>
+                    <a:lumOff val="80000"/>
+                  </a:schemeClr>
+                </a:solidFill>
+              </a:rPr>
               <a:t>Context Hook</a:t>
             </a:r>
-            <a:endParaRPr lang="fi-FI" dirty="0"/>
+            <a:endParaRPr lang="fi-FI" dirty="0">
+              <a:solidFill>
+                <a:schemeClr val="accent1">
+                  <a:lumMod val="20000"/>
+                  <a:lumOff val="80000"/>
+                </a:schemeClr>
+              </a:solidFill>
+            </a:endParaRPr>
           </a:p>
         </p:txBody>
       </p:sp>
@@ -7963,7 +7977,7 @@
           <a:p>
             <a:fld id="{202E1EC2-47B8-044B-A09E-6A63B4D80C87}" type="datetime1">
               <a:rPr lang="fi-FI" smtClean="0"/>
-              <a:t>3.10.2022</a:t>
+              <a:t>12.10.2022</a:t>
             </a:fld>
             <a:endParaRPr lang="en-GB"/>
           </a:p>
@@ -8076,10 +8090,24 @@
           <a:p>
             <a:pPr lvl="0"/>
             <a:r>
-              <a:rPr lang="en-US" i="1" dirty="0"/>
+              <a:rPr lang="en-US" i="1" dirty="0">
+                <a:solidFill>
+                  <a:schemeClr val="accent1">
+                    <a:lumMod val="20000"/>
+                    <a:lumOff val="80000"/>
+                  </a:schemeClr>
+                </a:solidFill>
+              </a:rPr>
               <a:t>Custom Hooks (a bit Advanced topic)</a:t>
             </a:r>
-            <a:endParaRPr lang="fi-FI" dirty="0"/>
+            <a:endParaRPr lang="fi-FI" dirty="0">
+              <a:solidFill>
+                <a:schemeClr val="accent1">
+                  <a:lumMod val="20000"/>
+                  <a:lumOff val="80000"/>
+                </a:schemeClr>
+              </a:solidFill>
+            </a:endParaRPr>
           </a:p>
         </p:txBody>
       </p:sp>
@@ -8178,7 +8206,7 @@
           <a:p>
             <a:fld id="{202E1EC2-47B8-044B-A09E-6A63B4D80C87}" type="datetime1">
               <a:rPr lang="fi-FI" smtClean="0"/>
-              <a:t>3.10.2022</a:t>
+              <a:t>12.10.2022</a:t>
             </a:fld>
             <a:endParaRPr lang="en-GB"/>
           </a:p>
@@ -8470,7 +8498,7 @@
           <a:p>
             <a:fld id="{202E1EC2-47B8-044B-A09E-6A63B4D80C87}" type="datetime1">
               <a:rPr lang="fi-FI" smtClean="0"/>
-              <a:t>3.10.2022</a:t>
+              <a:t>12.10.2022</a:t>
             </a:fld>
             <a:endParaRPr lang="en-GB"/>
           </a:p>
@@ -8701,7 +8729,7 @@
           <a:p>
             <a:fld id="{202E1EC2-47B8-044B-A09E-6A63B4D80C87}" type="datetime1">
               <a:rPr lang="fi-FI" smtClean="0"/>
-              <a:t>3.10.2022</a:t>
+              <a:t>12.10.2022</a:t>
             </a:fld>
             <a:endParaRPr lang="en-GB"/>
           </a:p>
@@ -9041,7 +9069,7 @@
           <a:p>
             <a:fld id="{202E1EC2-47B8-044B-A09E-6A63B4D80C87}" type="datetime1">
               <a:rPr lang="fi-FI" smtClean="0"/>
-              <a:t>3.10.2022</a:t>
+              <a:t>12.10.2022</a:t>
             </a:fld>
             <a:endParaRPr lang="en-GB"/>
           </a:p>
@@ -9362,7 +9390,7 @@
           <a:p>
             <a:fld id="{202E1EC2-47B8-044B-A09E-6A63B4D80C87}" type="datetime1">
               <a:rPr lang="fi-FI" smtClean="0"/>
-              <a:t>3.10.2022</a:t>
+              <a:t>12.10.2022</a:t>
             </a:fld>
             <a:endParaRPr lang="en-GB"/>
           </a:p>
@@ -9468,40 +9496,45 @@
             <p:ph type="title"/>
           </p:nvPr>
         </p:nvSpPr>
-        <p:spPr/>
-        <p:txBody>
-          <a:bodyPr/>
-          <a:lstStyle/>
-          <a:p>
-            <a:pPr lvl="0"/>
-            <a:r>
-              <a:rPr lang="en-US" dirty="0"/>
-              <a:t>Frontend architecture principles</a:t>
-            </a:r>
-            <a:endParaRPr lang="fi-FI" dirty="0"/>
-          </a:p>
-        </p:txBody>
-      </p:sp>
-      <p:sp>
-        <p:nvSpPr>
-          <p:cNvPr id="9" name="Content Placeholder 8">
-            <a:extLst>
-              <a:ext uri="{FF2B5EF4-FFF2-40B4-BE49-F238E27FC236}">
-                <a16:creationId xmlns:a16="http://schemas.microsoft.com/office/drawing/2014/main" id="{ACDE61D8-A75A-F94B-B57A-46F276C03311}"/>
-              </a:ext>
-            </a:extLst>
-          </p:cNvPr>
-          <p:cNvSpPr>
-            <a:spLocks noGrp="1"/>
-          </p:cNvSpPr>
-          <p:nvPr>
-            <p:ph sz="half" idx="2"/>
-          </p:nvPr>
-        </p:nvSpPr>
         <p:spPr>
           <a:xfrm>
-            <a:off x="192299" y="1016437"/>
-            <a:ext cx="11883275" cy="4897002"/>
+            <a:off x="1066800" y="233495"/>
+            <a:ext cx="11125200" cy="1223963"/>
+          </a:xfrm>
+        </p:spPr>
+        <p:txBody>
+          <a:bodyPr/>
+          <a:lstStyle/>
+          <a:p>
+            <a:pPr lvl="0"/>
+            <a:r>
+              <a:rPr lang="en-US" dirty="0"/>
+              <a:t>Frontend architecture principles</a:t>
+            </a:r>
+            <a:endParaRPr lang="fi-FI" dirty="0"/>
+          </a:p>
+        </p:txBody>
+      </p:sp>
+      <p:sp>
+        <p:nvSpPr>
+          <p:cNvPr id="9" name="Content Placeholder 8">
+            <a:extLst>
+              <a:ext uri="{FF2B5EF4-FFF2-40B4-BE49-F238E27FC236}">
+                <a16:creationId xmlns:a16="http://schemas.microsoft.com/office/drawing/2014/main" id="{ACDE61D8-A75A-F94B-B57A-46F276C03311}"/>
+              </a:ext>
+            </a:extLst>
+          </p:cNvPr>
+          <p:cNvSpPr>
+            <a:spLocks noGrp="1"/>
+          </p:cNvSpPr>
+          <p:nvPr>
+            <p:ph sz="half" idx="2"/>
+          </p:nvPr>
+        </p:nvSpPr>
+        <p:spPr>
+          <a:xfrm>
+            <a:off x="426756" y="980499"/>
+            <a:ext cx="11336337" cy="4897002"/>
           </a:xfrm>
         </p:spPr>
         <p:txBody>
@@ -9572,11 +9605,7 @@
             </a:pPr>
             <a:r>
               <a:rPr lang="en-US" dirty="0"/>
-              <a:t>Each thing of different nature should be in separate location. Like routing in one folder, all ajax actions </a:t>
-            </a:r>
-            <a:r>
-              <a:rPr lang="en-US"/>
-              <a:t>in another.</a:t>
+              <a:t>Each thing of different nature should be in separate location. Like routing in one folder, all ajax actions in another.</a:t>
             </a:r>
           </a:p>
           <a:p>
@@ -9730,7 +9759,7 @@
           <a:p>
             <a:fld id="{202E1EC2-47B8-044B-A09E-6A63B4D80C87}" type="datetime1">
               <a:rPr lang="fi-FI" smtClean="0"/>
-              <a:t>3.10.2022</a:t>
+              <a:t>12.10.2022</a:t>
             </a:fld>
             <a:endParaRPr lang="en-GB"/>
           </a:p>
@@ -9985,7 +10014,7 @@
           <a:p>
             <a:fld id="{202E1EC2-47B8-044B-A09E-6A63B4D80C87}" type="datetime1">
               <a:rPr lang="fi-FI" smtClean="0"/>
-              <a:t>3.10.2022</a:t>
+              <a:t>12.10.2022</a:t>
             </a:fld>
             <a:endParaRPr lang="en-GB"/>
           </a:p>
@@ -10206,7 +10235,7 @@
           <a:p>
             <a:fld id="{202E1EC2-47B8-044B-A09E-6A63B4D80C87}" type="datetime1">
               <a:rPr lang="fi-FI" smtClean="0"/>
-              <a:t>3.10.2022</a:t>
+              <a:t>12.10.2022</a:t>
             </a:fld>
             <a:endParaRPr lang="en-GB"/>
           </a:p>
@@ -10320,7 +10349,7 @@
             <a:pPr lvl="0"/>
             <a:r>
               <a:rPr lang="en-US" dirty="0"/>
-              <a:t>Other topics for the exam</a:t>
+              <a:t>Other topics for the exam ? (Mainly extras)</a:t>
             </a:r>
             <a:endParaRPr lang="fi-FI" dirty="0"/>
           </a:p>
@@ -10479,7 +10508,7 @@
           <a:p>
             <a:fld id="{202E1EC2-47B8-044B-A09E-6A63B4D80C87}" type="datetime1">
               <a:rPr lang="fi-FI" smtClean="0"/>
-              <a:t>3.10.2022</a:t>
+              <a:t>12.10.2022</a:t>
             </a:fld>
             <a:endParaRPr lang="en-GB"/>
           </a:p>
@@ -10792,7 +10821,7 @@
           <a:p>
             <a:fld id="{202E1EC2-47B8-044B-A09E-6A63B4D80C87}" type="datetime1">
               <a:rPr lang="fi-FI" smtClean="0"/>
-              <a:t>3.10.2022</a:t>
+              <a:t>12.10.2022</a:t>
             </a:fld>
             <a:endParaRPr lang="en-GB"/>
           </a:p>
@@ -11162,7 +11191,7 @@
           <a:p>
             <a:fld id="{202E1EC2-47B8-044B-A09E-6A63B4D80C87}" type="datetime1">
               <a:rPr lang="fi-FI" smtClean="0"/>
-              <a:t>3.10.2022</a:t>
+              <a:t>12.10.2022</a:t>
             </a:fld>
             <a:endParaRPr lang="en-GB" dirty="0"/>
           </a:p>
@@ -11418,7 +11447,7 @@
           <a:p>
             <a:fld id="{202E1EC2-47B8-044B-A09E-6A63B4D80C87}" type="datetime1">
               <a:rPr lang="fi-FI" smtClean="0"/>
-              <a:t>3.10.2022</a:t>
+              <a:t>12.10.2022</a:t>
             </a:fld>
             <a:endParaRPr lang="en-GB"/>
           </a:p>
@@ -12578,7 +12607,7 @@
           <a:p>
             <a:fld id="{202E1EC2-47B8-044B-A09E-6A63B4D80C87}" type="datetime1">
               <a:rPr lang="fi-FI" smtClean="0"/>
-              <a:t>3.10.2022</a:t>
+              <a:t>12.10.2022</a:t>
             </a:fld>
             <a:endParaRPr lang="en-GB"/>
           </a:p>
@@ -12865,7 +12894,7 @@
           <a:p>
             <a:fld id="{202E1EC2-47B8-044B-A09E-6A63B4D80C87}" type="datetime1">
               <a:rPr lang="fi-FI" smtClean="0"/>
-              <a:t>3.10.2022</a:t>
+              <a:t>12.10.2022</a:t>
             </a:fld>
             <a:endParaRPr lang="en-GB"/>
           </a:p>
@@ -13198,7 +13227,7 @@
           <a:p>
             <a:fld id="{202E1EC2-47B8-044B-A09E-6A63B4D80C87}" type="datetime1">
               <a:rPr lang="fi-FI" smtClean="0"/>
-              <a:t>3.10.2022</a:t>
+              <a:t>12.10.2022</a:t>
             </a:fld>
             <a:endParaRPr lang="en-GB"/>
           </a:p>
@@ -13458,7 +13487,7 @@
           <a:p>
             <a:fld id="{202E1EC2-47B8-044B-A09E-6A63B4D80C87}" type="datetime1">
               <a:rPr lang="fi-FI" smtClean="0"/>
-              <a:t>3.10.2022</a:t>
+              <a:t>12.10.2022</a:t>
             </a:fld>
             <a:endParaRPr lang="en-GB"/>
           </a:p>
@@ -14088,12 +14117,12 @@
 </file>
 
 <file path=customXml/item1.xml><?xml version="1.0" encoding="utf-8"?>
-<?mso-contentType ?>
-<FormTemplates xmlns="http://schemas.microsoft.com/sharepoint/v3/contenttype/forms">
-  <Display>DocumentLibraryForm</Display>
-  <Edit>DocumentLibraryForm</Edit>
-  <New>DocumentLibraryForm</New>
-</FormTemplates>
+<p:properties xmlns:p="http://schemas.microsoft.com/office/2006/metadata/properties" xmlns:xsi="http://www.w3.org/2001/XMLSchema-instance" xmlns:pc="http://schemas.microsoft.com/office/infopath/2007/PartnerControls">
+  <documentManagement>
+    <PublishingExpirationDate xmlns="http://schemas.microsoft.com/sharepoint/v3" xsi:nil="true"/>
+    <PublishingStartDate xmlns="http://schemas.microsoft.com/sharepoint/v3" xsi:nil="true"/>
+  </documentManagement>
+</p:properties>
 </file>
 
 <file path=customXml/item2.xml><?xml version="1.0" encoding="utf-8"?>
@@ -14229,18 +14258,26 @@
 </file>
 
 <file path=customXml/item3.xml><?xml version="1.0" encoding="utf-8"?>
-<p:properties xmlns:p="http://schemas.microsoft.com/office/2006/metadata/properties" xmlns:xsi="http://www.w3.org/2001/XMLSchema-instance" xmlns:pc="http://schemas.microsoft.com/office/infopath/2007/PartnerControls">
-  <documentManagement>
-    <PublishingExpirationDate xmlns="http://schemas.microsoft.com/sharepoint/v3" xsi:nil="true"/>
-    <PublishingStartDate xmlns="http://schemas.microsoft.com/sharepoint/v3" xsi:nil="true"/>
-  </documentManagement>
-</p:properties>
+<?mso-contentType ?>
+<FormTemplates xmlns="http://schemas.microsoft.com/sharepoint/v3/contenttype/forms">
+  <Display>DocumentLibraryForm</Display>
+  <Edit>DocumentLibraryForm</Edit>
+  <New>DocumentLibraryForm</New>
+</FormTemplates>
 </file>
 
 <file path=customXml/itemProps1.xml><?xml version="1.0" encoding="utf-8"?>
-<ds:datastoreItem xmlns:ds="http://schemas.openxmlformats.org/officeDocument/2006/customXml" ds:itemID="{D546C03B-CD3A-4EA0-AAA4-0E00E896454E}">
+<ds:datastoreItem xmlns:ds="http://schemas.openxmlformats.org/officeDocument/2006/customXml" ds:itemID="{DED4E12E-7268-4B03-A47B-0755D62B5E31}">
   <ds:schemaRefs>
-    <ds:schemaRef ds:uri="http://schemas.microsoft.com/sharepoint/v3/contenttype/forms"/>
+    <ds:schemaRef ds:uri="http://purl.org/dc/terms/"/>
+    <ds:schemaRef ds:uri="http://schemas.microsoft.com/office/2006/documentManagement/types"/>
+    <ds:schemaRef ds:uri="http://schemas.microsoft.com/sharepoint/v3"/>
+    <ds:schemaRef ds:uri="http://schemas.microsoft.com/office/infopath/2007/PartnerControls"/>
+    <ds:schemaRef ds:uri="http://schemas.openxmlformats.org/package/2006/metadata/core-properties"/>
+    <ds:schemaRef ds:uri="http://schemas.microsoft.com/office/2006/metadata/properties"/>
+    <ds:schemaRef ds:uri="http://www.w3.org/XML/1998/namespace"/>
+    <ds:schemaRef ds:uri="http://purl.org/dc/dcmitype/"/>
+    <ds:schemaRef ds:uri="http://purl.org/dc/elements/1.1/"/>
   </ds:schemaRefs>
 </ds:datastoreItem>
 </file>
@@ -14264,17 +14301,9 @@
 </file>
 
 <file path=customXml/itemProps3.xml><?xml version="1.0" encoding="utf-8"?>
-<ds:datastoreItem xmlns:ds="http://schemas.openxmlformats.org/officeDocument/2006/customXml" ds:itemID="{DED4E12E-7268-4B03-A47B-0755D62B5E31}">
+<ds:datastoreItem xmlns:ds="http://schemas.openxmlformats.org/officeDocument/2006/customXml" ds:itemID="{D546C03B-CD3A-4EA0-AAA4-0E00E896454E}">
   <ds:schemaRefs>
-    <ds:schemaRef ds:uri="http://purl.org/dc/terms/"/>
-    <ds:schemaRef ds:uri="http://schemas.microsoft.com/office/2006/documentManagement/types"/>
-    <ds:schemaRef ds:uri="http://schemas.microsoft.com/sharepoint/v3"/>
-    <ds:schemaRef ds:uri="http://schemas.microsoft.com/office/infopath/2007/PartnerControls"/>
-    <ds:schemaRef ds:uri="http://schemas.openxmlformats.org/package/2006/metadata/core-properties"/>
-    <ds:schemaRef ds:uri="http://schemas.microsoft.com/office/2006/metadata/properties"/>
-    <ds:schemaRef ds:uri="http://www.w3.org/XML/1998/namespace"/>
-    <ds:schemaRef ds:uri="http://purl.org/dc/dcmitype/"/>
-    <ds:schemaRef ds:uri="http://purl.org/dc/elements/1.1/"/>
+    <ds:schemaRef ds:uri="http://schemas.microsoft.com/sharepoint/v3/contenttype/forms"/>
   </ds:schemaRefs>
 </ds:datastoreItem>
 </file>
</xml_diff>

<commit_message>
Updates to Frontend ppt
</commit_message>
<xml_diff>
--- a/FrontendStuff_ForExam.pptx
+++ b/FrontendStuff_ForExam.pptx
@@ -1210,7 +1210,7 @@
           <a:p>
             <a:fld id="{5645C365-1C26-6946-87AF-75D6A7DF4277}" type="datetimeFigureOut">
               <a:rPr lang="en-GB" smtClean="0"/>
-              <a:t>12/10/2022</a:t>
+              <a:t>16/02/2023</a:t>
             </a:fld>
             <a:endParaRPr lang="en-GB"/>
           </a:p>
@@ -1709,7 +1709,7 @@
           <a:p>
             <a:fld id="{35B864B8-8D08-7B43-B4FB-B2FB41A5D9E3}" type="datetime1">
               <a:rPr lang="fi-FI" smtClean="0"/>
-              <a:t>12.10.2022</a:t>
+              <a:t>16.2.2023</a:t>
             </a:fld>
             <a:endParaRPr lang="en-GB" dirty="0"/>
           </a:p>
@@ -2036,7 +2036,7 @@
           <a:p>
             <a:fld id="{D5AEA85A-FC56-D34C-9AA6-ECC3D2586F37}" type="datetime1">
               <a:rPr lang="fi-FI" smtClean="0"/>
-              <a:t>12.10.2022</a:t>
+              <a:t>16.2.2023</a:t>
             </a:fld>
             <a:endParaRPr lang="en-GB" dirty="0"/>
           </a:p>
@@ -2246,7 +2246,7 @@
           <a:p>
             <a:fld id="{E6BC6EEF-E660-7844-8930-418AFF95EA40}" type="datetime1">
               <a:rPr lang="fi-FI" smtClean="0"/>
-              <a:t>12.10.2022</a:t>
+              <a:t>16.2.2023</a:t>
             </a:fld>
             <a:endParaRPr lang="en-GB" dirty="0"/>
           </a:p>
@@ -2555,7 +2555,7 @@
           <a:p>
             <a:fld id="{4E10C7EC-C1C1-9849-A573-7692478FCD52}" type="datetime1">
               <a:rPr lang="fi-FI" smtClean="0"/>
-              <a:t>12.10.2022</a:t>
+              <a:t>16.2.2023</a:t>
             </a:fld>
             <a:endParaRPr lang="en-GB" dirty="0"/>
           </a:p>
@@ -2828,7 +2828,7 @@
           <a:p>
             <a:fld id="{844FF3FE-30BE-2040-9151-6FBC4992BF4F}" type="datetime1">
               <a:rPr lang="fi-FI" smtClean="0"/>
-              <a:t>12.10.2022</a:t>
+              <a:t>16.2.2023</a:t>
             </a:fld>
             <a:endParaRPr lang="en-GB" dirty="0"/>
           </a:p>
@@ -3068,7 +3068,7 @@
           <a:p>
             <a:fld id="{11EDCD7B-6966-E249-89F2-D46BDFBF56BE}" type="datetime1">
               <a:rPr lang="fi-FI" smtClean="0"/>
-              <a:t>12.10.2022</a:t>
+              <a:t>16.2.2023</a:t>
             </a:fld>
             <a:endParaRPr lang="en-GB" dirty="0"/>
           </a:p>
@@ -3361,7 +3361,7 @@
           <a:p>
             <a:fld id="{11EDCD7B-6966-E249-89F2-D46BDFBF56BE}" type="datetime1">
               <a:rPr lang="fi-FI" smtClean="0"/>
-              <a:t>12.10.2022</a:t>
+              <a:t>16.2.2023</a:t>
             </a:fld>
             <a:endParaRPr lang="en-GB" dirty="0"/>
           </a:p>
@@ -3800,7 +3800,7 @@
           <a:p>
             <a:fld id="{844FF3FE-30BE-2040-9151-6FBC4992BF4F}" type="datetime1">
               <a:rPr lang="fi-FI" smtClean="0"/>
-              <a:t>12.10.2022</a:t>
+              <a:t>16.2.2023</a:t>
             </a:fld>
             <a:endParaRPr lang="en-GB" dirty="0"/>
           </a:p>
@@ -4028,7 +4028,7 @@
           <a:p>
             <a:fld id="{11EDCD7B-6966-E249-89F2-D46BDFBF56BE}" type="datetime1">
               <a:rPr lang="fi-FI" smtClean="0"/>
-              <a:t>12.10.2022</a:t>
+              <a:t>16.2.2023</a:t>
             </a:fld>
             <a:endParaRPr lang="en-GB" dirty="0"/>
           </a:p>
@@ -4443,7 +4443,7 @@
           <a:p>
             <a:fld id="{B62E192A-D52B-F541-B2AA-4AEB9388F1F7}" type="datetime1">
               <a:rPr lang="fi-FI" smtClean="0"/>
-              <a:t>12.10.2022</a:t>
+              <a:t>16.2.2023</a:t>
             </a:fld>
             <a:endParaRPr lang="en-GB" dirty="0"/>
           </a:p>
@@ -4743,7 +4743,7 @@
           <a:p>
             <a:fld id="{EEA4FAA2-2B3E-264C-A42F-2D6D3EF33A3C}" type="datetime1">
               <a:rPr lang="fi-FI" smtClean="0"/>
-              <a:t>12.10.2022</a:t>
+              <a:t>16.2.2023</a:t>
             </a:fld>
             <a:endParaRPr lang="en-GB" dirty="0"/>
           </a:p>
@@ -5646,7 +5646,7 @@
           <a:p>
             <a:fld id="{B3114A65-8017-1743-A85A-B2A4BB835AE9}" type="datetime1">
               <a:rPr lang="fi-FI" smtClean="0"/>
-              <a:t>12.10.2022</a:t>
+              <a:t>16.2.2023</a:t>
             </a:fld>
             <a:endParaRPr lang="en-GB" dirty="0"/>
           </a:p>
@@ -5874,7 +5874,7 @@
           <a:p>
             <a:fld id="{11EDCD7B-6966-E249-89F2-D46BDFBF56BE}" type="datetime1">
               <a:rPr lang="fi-FI" smtClean="0"/>
-              <a:t>12.10.2022</a:t>
+              <a:t>16.2.2023</a:t>
             </a:fld>
             <a:endParaRPr lang="en-GB" dirty="0"/>
           </a:p>
@@ -6166,7 +6166,7 @@
           <a:p>
             <a:fld id="{45F98643-D206-614D-B596-3C8548138211}" type="datetime1">
               <a:rPr lang="fi-FI" smtClean="0"/>
-              <a:t>12.10.2022</a:t>
+              <a:t>16.2.2023</a:t>
             </a:fld>
             <a:endParaRPr lang="en-GB" dirty="0"/>
           </a:p>
@@ -6778,13 +6778,8 @@
           <a:p>
             <a:r>
               <a:rPr lang="en-GB" dirty="0"/>
-              <a:t>The previously Word-presented things in a </a:t>
-            </a:r>
-            <a:r>
-              <a:rPr lang="en-GB" dirty="0" err="1"/>
-              <a:t>Powerpoint</a:t>
-            </a:r>
-            <a:endParaRPr lang="en-GB" dirty="0"/>
+              <a:t>Some React app learnings</a:t>
+            </a:r>
           </a:p>
         </p:txBody>
       </p:sp>
@@ -6811,7 +6806,7 @@
           <a:p>
             <a:fld id="{30BF63A1-919F-FB49-ABA8-182126D24C50}" type="datetime1">
               <a:rPr lang="fi-FI" smtClean="0"/>
-              <a:t>12.10.2022</a:t>
+              <a:t>16.2.2023</a:t>
             </a:fld>
             <a:endParaRPr lang="en-GB" dirty="0"/>
           </a:p>
@@ -7182,7 +7177,7 @@
           <a:p>
             <a:fld id="{202E1EC2-47B8-044B-A09E-6A63B4D80C87}" type="datetime1">
               <a:rPr lang="fi-FI" smtClean="0"/>
-              <a:t>12.10.2022</a:t>
+              <a:t>16.2.2023</a:t>
             </a:fld>
             <a:endParaRPr lang="en-GB"/>
           </a:p>
@@ -7553,7 +7548,7 @@
           <a:p>
             <a:fld id="{202E1EC2-47B8-044B-A09E-6A63B4D80C87}" type="datetime1">
               <a:rPr lang="fi-FI" smtClean="0"/>
-              <a:t>12.10.2022</a:t>
+              <a:t>16.2.2023</a:t>
             </a:fld>
             <a:endParaRPr lang="en-GB"/>
           </a:p>
@@ -7977,7 +7972,7 @@
           <a:p>
             <a:fld id="{202E1EC2-47B8-044B-A09E-6A63B4D80C87}" type="datetime1">
               <a:rPr lang="fi-FI" smtClean="0"/>
-              <a:t>12.10.2022</a:t>
+              <a:t>16.2.2023</a:t>
             </a:fld>
             <a:endParaRPr lang="en-GB"/>
           </a:p>
@@ -8206,7 +8201,7 @@
           <a:p>
             <a:fld id="{202E1EC2-47B8-044B-A09E-6A63B4D80C87}" type="datetime1">
               <a:rPr lang="fi-FI" smtClean="0"/>
-              <a:t>12.10.2022</a:t>
+              <a:t>16.2.2023</a:t>
             </a:fld>
             <a:endParaRPr lang="en-GB"/>
           </a:p>
@@ -8498,7 +8493,7 @@
           <a:p>
             <a:fld id="{202E1EC2-47B8-044B-A09E-6A63B4D80C87}" type="datetime1">
               <a:rPr lang="fi-FI" smtClean="0"/>
-              <a:t>12.10.2022</a:t>
+              <a:t>16.2.2023</a:t>
             </a:fld>
             <a:endParaRPr lang="en-GB"/>
           </a:p>
@@ -8729,7 +8724,7 @@
           <a:p>
             <a:fld id="{202E1EC2-47B8-044B-A09E-6A63B4D80C87}" type="datetime1">
               <a:rPr lang="fi-FI" smtClean="0"/>
-              <a:t>12.10.2022</a:t>
+              <a:t>16.2.2023</a:t>
             </a:fld>
             <a:endParaRPr lang="en-GB"/>
           </a:p>
@@ -9069,7 +9064,7 @@
           <a:p>
             <a:fld id="{202E1EC2-47B8-044B-A09E-6A63B4D80C87}" type="datetime1">
               <a:rPr lang="fi-FI" smtClean="0"/>
-              <a:t>12.10.2022</a:t>
+              <a:t>16.2.2023</a:t>
             </a:fld>
             <a:endParaRPr lang="en-GB"/>
           </a:p>
@@ -9390,7 +9385,7 @@
           <a:p>
             <a:fld id="{202E1EC2-47B8-044B-A09E-6A63B4D80C87}" type="datetime1">
               <a:rPr lang="fi-FI" smtClean="0"/>
-              <a:t>12.10.2022</a:t>
+              <a:t>16.2.2023</a:t>
             </a:fld>
             <a:endParaRPr lang="en-GB"/>
           </a:p>
@@ -9759,7 +9754,7 @@
           <a:p>
             <a:fld id="{202E1EC2-47B8-044B-A09E-6A63B4D80C87}" type="datetime1">
               <a:rPr lang="fi-FI" smtClean="0"/>
-              <a:t>12.10.2022</a:t>
+              <a:t>16.2.2023</a:t>
             </a:fld>
             <a:endParaRPr lang="en-GB"/>
           </a:p>
@@ -10014,7 +10009,7 @@
           <a:p>
             <a:fld id="{202E1EC2-47B8-044B-A09E-6A63B4D80C87}" type="datetime1">
               <a:rPr lang="fi-FI" smtClean="0"/>
-              <a:t>12.10.2022</a:t>
+              <a:t>16.2.2023</a:t>
             </a:fld>
             <a:endParaRPr lang="en-GB"/>
           </a:p>
@@ -10235,7 +10230,7 @@
           <a:p>
             <a:fld id="{202E1EC2-47B8-044B-A09E-6A63B4D80C87}" type="datetime1">
               <a:rPr lang="fi-FI" smtClean="0"/>
-              <a:t>12.10.2022</a:t>
+              <a:t>16.2.2023</a:t>
             </a:fld>
             <a:endParaRPr lang="en-GB"/>
           </a:p>
@@ -10508,7 +10503,7 @@
           <a:p>
             <a:fld id="{202E1EC2-47B8-044B-A09E-6A63B4D80C87}" type="datetime1">
               <a:rPr lang="fi-FI" smtClean="0"/>
-              <a:t>12.10.2022</a:t>
+              <a:t>16.2.2023</a:t>
             </a:fld>
             <a:endParaRPr lang="en-GB"/>
           </a:p>
@@ -10757,7 +10752,7 @@
             </a:r>
             <a:r>
               <a:rPr lang="en-US" dirty="0"/>
-              <a:t>, HTML elements/attributes with small letter</a:t>
+              <a:t>, HTML elements/attributes with small letter: &lt;div&gt;…&lt;/div&gt;</a:t>
             </a:r>
           </a:p>
           <a:p>
@@ -10792,7 +10787,39 @@
           <a:p>
             <a:r>
               <a:rPr lang="en-US" dirty="0"/>
-              <a:t>when returning JSX, wrap it inside (  ) (((Or make sure to start JSX from same line as the return keyword))) </a:t>
+              <a:t>when you </a:t>
+            </a:r>
+            <a:r>
+              <a:rPr lang="en-US" b="1" dirty="0"/>
+              <a:t>return</a:t>
+            </a:r>
+            <a:r>
+              <a:rPr lang="en-US" dirty="0"/>
+              <a:t> JSX, wrap it inside </a:t>
+            </a:r>
+            <a:r>
+              <a:rPr lang="en-US" b="1" dirty="0"/>
+              <a:t>(</a:t>
+            </a:r>
+            <a:r>
+              <a:rPr lang="en-US" dirty="0"/>
+              <a:t>  </a:t>
+            </a:r>
+            <a:r>
+              <a:rPr lang="en-US" b="1" dirty="0"/>
+              <a:t>)</a:t>
+            </a:r>
+            <a:r>
+              <a:rPr lang="en-US" dirty="0"/>
+              <a:t> (((Or make sure to start JSX from same line as the </a:t>
+            </a:r>
+            <a:r>
+              <a:rPr lang="en-US" b="1" dirty="0"/>
+              <a:t>return</a:t>
+            </a:r>
+            <a:r>
+              <a:rPr lang="en-US" dirty="0"/>
+              <a:t> keyword))) </a:t>
             </a:r>
             <a:endParaRPr lang="fi-FI" dirty="0"/>
           </a:p>
@@ -10821,7 +10848,7 @@
           <a:p>
             <a:fld id="{202E1EC2-47B8-044B-A09E-6A63B4D80C87}" type="datetime1">
               <a:rPr lang="fi-FI" smtClean="0"/>
-              <a:t>12.10.2022</a:t>
+              <a:t>16.2.2023</a:t>
             </a:fld>
             <a:endParaRPr lang="en-GB"/>
           </a:p>
@@ -10934,7 +10961,7 @@
           <a:p>
             <a:r>
               <a:rPr lang="fi-FI" dirty="0" err="1"/>
-              <a:t>Reac</a:t>
+              <a:t>React</a:t>
             </a:r>
             <a:r>
               <a:rPr lang="fi-FI" dirty="0"/>
@@ -11191,7 +11218,7 @@
           <a:p>
             <a:fld id="{202E1EC2-47B8-044B-A09E-6A63B4D80C87}" type="datetime1">
               <a:rPr lang="fi-FI" smtClean="0"/>
-              <a:t>12.10.2022</a:t>
+              <a:t>16.2.2023</a:t>
             </a:fld>
             <a:endParaRPr lang="en-GB" dirty="0"/>
           </a:p>
@@ -11370,7 +11397,14 @@
           <a:p>
             <a:r>
               <a:rPr lang="en-US" i="1" dirty="0"/>
-              <a:t>What 4-5 things will happen with this: </a:t>
+              <a:t>What 4-5 things will happen with this? </a:t>
+            </a:r>
+            <a:br>
+              <a:rPr lang="en-US" i="1" dirty="0"/>
+            </a:br>
+            <a:r>
+              <a:rPr lang="en-US" i="1" dirty="0"/>
+              <a:t>					</a:t>
             </a:r>
             <a:r>
               <a:rPr lang="en-US" b="1" dirty="0"/>
@@ -11396,10 +11430,7 @@
               <a:rPr lang="en-US" dirty="0"/>
               <a:t> </a:t>
             </a:r>
-            <a:r>
-              <a:rPr lang="en-US" i="1" dirty="0"/>
-              <a:t>?</a:t>
-            </a:r>
+            <a:endParaRPr lang="en-US" i="1" dirty="0"/>
           </a:p>
           <a:p>
             <a:r>
@@ -11447,7 +11478,7 @@
           <a:p>
             <a:fld id="{202E1EC2-47B8-044B-A09E-6A63B4D80C87}" type="datetime1">
               <a:rPr lang="fi-FI" smtClean="0"/>
-              <a:t>12.10.2022</a:t>
+              <a:t>16.2.2023</a:t>
             </a:fld>
             <a:endParaRPr lang="en-GB"/>
           </a:p>
@@ -12607,7 +12638,7 @@
           <a:p>
             <a:fld id="{202E1EC2-47B8-044B-A09E-6A63B4D80C87}" type="datetime1">
               <a:rPr lang="fi-FI" smtClean="0"/>
-              <a:t>12.10.2022</a:t>
+              <a:t>16.2.2023</a:t>
             </a:fld>
             <a:endParaRPr lang="en-GB"/>
           </a:p>
@@ -12735,7 +12766,13 @@
               <a:t>, </a:t>
             </a:r>
             <a:r>
-              <a:rPr lang="fi-FI" dirty="0" err="1"/>
+              <a:rPr lang="fi-FI" dirty="0" err="1">
+                <a:solidFill>
+                  <a:schemeClr val="bg1">
+                    <a:lumMod val="50000"/>
+                  </a:schemeClr>
+                </a:solidFill>
+              </a:rPr>
               <a:t>useContext</a:t>
             </a:r>
             <a:r>
@@ -12844,7 +12881,7 @@
           <a:p>
             <a:r>
               <a:rPr lang="en-US" dirty="0"/>
-              <a:t>state/props created or changed =&gt; </a:t>
+              <a:t>state/props created or changed, render happens =&gt; </a:t>
             </a:r>
             <a:r>
               <a:rPr lang="en-US" b="1" dirty="0" err="1"/>
@@ -12861,7 +12898,13 @@
           </a:p>
           <a:p>
             <a:r>
-              <a:rPr lang="en-US" b="1" dirty="0" err="1"/>
+              <a:rPr lang="en-US" b="1" dirty="0" err="1">
+                <a:solidFill>
+                  <a:schemeClr val="bg1">
+                    <a:lumMod val="50000"/>
+                  </a:schemeClr>
+                </a:solidFill>
+              </a:rPr>
               <a:t>useContext</a:t>
             </a:r>
             <a:r>
@@ -12894,7 +12937,7 @@
           <a:p>
             <a:fld id="{202E1EC2-47B8-044B-A09E-6A63B4D80C87}" type="datetime1">
               <a:rPr lang="fi-FI" smtClean="0"/>
-              <a:t>12.10.2022</a:t>
+              <a:t>16.2.2023</a:t>
             </a:fld>
             <a:endParaRPr lang="en-GB"/>
           </a:p>
@@ -13227,7 +13270,7 @@
           <a:p>
             <a:fld id="{202E1EC2-47B8-044B-A09E-6A63B4D80C87}" type="datetime1">
               <a:rPr lang="fi-FI" smtClean="0"/>
-              <a:t>12.10.2022</a:t>
+              <a:t>16.2.2023</a:t>
             </a:fld>
             <a:endParaRPr lang="en-GB"/>
           </a:p>
@@ -13487,7 +13530,7 @@
           <a:p>
             <a:fld id="{202E1EC2-47B8-044B-A09E-6A63B4D80C87}" type="datetime1">
               <a:rPr lang="fi-FI" smtClean="0"/>
-              <a:t>12.10.2022</a:t>
+              <a:t>16.2.2023</a:t>
             </a:fld>
             <a:endParaRPr lang="en-GB"/>
           </a:p>

</xml_diff>

<commit_message>
Updates for Frontend exam Fall 2023
</commit_message>
<xml_diff>
--- a/FrontendStuff_ForExam.pptx
+++ b/FrontendStuff_ForExam.pptx
@@ -1210,7 +1210,7 @@
           <a:p>
             <a:fld id="{5645C365-1C26-6946-87AF-75D6A7DF4277}" type="datetimeFigureOut">
               <a:rPr lang="en-GB" smtClean="0"/>
-              <a:t>16/02/2023</a:t>
+              <a:t>07/11/2023</a:t>
             </a:fld>
             <a:endParaRPr lang="en-GB"/>
           </a:p>
@@ -1709,7 +1709,7 @@
           <a:p>
             <a:fld id="{35B864B8-8D08-7B43-B4FB-B2FB41A5D9E3}" type="datetime1">
               <a:rPr lang="fi-FI" smtClean="0"/>
-              <a:t>16.2.2023</a:t>
+              <a:t>7.11.2023</a:t>
             </a:fld>
             <a:endParaRPr lang="en-GB" dirty="0"/>
           </a:p>
@@ -2036,7 +2036,7 @@
           <a:p>
             <a:fld id="{D5AEA85A-FC56-D34C-9AA6-ECC3D2586F37}" type="datetime1">
               <a:rPr lang="fi-FI" smtClean="0"/>
-              <a:t>16.2.2023</a:t>
+              <a:t>7.11.2023</a:t>
             </a:fld>
             <a:endParaRPr lang="en-GB" dirty="0"/>
           </a:p>
@@ -2246,7 +2246,7 @@
           <a:p>
             <a:fld id="{E6BC6EEF-E660-7844-8930-418AFF95EA40}" type="datetime1">
               <a:rPr lang="fi-FI" smtClean="0"/>
-              <a:t>16.2.2023</a:t>
+              <a:t>7.11.2023</a:t>
             </a:fld>
             <a:endParaRPr lang="en-GB" dirty="0"/>
           </a:p>
@@ -2555,7 +2555,7 @@
           <a:p>
             <a:fld id="{4E10C7EC-C1C1-9849-A573-7692478FCD52}" type="datetime1">
               <a:rPr lang="fi-FI" smtClean="0"/>
-              <a:t>16.2.2023</a:t>
+              <a:t>7.11.2023</a:t>
             </a:fld>
             <a:endParaRPr lang="en-GB" dirty="0"/>
           </a:p>
@@ -2828,7 +2828,7 @@
           <a:p>
             <a:fld id="{844FF3FE-30BE-2040-9151-6FBC4992BF4F}" type="datetime1">
               <a:rPr lang="fi-FI" smtClean="0"/>
-              <a:t>16.2.2023</a:t>
+              <a:t>7.11.2023</a:t>
             </a:fld>
             <a:endParaRPr lang="en-GB" dirty="0"/>
           </a:p>
@@ -3068,7 +3068,7 @@
           <a:p>
             <a:fld id="{11EDCD7B-6966-E249-89F2-D46BDFBF56BE}" type="datetime1">
               <a:rPr lang="fi-FI" smtClean="0"/>
-              <a:t>16.2.2023</a:t>
+              <a:t>7.11.2023</a:t>
             </a:fld>
             <a:endParaRPr lang="en-GB" dirty="0"/>
           </a:p>
@@ -3361,7 +3361,7 @@
           <a:p>
             <a:fld id="{11EDCD7B-6966-E249-89F2-D46BDFBF56BE}" type="datetime1">
               <a:rPr lang="fi-FI" smtClean="0"/>
-              <a:t>16.2.2023</a:t>
+              <a:t>7.11.2023</a:t>
             </a:fld>
             <a:endParaRPr lang="en-GB" dirty="0"/>
           </a:p>
@@ -3800,7 +3800,7 @@
           <a:p>
             <a:fld id="{844FF3FE-30BE-2040-9151-6FBC4992BF4F}" type="datetime1">
               <a:rPr lang="fi-FI" smtClean="0"/>
-              <a:t>16.2.2023</a:t>
+              <a:t>7.11.2023</a:t>
             </a:fld>
             <a:endParaRPr lang="en-GB" dirty="0"/>
           </a:p>
@@ -4028,7 +4028,7 @@
           <a:p>
             <a:fld id="{11EDCD7B-6966-E249-89F2-D46BDFBF56BE}" type="datetime1">
               <a:rPr lang="fi-FI" smtClean="0"/>
-              <a:t>16.2.2023</a:t>
+              <a:t>7.11.2023</a:t>
             </a:fld>
             <a:endParaRPr lang="en-GB" dirty="0"/>
           </a:p>
@@ -4443,7 +4443,7 @@
           <a:p>
             <a:fld id="{B62E192A-D52B-F541-B2AA-4AEB9388F1F7}" type="datetime1">
               <a:rPr lang="fi-FI" smtClean="0"/>
-              <a:t>16.2.2023</a:t>
+              <a:t>7.11.2023</a:t>
             </a:fld>
             <a:endParaRPr lang="en-GB" dirty="0"/>
           </a:p>
@@ -4743,7 +4743,7 @@
           <a:p>
             <a:fld id="{EEA4FAA2-2B3E-264C-A42F-2D6D3EF33A3C}" type="datetime1">
               <a:rPr lang="fi-FI" smtClean="0"/>
-              <a:t>16.2.2023</a:t>
+              <a:t>7.11.2023</a:t>
             </a:fld>
             <a:endParaRPr lang="en-GB" dirty="0"/>
           </a:p>
@@ -5646,7 +5646,7 @@
           <a:p>
             <a:fld id="{B3114A65-8017-1743-A85A-B2A4BB835AE9}" type="datetime1">
               <a:rPr lang="fi-FI" smtClean="0"/>
-              <a:t>16.2.2023</a:t>
+              <a:t>7.11.2023</a:t>
             </a:fld>
             <a:endParaRPr lang="en-GB" dirty="0"/>
           </a:p>
@@ -5874,7 +5874,7 @@
           <a:p>
             <a:fld id="{11EDCD7B-6966-E249-89F2-D46BDFBF56BE}" type="datetime1">
               <a:rPr lang="fi-FI" smtClean="0"/>
-              <a:t>16.2.2023</a:t>
+              <a:t>7.11.2023</a:t>
             </a:fld>
             <a:endParaRPr lang="en-GB" dirty="0"/>
           </a:p>
@@ -6166,7 +6166,7 @@
           <a:p>
             <a:fld id="{45F98643-D206-614D-B596-3C8548138211}" type="datetime1">
               <a:rPr lang="fi-FI" smtClean="0"/>
-              <a:t>16.2.2023</a:t>
+              <a:t>7.11.2023</a:t>
             </a:fld>
             <a:endParaRPr lang="en-GB" dirty="0"/>
           </a:p>
@@ -6806,7 +6806,7 @@
           <a:p>
             <a:fld id="{30BF63A1-919F-FB49-ABA8-182126D24C50}" type="datetime1">
               <a:rPr lang="fi-FI" smtClean="0"/>
-              <a:t>16.2.2023</a:t>
+              <a:t>7.11.2023</a:t>
             </a:fld>
             <a:endParaRPr lang="en-GB" dirty="0"/>
           </a:p>
@@ -6956,7 +6956,15 @@
             <a:pPr lvl="2"/>
             <a:r>
               <a:rPr lang="en-US" dirty="0"/>
-              <a:t>Do not call them from your regular JavaScript functions</a:t>
+              <a:t>Do not call them </a:t>
+            </a:r>
+            <a:r>
+              <a:rPr lang="en-US" b="1" dirty="0"/>
+              <a:t>from</a:t>
+            </a:r>
+            <a:r>
+              <a:rPr lang="en-US" dirty="0"/>
+              <a:t> your regular JavaScript functions</a:t>
             </a:r>
           </a:p>
           <a:p>
@@ -6975,24 +6983,6 @@
             <a:pPr marL="504000" lvl="1" indent="0">
               <a:buNone/>
             </a:pPr>
-            <a:endParaRPr lang="en-US" dirty="0"/>
-          </a:p>
-          <a:p>
-            <a:pPr marL="504000" lvl="1" indent="0">
-              <a:buNone/>
-            </a:pPr>
-            <a:endParaRPr lang="en-US" dirty="0"/>
-          </a:p>
-          <a:p>
-            <a:pPr marL="504000" lvl="1" indent="0">
-              <a:buNone/>
-            </a:pPr>
-            <a:endParaRPr lang="en-US" dirty="0"/>
-          </a:p>
-          <a:p>
-            <a:pPr marL="504000" lvl="1" indent="0">
-              <a:buNone/>
-            </a:pPr>
             <a:r>
               <a:rPr lang="fi-FI" dirty="0" err="1"/>
               <a:t>Mostly</a:t>
@@ -7131,7 +7121,7 @@
             </a:r>
             <a:r>
               <a:rPr lang="fi-FI" dirty="0" err="1"/>
-              <a:t>rect</a:t>
+              <a:t>React</a:t>
             </a:r>
             <a:r>
               <a:rPr lang="fi-FI" dirty="0"/>
@@ -7177,7 +7167,7 @@
           <a:p>
             <a:fld id="{202E1EC2-47B8-044B-A09E-6A63B4D80C87}" type="datetime1">
               <a:rPr lang="fi-FI" smtClean="0"/>
-              <a:t>16.2.2023</a:t>
+              <a:t>7.11.2023</a:t>
             </a:fld>
             <a:endParaRPr lang="en-GB"/>
           </a:p>
@@ -7477,13 +7467,8 @@
             </a:r>
             <a:r>
               <a:rPr lang="en-US" i="1" dirty="0"/>
-              <a:t> does </a:t>
-            </a:r>
-            <a:r>
-              <a:rPr lang="en-US" i="1"/>
-              <a:t>by default.</a:t>
-            </a:r>
-            <a:endParaRPr lang="en-US" i="1" dirty="0"/>
+              <a:t> does by default.</a:t>
+            </a:r>
           </a:p>
           <a:p>
             <a:pPr lvl="1"/>
@@ -7509,7 +7494,7 @@
             </a:r>
             <a:r>
               <a:rPr lang="en-US" i="1" dirty="0"/>
-              <a:t>, is executed, the one that calls </a:t>
+              <a:t>, will be executed, the one that calls </a:t>
             </a:r>
             <a:r>
               <a:rPr lang="en-US" i="1" dirty="0" err="1"/>
@@ -7548,7 +7533,7 @@
           <a:p>
             <a:fld id="{202E1EC2-47B8-044B-A09E-6A63B4D80C87}" type="datetime1">
               <a:rPr lang="fi-FI" smtClean="0"/>
-              <a:t>16.2.2023</a:t>
+              <a:t>7.11.2023</a:t>
             </a:fld>
             <a:endParaRPr lang="en-GB"/>
           </a:p>
@@ -7972,7 +7957,7 @@
           <a:p>
             <a:fld id="{202E1EC2-47B8-044B-A09E-6A63B4D80C87}" type="datetime1">
               <a:rPr lang="fi-FI" smtClean="0"/>
-              <a:t>16.2.2023</a:t>
+              <a:t>7.11.2023</a:t>
             </a:fld>
             <a:endParaRPr lang="en-GB"/>
           </a:p>
@@ -8201,7 +8186,7 @@
           <a:p>
             <a:fld id="{202E1EC2-47B8-044B-A09E-6A63B4D80C87}" type="datetime1">
               <a:rPr lang="fi-FI" smtClean="0"/>
-              <a:t>16.2.2023</a:t>
+              <a:t>7.11.2023</a:t>
             </a:fld>
             <a:endParaRPr lang="en-GB"/>
           </a:p>
@@ -8315,7 +8300,11 @@
             <a:pPr lvl="0"/>
             <a:r>
               <a:rPr lang="en-US" dirty="0"/>
-              <a:t>create-react-app – “CRA”</a:t>
+              <a:t>create-react-app – “CRA”  OR  </a:t>
+            </a:r>
+            <a:r>
+              <a:rPr lang="en-US" dirty="0" err="1"/>
+              <a:t>vite</a:t>
             </a:r>
             <a:endParaRPr lang="fi-FI" dirty="0"/>
           </a:p>
@@ -8358,7 +8347,7 @@
           <a:p>
             <a:r>
               <a:rPr lang="en-US" i="1" dirty="0"/>
-              <a:t>What kind of project create-react-app creates? </a:t>
+              <a:t>What kind of project created? </a:t>
             </a:r>
             <a:r>
               <a:rPr lang="en-US" dirty="0"/>
@@ -8393,7 +8382,21 @@
           <a:p>
             <a:r>
               <a:rPr lang="en-US" i="1" dirty="0"/>
-              <a:t>What's the relationship with the /public/index.html and the React app? How the React app starts and builds up the page? index.js | index.html + App.js | and so on.</a:t>
+              <a:t>What's the relationship with e.g. the </a:t>
+            </a:r>
+            <a:r>
+              <a:rPr lang="en-US" i="1" dirty="0">
+                <a:solidFill>
+                  <a:schemeClr val="bg1">
+                    <a:lumMod val="75000"/>
+                  </a:schemeClr>
+                </a:solidFill>
+              </a:rPr>
+              <a:t>/public</a:t>
+            </a:r>
+            <a:r>
+              <a:rPr lang="en-US" i="1" dirty="0"/>
+              <a:t>/index.html and the React app? How the React app starts and builds up the page? index.js | index.html + App.js | and so on.</a:t>
             </a:r>
             <a:endParaRPr lang="fi-FI" dirty="0"/>
           </a:p>
@@ -8493,7 +8496,7 @@
           <a:p>
             <a:fld id="{202E1EC2-47B8-044B-A09E-6A63B4D80C87}" type="datetime1">
               <a:rPr lang="fi-FI" smtClean="0"/>
-              <a:t>16.2.2023</a:t>
+              <a:t>7.11.2023</a:t>
             </a:fld>
             <a:endParaRPr lang="en-GB"/>
           </a:p>
@@ -8645,7 +8648,7 @@
           <a:p>
             <a:r>
               <a:rPr lang="en-US" dirty="0"/>
-              <a:t>SPA understood in general. </a:t>
+              <a:t>SPA basic understanding needed. </a:t>
             </a:r>
           </a:p>
           <a:p>
@@ -8665,7 +8668,7 @@
             <a:pPr lvl="1"/>
             <a:r>
               <a:rPr lang="en-US" dirty="0"/>
-              <a:t>Views = SPA ‘pages’ we can get routed to</a:t>
+              <a:t>‘Views’ = SPA ‘pages’ we can get routed to</a:t>
             </a:r>
             <a:endParaRPr lang="fi-FI" dirty="0"/>
           </a:p>
@@ -8673,7 +8676,7 @@
             <a:pPr lvl="1"/>
             <a:r>
               <a:rPr lang="en-US" dirty="0"/>
-              <a:t>Some others are re-usable children of the Views</a:t>
+              <a:t>Some others are re-usable child components of the Views</a:t>
             </a:r>
             <a:endParaRPr lang="fi-FI" dirty="0"/>
           </a:p>
@@ -8686,8 +8689,12 @@
           <a:p>
             <a:pPr lvl="1"/>
             <a:r>
-              <a:rPr lang="en-US" dirty="0"/>
-              <a:t>container components who have/fetch the data, hold the state</a:t>
+              <a:rPr lang="en-US" i="1" dirty="0"/>
+              <a:t>container components</a:t>
+            </a:r>
+            <a:r>
+              <a:rPr lang="en-US" dirty="0"/>
+              <a:t> who have/fetch the data, hold the state</a:t>
             </a:r>
             <a:endParaRPr lang="fi-FI" dirty="0"/>
           </a:p>
@@ -8695,7 +8702,15 @@
             <a:pPr lvl="1"/>
             <a:r>
               <a:rPr lang="en-US" dirty="0"/>
-              <a:t>Some others are presentational components who get the data from mother, and who only show what they get (plus possibly provide links/buttons related to _that_ item that it's showing)</a:t>
+              <a:t>Some others are </a:t>
+            </a:r>
+            <a:r>
+              <a:rPr lang="en-US" i="1" dirty="0"/>
+              <a:t>presentational components</a:t>
+            </a:r>
+            <a:r>
+              <a:rPr lang="en-US" dirty="0"/>
+              <a:t> who get the data from mother, and who only show what they get (plus possibly provide links/buttons related to _that_ item that it's showing)</a:t>
             </a:r>
             <a:endParaRPr lang="fi-FI" dirty="0"/>
           </a:p>
@@ -8724,7 +8739,7 @@
           <a:p>
             <a:fld id="{202E1EC2-47B8-044B-A09E-6A63B4D80C87}" type="datetime1">
               <a:rPr lang="fi-FI" smtClean="0"/>
-              <a:t>16.2.2023</a:t>
+              <a:t>7.11.2023</a:t>
             </a:fld>
             <a:endParaRPr lang="en-GB"/>
           </a:p>
@@ -9013,7 +9028,7 @@
             <a:pPr lvl="1"/>
             <a:r>
               <a:rPr lang="en-US" dirty="0"/>
-              <a:t>Route mapped to (view) React </a:t>
+              <a:t>Each Route mapped to a (‘View’) React </a:t>
             </a:r>
             <a:r>
               <a:rPr lang="en-US" b="1" dirty="0"/>
@@ -9064,7 +9079,7 @@
           <a:p>
             <a:fld id="{202E1EC2-47B8-044B-A09E-6A63B4D80C87}" type="datetime1">
               <a:rPr lang="fi-FI" smtClean="0"/>
-              <a:t>16.2.2023</a:t>
+              <a:t>7.11.2023</a:t>
             </a:fld>
             <a:endParaRPr lang="en-GB"/>
           </a:p>
@@ -9385,7 +9400,7 @@
           <a:p>
             <a:fld id="{202E1EC2-47B8-044B-A09E-6A63B4D80C87}" type="datetime1">
               <a:rPr lang="fi-FI" smtClean="0"/>
-              <a:t>16.2.2023</a:t>
+              <a:t>7.11.2023</a:t>
             </a:fld>
             <a:endParaRPr lang="en-GB"/>
           </a:p>
@@ -9754,7 +9769,7 @@
           <a:p>
             <a:fld id="{202E1EC2-47B8-044B-A09E-6A63B4D80C87}" type="datetime1">
               <a:rPr lang="fi-FI" smtClean="0"/>
-              <a:t>16.2.2023</a:t>
+              <a:t>7.11.2023</a:t>
             </a:fld>
             <a:endParaRPr lang="en-GB"/>
           </a:p>
@@ -10009,7 +10024,7 @@
           <a:p>
             <a:fld id="{202E1EC2-47B8-044B-A09E-6A63B4D80C87}" type="datetime1">
               <a:rPr lang="fi-FI" smtClean="0"/>
-              <a:t>16.2.2023</a:t>
+              <a:t>7.11.2023</a:t>
             </a:fld>
             <a:endParaRPr lang="en-GB"/>
           </a:p>
@@ -10230,7 +10245,7 @@
           <a:p>
             <a:fld id="{202E1EC2-47B8-044B-A09E-6A63B4D80C87}" type="datetime1">
               <a:rPr lang="fi-FI" smtClean="0"/>
-              <a:t>16.2.2023</a:t>
+              <a:t>7.11.2023</a:t>
             </a:fld>
             <a:endParaRPr lang="en-GB"/>
           </a:p>
@@ -10344,7 +10359,19 @@
             <a:pPr lvl="0"/>
             <a:r>
               <a:rPr lang="en-US" dirty="0"/>
-              <a:t>Other topics for the exam ? (Mainly extras)</a:t>
+              <a:t>Other topics for the exam ? (</a:t>
+            </a:r>
+            <a:r>
+              <a:rPr lang="en-US" u="sng" dirty="0"/>
+              <a:t>Mainly</a:t>
+            </a:r>
+            <a:r>
+              <a:rPr lang="en-US" dirty="0"/>
+              <a:t> </a:t>
+            </a:r>
+            <a:r>
+              <a:rPr lang="en-US"/>
+              <a:t>extras though)</a:t>
             </a:r>
             <a:endParaRPr lang="fi-FI" dirty="0"/>
           </a:p>
@@ -10503,7 +10530,7 @@
           <a:p>
             <a:fld id="{202E1EC2-47B8-044B-A09E-6A63B4D80C87}" type="datetime1">
               <a:rPr lang="fi-FI" smtClean="0"/>
-              <a:t>16.2.2023</a:t>
+              <a:t>7.11.2023</a:t>
             </a:fld>
             <a:endParaRPr lang="en-GB"/>
           </a:p>
@@ -10662,14 +10689,26 @@
             <a:pPr lvl="1"/>
             <a:r>
               <a:rPr lang="en-US" dirty="0"/>
-              <a:t>XML-like language mixing JS and React component markup, </a:t>
+              <a:t>XML-</a:t>
+            </a:r>
+            <a:r>
+              <a:rPr lang="en-US" b="1" u="sng" dirty="0"/>
+              <a:t>like</a:t>
+            </a:r>
+            <a:r>
+              <a:rPr lang="en-US" dirty="0"/>
+              <a:t> language mixing JS and React component markup, </a:t>
             </a:r>
           </a:p>
           <a:p>
             <a:pPr lvl="1"/>
             <a:r>
-              <a:rPr lang="en-US" dirty="0"/>
-              <a:t>not XML as it's not following XML rules, </a:t>
+              <a:rPr lang="en-US" b="1" u="sng" dirty="0"/>
+              <a:t>not</a:t>
+            </a:r>
+            <a:r>
+              <a:rPr lang="en-US" dirty="0"/>
+              <a:t> XML as it's not following XML rules, </a:t>
             </a:r>
           </a:p>
           <a:p>
@@ -10781,13 +10820,13 @@
             <a:pPr lvl="1"/>
             <a:r>
               <a:rPr lang="en-US" dirty="0"/>
-              <a:t>Thus, being able to mix JSX and ready html, though only okay if unavoidable</a:t>
-            </a:r>
-          </a:p>
-          <a:p>
-            <a:r>
-              <a:rPr lang="en-US" dirty="0"/>
-              <a:t>when you </a:t>
+              <a:t>Thus, being able to mix JSX and ready HTML, though only okay if unavoidable</a:t>
+            </a:r>
+          </a:p>
+          <a:p>
+            <a:r>
+              <a:rPr lang="en-US" dirty="0"/>
+              <a:t>if you </a:t>
             </a:r>
             <a:r>
               <a:rPr lang="en-US" b="1" dirty="0"/>
@@ -10848,7 +10887,7 @@
           <a:p>
             <a:fld id="{202E1EC2-47B8-044B-A09E-6A63B4D80C87}" type="datetime1">
               <a:rPr lang="fi-FI" smtClean="0"/>
-              <a:t>16.2.2023</a:t>
+              <a:t>7.11.2023</a:t>
             </a:fld>
             <a:endParaRPr lang="en-GB"/>
           </a:p>
@@ -11090,7 +11129,7 @@
             </a:r>
             <a:r>
               <a:rPr lang="en-US" dirty="0"/>
-              <a:t> calls! (function definitions / ready function objects passed, not calls)</a:t>
+              <a:t> calls! (function definitions / ready function objects passed, not function calls)</a:t>
             </a:r>
           </a:p>
           <a:p>
@@ -11099,7 +11138,7 @@
             </a:pPr>
             <a:r>
               <a:rPr lang="en-US" dirty="0"/>
-              <a:t>set state function is created automatically</a:t>
+              <a:t>set state function is created automatically for you</a:t>
             </a:r>
           </a:p>
           <a:p>
@@ -11117,7 +11156,7 @@
             </a:pPr>
             <a:r>
               <a:rPr lang="en-US" dirty="0"/>
-              <a:t>Above also Mother passing to Children data and/or event-handler function objects, in </a:t>
+              <a:t>Above also Mother passing to Children: data and/or event-handler function objects, in </a:t>
             </a:r>
             <a:r>
               <a:rPr lang="en-US" dirty="0" err="1"/>
@@ -11166,7 +11205,7 @@
             </a:r>
             <a:r>
               <a:rPr lang="en-US" dirty="0"/>
-              <a:t>’ could be called e.g. ‘task’ ‘</a:t>
+              <a:t>’ could be called e.g. ‘task’, ‘</a:t>
             </a:r>
             <a:r>
               <a:rPr lang="en-US" dirty="0" err="1"/>
@@ -11186,7 +11225,7 @@
             </a:r>
             <a:r>
               <a:rPr lang="en-US" dirty="0"/>
-              <a:t> Tutorial text and examples of the same  </a:t>
+              <a:t> Tutorial text and examples of the same basic hooks knowledge  </a:t>
             </a:r>
             <a:endParaRPr lang="fi-FI" dirty="0"/>
           </a:p>
@@ -11218,7 +11257,7 @@
           <a:p>
             <a:fld id="{202E1EC2-47B8-044B-A09E-6A63B4D80C87}" type="datetime1">
               <a:rPr lang="fi-FI" smtClean="0"/>
-              <a:t>16.2.2023</a:t>
+              <a:t>7.11.2023</a:t>
             </a:fld>
             <a:endParaRPr lang="en-GB" dirty="0"/>
           </a:p>
@@ -11478,7 +11517,7 @@
           <a:p>
             <a:fld id="{202E1EC2-47B8-044B-A09E-6A63B4D80C87}" type="datetime1">
               <a:rPr lang="fi-FI" smtClean="0"/>
-              <a:t>16.2.2023</a:t>
+              <a:t>7.11.2023</a:t>
             </a:fld>
             <a:endParaRPr lang="en-GB"/>
           </a:p>
@@ -12638,7 +12677,7 @@
           <a:p>
             <a:fld id="{202E1EC2-47B8-044B-A09E-6A63B4D80C87}" type="datetime1">
               <a:rPr lang="fi-FI" smtClean="0"/>
-              <a:t>16.2.2023</a:t>
+              <a:t>7.11.2023</a:t>
             </a:fld>
             <a:endParaRPr lang="en-GB"/>
           </a:p>
@@ -12875,7 +12914,19 @@
             </a:r>
             <a:r>
               <a:rPr lang="en-US" dirty="0"/>
-              <a:t> =&gt; used to just setup some fraction of the component’s React state and its maintenance function</a:t>
+              <a:t> =&gt; used to just setup some fraction of the component’s React </a:t>
+            </a:r>
+            <a:r>
+              <a:rPr lang="en-US" b="1" dirty="0"/>
+              <a:t>state</a:t>
+            </a:r>
+            <a:r>
+              <a:rPr lang="en-US" dirty="0"/>
+              <a:t> and its </a:t>
+            </a:r>
+            <a:r>
+              <a:rPr lang="en-US" b="1" dirty="0"/>
+              <a:t>update function</a:t>
             </a:r>
           </a:p>
           <a:p>
@@ -12893,8 +12944,13 @@
             </a:r>
             <a:r>
               <a:rPr lang="en-US" dirty="0"/>
-              <a:t> fires! Thus useful for attaching any functionality</a:t>
-            </a:r>
+              <a:t> fires! Thus useful for attaching any functionality defined inside the </a:t>
+            </a:r>
+            <a:r>
+              <a:rPr lang="en-US" dirty="0" err="1"/>
+              <a:t>useEffect:s</a:t>
+            </a:r>
+            <a:endParaRPr lang="en-US" dirty="0"/>
           </a:p>
           <a:p>
             <a:r>
@@ -12937,7 +12993,7 @@
           <a:p>
             <a:fld id="{202E1EC2-47B8-044B-A09E-6A63B4D80C87}" type="datetime1">
               <a:rPr lang="fi-FI" smtClean="0"/>
-              <a:t>16.2.2023</a:t>
+              <a:t>7.11.2023</a:t>
             </a:fld>
             <a:endParaRPr lang="en-GB"/>
           </a:p>
@@ -13236,13 +13292,14 @@
             </a:r>
           </a:p>
           <a:p>
+            <a:pPr lvl="1"/>
             <a:r>
               <a:rPr lang="en-US" dirty="0" err="1"/>
               <a:t>useEffect</a:t>
             </a:r>
             <a:r>
               <a:rPr lang="en-US" dirty="0"/>
-              <a:t> has replaced the old React component life-cycle event handlers (Where you could 'attach' your event-handler functions). inner function = function defined inside the component function. So, the visibility of the function is inside the outer function, inside that component only.</a:t>
+              <a:t> has replaced the old React component life-cycle event handlers (Where you could 'attach' your event-handler functions). inner function = function defined inside the component function. Then the visibility of the function is inside the outer function, inside that component only.</a:t>
             </a:r>
           </a:p>
         </p:txBody>
@@ -13270,7 +13327,7 @@
           <a:p>
             <a:fld id="{202E1EC2-47B8-044B-A09E-6A63B4D80C87}" type="datetime1">
               <a:rPr lang="fi-FI" smtClean="0"/>
-              <a:t>16.2.2023</a:t>
+              <a:t>7.11.2023</a:t>
             </a:fld>
             <a:endParaRPr lang="en-GB"/>
           </a:p>
@@ -13530,7 +13587,7 @@
           <a:p>
             <a:fld id="{202E1EC2-47B8-044B-A09E-6A63B4D80C87}" type="datetime1">
               <a:rPr lang="fi-FI" smtClean="0"/>
-              <a:t>16.2.2023</a:t>
+              <a:t>7.11.2023</a:t>
             </a:fld>
             <a:endParaRPr lang="en-GB"/>
           </a:p>
@@ -14160,12 +14217,12 @@
 </file>
 
 <file path=customXml/item1.xml><?xml version="1.0" encoding="utf-8"?>
-<p:properties xmlns:p="http://schemas.microsoft.com/office/2006/metadata/properties" xmlns:xsi="http://www.w3.org/2001/XMLSchema-instance" xmlns:pc="http://schemas.microsoft.com/office/infopath/2007/PartnerControls">
-  <documentManagement>
-    <PublishingExpirationDate xmlns="http://schemas.microsoft.com/sharepoint/v3" xsi:nil="true"/>
-    <PublishingStartDate xmlns="http://schemas.microsoft.com/sharepoint/v3" xsi:nil="true"/>
-  </documentManagement>
-</p:properties>
+<?mso-contentType ?>
+<FormTemplates xmlns="http://schemas.microsoft.com/sharepoint/v3/contenttype/forms">
+  <Display>DocumentLibraryForm</Display>
+  <Edit>DocumentLibraryForm</Edit>
+  <New>DocumentLibraryForm</New>
+</FormTemplates>
 </file>
 
 <file path=customXml/item2.xml><?xml version="1.0" encoding="utf-8"?>
@@ -14301,26 +14358,18 @@
 </file>
 
 <file path=customXml/item3.xml><?xml version="1.0" encoding="utf-8"?>
-<?mso-contentType ?>
-<FormTemplates xmlns="http://schemas.microsoft.com/sharepoint/v3/contenttype/forms">
-  <Display>DocumentLibraryForm</Display>
-  <Edit>DocumentLibraryForm</Edit>
-  <New>DocumentLibraryForm</New>
-</FormTemplates>
+<p:properties xmlns:p="http://schemas.microsoft.com/office/2006/metadata/properties" xmlns:xsi="http://www.w3.org/2001/XMLSchema-instance" xmlns:pc="http://schemas.microsoft.com/office/infopath/2007/PartnerControls">
+  <documentManagement>
+    <PublishingExpirationDate xmlns="http://schemas.microsoft.com/sharepoint/v3" xsi:nil="true"/>
+    <PublishingStartDate xmlns="http://schemas.microsoft.com/sharepoint/v3" xsi:nil="true"/>
+  </documentManagement>
+</p:properties>
 </file>
 
 <file path=customXml/itemProps1.xml><?xml version="1.0" encoding="utf-8"?>
-<ds:datastoreItem xmlns:ds="http://schemas.openxmlformats.org/officeDocument/2006/customXml" ds:itemID="{DED4E12E-7268-4B03-A47B-0755D62B5E31}">
+<ds:datastoreItem xmlns:ds="http://schemas.openxmlformats.org/officeDocument/2006/customXml" ds:itemID="{D546C03B-CD3A-4EA0-AAA4-0E00E896454E}">
   <ds:schemaRefs>
-    <ds:schemaRef ds:uri="http://purl.org/dc/terms/"/>
-    <ds:schemaRef ds:uri="http://schemas.microsoft.com/office/2006/documentManagement/types"/>
-    <ds:schemaRef ds:uri="http://schemas.microsoft.com/sharepoint/v3"/>
-    <ds:schemaRef ds:uri="http://schemas.microsoft.com/office/infopath/2007/PartnerControls"/>
-    <ds:schemaRef ds:uri="http://schemas.openxmlformats.org/package/2006/metadata/core-properties"/>
-    <ds:schemaRef ds:uri="http://schemas.microsoft.com/office/2006/metadata/properties"/>
-    <ds:schemaRef ds:uri="http://www.w3.org/XML/1998/namespace"/>
-    <ds:schemaRef ds:uri="http://purl.org/dc/dcmitype/"/>
-    <ds:schemaRef ds:uri="http://purl.org/dc/elements/1.1/"/>
+    <ds:schemaRef ds:uri="http://schemas.microsoft.com/sharepoint/v3/contenttype/forms"/>
   </ds:schemaRefs>
 </ds:datastoreItem>
 </file>
@@ -14344,9 +14393,17 @@
 </file>
 
 <file path=customXml/itemProps3.xml><?xml version="1.0" encoding="utf-8"?>
-<ds:datastoreItem xmlns:ds="http://schemas.openxmlformats.org/officeDocument/2006/customXml" ds:itemID="{D546C03B-CD3A-4EA0-AAA4-0E00E896454E}">
+<ds:datastoreItem xmlns:ds="http://schemas.openxmlformats.org/officeDocument/2006/customXml" ds:itemID="{DED4E12E-7268-4B03-A47B-0755D62B5E31}">
   <ds:schemaRefs>
-    <ds:schemaRef ds:uri="http://schemas.microsoft.com/sharepoint/v3/contenttype/forms"/>
+    <ds:schemaRef ds:uri="http://purl.org/dc/terms/"/>
+    <ds:schemaRef ds:uri="http://schemas.microsoft.com/office/2006/documentManagement/types"/>
+    <ds:schemaRef ds:uri="http://schemas.microsoft.com/sharepoint/v3"/>
+    <ds:schemaRef ds:uri="http://schemas.microsoft.com/office/infopath/2007/PartnerControls"/>
+    <ds:schemaRef ds:uri="http://schemas.openxmlformats.org/package/2006/metadata/core-properties"/>
+    <ds:schemaRef ds:uri="http://schemas.microsoft.com/office/2006/metadata/properties"/>
+    <ds:schemaRef ds:uri="http://www.w3.org/XML/1998/namespace"/>
+    <ds:schemaRef ds:uri="http://purl.org/dc/dcmitype/"/>
+    <ds:schemaRef ds:uri="http://purl.org/dc/elements/1.1/"/>
   </ds:schemaRefs>
 </ds:datastoreItem>
 </file>
</xml_diff>

<commit_message>
Upd frontend exam materials
</commit_message>
<xml_diff>
--- a/FrontendStuff_ForExam.pptx
+++ b/FrontendStuff_ForExam.pptx
@@ -1210,7 +1210,7 @@
           <a:p>
             <a:fld id="{5645C365-1C26-6946-87AF-75D6A7DF4277}" type="datetimeFigureOut">
               <a:rPr lang="en-GB" smtClean="0"/>
-              <a:t>14/11/2023</a:t>
+              <a:t>15/04/2025</a:t>
             </a:fld>
             <a:endParaRPr lang="en-GB"/>
           </a:p>
@@ -1709,7 +1709,7 @@
           <a:p>
             <a:fld id="{35B864B8-8D08-7B43-B4FB-B2FB41A5D9E3}" type="datetime1">
               <a:rPr lang="fi-FI" smtClean="0"/>
-              <a:t>14.11.2023</a:t>
+              <a:t>15.4.2025</a:t>
             </a:fld>
             <a:endParaRPr lang="en-GB" dirty="0"/>
           </a:p>
@@ -2036,7 +2036,7 @@
           <a:p>
             <a:fld id="{D5AEA85A-FC56-D34C-9AA6-ECC3D2586F37}" type="datetime1">
               <a:rPr lang="fi-FI" smtClean="0"/>
-              <a:t>14.11.2023</a:t>
+              <a:t>15.4.2025</a:t>
             </a:fld>
             <a:endParaRPr lang="en-GB" dirty="0"/>
           </a:p>
@@ -2246,7 +2246,7 @@
           <a:p>
             <a:fld id="{E6BC6EEF-E660-7844-8930-418AFF95EA40}" type="datetime1">
               <a:rPr lang="fi-FI" smtClean="0"/>
-              <a:t>14.11.2023</a:t>
+              <a:t>15.4.2025</a:t>
             </a:fld>
             <a:endParaRPr lang="en-GB" dirty="0"/>
           </a:p>
@@ -2555,7 +2555,7 @@
           <a:p>
             <a:fld id="{4E10C7EC-C1C1-9849-A573-7692478FCD52}" type="datetime1">
               <a:rPr lang="fi-FI" smtClean="0"/>
-              <a:t>14.11.2023</a:t>
+              <a:t>15.4.2025</a:t>
             </a:fld>
             <a:endParaRPr lang="en-GB" dirty="0"/>
           </a:p>
@@ -2828,7 +2828,7 @@
           <a:p>
             <a:fld id="{844FF3FE-30BE-2040-9151-6FBC4992BF4F}" type="datetime1">
               <a:rPr lang="fi-FI" smtClean="0"/>
-              <a:t>14.11.2023</a:t>
+              <a:t>15.4.2025</a:t>
             </a:fld>
             <a:endParaRPr lang="en-GB" dirty="0"/>
           </a:p>
@@ -3068,7 +3068,7 @@
           <a:p>
             <a:fld id="{11EDCD7B-6966-E249-89F2-D46BDFBF56BE}" type="datetime1">
               <a:rPr lang="fi-FI" smtClean="0"/>
-              <a:t>14.11.2023</a:t>
+              <a:t>15.4.2025</a:t>
             </a:fld>
             <a:endParaRPr lang="en-GB" dirty="0"/>
           </a:p>
@@ -3361,7 +3361,7 @@
           <a:p>
             <a:fld id="{11EDCD7B-6966-E249-89F2-D46BDFBF56BE}" type="datetime1">
               <a:rPr lang="fi-FI" smtClean="0"/>
-              <a:t>14.11.2023</a:t>
+              <a:t>15.4.2025</a:t>
             </a:fld>
             <a:endParaRPr lang="en-GB" dirty="0"/>
           </a:p>
@@ -3800,7 +3800,7 @@
           <a:p>
             <a:fld id="{844FF3FE-30BE-2040-9151-6FBC4992BF4F}" type="datetime1">
               <a:rPr lang="fi-FI" smtClean="0"/>
-              <a:t>14.11.2023</a:t>
+              <a:t>15.4.2025</a:t>
             </a:fld>
             <a:endParaRPr lang="en-GB" dirty="0"/>
           </a:p>
@@ -4028,7 +4028,7 @@
           <a:p>
             <a:fld id="{11EDCD7B-6966-E249-89F2-D46BDFBF56BE}" type="datetime1">
               <a:rPr lang="fi-FI" smtClean="0"/>
-              <a:t>14.11.2023</a:t>
+              <a:t>15.4.2025</a:t>
             </a:fld>
             <a:endParaRPr lang="en-GB" dirty="0"/>
           </a:p>
@@ -4443,7 +4443,7 @@
           <a:p>
             <a:fld id="{B62E192A-D52B-F541-B2AA-4AEB9388F1F7}" type="datetime1">
               <a:rPr lang="fi-FI" smtClean="0"/>
-              <a:t>14.11.2023</a:t>
+              <a:t>15.4.2025</a:t>
             </a:fld>
             <a:endParaRPr lang="en-GB" dirty="0"/>
           </a:p>
@@ -4743,7 +4743,7 @@
           <a:p>
             <a:fld id="{EEA4FAA2-2B3E-264C-A42F-2D6D3EF33A3C}" type="datetime1">
               <a:rPr lang="fi-FI" smtClean="0"/>
-              <a:t>14.11.2023</a:t>
+              <a:t>15.4.2025</a:t>
             </a:fld>
             <a:endParaRPr lang="en-GB" dirty="0"/>
           </a:p>
@@ -5646,7 +5646,7 @@
           <a:p>
             <a:fld id="{B3114A65-8017-1743-A85A-B2A4BB835AE9}" type="datetime1">
               <a:rPr lang="fi-FI" smtClean="0"/>
-              <a:t>14.11.2023</a:t>
+              <a:t>15.4.2025</a:t>
             </a:fld>
             <a:endParaRPr lang="en-GB" dirty="0"/>
           </a:p>
@@ -5874,7 +5874,7 @@
           <a:p>
             <a:fld id="{11EDCD7B-6966-E249-89F2-D46BDFBF56BE}" type="datetime1">
               <a:rPr lang="fi-FI" smtClean="0"/>
-              <a:t>14.11.2023</a:t>
+              <a:t>15.4.2025</a:t>
             </a:fld>
             <a:endParaRPr lang="en-GB" dirty="0"/>
           </a:p>
@@ -6166,7 +6166,7 @@
           <a:p>
             <a:fld id="{45F98643-D206-614D-B596-3C8548138211}" type="datetime1">
               <a:rPr lang="fi-FI" smtClean="0"/>
-              <a:t>14.11.2023</a:t>
+              <a:t>15.4.2025</a:t>
             </a:fld>
             <a:endParaRPr lang="en-GB" dirty="0"/>
           </a:p>
@@ -6616,7 +6616,7 @@
       </a:lvl9pPr>
     </p:otherStyle>
   </p:txStyles>
-  <p:extLst mod="1">
+  <p:extLst>
     <p:ext uri="{27BBF7A9-308A-43DC-89C8-2F10F3537804}">
       <p15:sldGuideLst xmlns:p15="http://schemas.microsoft.com/office/powerpoint/2012/main">
         <p15:guide id="1" orient="horz" pos="2160" userDrawn="1">
@@ -6806,7 +6806,7 @@
           <a:p>
             <a:fld id="{30BF63A1-919F-FB49-ABA8-182126D24C50}" type="datetime1">
               <a:rPr lang="fi-FI" smtClean="0"/>
-              <a:t>14.11.2023</a:t>
+              <a:t>15.4.2025</a:t>
             </a:fld>
             <a:endParaRPr lang="en-GB" dirty="0"/>
           </a:p>
@@ -6942,14 +6942,14 @@
             <a:pPr lvl="1"/>
             <a:r>
               <a:rPr lang="en-US" dirty="0"/>
-              <a:t>Should only be placed/called in the main level of the react component function</a:t>
+              <a:t>Should only be called/ in the main level of the react component function</a:t>
             </a:r>
           </a:p>
           <a:p>
             <a:pPr lvl="1"/>
             <a:r>
               <a:rPr lang="en-US" dirty="0"/>
-              <a:t>Call hooks only from your react functions (e.g. from your other hooks), </a:t>
+              <a:t>Call hooks only from your React functions (e.g. from your other hooks), </a:t>
             </a:r>
           </a:p>
           <a:p>
@@ -6964,28 +6964,321 @@
             </a:r>
             <a:r>
               <a:rPr lang="en-US" dirty="0"/>
-              <a:t> your regular JavaScript functions</a:t>
-            </a:r>
-          </a:p>
-          <a:p>
-            <a:pPr marL="504000" lvl="1" indent="0">
-              <a:buNone/>
-            </a:pPr>
-            <a:endParaRPr lang="en-US" dirty="0"/>
-          </a:p>
-          <a:p>
-            <a:pPr marL="504000" lvl="1" indent="0">
-              <a:buNone/>
-            </a:pPr>
-            <a:endParaRPr lang="en-US" dirty="0"/>
-          </a:p>
-          <a:p>
-            <a:pPr marL="504000" lvl="1" indent="0">
-              <a:buNone/>
-            </a:pPr>
+              <a:t> your regular JavaScript/TS functions</a:t>
+            </a:r>
+          </a:p>
+          <a:p>
+            <a:pPr lvl="2"/>
+            <a:r>
+              <a:rPr lang="fi-FI" b="1" dirty="0" err="1">
+                <a:solidFill>
+                  <a:srgbClr val="FF0000"/>
+                </a:solidFill>
+              </a:rPr>
+              <a:t>Mostly</a:t>
+            </a:r>
+            <a:r>
+              <a:rPr lang="fi-FI" b="1" dirty="0">
+                <a:solidFill>
+                  <a:srgbClr val="FF0000"/>
+                </a:solidFill>
+              </a:rPr>
+              <a:t> of </a:t>
+            </a:r>
+            <a:r>
+              <a:rPr lang="fi-FI" b="1" dirty="0" err="1">
+                <a:solidFill>
+                  <a:srgbClr val="FF0000"/>
+                </a:solidFill>
+              </a:rPr>
+              <a:t>course</a:t>
+            </a:r>
+            <a:r>
+              <a:rPr lang="fi-FI" b="1" dirty="0">
+                <a:solidFill>
+                  <a:srgbClr val="FF0000"/>
+                </a:solidFill>
+              </a:rPr>
+              <a:t> </a:t>
+            </a:r>
+            <a:r>
+              <a:rPr lang="fi-FI" b="1" dirty="0" err="1">
+                <a:solidFill>
+                  <a:srgbClr val="FF0000"/>
+                </a:solidFill>
+              </a:rPr>
+              <a:t>the</a:t>
+            </a:r>
+            <a:r>
+              <a:rPr lang="fi-FI" b="1" dirty="0">
+                <a:solidFill>
+                  <a:srgbClr val="FF0000"/>
+                </a:solidFill>
+              </a:rPr>
+              <a:t> </a:t>
+            </a:r>
+            <a:r>
+              <a:rPr lang="fi-FI" b="1" dirty="0" err="1">
+                <a:solidFill>
+                  <a:srgbClr val="FF0000"/>
+                </a:solidFill>
+              </a:rPr>
+              <a:t>React</a:t>
+            </a:r>
+            <a:r>
+              <a:rPr lang="fi-FI" b="1" dirty="0">
+                <a:solidFill>
+                  <a:srgbClr val="FF0000"/>
+                </a:solidFill>
+              </a:rPr>
+              <a:t> </a:t>
+            </a:r>
+            <a:r>
+              <a:rPr lang="fi-FI" b="1" dirty="0" err="1">
+                <a:solidFill>
+                  <a:srgbClr val="FF0000"/>
+                </a:solidFill>
+              </a:rPr>
+              <a:t>environment</a:t>
+            </a:r>
+            <a:r>
+              <a:rPr lang="fi-FI" b="1" dirty="0">
+                <a:solidFill>
+                  <a:srgbClr val="FF0000"/>
+                </a:solidFill>
+              </a:rPr>
+              <a:t> </a:t>
+            </a:r>
+            <a:r>
+              <a:rPr lang="fi-FI" b="1" dirty="0" err="1">
+                <a:solidFill>
+                  <a:srgbClr val="FF0000"/>
+                </a:solidFill>
+              </a:rPr>
+              <a:t>itself</a:t>
+            </a:r>
+            <a:r>
+              <a:rPr lang="fi-FI" b="1" dirty="0">
+                <a:solidFill>
+                  <a:srgbClr val="FF0000"/>
+                </a:solidFill>
+              </a:rPr>
+              <a:t> </a:t>
+            </a:r>
+            <a:r>
+              <a:rPr lang="fi-FI" b="1" dirty="0" err="1">
+                <a:solidFill>
+                  <a:srgbClr val="FF0000"/>
+                </a:solidFill>
+              </a:rPr>
+              <a:t>calls</a:t>
+            </a:r>
+            <a:r>
+              <a:rPr lang="fi-FI" b="1" dirty="0">
+                <a:solidFill>
+                  <a:srgbClr val="FF0000"/>
+                </a:solidFill>
+              </a:rPr>
+              <a:t> </a:t>
+            </a:r>
+            <a:r>
+              <a:rPr lang="fi-FI" b="1" dirty="0" err="1">
+                <a:solidFill>
+                  <a:srgbClr val="FF0000"/>
+                </a:solidFill>
+              </a:rPr>
+              <a:t>the</a:t>
+            </a:r>
+            <a:r>
+              <a:rPr lang="fi-FI" b="1" dirty="0">
+                <a:solidFill>
+                  <a:srgbClr val="FF0000"/>
+                </a:solidFill>
+              </a:rPr>
+              <a:t> </a:t>
+            </a:r>
+            <a:r>
+              <a:rPr lang="fi-FI" b="1" dirty="0" err="1">
+                <a:solidFill>
+                  <a:srgbClr val="FF0000"/>
+                </a:solidFill>
+              </a:rPr>
+              <a:t>hooks</a:t>
+            </a:r>
+            <a:r>
+              <a:rPr lang="fi-FI" b="1" dirty="0">
+                <a:solidFill>
+                  <a:srgbClr val="FF0000"/>
+                </a:solidFill>
+              </a:rPr>
+              <a:t>, and </a:t>
+            </a:r>
+            <a:r>
+              <a:rPr lang="fi-FI" b="1" dirty="0" err="1">
+                <a:solidFill>
+                  <a:srgbClr val="FF0000"/>
+                </a:solidFill>
+              </a:rPr>
+              <a:t>not</a:t>
+            </a:r>
+            <a:r>
+              <a:rPr lang="fi-FI" b="1" dirty="0">
+                <a:solidFill>
+                  <a:srgbClr val="FF0000"/>
+                </a:solidFill>
+              </a:rPr>
+              <a:t> us. </a:t>
+            </a:r>
+            <a:r>
+              <a:rPr lang="fi-FI" b="1" dirty="0" err="1">
+                <a:solidFill>
+                  <a:srgbClr val="FF0000"/>
+                </a:solidFill>
+              </a:rPr>
+              <a:t>But</a:t>
+            </a:r>
+            <a:r>
+              <a:rPr lang="fi-FI" b="1" dirty="0">
+                <a:solidFill>
+                  <a:srgbClr val="FF0000"/>
+                </a:solidFill>
+              </a:rPr>
+              <a:t> </a:t>
+            </a:r>
+            <a:r>
+              <a:rPr lang="fi-FI" b="1" dirty="0" err="1">
+                <a:solidFill>
+                  <a:srgbClr val="FF0000"/>
+                </a:solidFill>
+              </a:rPr>
+              <a:t>if</a:t>
+            </a:r>
+            <a:r>
+              <a:rPr lang="fi-FI" b="1" dirty="0">
+                <a:solidFill>
+                  <a:srgbClr val="FF0000"/>
+                </a:solidFill>
+              </a:rPr>
+              <a:t> </a:t>
+            </a:r>
+            <a:r>
+              <a:rPr lang="fi-FI" b="1" dirty="0" err="1">
+                <a:solidFill>
+                  <a:srgbClr val="FF0000"/>
+                </a:solidFill>
+              </a:rPr>
+              <a:t>we</a:t>
+            </a:r>
+            <a:r>
+              <a:rPr lang="fi-FI" b="1" dirty="0">
+                <a:solidFill>
+                  <a:srgbClr val="FF0000"/>
+                </a:solidFill>
+              </a:rPr>
+              <a:t> </a:t>
+            </a:r>
+            <a:r>
+              <a:rPr lang="fi-FI" b="1" dirty="0" err="1">
+                <a:solidFill>
+                  <a:srgbClr val="FF0000"/>
+                </a:solidFill>
+              </a:rPr>
+              <a:t>call</a:t>
+            </a:r>
+            <a:r>
+              <a:rPr lang="fi-FI" b="1" dirty="0">
+                <a:solidFill>
+                  <a:srgbClr val="FF0000"/>
+                </a:solidFill>
+              </a:rPr>
+              <a:t>, </a:t>
+            </a:r>
+            <a:r>
+              <a:rPr lang="fi-FI" b="1" dirty="0" err="1">
+                <a:solidFill>
+                  <a:srgbClr val="FF0000"/>
+                </a:solidFill>
+              </a:rPr>
+              <a:t>then</a:t>
+            </a:r>
+            <a:r>
+              <a:rPr lang="fi-FI" b="1" dirty="0">
+                <a:solidFill>
+                  <a:srgbClr val="FF0000"/>
+                </a:solidFill>
+              </a:rPr>
+              <a:t> </a:t>
+            </a:r>
+            <a:r>
+              <a:rPr lang="fi-FI" b="1" dirty="0" err="1">
+                <a:solidFill>
+                  <a:srgbClr val="FF0000"/>
+                </a:solidFill>
+              </a:rPr>
+              <a:t>from</a:t>
+            </a:r>
+            <a:r>
+              <a:rPr lang="fi-FI" b="1" dirty="0">
+                <a:solidFill>
+                  <a:srgbClr val="FF0000"/>
+                </a:solidFill>
+              </a:rPr>
+              <a:t> </a:t>
+            </a:r>
+            <a:r>
+              <a:rPr lang="fi-FI" b="1" dirty="0" err="1">
+                <a:solidFill>
+                  <a:srgbClr val="FF0000"/>
+                </a:solidFill>
+              </a:rPr>
+              <a:t>our</a:t>
+            </a:r>
+            <a:r>
+              <a:rPr lang="fi-FI" b="1" dirty="0">
+                <a:solidFill>
+                  <a:srgbClr val="FF0000"/>
+                </a:solidFill>
+              </a:rPr>
+              <a:t> </a:t>
+            </a:r>
+            <a:r>
+              <a:rPr lang="fi-FI" b="1" dirty="0" err="1">
+                <a:solidFill>
+                  <a:srgbClr val="FF0000"/>
+                </a:solidFill>
+              </a:rPr>
+              <a:t>React</a:t>
+            </a:r>
+            <a:r>
+              <a:rPr lang="fi-FI" b="1" dirty="0">
+                <a:solidFill>
+                  <a:srgbClr val="FF0000"/>
+                </a:solidFill>
+              </a:rPr>
+              <a:t> </a:t>
+            </a:r>
+            <a:r>
+              <a:rPr lang="fi-FI" b="1" dirty="0" err="1">
+                <a:solidFill>
+                  <a:srgbClr val="FF0000"/>
+                </a:solidFill>
+              </a:rPr>
+              <a:t>functions</a:t>
+            </a:r>
+            <a:r>
+              <a:rPr lang="fi-FI" dirty="0"/>
+              <a:t>.</a:t>
+            </a:r>
+          </a:p>
+          <a:p>
+            <a:pPr lvl="2"/>
+            <a:r>
+              <a:rPr lang="fi-FI" dirty="0"/>
+              <a:t>=&gt; </a:t>
+            </a:r>
             <a:r>
               <a:rPr lang="fi-FI" dirty="0" err="1"/>
-              <a:t>Mostly</a:t>
+              <a:t>triggering</a:t>
             </a:r>
             <a:r>
               <a:rPr lang="fi-FI" dirty="0"/>
@@ -6993,7 +7286,7 @@
             </a:r>
             <a:r>
               <a:rPr lang="fi-FI" dirty="0" err="1"/>
-              <a:t>course</a:t>
+              <a:t>the</a:t>
             </a:r>
             <a:r>
               <a:rPr lang="fi-FI" dirty="0"/>
@@ -7001,7 +7294,7 @@
             </a:r>
             <a:r>
               <a:rPr lang="fi-FI" dirty="0" err="1"/>
-              <a:t>the</a:t>
+              <a:t>events</a:t>
             </a:r>
             <a:r>
               <a:rPr lang="fi-FI" dirty="0"/>
@@ -7009,7 +7302,15 @@
             </a:r>
             <a:r>
               <a:rPr lang="fi-FI" dirty="0" err="1"/>
-              <a:t>React</a:t>
+              <a:t>has</a:t>
+            </a:r>
+            <a:r>
+              <a:rPr lang="fi-FI" dirty="0"/>
+              <a:t> to </a:t>
+            </a:r>
+            <a:r>
+              <a:rPr lang="fi-FI" dirty="0" err="1"/>
+              <a:t>be</a:t>
             </a:r>
             <a:r>
               <a:rPr lang="fi-FI" dirty="0"/>
@@ -7017,7 +7318,7 @@
             </a:r>
             <a:r>
               <a:rPr lang="fi-FI" dirty="0" err="1"/>
-              <a:t>environment</a:t>
+              <a:t>managed</a:t>
             </a:r>
             <a:r>
               <a:rPr lang="fi-FI" dirty="0"/>
@@ -7025,7 +7326,7 @@
             </a:r>
             <a:r>
               <a:rPr lang="fi-FI" dirty="0" err="1"/>
-              <a:t>itself</a:t>
+              <a:t>by</a:t>
             </a:r>
             <a:r>
               <a:rPr lang="fi-FI" dirty="0"/>
@@ -7033,108 +7334,9 @@
             </a:r>
             <a:r>
               <a:rPr lang="fi-FI" dirty="0" err="1"/>
-              <a:t>calls</a:t>
-            </a:r>
-            <a:r>
-              <a:rPr lang="fi-FI" dirty="0"/>
-              <a:t> </a:t>
-            </a:r>
-            <a:r>
-              <a:rPr lang="fi-FI" dirty="0" err="1"/>
-              <a:t>the</a:t>
-            </a:r>
-            <a:r>
-              <a:rPr lang="fi-FI" dirty="0"/>
-              <a:t> </a:t>
-            </a:r>
-            <a:r>
-              <a:rPr lang="fi-FI" dirty="0" err="1"/>
-              <a:t>hooks</a:t>
-            </a:r>
-            <a:r>
-              <a:rPr lang="fi-FI" dirty="0"/>
-              <a:t>, and </a:t>
-            </a:r>
-            <a:r>
-              <a:rPr lang="fi-FI" dirty="0" err="1"/>
-              <a:t>not</a:t>
-            </a:r>
-            <a:r>
-              <a:rPr lang="fi-FI" dirty="0"/>
-              <a:t> us. </a:t>
-            </a:r>
-            <a:r>
-              <a:rPr lang="fi-FI" dirty="0" err="1"/>
-              <a:t>But</a:t>
-            </a:r>
-            <a:r>
-              <a:rPr lang="fi-FI" dirty="0"/>
-              <a:t> </a:t>
-            </a:r>
-            <a:r>
-              <a:rPr lang="fi-FI" dirty="0" err="1"/>
-              <a:t>if</a:t>
-            </a:r>
-            <a:r>
-              <a:rPr lang="fi-FI" dirty="0"/>
-              <a:t> </a:t>
-            </a:r>
-            <a:r>
-              <a:rPr lang="fi-FI" dirty="0" err="1"/>
-              <a:t>we</a:t>
-            </a:r>
-            <a:r>
-              <a:rPr lang="fi-FI" dirty="0"/>
-              <a:t> </a:t>
-            </a:r>
-            <a:r>
-              <a:rPr lang="fi-FI" dirty="0" err="1"/>
-              <a:t>call</a:t>
-            </a:r>
-            <a:r>
-              <a:rPr lang="fi-FI" dirty="0"/>
-              <a:t>, </a:t>
-            </a:r>
-            <a:r>
-              <a:rPr lang="fi-FI" dirty="0" err="1"/>
-              <a:t>then</a:t>
-            </a:r>
-            <a:r>
-              <a:rPr lang="fi-FI" dirty="0"/>
-              <a:t> </a:t>
-            </a:r>
-            <a:r>
-              <a:rPr lang="fi-FI" dirty="0" err="1"/>
-              <a:t>from</a:t>
-            </a:r>
-            <a:r>
-              <a:rPr lang="fi-FI" dirty="0"/>
-              <a:t> </a:t>
-            </a:r>
-            <a:r>
-              <a:rPr lang="fi-FI" dirty="0" err="1"/>
-              <a:t>our</a:t>
-            </a:r>
-            <a:r>
-              <a:rPr lang="fi-FI" dirty="0"/>
-              <a:t> </a:t>
-            </a:r>
-            <a:r>
-              <a:rPr lang="fi-FI" dirty="0" err="1"/>
               <a:t>React</a:t>
             </a:r>
-            <a:r>
-              <a:rPr lang="fi-FI" dirty="0"/>
-              <a:t> </a:t>
-            </a:r>
-            <a:r>
-              <a:rPr lang="fi-FI" dirty="0" err="1"/>
-              <a:t>functions</a:t>
-            </a:r>
-            <a:r>
-              <a:rPr lang="fi-FI" dirty="0"/>
-              <a:t>.</a:t>
-            </a:r>
+            <a:endParaRPr lang="fi-FI" dirty="0"/>
           </a:p>
           <a:p>
             <a:endParaRPr lang="en-US" i="1" dirty="0"/>
@@ -7167,7 +7369,7 @@
           <a:p>
             <a:fld id="{202E1EC2-47B8-044B-A09E-6A63B4D80C87}" type="datetime1">
               <a:rPr lang="fi-FI" smtClean="0"/>
-              <a:t>14.11.2023</a:t>
+              <a:t>15.4.2025</a:t>
             </a:fld>
             <a:endParaRPr lang="en-GB"/>
           </a:p>
@@ -7506,7 +7708,7 @@
             </a:r>
             <a:r>
               <a:rPr lang="en-US" i="1" dirty="0"/>
-              <a:t>, will be executed, the one that calls </a:t>
+              <a:t>, will be executed by the React, the one that calls </a:t>
             </a:r>
             <a:r>
               <a:rPr lang="en-US" i="1" dirty="0" err="1"/>
@@ -7545,7 +7747,7 @@
           <a:p>
             <a:fld id="{202E1EC2-47B8-044B-A09E-6A63B4D80C87}" type="datetime1">
               <a:rPr lang="fi-FI" smtClean="0"/>
-              <a:t>14.11.2023</a:t>
+              <a:t>15.4.2025</a:t>
             </a:fld>
             <a:endParaRPr lang="en-GB"/>
           </a:p>
@@ -7969,7 +8171,7 @@
           <a:p>
             <a:fld id="{202E1EC2-47B8-044B-A09E-6A63B4D80C87}" type="datetime1">
               <a:rPr lang="fi-FI" smtClean="0"/>
-              <a:t>14.11.2023</a:t>
+              <a:t>15.4.2025</a:t>
             </a:fld>
             <a:endParaRPr lang="en-GB"/>
           </a:p>
@@ -8198,7 +8400,7 @@
           <a:p>
             <a:fld id="{202E1EC2-47B8-044B-A09E-6A63B4D80C87}" type="datetime1">
               <a:rPr lang="fi-FI" smtClean="0"/>
-              <a:t>14.11.2023</a:t>
+              <a:t>15.4.2025</a:t>
             </a:fld>
             <a:endParaRPr lang="en-GB"/>
           </a:p>
@@ -8387,7 +8589,15 @@
             </a:r>
             <a:r>
               <a:rPr lang="en-US" dirty="0"/>
-              <a:t> (and e.g. React Dev tools) starts)</a:t>
+              <a:t> (and e.g. React Dev tools) starts, possible with </a:t>
+            </a:r>
+            <a:r>
+              <a:rPr lang="en-US" dirty="0" err="1"/>
+              <a:t>tsc</a:t>
+            </a:r>
+            <a:r>
+              <a:rPr lang="en-US" dirty="0"/>
+              <a:t> TypeScript compilation and e.g. biome checks)</a:t>
             </a:r>
             <a:endParaRPr lang="fi-FI" dirty="0"/>
           </a:p>
@@ -8556,7 +8766,7 @@
           <a:p>
             <a:fld id="{202E1EC2-47B8-044B-A09E-6A63B4D80C87}" type="datetime1">
               <a:rPr lang="fi-FI" smtClean="0"/>
-              <a:t>14.11.2023</a:t>
+              <a:t>15.4.2025</a:t>
             </a:fld>
             <a:endParaRPr lang="en-GB"/>
           </a:p>
@@ -8799,7 +9009,7 @@
           <a:p>
             <a:fld id="{202E1EC2-47B8-044B-A09E-6A63B4D80C87}" type="datetime1">
               <a:rPr lang="fi-FI" smtClean="0"/>
-              <a:t>14.11.2023</a:t>
+              <a:t>15.4.2025</a:t>
             </a:fld>
             <a:endParaRPr lang="en-GB"/>
           </a:p>
@@ -9170,7 +9380,7 @@
           <a:p>
             <a:fld id="{202E1EC2-47B8-044B-A09E-6A63B4D80C87}" type="datetime1">
               <a:rPr lang="fi-FI" smtClean="0"/>
-              <a:t>14.11.2023</a:t>
+              <a:t>15.4.2025</a:t>
             </a:fld>
             <a:endParaRPr lang="en-GB"/>
           </a:p>
@@ -9491,7 +9701,7 @@
           <a:p>
             <a:fld id="{202E1EC2-47B8-044B-A09E-6A63B4D80C87}" type="datetime1">
               <a:rPr lang="fi-FI" smtClean="0"/>
-              <a:t>14.11.2023</a:t>
+              <a:t>15.4.2025</a:t>
             </a:fld>
             <a:endParaRPr lang="en-GB"/>
           </a:p>
@@ -9860,7 +10070,7 @@
           <a:p>
             <a:fld id="{202E1EC2-47B8-044B-A09E-6A63B4D80C87}" type="datetime1">
               <a:rPr lang="fi-FI" smtClean="0"/>
-              <a:t>14.11.2023</a:t>
+              <a:t>15.4.2025</a:t>
             </a:fld>
             <a:endParaRPr lang="en-GB"/>
           </a:p>
@@ -10115,7 +10325,7 @@
           <a:p>
             <a:fld id="{202E1EC2-47B8-044B-A09E-6A63B4D80C87}" type="datetime1">
               <a:rPr lang="fi-FI" smtClean="0"/>
-              <a:t>14.11.2023</a:t>
+              <a:t>15.4.2025</a:t>
             </a:fld>
             <a:endParaRPr lang="en-GB"/>
           </a:p>
@@ -10336,7 +10546,7 @@
           <a:p>
             <a:fld id="{202E1EC2-47B8-044B-A09E-6A63B4D80C87}" type="datetime1">
               <a:rPr lang="fi-FI" smtClean="0"/>
-              <a:t>14.11.2023</a:t>
+              <a:t>15.4.2025</a:t>
             </a:fld>
             <a:endParaRPr lang="en-GB"/>
           </a:p>
@@ -10621,7 +10831,7 @@
           <a:p>
             <a:fld id="{202E1EC2-47B8-044B-A09E-6A63B4D80C87}" type="datetime1">
               <a:rPr lang="fi-FI" smtClean="0"/>
-              <a:t>14.11.2023</a:t>
+              <a:t>15.4.2025</a:t>
             </a:fld>
             <a:endParaRPr lang="en-GB"/>
           </a:p>
@@ -10896,7 +11106,7 @@
             </a:r>
             <a:r>
               <a:rPr lang="en-US" dirty="0"/>
-              <a:t> attribute or so (in React, react-rendered)  vs.   </a:t>
+              <a:t> property or so (in React, react-rendered)  vs.   </a:t>
             </a:r>
             <a:r>
               <a:rPr lang="en-US" b="1" dirty="0"/>
@@ -10978,7 +11188,7 @@
           <a:p>
             <a:fld id="{202E1EC2-47B8-044B-A09E-6A63B4D80C87}" type="datetime1">
               <a:rPr lang="fi-FI" smtClean="0"/>
-              <a:t>14.11.2023</a:t>
+              <a:t>15.4.2025</a:t>
             </a:fld>
             <a:endParaRPr lang="en-GB"/>
           </a:p>
@@ -11348,7 +11558,7 @@
           <a:p>
             <a:fld id="{202E1EC2-47B8-044B-A09E-6A63B4D80C87}" type="datetime1">
               <a:rPr lang="fi-FI" smtClean="0"/>
-              <a:t>14.11.2023</a:t>
+              <a:t>15.4.2025</a:t>
             </a:fld>
             <a:endParaRPr lang="en-GB" dirty="0"/>
           </a:p>
@@ -11661,7 +11871,7 @@
           <a:p>
             <a:fld id="{202E1EC2-47B8-044B-A09E-6A63B4D80C87}" type="datetime1">
               <a:rPr lang="fi-FI" smtClean="0"/>
-              <a:t>14.11.2023</a:t>
+              <a:t>15.4.2025</a:t>
             </a:fld>
             <a:endParaRPr lang="en-GB"/>
           </a:p>
@@ -12662,11 +12872,35 @@
             </a:r>
             <a:r>
               <a:rPr lang="fi-FI" i="1" dirty="0" err="1"/>
+              <a:t>state</a:t>
+            </a:r>
+            <a:r>
+              <a:rPr lang="fi-FI" i="1" dirty="0"/>
+              <a:t> </a:t>
+            </a:r>
+            <a:r>
+              <a:rPr lang="fi-FI" i="1" dirty="0" err="1"/>
+              <a:t>fragment</a:t>
+            </a:r>
+            <a:r>
+              <a:rPr lang="fi-FI" i="1" dirty="0"/>
+              <a:t> </a:t>
+            </a:r>
+            <a:r>
+              <a:rPr lang="fi-FI" i="1" dirty="0" err="1"/>
+              <a:t>with</a:t>
+            </a:r>
+            <a:r>
+              <a:rPr lang="fi-FI" i="1" dirty="0"/>
+              <a:t> </a:t>
+            </a:r>
+            <a:r>
+              <a:rPr lang="fi-FI" i="1" dirty="0" err="1"/>
               <a:t>value</a:t>
             </a:r>
             <a:r>
               <a:rPr lang="fi-FI" i="1" dirty="0"/>
-              <a:t> 7 and </a:t>
+              <a:t> 7 inside, and </a:t>
             </a:r>
             <a:r>
               <a:rPr lang="fi-FI" i="1" dirty="0" err="1"/>
@@ -12693,10 +12927,10 @@
               <a:t> as an </a:t>
             </a:r>
             <a:r>
-              <a:rPr lang="fi-FI" i="1" dirty="0" err="1"/>
+              <a:rPr lang="fi-FI" b="1" i="1" dirty="0" err="1"/>
               <a:t>array</a:t>
             </a:r>
-            <a:endParaRPr lang="fi-FI" i="1" dirty="0"/>
+            <a:endParaRPr lang="fi-FI" b="1" i="1" dirty="0"/>
           </a:p>
           <a:p>
             <a:pPr lvl="1"/>
@@ -12725,6 +12959,14 @@
               <a:t> </a:t>
             </a:r>
             <a:r>
+              <a:rPr lang="fi-FI" b="1" i="1" dirty="0" err="1"/>
+              <a:t>array</a:t>
+            </a:r>
+            <a:r>
+              <a:rPr lang="fi-FI" i="1" dirty="0"/>
+              <a:t> </a:t>
+            </a:r>
+            <a:r>
               <a:rPr lang="fi-FI" i="1" dirty="0" err="1"/>
               <a:t>destructuring</a:t>
             </a:r>
@@ -12836,7 +13078,7 @@
           <a:p>
             <a:fld id="{202E1EC2-47B8-044B-A09E-6A63B4D80C87}" type="datetime1">
               <a:rPr lang="fi-FI" smtClean="0"/>
-              <a:t>14.11.2023</a:t>
+              <a:t>15.4.2025</a:t>
             </a:fld>
             <a:endParaRPr lang="en-GB"/>
           </a:p>
@@ -13147,7 +13389,7 @@
           <a:p>
             <a:fld id="{202E1EC2-47B8-044B-A09E-6A63B4D80C87}" type="datetime1">
               <a:rPr lang="fi-FI" smtClean="0"/>
-              <a:t>14.11.2023</a:t>
+              <a:t>15.4.2025</a:t>
             </a:fld>
             <a:endParaRPr lang="en-GB"/>
           </a:p>
@@ -13442,7 +13684,7 @@
             </a:r>
             <a:r>
               <a:rPr lang="en-US" dirty="0"/>
-              <a:t> is an inner function of the component function. </a:t>
+              <a:t> is called inside of the component function. </a:t>
             </a:r>
           </a:p>
           <a:p>
@@ -13453,7 +13695,18 @@
             </a:r>
             <a:r>
               <a:rPr lang="en-US" dirty="0"/>
-              <a:t> has replaced the old React component life-cycle event handlers (Where you could 'attach' your event-handler functions). inner function = function defined inside the component function. Then the visibility of the function is inside the outer function, inside that component.</a:t>
+              <a:t> has replaced the old React component life-cycle event handlers (Where you could 'attach' your event-handler functions).</a:t>
+            </a:r>
+          </a:p>
+          <a:p>
+            <a:pPr lvl="1"/>
+            <a:r>
+              <a:rPr lang="en-US" dirty="0" err="1"/>
+              <a:t>useEffect</a:t>
+            </a:r>
+            <a:r>
+              <a:rPr lang="en-US" dirty="0"/>
+              <a:t>(s) are always called at component creation, but they just attach some code to possibly be run later, triggered by component mount and e.g. subsequent updates to defined parts of the state.</a:t>
             </a:r>
           </a:p>
         </p:txBody>
@@ -13481,7 +13734,7 @@
           <a:p>
             <a:fld id="{202E1EC2-47B8-044B-A09E-6A63B4D80C87}" type="datetime1">
               <a:rPr lang="fi-FI" smtClean="0"/>
-              <a:t>14.11.2023</a:t>
+              <a:t>15.4.2025</a:t>
             </a:fld>
             <a:endParaRPr lang="en-GB"/>
           </a:p>
@@ -13741,7 +13994,7 @@
           <a:p>
             <a:fld id="{202E1EC2-47B8-044B-A09E-6A63B4D80C87}" type="datetime1">
               <a:rPr lang="fi-FI" smtClean="0"/>
-              <a:t>14.11.2023</a:t>
+              <a:t>15.4.2025</a:t>
             </a:fld>
             <a:endParaRPr lang="en-GB"/>
           </a:p>
@@ -14371,21 +14624,21 @@
 </file>
 
 <file path=customXml/item1.xml><?xml version="1.0" encoding="utf-8"?>
+<p:properties xmlns:p="http://schemas.microsoft.com/office/2006/metadata/properties" xmlns:xsi="http://www.w3.org/2001/XMLSchema-instance" xmlns:pc="http://schemas.microsoft.com/office/infopath/2007/PartnerControls">
+  <documentManagement>
+    <PublishingExpirationDate xmlns="http://schemas.microsoft.com/sharepoint/v3" xsi:nil="true"/>
+    <PublishingStartDate xmlns="http://schemas.microsoft.com/sharepoint/v3" xsi:nil="true"/>
+  </documentManagement>
+</p:properties>
+</file>
+
+<file path=customXml/item2.xml><?xml version="1.0" encoding="utf-8"?>
 <?mso-contentType ?>
 <FormTemplates xmlns="http://schemas.microsoft.com/sharepoint/v3/contenttype/forms">
   <Display>DocumentLibraryForm</Display>
   <Edit>DocumentLibraryForm</Edit>
   <New>DocumentLibraryForm</New>
 </FormTemplates>
-</file>
-
-<file path=customXml/item2.xml><?xml version="1.0" encoding="utf-8"?>
-<p:properties xmlns:p="http://schemas.microsoft.com/office/2006/metadata/properties" xmlns:xsi="http://www.w3.org/2001/XMLSchema-instance" xmlns:pc="http://schemas.microsoft.com/office/infopath/2007/PartnerControls">
-  <documentManagement>
-    <PublishingExpirationDate xmlns="http://schemas.microsoft.com/sharepoint/v3" xsi:nil="true"/>
-    <PublishingStartDate xmlns="http://schemas.microsoft.com/sharepoint/v3" xsi:nil="true"/>
-  </documentManagement>
-</p:properties>
 </file>
 
 <file path=customXml/item3.xml><?xml version="1.0" encoding="utf-8"?>
@@ -14521,14 +14774,6 @@
 </file>
 
 <file path=customXml/itemProps1.xml><?xml version="1.0" encoding="utf-8"?>
-<ds:datastoreItem xmlns:ds="http://schemas.openxmlformats.org/officeDocument/2006/customXml" ds:itemID="{D546C03B-CD3A-4EA0-AAA4-0E00E896454E}">
-  <ds:schemaRefs>
-    <ds:schemaRef ds:uri="http://schemas.microsoft.com/sharepoint/v3/contenttype/forms"/>
-  </ds:schemaRefs>
-</ds:datastoreItem>
-</file>
-
-<file path=customXml/itemProps2.xml><?xml version="1.0" encoding="utf-8"?>
 <ds:datastoreItem xmlns:ds="http://schemas.openxmlformats.org/officeDocument/2006/customXml" ds:itemID="{DED4E12E-7268-4B03-A47B-0755D62B5E31}">
   <ds:schemaRefs>
     <ds:schemaRef ds:uri="http://schemas.microsoft.com/sharepoint/v3"/>
@@ -14540,6 +14785,14 @@
     <ds:schemaRef ds:uri="http://schemas.microsoft.com/office/infopath/2007/PartnerControls"/>
     <ds:schemaRef ds:uri="http://schemas.openxmlformats.org/package/2006/metadata/core-properties"/>
     <ds:schemaRef ds:uri="http://www.w3.org/XML/1998/namespace"/>
+  </ds:schemaRefs>
+</ds:datastoreItem>
+</file>
+
+<file path=customXml/itemProps2.xml><?xml version="1.0" encoding="utf-8"?>
+<ds:datastoreItem xmlns:ds="http://schemas.openxmlformats.org/officeDocument/2006/customXml" ds:itemID="{D546C03B-CD3A-4EA0-AAA4-0E00E896454E}">
+  <ds:schemaRefs>
+    <ds:schemaRef ds:uri="http://schemas.microsoft.com/sharepoint/v3/contenttype/forms"/>
   </ds:schemaRefs>
 </ds:datastoreItem>
 </file>

</xml_diff>